<commit_message>
Cominezo del coeficiente de clustering
</commit_message>
<xml_diff>
--- a/images/paraEsquemasYFiguras.pptx
+++ b/images/paraEsquemasYFiguras.pptx
@@ -6,10 +6,6 @@
   </p:sldMasterIdLst>
   <p:sldIdLst>
     <p:sldId id="256" r:id="rId2"/>
-    <p:sldId id="257" r:id="rId3"/>
-    <p:sldId id="258" r:id="rId4"/>
-    <p:sldId id="259" r:id="rId5"/>
-    <p:sldId id="260" r:id="rId6"/>
   </p:sldIdLst>
   <p:sldSz cx="9144000" cy="6858000" type="screen4x3"/>
   <p:notesSz cx="6858000" cy="9144000"/>
@@ -292,7 +288,7 @@
           <a:p>
             <a:fld id="{D7E2043C-A4E6-B74E-9C07-871FC106E480}" type="datetimeFigureOut">
               <a:rPr lang="es-ES" smtClean="0"/>
-              <a:t>09/11/13</a:t>
+              <a:t>06/10/14</a:t>
             </a:fld>
             <a:endParaRPr lang="es-ES"/>
           </a:p>
@@ -462,7 +458,7 @@
           <a:p>
             <a:fld id="{D7E2043C-A4E6-B74E-9C07-871FC106E480}" type="datetimeFigureOut">
               <a:rPr lang="es-ES" smtClean="0"/>
-              <a:t>09/11/13</a:t>
+              <a:t>06/10/14</a:t>
             </a:fld>
             <a:endParaRPr lang="es-ES"/>
           </a:p>
@@ -642,7 +638,7 @@
           <a:p>
             <a:fld id="{D7E2043C-A4E6-B74E-9C07-871FC106E480}" type="datetimeFigureOut">
               <a:rPr lang="es-ES" smtClean="0"/>
-              <a:t>09/11/13</a:t>
+              <a:t>06/10/14</a:t>
             </a:fld>
             <a:endParaRPr lang="es-ES"/>
           </a:p>
@@ -812,7 +808,7 @@
           <a:p>
             <a:fld id="{D7E2043C-A4E6-B74E-9C07-871FC106E480}" type="datetimeFigureOut">
               <a:rPr lang="es-ES" smtClean="0"/>
-              <a:t>09/11/13</a:t>
+              <a:t>06/10/14</a:t>
             </a:fld>
             <a:endParaRPr lang="es-ES"/>
           </a:p>
@@ -1058,7 +1054,7 @@
           <a:p>
             <a:fld id="{D7E2043C-A4E6-B74E-9C07-871FC106E480}" type="datetimeFigureOut">
               <a:rPr lang="es-ES" smtClean="0"/>
-              <a:t>09/11/13</a:t>
+              <a:t>06/10/14</a:t>
             </a:fld>
             <a:endParaRPr lang="es-ES"/>
           </a:p>
@@ -1346,7 +1342,7 @@
           <a:p>
             <a:fld id="{D7E2043C-A4E6-B74E-9C07-871FC106E480}" type="datetimeFigureOut">
               <a:rPr lang="es-ES" smtClean="0"/>
-              <a:t>09/11/13</a:t>
+              <a:t>06/10/14</a:t>
             </a:fld>
             <a:endParaRPr lang="es-ES"/>
           </a:p>
@@ -1768,7 +1764,7 @@
           <a:p>
             <a:fld id="{D7E2043C-A4E6-B74E-9C07-871FC106E480}" type="datetimeFigureOut">
               <a:rPr lang="es-ES" smtClean="0"/>
-              <a:t>09/11/13</a:t>
+              <a:t>06/10/14</a:t>
             </a:fld>
             <a:endParaRPr lang="es-ES"/>
           </a:p>
@@ -1886,7 +1882,7 @@
           <a:p>
             <a:fld id="{D7E2043C-A4E6-B74E-9C07-871FC106E480}" type="datetimeFigureOut">
               <a:rPr lang="es-ES" smtClean="0"/>
-              <a:t>09/11/13</a:t>
+              <a:t>06/10/14</a:t>
             </a:fld>
             <a:endParaRPr lang="es-ES"/>
           </a:p>
@@ -1981,7 +1977,7 @@
           <a:p>
             <a:fld id="{D7E2043C-A4E6-B74E-9C07-871FC106E480}" type="datetimeFigureOut">
               <a:rPr lang="es-ES" smtClean="0"/>
-              <a:t>09/11/13</a:t>
+              <a:t>06/10/14</a:t>
             </a:fld>
             <a:endParaRPr lang="es-ES"/>
           </a:p>
@@ -2258,7 +2254,7 @@
           <a:p>
             <a:fld id="{D7E2043C-A4E6-B74E-9C07-871FC106E480}" type="datetimeFigureOut">
               <a:rPr lang="es-ES" smtClean="0"/>
-              <a:t>09/11/13</a:t>
+              <a:t>06/10/14</a:t>
             </a:fld>
             <a:endParaRPr lang="es-ES"/>
           </a:p>
@@ -2511,7 +2507,7 @@
           <a:p>
             <a:fld id="{D7E2043C-A4E6-B74E-9C07-871FC106E480}" type="datetimeFigureOut">
               <a:rPr lang="es-ES" smtClean="0"/>
-              <a:t>09/11/13</a:t>
+              <a:t>06/10/14</a:t>
             </a:fld>
             <a:endParaRPr lang="es-ES"/>
           </a:p>
@@ -2724,7 +2720,7 @@
           <a:p>
             <a:fld id="{D7E2043C-A4E6-B74E-9C07-871FC106E480}" type="datetimeFigureOut">
               <a:rPr lang="es-ES" smtClean="0"/>
-              <a:t>09/11/13</a:t>
+              <a:t>06/10/14</a:t>
             </a:fld>
             <a:endParaRPr lang="es-ES"/>
           </a:p>
@@ -3099,2131 +3095,70 @@
           <a:chExt cx="0" cy="0"/>
         </a:xfrm>
       </p:grpSpPr>
-      <p:sp>
-        <p:nvSpPr>
-          <p:cNvPr id="4" name="Pentágono 3"/>
-          <p:cNvSpPr/>
+      <p:pic>
+        <p:nvPicPr>
+          <p:cNvPr id="4" name="Imagen 3" descr="gradoMedio_N_log.png"/>
+          <p:cNvPicPr>
+            <a:picLocks noChangeAspect="1"/>
+          </p:cNvPicPr>
           <p:nvPr/>
-        </p:nvSpPr>
+        </p:nvPicPr>
+        <p:blipFill>
+          <a:blip r:embed="rId2">
+            <a:extLst>
+              <a:ext uri="{28A0092B-C50C-407E-A947-70E740481C1C}">
+                <a14:useLocalDpi xmlns:a14="http://schemas.microsoft.com/office/drawing/2010/main" val="0"/>
+              </a:ext>
+            </a:extLst>
+          </a:blip>
+          <a:stretch>
+            <a:fillRect/>
+          </a:stretch>
+        </p:blipFill>
         <p:spPr>
-          <a:xfrm rot="5400000">
-            <a:off x="4458951" y="-16860"/>
-            <a:ext cx="1076820" cy="2015687"/>
+          <a:xfrm>
+            <a:off x="5056425" y="3178803"/>
+            <a:ext cx="3054923" cy="1868373"/>
           </a:xfrm>
-          <a:prstGeom prst="homePlate">
+          <a:prstGeom prst="rect">
             <a:avLst/>
           </a:prstGeom>
-          <a:noFill/>
-          <a:ln>
-            <a:solidFill>
-              <a:schemeClr val="tx1"/>
-            </a:solidFill>
-          </a:ln>
-          <a:effectLst/>
         </p:spPr>
-        <p:style>
-          <a:lnRef idx="1">
-            <a:schemeClr val="accent1"/>
-          </a:lnRef>
-          <a:fillRef idx="3">
-            <a:schemeClr val="accent1"/>
-          </a:fillRef>
-          <a:effectRef idx="2">
-            <a:schemeClr val="accent1"/>
-          </a:effectRef>
-          <a:fontRef idx="minor">
-            <a:schemeClr val="lt1"/>
-          </a:fontRef>
-        </p:style>
-        <p:txBody>
-          <a:bodyPr vert="vert270" wrap="square" rtlCol="0" anchor="ctr"/>
-          <a:lstStyle/>
-          <a:p>
-            <a:pPr algn="ctr"/>
-            <a:r>
-              <a:rPr lang="es-ES" dirty="0" smtClean="0">
-                <a:solidFill>
-                  <a:schemeClr val="tx1"/>
-                </a:solidFill>
-              </a:rPr>
-              <a:t>Conocer al usuario</a:t>
-            </a:r>
-            <a:endParaRPr lang="es-ES" dirty="0">
-              <a:solidFill>
-                <a:schemeClr val="tx1"/>
-              </a:solidFill>
-            </a:endParaRPr>
-          </a:p>
-        </p:txBody>
-      </p:sp>
-      <p:sp>
-        <p:nvSpPr>
-          <p:cNvPr id="20" name="Pentágono 19"/>
-          <p:cNvSpPr/>
+      </p:pic>
+      <p:pic>
+        <p:nvPicPr>
+          <p:cNvPr id="5" name="Imagen 4" descr="gradoMedio_N_normal.png"/>
+          <p:cNvPicPr>
+            <a:picLocks noChangeAspect="1"/>
+          </p:cNvPicPr>
           <p:nvPr/>
-        </p:nvSpPr>
+        </p:nvPicPr>
+        <p:blipFill>
+          <a:blip r:embed="rId3">
+            <a:extLst>
+              <a:ext uri="{28A0092B-C50C-407E-A947-70E740481C1C}">
+                <a14:useLocalDpi xmlns:a14="http://schemas.microsoft.com/office/drawing/2010/main" val="0"/>
+              </a:ext>
+            </a:extLst>
+          </a:blip>
+          <a:stretch>
+            <a:fillRect/>
+          </a:stretch>
+        </p:blipFill>
         <p:spPr>
-          <a:xfrm rot="5400000">
-            <a:off x="3251877" y="929514"/>
-            <a:ext cx="3490968" cy="4948887"/>
+          <a:xfrm>
+            <a:off x="1922863" y="3020636"/>
+            <a:ext cx="3062825" cy="2077057"/>
           </a:xfrm>
-          <a:prstGeom prst="homePlate">
+          <a:prstGeom prst="rect">
             <a:avLst/>
           </a:prstGeom>
-          <a:noFill/>
-          <a:ln>
-            <a:solidFill>
-              <a:schemeClr val="tx1"/>
-            </a:solidFill>
-          </a:ln>
-          <a:effectLst/>
         </p:spPr>
-        <p:style>
-          <a:lnRef idx="1">
-            <a:schemeClr val="accent1"/>
-          </a:lnRef>
-          <a:fillRef idx="3">
-            <a:schemeClr val="accent1"/>
-          </a:fillRef>
-          <a:effectRef idx="2">
-            <a:schemeClr val="accent1"/>
-          </a:effectRef>
-          <a:fontRef idx="minor">
-            <a:schemeClr val="lt1"/>
-          </a:fontRef>
-        </p:style>
-        <p:txBody>
-          <a:bodyPr vert="vert270" wrap="square" rtlCol="0" anchor="t" anchorCtr="0"/>
-          <a:lstStyle/>
-          <a:p>
-            <a:pPr algn="ctr"/>
-            <a:r>
-              <a:rPr lang="es-ES" dirty="0" smtClean="0">
-                <a:solidFill>
-                  <a:schemeClr val="tx1"/>
-                </a:solidFill>
-              </a:rPr>
-              <a:t>Diseño iterativo</a:t>
-            </a:r>
-            <a:endParaRPr lang="es-ES" dirty="0">
-              <a:solidFill>
-                <a:schemeClr val="tx1"/>
-              </a:solidFill>
-            </a:endParaRPr>
-          </a:p>
-        </p:txBody>
-      </p:sp>
-      <p:sp>
-        <p:nvSpPr>
-          <p:cNvPr id="21" name="Rectángulo redondeado 20"/>
-          <p:cNvSpPr/>
-          <p:nvPr/>
-        </p:nvSpPr>
-        <p:spPr>
-          <a:xfrm>
-            <a:off x="3568559" y="5283912"/>
-            <a:ext cx="2857608" cy="621258"/>
-          </a:xfrm>
-          <a:prstGeom prst="roundRect">
-            <a:avLst/>
-          </a:prstGeom>
-          <a:solidFill>
-            <a:schemeClr val="bg1"/>
-          </a:solidFill>
-          <a:ln>
-            <a:solidFill>
-              <a:schemeClr val="tx1"/>
-            </a:solidFill>
-          </a:ln>
-          <a:effectLst/>
-        </p:spPr>
-        <p:style>
-          <a:lnRef idx="1">
-            <a:schemeClr val="accent1"/>
-          </a:lnRef>
-          <a:fillRef idx="3">
-            <a:schemeClr val="accent1"/>
-          </a:fillRef>
-          <a:effectRef idx="2">
-            <a:schemeClr val="accent1"/>
-          </a:effectRef>
-          <a:fontRef idx="minor">
-            <a:schemeClr val="lt1"/>
-          </a:fontRef>
-        </p:style>
-        <p:txBody>
-          <a:bodyPr rtlCol="0" anchor="ctr"/>
-          <a:lstStyle/>
-          <a:p>
-            <a:pPr algn="ctr"/>
-            <a:r>
-              <a:rPr lang="es-ES" dirty="0" smtClean="0">
-                <a:solidFill>
-                  <a:schemeClr val="tx1"/>
-                </a:solidFill>
-              </a:rPr>
-              <a:t>Estudios de seguimiento</a:t>
-            </a:r>
-            <a:endParaRPr lang="es-ES" dirty="0">
-              <a:solidFill>
-                <a:schemeClr val="tx1"/>
-              </a:solidFill>
-            </a:endParaRPr>
-          </a:p>
-        </p:txBody>
-      </p:sp>
-      <p:grpSp>
-        <p:nvGrpSpPr>
-          <p:cNvPr id="2" name="Agrupar 1"/>
-          <p:cNvGrpSpPr/>
-          <p:nvPr/>
-        </p:nvGrpSpPr>
-        <p:grpSpPr>
-          <a:xfrm>
-            <a:off x="3608519" y="2165776"/>
-            <a:ext cx="2884571" cy="2022528"/>
-            <a:chOff x="3608519" y="2165776"/>
-            <a:chExt cx="2884571" cy="2022528"/>
-          </a:xfrm>
-        </p:grpSpPr>
-        <p:cxnSp>
-          <p:nvCxnSpPr>
-            <p:cNvPr id="7" name="Conector recto 6"/>
-            <p:cNvCxnSpPr/>
-            <p:nvPr/>
-          </p:nvCxnSpPr>
-          <p:spPr>
-            <a:xfrm flipH="1">
-              <a:off x="5011168" y="2524727"/>
-              <a:ext cx="13806" cy="745509"/>
-            </a:xfrm>
-            <a:prstGeom prst="line">
-              <a:avLst/>
-            </a:prstGeom>
-            <a:ln>
-              <a:solidFill>
-                <a:schemeClr val="tx1"/>
-              </a:solidFill>
-            </a:ln>
-            <a:effectLst/>
-          </p:spPr>
-          <p:style>
-            <a:lnRef idx="2">
-              <a:schemeClr val="accent1"/>
-            </a:lnRef>
-            <a:fillRef idx="0">
-              <a:schemeClr val="accent1"/>
-            </a:fillRef>
-            <a:effectRef idx="1">
-              <a:schemeClr val="accent1"/>
-            </a:effectRef>
-            <a:fontRef idx="minor">
-              <a:schemeClr val="tx1"/>
-            </a:fontRef>
-          </p:style>
-        </p:cxnSp>
-        <p:cxnSp>
-          <p:nvCxnSpPr>
-            <p:cNvPr id="8" name="Conector recto 7"/>
-            <p:cNvCxnSpPr/>
-            <p:nvPr/>
-          </p:nvCxnSpPr>
-          <p:spPr>
-            <a:xfrm>
-              <a:off x="4997363" y="3270236"/>
-              <a:ext cx="828293" cy="524619"/>
-            </a:xfrm>
-            <a:prstGeom prst="line">
-              <a:avLst/>
-            </a:prstGeom>
-            <a:ln>
-              <a:solidFill>
-                <a:schemeClr val="tx1"/>
-              </a:solidFill>
-            </a:ln>
-            <a:effectLst/>
-          </p:spPr>
-          <p:style>
-            <a:lnRef idx="2">
-              <a:schemeClr val="accent1"/>
-            </a:lnRef>
-            <a:fillRef idx="0">
-              <a:schemeClr val="accent1"/>
-            </a:fillRef>
-            <a:effectRef idx="1">
-              <a:schemeClr val="accent1"/>
-            </a:effectRef>
-            <a:fontRef idx="minor">
-              <a:schemeClr val="tx1"/>
-            </a:fontRef>
-          </p:style>
-        </p:cxnSp>
-        <p:cxnSp>
-          <p:nvCxnSpPr>
-            <p:cNvPr id="9" name="Conector recto 8"/>
-            <p:cNvCxnSpPr/>
-            <p:nvPr/>
-          </p:nvCxnSpPr>
-          <p:spPr>
-            <a:xfrm flipH="1">
-              <a:off x="4196681" y="3270236"/>
-              <a:ext cx="828293" cy="566036"/>
-            </a:xfrm>
-            <a:prstGeom prst="line">
-              <a:avLst/>
-            </a:prstGeom>
-            <a:ln>
-              <a:solidFill>
-                <a:schemeClr val="tx1"/>
-              </a:solidFill>
-            </a:ln>
-            <a:effectLst/>
-          </p:spPr>
-          <p:style>
-            <a:lnRef idx="2">
-              <a:schemeClr val="accent1"/>
-            </a:lnRef>
-            <a:fillRef idx="0">
-              <a:schemeClr val="accent1"/>
-            </a:fillRef>
-            <a:effectRef idx="1">
-              <a:schemeClr val="accent1"/>
-            </a:effectRef>
-            <a:fontRef idx="minor">
-              <a:schemeClr val="tx1"/>
-            </a:fontRef>
-          </p:style>
-        </p:cxnSp>
-        <p:sp>
-          <p:nvSpPr>
-            <p:cNvPr id="14" name="CuadroTexto 13"/>
-            <p:cNvSpPr txBox="1"/>
-            <p:nvPr/>
-          </p:nvSpPr>
-          <p:spPr>
-            <a:xfrm>
-              <a:off x="4576417" y="2165776"/>
-              <a:ext cx="952692" cy="369332"/>
-            </a:xfrm>
-            <a:prstGeom prst="rect">
-              <a:avLst/>
-            </a:prstGeom>
-            <a:noFill/>
-          </p:spPr>
-          <p:txBody>
-            <a:bodyPr wrap="none" rtlCol="0">
-              <a:spAutoFit/>
-            </a:bodyPr>
-            <a:lstStyle/>
-            <a:p>
-              <a:r>
-                <a:rPr lang="es-ES" i="1" dirty="0" smtClean="0"/>
-                <a:t>Diseñar</a:t>
-              </a:r>
-              <a:endParaRPr lang="es-ES" i="1" dirty="0"/>
-            </a:p>
-          </p:txBody>
-        </p:sp>
-        <p:sp>
-          <p:nvSpPr>
-            <p:cNvPr id="18" name="CuadroTexto 17"/>
-            <p:cNvSpPr txBox="1"/>
-            <p:nvPr/>
-          </p:nvSpPr>
-          <p:spPr>
-            <a:xfrm>
-              <a:off x="5294237" y="3818972"/>
-              <a:ext cx="1198853" cy="369332"/>
-            </a:xfrm>
-            <a:prstGeom prst="rect">
-              <a:avLst/>
-            </a:prstGeom>
-            <a:noFill/>
-          </p:spPr>
-          <p:txBody>
-            <a:bodyPr wrap="none" rtlCol="0">
-              <a:spAutoFit/>
-            </a:bodyPr>
-            <a:lstStyle/>
-            <a:p>
-              <a:r>
-                <a:rPr lang="es-ES" i="1" dirty="0" err="1" smtClean="0"/>
-                <a:t>Prototipar</a:t>
-              </a:r>
-              <a:endParaRPr lang="es-ES" i="1" dirty="0"/>
-            </a:p>
-          </p:txBody>
-        </p:sp>
-        <p:sp>
-          <p:nvSpPr>
-            <p:cNvPr id="19" name="CuadroTexto 18"/>
-            <p:cNvSpPr txBox="1"/>
-            <p:nvPr/>
-          </p:nvSpPr>
-          <p:spPr>
-            <a:xfrm>
-              <a:off x="3608519" y="3807630"/>
-              <a:ext cx="944915" cy="369332"/>
-            </a:xfrm>
-            <a:prstGeom prst="rect">
-              <a:avLst/>
-            </a:prstGeom>
-            <a:noFill/>
-          </p:spPr>
-          <p:txBody>
-            <a:bodyPr wrap="none" rtlCol="0">
-              <a:spAutoFit/>
-            </a:bodyPr>
-            <a:lstStyle/>
-            <a:p>
-              <a:r>
-                <a:rPr lang="es-ES" i="1" dirty="0" smtClean="0"/>
-                <a:t>Evaluar</a:t>
-              </a:r>
-              <a:endParaRPr lang="es-ES" i="1" dirty="0"/>
-            </a:p>
-          </p:txBody>
-        </p:sp>
-        <p:sp>
-          <p:nvSpPr>
-            <p:cNvPr id="27" name="Forma libre 26"/>
-            <p:cNvSpPr/>
-            <p:nvPr/>
-          </p:nvSpPr>
-          <p:spPr>
-            <a:xfrm>
-              <a:off x="4228354" y="2600170"/>
-              <a:ext cx="1540739" cy="1265990"/>
-            </a:xfrm>
-            <a:custGeom>
-              <a:avLst/>
-              <a:gdLst>
-                <a:gd name="connsiteX0" fmla="*/ 806823 w 1540739"/>
-                <a:gd name="connsiteY0" fmla="*/ 373860 h 1265990"/>
-                <a:gd name="connsiteX1" fmla="*/ 1075765 w 1540739"/>
-                <a:gd name="connsiteY1" fmla="*/ 822096 h 1265990"/>
-                <a:gd name="connsiteX2" fmla="*/ 508000 w 1540739"/>
-                <a:gd name="connsiteY2" fmla="*/ 881860 h 1265990"/>
-                <a:gd name="connsiteX3" fmla="*/ 762000 w 1540739"/>
-                <a:gd name="connsiteY3" fmla="*/ 179625 h 1265990"/>
-                <a:gd name="connsiteX4" fmla="*/ 1344706 w 1540739"/>
-                <a:gd name="connsiteY4" fmla="*/ 1001390 h 1265990"/>
-                <a:gd name="connsiteX5" fmla="*/ 209176 w 1540739"/>
-                <a:gd name="connsiteY5" fmla="*/ 1031272 h 1265990"/>
-                <a:gd name="connsiteX6" fmla="*/ 776941 w 1540739"/>
-                <a:gd name="connsiteY6" fmla="*/ 331 h 1265990"/>
-                <a:gd name="connsiteX7" fmla="*/ 1524000 w 1540739"/>
-                <a:gd name="connsiteY7" fmla="*/ 1150802 h 1265990"/>
-                <a:gd name="connsiteX8" fmla="*/ 0 w 1540739"/>
-                <a:gd name="connsiteY8" fmla="*/ 1225507 h 1265990"/>
-                <a:gd name="connsiteX9" fmla="*/ 0 w 1540739"/>
-                <a:gd name="connsiteY9" fmla="*/ 1225507 h 1265990"/>
-              </a:gdLst>
-              <a:ahLst/>
-              <a:cxnLst>
-                <a:cxn ang="0">
-                  <a:pos x="connsiteX0" y="connsiteY0"/>
-                </a:cxn>
-                <a:cxn ang="0">
-                  <a:pos x="connsiteX1" y="connsiteY1"/>
-                </a:cxn>
-                <a:cxn ang="0">
-                  <a:pos x="connsiteX2" y="connsiteY2"/>
-                </a:cxn>
-                <a:cxn ang="0">
-                  <a:pos x="connsiteX3" y="connsiteY3"/>
-                </a:cxn>
-                <a:cxn ang="0">
-                  <a:pos x="connsiteX4" y="connsiteY4"/>
-                </a:cxn>
-                <a:cxn ang="0">
-                  <a:pos x="connsiteX5" y="connsiteY5"/>
-                </a:cxn>
-                <a:cxn ang="0">
-                  <a:pos x="connsiteX6" y="connsiteY6"/>
-                </a:cxn>
-                <a:cxn ang="0">
-                  <a:pos x="connsiteX7" y="connsiteY7"/>
-                </a:cxn>
-                <a:cxn ang="0">
-                  <a:pos x="connsiteX8" y="connsiteY8"/>
-                </a:cxn>
-                <a:cxn ang="0">
-                  <a:pos x="connsiteX9" y="connsiteY9"/>
-                </a:cxn>
-              </a:cxnLst>
-              <a:rect l="l" t="t" r="r" b="b"/>
-              <a:pathLst>
-                <a:path w="1540739" h="1265990">
-                  <a:moveTo>
-                    <a:pt x="806823" y="373860"/>
-                  </a:moveTo>
-                  <a:cubicBezTo>
-                    <a:pt x="966196" y="555644"/>
-                    <a:pt x="1125569" y="737429"/>
-                    <a:pt x="1075765" y="822096"/>
-                  </a:cubicBezTo>
-                  <a:cubicBezTo>
-                    <a:pt x="1025961" y="906763"/>
-                    <a:pt x="560294" y="988939"/>
-                    <a:pt x="508000" y="881860"/>
-                  </a:cubicBezTo>
-                  <a:cubicBezTo>
-                    <a:pt x="455706" y="774782"/>
-                    <a:pt x="622549" y="159703"/>
-                    <a:pt x="762000" y="179625"/>
-                  </a:cubicBezTo>
-                  <a:cubicBezTo>
-                    <a:pt x="901451" y="199547"/>
-                    <a:pt x="1436843" y="859449"/>
-                    <a:pt x="1344706" y="1001390"/>
-                  </a:cubicBezTo>
-                  <a:cubicBezTo>
-                    <a:pt x="1252569" y="1143331"/>
-                    <a:pt x="303804" y="1198115"/>
-                    <a:pt x="209176" y="1031272"/>
-                  </a:cubicBezTo>
-                  <a:cubicBezTo>
-                    <a:pt x="114548" y="864429"/>
-                    <a:pt x="557804" y="-19591"/>
-                    <a:pt x="776941" y="331"/>
-                  </a:cubicBezTo>
-                  <a:cubicBezTo>
-                    <a:pt x="996078" y="20253"/>
-                    <a:pt x="1653490" y="946606"/>
-                    <a:pt x="1524000" y="1150802"/>
-                  </a:cubicBezTo>
-                  <a:cubicBezTo>
-                    <a:pt x="1394510" y="1354998"/>
-                    <a:pt x="0" y="1225507"/>
-                    <a:pt x="0" y="1225507"/>
-                  </a:cubicBezTo>
-                  <a:lnTo>
-                    <a:pt x="0" y="1225507"/>
-                  </a:lnTo>
-                </a:path>
-              </a:pathLst>
-            </a:custGeom>
-            <a:ln w="38100"/>
-            <a:effectLst/>
-          </p:spPr>
-          <p:style>
-            <a:lnRef idx="2">
-              <a:schemeClr val="accent1"/>
-            </a:lnRef>
-            <a:fillRef idx="0">
-              <a:schemeClr val="accent1"/>
-            </a:fillRef>
-            <a:effectRef idx="1">
-              <a:schemeClr val="accent1"/>
-            </a:effectRef>
-            <a:fontRef idx="minor">
-              <a:schemeClr val="tx1"/>
-            </a:fontRef>
-          </p:style>
-          <p:txBody>
-            <a:bodyPr rtlCol="0" anchor="ctr"/>
-            <a:lstStyle/>
-            <a:p>
-              <a:pPr algn="ctr"/>
-              <a:endParaRPr lang="es-ES"/>
-            </a:p>
-          </p:txBody>
-        </p:sp>
-      </p:grpSp>
+      </p:pic>
     </p:spTree>
     <p:extLst>
       <p:ext uri="{BB962C8B-B14F-4D97-AF65-F5344CB8AC3E}">
-        <p14:creationId xmlns:p14="http://schemas.microsoft.com/office/powerpoint/2010/main" val="3209028892"/>
-      </p:ext>
-    </p:extLst>
-  </p:cSld>
-  <p:clrMapOvr>
-    <a:masterClrMapping/>
-  </p:clrMapOvr>
-</p:sld>
-</file>
-
-<file path=ppt/slides/slide2.xml><?xml version="1.0" encoding="utf-8"?>
-<p:sld xmlns:a="http://schemas.openxmlformats.org/drawingml/2006/main" xmlns:r="http://schemas.openxmlformats.org/officeDocument/2006/relationships" xmlns:p="http://schemas.openxmlformats.org/presentationml/2006/main">
-  <p:cSld>
-    <p:spTree>
-      <p:nvGrpSpPr>
-        <p:cNvPr id="1" name=""/>
-        <p:cNvGrpSpPr/>
-        <p:nvPr/>
-      </p:nvGrpSpPr>
-      <p:grpSpPr>
-        <a:xfrm>
-          <a:off x="0" y="0"/>
-          <a:ext cx="0" cy="0"/>
-          <a:chOff x="0" y="0"/>
-          <a:chExt cx="0" cy="0"/>
-        </a:xfrm>
-      </p:grpSpPr>
-      <p:grpSp>
-        <p:nvGrpSpPr>
-          <p:cNvPr id="6" name="Agrupar 5"/>
-          <p:cNvGrpSpPr/>
-          <p:nvPr/>
-        </p:nvGrpSpPr>
-        <p:grpSpPr>
-          <a:xfrm>
-            <a:off x="762000" y="571500"/>
-            <a:ext cx="7624979" cy="2864970"/>
-            <a:chOff x="762000" y="571500"/>
-            <a:chExt cx="7624979" cy="2864970"/>
-          </a:xfrm>
-        </p:grpSpPr>
-        <p:pic>
-          <p:nvPicPr>
-            <p:cNvPr id="2" name="Imagen 1" descr="lego01.jpg"/>
-            <p:cNvPicPr>
-              <a:picLocks noChangeAspect="1"/>
-            </p:cNvPicPr>
-            <p:nvPr/>
-          </p:nvPicPr>
-          <p:blipFill>
-            <a:blip r:embed="rId2">
-              <a:extLst>
-                <a:ext uri="{28A0092B-C50C-407E-A947-70E740481C1C}">
-                  <a14:useLocalDpi xmlns:a14="http://schemas.microsoft.com/office/drawing/2010/main" val="0"/>
-                </a:ext>
-              </a:extLst>
-            </a:blip>
-            <a:stretch>
-              <a:fillRect/>
-            </a:stretch>
-          </p:blipFill>
-          <p:spPr>
-            <a:xfrm>
-              <a:off x="4567019" y="571500"/>
-              <a:ext cx="3819960" cy="2864970"/>
-            </a:xfrm>
-            <a:prstGeom prst="rect">
-              <a:avLst/>
-            </a:prstGeom>
-          </p:spPr>
-        </p:pic>
-        <p:pic>
-          <p:nvPicPr>
-            <p:cNvPr id="4" name="Imagen 3" descr="lego02.jpg"/>
-            <p:cNvPicPr>
-              <a:picLocks noChangeAspect="1"/>
-            </p:cNvPicPr>
-            <p:nvPr/>
-          </p:nvPicPr>
-          <p:blipFill>
-            <a:blip r:embed="rId3">
-              <a:extLst>
-                <a:ext uri="{28A0092B-C50C-407E-A947-70E740481C1C}">
-                  <a14:useLocalDpi xmlns:a14="http://schemas.microsoft.com/office/drawing/2010/main" val="0"/>
-                </a:ext>
-              </a:extLst>
-            </a:blip>
-            <a:stretch>
-              <a:fillRect/>
-            </a:stretch>
-          </p:blipFill>
-          <p:spPr>
-            <a:xfrm>
-              <a:off x="762000" y="571500"/>
-              <a:ext cx="3819960" cy="2864970"/>
-            </a:xfrm>
-            <a:prstGeom prst="rect">
-              <a:avLst/>
-            </a:prstGeom>
-          </p:spPr>
-        </p:pic>
-        <p:sp>
-          <p:nvSpPr>
-            <p:cNvPr id="5" name="Flecha derecha 4"/>
-            <p:cNvSpPr/>
-            <p:nvPr/>
-          </p:nvSpPr>
-          <p:spPr>
-            <a:xfrm>
-              <a:off x="4141126" y="2413858"/>
-              <a:ext cx="1033309" cy="757289"/>
-            </a:xfrm>
-            <a:prstGeom prst="rightArrow">
-              <a:avLst/>
-            </a:prstGeom>
-            <a:solidFill>
-              <a:schemeClr val="tx1"/>
-            </a:solidFill>
-            <a:ln>
-              <a:solidFill>
-                <a:schemeClr val="tx1"/>
-              </a:solidFill>
-            </a:ln>
-          </p:spPr>
-          <p:style>
-            <a:lnRef idx="1">
-              <a:schemeClr val="accent1"/>
-            </a:lnRef>
-            <a:fillRef idx="3">
-              <a:schemeClr val="accent1"/>
-            </a:fillRef>
-            <a:effectRef idx="2">
-              <a:schemeClr val="accent1"/>
-            </a:effectRef>
-            <a:fontRef idx="minor">
-              <a:schemeClr val="lt1"/>
-            </a:fontRef>
-          </p:style>
-          <p:txBody>
-            <a:bodyPr rtlCol="0" anchor="ctr"/>
-            <a:lstStyle/>
-            <a:p>
-              <a:pPr algn="ctr"/>
-              <a:endParaRPr lang="es-ES"/>
-            </a:p>
-          </p:txBody>
-        </p:sp>
-      </p:grpSp>
-    </p:spTree>
-    <p:extLst>
-      <p:ext uri="{BB962C8B-B14F-4D97-AF65-F5344CB8AC3E}">
-        <p14:creationId xmlns:p14="http://schemas.microsoft.com/office/powerpoint/2010/main" val="3362583967"/>
-      </p:ext>
-    </p:extLst>
-  </p:cSld>
-  <p:clrMapOvr>
-    <a:masterClrMapping/>
-  </p:clrMapOvr>
-</p:sld>
-</file>
-
-<file path=ppt/slides/slide3.xml><?xml version="1.0" encoding="utf-8"?>
-<p:sld xmlns:a="http://schemas.openxmlformats.org/drawingml/2006/main" xmlns:r="http://schemas.openxmlformats.org/officeDocument/2006/relationships" xmlns:p="http://schemas.openxmlformats.org/presentationml/2006/main">
-  <p:cSld>
-    <p:spTree>
-      <p:nvGrpSpPr>
-        <p:cNvPr id="1" name=""/>
-        <p:cNvGrpSpPr/>
-        <p:nvPr/>
-      </p:nvGrpSpPr>
-      <p:grpSpPr>
-        <a:xfrm>
-          <a:off x="0" y="0"/>
-          <a:ext cx="0" cy="0"/>
-          <a:chOff x="0" y="0"/>
-          <a:chExt cx="0" cy="0"/>
-        </a:xfrm>
-      </p:grpSpPr>
-      <p:grpSp>
-        <p:nvGrpSpPr>
-          <p:cNvPr id="19" name="Agrupar 18"/>
-          <p:cNvGrpSpPr/>
-          <p:nvPr/>
-        </p:nvGrpSpPr>
-        <p:grpSpPr>
-          <a:xfrm>
-            <a:off x="2365527" y="1941955"/>
-            <a:ext cx="3919765" cy="992333"/>
-            <a:chOff x="2365527" y="1941955"/>
-            <a:chExt cx="3919765" cy="992333"/>
-          </a:xfrm>
-        </p:grpSpPr>
-        <p:grpSp>
-          <p:nvGrpSpPr>
-            <p:cNvPr id="6" name="Agrupar 5"/>
-            <p:cNvGrpSpPr/>
-            <p:nvPr/>
-          </p:nvGrpSpPr>
-          <p:grpSpPr>
-            <a:xfrm>
-              <a:off x="2365527" y="1941955"/>
-              <a:ext cx="3788434" cy="883504"/>
-              <a:chOff x="2626657" y="2166074"/>
-              <a:chExt cx="3788434" cy="883504"/>
-            </a:xfrm>
-          </p:grpSpPr>
-          <p:sp>
-            <p:nvSpPr>
-              <p:cNvPr id="2" name="Flecha izquierda 1"/>
-              <p:cNvSpPr/>
-              <p:nvPr/>
-            </p:nvSpPr>
-            <p:spPr>
-              <a:xfrm>
-                <a:off x="2626657" y="2166074"/>
-                <a:ext cx="1364601" cy="883504"/>
-              </a:xfrm>
-              <a:prstGeom prst="leftArrow">
-                <a:avLst/>
-              </a:prstGeom>
-              <a:solidFill>
-                <a:srgbClr val="FF0000"/>
-              </a:solidFill>
-              <a:ln>
-                <a:solidFill>
-                  <a:schemeClr val="tx1"/>
-                </a:solidFill>
-              </a:ln>
-              <a:effectLst/>
-            </p:spPr>
-            <p:style>
-              <a:lnRef idx="1">
-                <a:schemeClr val="accent1"/>
-              </a:lnRef>
-              <a:fillRef idx="3">
-                <a:schemeClr val="accent1"/>
-              </a:fillRef>
-              <a:effectRef idx="2">
-                <a:schemeClr val="accent1"/>
-              </a:effectRef>
-              <a:fontRef idx="minor">
-                <a:schemeClr val="lt1"/>
-              </a:fontRef>
-            </p:style>
-            <p:txBody>
-              <a:bodyPr rtlCol="0" anchor="ctr"/>
-              <a:lstStyle/>
-              <a:p>
-                <a:pPr algn="ctr"/>
-                <a:r>
-                  <a:rPr lang="es-ES" sz="1400" dirty="0" smtClean="0">
-                    <a:solidFill>
-                      <a:schemeClr val="tx1"/>
-                    </a:solidFill>
-                    <a:latin typeface="Arial"/>
-                  </a:rPr>
-                  <a:t>Inaceptable</a:t>
-                </a:r>
-                <a:endParaRPr lang="es-ES" sz="1400" dirty="0">
-                  <a:solidFill>
-                    <a:schemeClr val="tx1"/>
-                  </a:solidFill>
-                  <a:latin typeface="Arial"/>
-                </a:endParaRPr>
-              </a:p>
-            </p:txBody>
-          </p:sp>
-          <p:sp>
-            <p:nvSpPr>
-              <p:cNvPr id="3" name="Rectángulo 2"/>
-              <p:cNvSpPr/>
-              <p:nvPr/>
-            </p:nvSpPr>
-            <p:spPr>
-              <a:xfrm>
-                <a:off x="3991258" y="2386310"/>
-                <a:ext cx="803641" cy="439149"/>
-              </a:xfrm>
-              <a:prstGeom prst="rect">
-                <a:avLst/>
-              </a:prstGeom>
-              <a:solidFill>
-                <a:schemeClr val="accent6"/>
-              </a:solidFill>
-              <a:ln>
-                <a:solidFill>
-                  <a:schemeClr val="tx1"/>
-                </a:solidFill>
-              </a:ln>
-              <a:effectLst/>
-            </p:spPr>
-            <p:style>
-              <a:lnRef idx="1">
-                <a:schemeClr val="accent1"/>
-              </a:lnRef>
-              <a:fillRef idx="3">
-                <a:schemeClr val="accent1"/>
-              </a:fillRef>
-              <a:effectRef idx="2">
-                <a:schemeClr val="accent1"/>
-              </a:effectRef>
-              <a:fontRef idx="minor">
-                <a:schemeClr val="lt1"/>
-              </a:fontRef>
-            </p:style>
-            <p:txBody>
-              <a:bodyPr rtlCol="0" anchor="ctr"/>
-              <a:lstStyle/>
-              <a:p>
-                <a:pPr algn="ctr"/>
-                <a:r>
-                  <a:rPr lang="es-ES" sz="1400" dirty="0" smtClean="0">
-                    <a:solidFill>
-                      <a:schemeClr val="tx1"/>
-                    </a:solidFill>
-                    <a:latin typeface="Arial"/>
-                  </a:rPr>
-                  <a:t>Mínimo</a:t>
-                </a:r>
-                <a:endParaRPr lang="es-ES" sz="1400" dirty="0">
-                  <a:solidFill>
-                    <a:schemeClr val="tx1"/>
-                  </a:solidFill>
-                  <a:latin typeface="Arial"/>
-                </a:endParaRPr>
-              </a:p>
-            </p:txBody>
-          </p:sp>
-          <p:sp>
-            <p:nvSpPr>
-              <p:cNvPr id="4" name="Rectángulo 3"/>
-              <p:cNvSpPr/>
-              <p:nvPr/>
-            </p:nvSpPr>
-            <p:spPr>
-              <a:xfrm>
-                <a:off x="4794899" y="2386310"/>
-                <a:ext cx="836803" cy="439149"/>
-              </a:xfrm>
-              <a:prstGeom prst="rect">
-                <a:avLst/>
-              </a:prstGeom>
-              <a:solidFill>
-                <a:srgbClr val="FFFF00"/>
-              </a:solidFill>
-              <a:ln>
-                <a:solidFill>
-                  <a:schemeClr val="tx1"/>
-                </a:solidFill>
-              </a:ln>
-              <a:effectLst/>
-            </p:spPr>
-            <p:style>
-              <a:lnRef idx="1">
-                <a:schemeClr val="accent1"/>
-              </a:lnRef>
-              <a:fillRef idx="3">
-                <a:schemeClr val="accent1"/>
-              </a:fillRef>
-              <a:effectRef idx="2">
-                <a:schemeClr val="accent1"/>
-              </a:effectRef>
-              <a:fontRef idx="minor">
-                <a:schemeClr val="lt1"/>
-              </a:fontRef>
-            </p:style>
-            <p:txBody>
-              <a:bodyPr rtlCol="0" anchor="ctr"/>
-              <a:lstStyle/>
-              <a:p>
-                <a:pPr algn="ctr"/>
-                <a:r>
-                  <a:rPr lang="es-ES" sz="1400" dirty="0" smtClean="0">
-                    <a:solidFill>
-                      <a:schemeClr val="tx1"/>
-                    </a:solidFill>
-                    <a:latin typeface="Arial"/>
-                  </a:rPr>
-                  <a:t>Objetivo</a:t>
-                </a:r>
-                <a:endParaRPr lang="es-ES" sz="1400" dirty="0">
-                  <a:solidFill>
-                    <a:schemeClr val="tx1"/>
-                  </a:solidFill>
-                  <a:latin typeface="Arial"/>
-                </a:endParaRPr>
-              </a:p>
-            </p:txBody>
-          </p:sp>
-          <p:sp>
-            <p:nvSpPr>
-              <p:cNvPr id="5" name="Rectángulo 4"/>
-              <p:cNvSpPr/>
-              <p:nvPr/>
-            </p:nvSpPr>
-            <p:spPr>
-              <a:xfrm>
-                <a:off x="5631702" y="2386310"/>
-                <a:ext cx="783389" cy="439149"/>
-              </a:xfrm>
-              <a:prstGeom prst="rect">
-                <a:avLst/>
-              </a:prstGeom>
-              <a:solidFill>
-                <a:srgbClr val="14FF15"/>
-              </a:solidFill>
-              <a:ln>
-                <a:solidFill>
-                  <a:schemeClr val="tx1"/>
-                </a:solidFill>
-              </a:ln>
-              <a:effectLst/>
-            </p:spPr>
-            <p:style>
-              <a:lnRef idx="1">
-                <a:schemeClr val="accent1"/>
-              </a:lnRef>
-              <a:fillRef idx="3">
-                <a:schemeClr val="accent1"/>
-              </a:fillRef>
-              <a:effectRef idx="2">
-                <a:schemeClr val="accent1"/>
-              </a:effectRef>
-              <a:fontRef idx="minor">
-                <a:schemeClr val="lt1"/>
-              </a:fontRef>
-            </p:style>
-            <p:txBody>
-              <a:bodyPr rtlCol="0" anchor="ctr"/>
-              <a:lstStyle/>
-              <a:p>
-                <a:pPr algn="ctr"/>
-                <a:r>
-                  <a:rPr lang="es-ES" sz="1400" dirty="0" smtClean="0">
-                    <a:solidFill>
-                      <a:schemeClr val="tx1"/>
-                    </a:solidFill>
-                    <a:latin typeface="Arial"/>
-                  </a:rPr>
-                  <a:t>Óptimo</a:t>
-                </a:r>
-                <a:endParaRPr lang="es-ES" sz="1400" dirty="0">
-                  <a:solidFill>
-                    <a:schemeClr val="tx1"/>
-                  </a:solidFill>
-                  <a:latin typeface="Arial"/>
-                </a:endParaRPr>
-              </a:p>
-            </p:txBody>
-          </p:sp>
-        </p:grpSp>
-        <p:sp>
-          <p:nvSpPr>
-            <p:cNvPr id="7" name="CuadroTexto 6"/>
-            <p:cNvSpPr txBox="1"/>
-            <p:nvPr/>
-          </p:nvSpPr>
-          <p:spPr>
-            <a:xfrm>
-              <a:off x="3598797" y="2657289"/>
-              <a:ext cx="262662" cy="276999"/>
-            </a:xfrm>
-            <a:prstGeom prst="rect">
-              <a:avLst/>
-            </a:prstGeom>
-            <a:noFill/>
-          </p:spPr>
-          <p:txBody>
-            <a:bodyPr wrap="none" rtlCol="0">
-              <a:spAutoFit/>
-            </a:bodyPr>
-            <a:lstStyle/>
-            <a:p>
-              <a:r>
-                <a:rPr lang="es-ES" sz="1200" dirty="0" smtClean="0"/>
-                <a:t>5</a:t>
-              </a:r>
-              <a:endParaRPr lang="es-ES" sz="1200" dirty="0"/>
-            </a:p>
-          </p:txBody>
-        </p:sp>
-        <p:sp>
-          <p:nvSpPr>
-            <p:cNvPr id="8" name="CuadroTexto 7"/>
-            <p:cNvSpPr txBox="1"/>
-            <p:nvPr/>
-          </p:nvSpPr>
-          <p:spPr>
-            <a:xfrm>
-              <a:off x="3861459" y="2657289"/>
-              <a:ext cx="379055" cy="276999"/>
-            </a:xfrm>
-            <a:prstGeom prst="rect">
-              <a:avLst/>
-            </a:prstGeom>
-            <a:noFill/>
-          </p:spPr>
-          <p:txBody>
-            <a:bodyPr wrap="none" rtlCol="0">
-              <a:spAutoFit/>
-            </a:bodyPr>
-            <a:lstStyle/>
-            <a:p>
-              <a:r>
-                <a:rPr lang="es-ES" sz="1200" dirty="0" smtClean="0"/>
-                <a:t>4,5</a:t>
-              </a:r>
-              <a:endParaRPr lang="es-ES" sz="1200" dirty="0"/>
-            </a:p>
-          </p:txBody>
-        </p:sp>
-        <p:sp>
-          <p:nvSpPr>
-            <p:cNvPr id="9" name="CuadroTexto 8"/>
-            <p:cNvSpPr txBox="1"/>
-            <p:nvPr/>
-          </p:nvSpPr>
-          <p:spPr>
-            <a:xfrm>
-              <a:off x="4402438" y="2657289"/>
-              <a:ext cx="262662" cy="276999"/>
-            </a:xfrm>
-            <a:prstGeom prst="rect">
-              <a:avLst/>
-            </a:prstGeom>
-            <a:noFill/>
-          </p:spPr>
-          <p:txBody>
-            <a:bodyPr wrap="none" rtlCol="0">
-              <a:spAutoFit/>
-            </a:bodyPr>
-            <a:lstStyle/>
-            <a:p>
-              <a:r>
-                <a:rPr lang="es-ES" sz="1200" dirty="0"/>
-                <a:t>3</a:t>
-              </a:r>
-            </a:p>
-          </p:txBody>
-        </p:sp>
-        <p:sp>
-          <p:nvSpPr>
-            <p:cNvPr id="10" name="CuadroTexto 9"/>
-            <p:cNvSpPr txBox="1"/>
-            <p:nvPr/>
-          </p:nvSpPr>
-          <p:spPr>
-            <a:xfrm>
-              <a:off x="5239241" y="2657289"/>
-              <a:ext cx="262662" cy="276999"/>
-            </a:xfrm>
-            <a:prstGeom prst="rect">
-              <a:avLst/>
-            </a:prstGeom>
-            <a:noFill/>
-          </p:spPr>
-          <p:txBody>
-            <a:bodyPr wrap="none" rtlCol="0">
-              <a:spAutoFit/>
-            </a:bodyPr>
-            <a:lstStyle/>
-            <a:p>
-              <a:r>
-                <a:rPr lang="es-ES" sz="1200" dirty="0"/>
-                <a:t>1</a:t>
-              </a:r>
-            </a:p>
-          </p:txBody>
-        </p:sp>
-        <p:sp>
-          <p:nvSpPr>
-            <p:cNvPr id="11" name="CuadroTexto 10"/>
-            <p:cNvSpPr txBox="1"/>
-            <p:nvPr/>
-          </p:nvSpPr>
-          <p:spPr>
-            <a:xfrm>
-              <a:off x="6022630" y="2657289"/>
-              <a:ext cx="262662" cy="276999"/>
-            </a:xfrm>
-            <a:prstGeom prst="rect">
-              <a:avLst/>
-            </a:prstGeom>
-            <a:noFill/>
-          </p:spPr>
-          <p:txBody>
-            <a:bodyPr wrap="none" rtlCol="0">
-              <a:spAutoFit/>
-            </a:bodyPr>
-            <a:lstStyle/>
-            <a:p>
-              <a:r>
-                <a:rPr lang="es-ES" sz="1200" dirty="0"/>
-                <a:t>0</a:t>
-              </a:r>
-            </a:p>
-          </p:txBody>
-        </p:sp>
-        <p:cxnSp>
-          <p:nvCxnSpPr>
-            <p:cNvPr id="13" name="Conector recto 12"/>
-            <p:cNvCxnSpPr/>
-            <p:nvPr/>
-          </p:nvCxnSpPr>
-          <p:spPr>
-            <a:xfrm flipV="1">
-              <a:off x="3730128" y="2607275"/>
-              <a:ext cx="0" cy="122572"/>
-            </a:xfrm>
-            <a:prstGeom prst="line">
-              <a:avLst/>
-            </a:prstGeom>
-            <a:ln>
-              <a:solidFill>
-                <a:schemeClr val="tx1"/>
-              </a:solidFill>
-            </a:ln>
-            <a:effectLst/>
-          </p:spPr>
-          <p:style>
-            <a:lnRef idx="2">
-              <a:schemeClr val="accent1"/>
-            </a:lnRef>
-            <a:fillRef idx="0">
-              <a:schemeClr val="accent1"/>
-            </a:fillRef>
-            <a:effectRef idx="1">
-              <a:schemeClr val="accent1"/>
-            </a:effectRef>
-            <a:fontRef idx="minor">
-              <a:schemeClr val="tx1"/>
-            </a:fontRef>
-          </p:style>
-        </p:cxnSp>
-        <p:cxnSp>
-          <p:nvCxnSpPr>
-            <p:cNvPr id="15" name="Conector recto 14"/>
-            <p:cNvCxnSpPr/>
-            <p:nvPr/>
-          </p:nvCxnSpPr>
-          <p:spPr>
-            <a:xfrm flipV="1">
-              <a:off x="4060571" y="2601340"/>
-              <a:ext cx="0" cy="122572"/>
-            </a:xfrm>
-            <a:prstGeom prst="line">
-              <a:avLst/>
-            </a:prstGeom>
-            <a:ln>
-              <a:solidFill>
-                <a:schemeClr val="tx1"/>
-              </a:solidFill>
-            </a:ln>
-            <a:effectLst/>
-          </p:spPr>
-          <p:style>
-            <a:lnRef idx="2">
-              <a:schemeClr val="accent1"/>
-            </a:lnRef>
-            <a:fillRef idx="0">
-              <a:schemeClr val="accent1"/>
-            </a:fillRef>
-            <a:effectRef idx="1">
-              <a:schemeClr val="accent1"/>
-            </a:effectRef>
-            <a:fontRef idx="minor">
-              <a:schemeClr val="tx1"/>
-            </a:fontRef>
-          </p:style>
-        </p:cxnSp>
-        <p:cxnSp>
-          <p:nvCxnSpPr>
-            <p:cNvPr id="16" name="Conector recto 15"/>
-            <p:cNvCxnSpPr/>
-            <p:nvPr/>
-          </p:nvCxnSpPr>
-          <p:spPr>
-            <a:xfrm flipV="1">
-              <a:off x="4533769" y="2601340"/>
-              <a:ext cx="0" cy="122572"/>
-            </a:xfrm>
-            <a:prstGeom prst="line">
-              <a:avLst/>
-            </a:prstGeom>
-            <a:ln>
-              <a:solidFill>
-                <a:schemeClr val="tx1"/>
-              </a:solidFill>
-            </a:ln>
-            <a:effectLst/>
-          </p:spPr>
-          <p:style>
-            <a:lnRef idx="2">
-              <a:schemeClr val="accent1"/>
-            </a:lnRef>
-            <a:fillRef idx="0">
-              <a:schemeClr val="accent1"/>
-            </a:fillRef>
-            <a:effectRef idx="1">
-              <a:schemeClr val="accent1"/>
-            </a:effectRef>
-            <a:fontRef idx="minor">
-              <a:schemeClr val="tx1"/>
-            </a:fontRef>
-          </p:style>
-        </p:cxnSp>
-        <p:cxnSp>
-          <p:nvCxnSpPr>
-            <p:cNvPr id="17" name="Conector recto 16"/>
-            <p:cNvCxnSpPr/>
-            <p:nvPr/>
-          </p:nvCxnSpPr>
-          <p:spPr>
-            <a:xfrm flipV="1">
-              <a:off x="5370572" y="2601341"/>
-              <a:ext cx="0" cy="122572"/>
-            </a:xfrm>
-            <a:prstGeom prst="line">
-              <a:avLst/>
-            </a:prstGeom>
-            <a:ln>
-              <a:solidFill>
-                <a:schemeClr val="tx1"/>
-              </a:solidFill>
-            </a:ln>
-            <a:effectLst/>
-          </p:spPr>
-          <p:style>
-            <a:lnRef idx="2">
-              <a:schemeClr val="accent1"/>
-            </a:lnRef>
-            <a:fillRef idx="0">
-              <a:schemeClr val="accent1"/>
-            </a:fillRef>
-            <a:effectRef idx="1">
-              <a:schemeClr val="accent1"/>
-            </a:effectRef>
-            <a:fontRef idx="minor">
-              <a:schemeClr val="tx1"/>
-            </a:fontRef>
-          </p:style>
-        </p:cxnSp>
-        <p:cxnSp>
-          <p:nvCxnSpPr>
-            <p:cNvPr id="18" name="Conector recto 17"/>
-            <p:cNvCxnSpPr/>
-            <p:nvPr/>
-          </p:nvCxnSpPr>
-          <p:spPr>
-            <a:xfrm flipV="1">
-              <a:off x="6148026" y="2601341"/>
-              <a:ext cx="0" cy="122572"/>
-            </a:xfrm>
-            <a:prstGeom prst="line">
-              <a:avLst/>
-            </a:prstGeom>
-            <a:ln>
-              <a:solidFill>
-                <a:schemeClr val="tx1"/>
-              </a:solidFill>
-            </a:ln>
-            <a:effectLst/>
-          </p:spPr>
-          <p:style>
-            <a:lnRef idx="2">
-              <a:schemeClr val="accent1"/>
-            </a:lnRef>
-            <a:fillRef idx="0">
-              <a:schemeClr val="accent1"/>
-            </a:fillRef>
-            <a:effectRef idx="1">
-              <a:schemeClr val="accent1"/>
-            </a:effectRef>
-            <a:fontRef idx="minor">
-              <a:schemeClr val="tx1"/>
-            </a:fontRef>
-          </p:style>
-        </p:cxnSp>
-      </p:grpSp>
-    </p:spTree>
-    <p:extLst>
-      <p:ext uri="{BB962C8B-B14F-4D97-AF65-F5344CB8AC3E}">
-        <p14:creationId xmlns:p14="http://schemas.microsoft.com/office/powerpoint/2010/main" val="1496077856"/>
-      </p:ext>
-    </p:extLst>
-  </p:cSld>
-  <p:clrMapOvr>
-    <a:masterClrMapping/>
-  </p:clrMapOvr>
-</p:sld>
-</file>
-
-<file path=ppt/slides/slide4.xml><?xml version="1.0" encoding="utf-8"?>
-<p:sld xmlns:a="http://schemas.openxmlformats.org/drawingml/2006/main" xmlns:r="http://schemas.openxmlformats.org/officeDocument/2006/relationships" xmlns:p="http://schemas.openxmlformats.org/presentationml/2006/main">
-  <p:cSld>
-    <p:spTree>
-      <p:nvGrpSpPr>
-        <p:cNvPr id="1" name=""/>
-        <p:cNvGrpSpPr/>
-        <p:nvPr/>
-      </p:nvGrpSpPr>
-      <p:grpSpPr>
-        <a:xfrm>
-          <a:off x="0" y="0"/>
-          <a:ext cx="0" cy="0"/>
-          <a:chOff x="0" y="0"/>
-          <a:chExt cx="0" cy="0"/>
-        </a:xfrm>
-      </p:grpSpPr>
-      <p:grpSp>
-        <p:nvGrpSpPr>
-          <p:cNvPr id="31" name="Agrupar 30"/>
-          <p:cNvGrpSpPr/>
-          <p:nvPr/>
-        </p:nvGrpSpPr>
-        <p:grpSpPr>
-          <a:xfrm>
-            <a:off x="1766229" y="1515205"/>
-            <a:ext cx="4632925" cy="2064210"/>
-            <a:chOff x="1766229" y="1515205"/>
-            <a:chExt cx="4632925" cy="2064210"/>
-          </a:xfrm>
-        </p:grpSpPr>
-        <p:grpSp>
-          <p:nvGrpSpPr>
-            <p:cNvPr id="6" name="Agrupar 5"/>
-            <p:cNvGrpSpPr/>
-            <p:nvPr/>
-          </p:nvGrpSpPr>
-          <p:grpSpPr>
-            <a:xfrm>
-              <a:off x="2729995" y="1980216"/>
-              <a:ext cx="3008930" cy="1111634"/>
-              <a:chOff x="2729995" y="1980215"/>
-              <a:chExt cx="3459972" cy="1390553"/>
-            </a:xfrm>
-          </p:grpSpPr>
-          <p:sp>
-            <p:nvSpPr>
-              <p:cNvPr id="2" name="Rectángulo 1"/>
-              <p:cNvSpPr/>
-              <p:nvPr/>
-            </p:nvSpPr>
-            <p:spPr>
-              <a:xfrm>
-                <a:off x="2729995" y="1982107"/>
-                <a:ext cx="3459972" cy="1388661"/>
-              </a:xfrm>
-              <a:prstGeom prst="rect">
-                <a:avLst/>
-              </a:prstGeom>
-              <a:solidFill>
-                <a:schemeClr val="bg1"/>
-              </a:solidFill>
-              <a:ln>
-                <a:solidFill>
-                  <a:schemeClr val="tx1"/>
-                </a:solidFill>
-              </a:ln>
-              <a:effectLst/>
-            </p:spPr>
-            <p:style>
-              <a:lnRef idx="1">
-                <a:schemeClr val="accent1"/>
-              </a:lnRef>
-              <a:fillRef idx="3">
-                <a:schemeClr val="accent1"/>
-              </a:fillRef>
-              <a:effectRef idx="2">
-                <a:schemeClr val="accent1"/>
-              </a:effectRef>
-              <a:fontRef idx="minor">
-                <a:schemeClr val="lt1"/>
-              </a:fontRef>
-            </p:style>
-            <p:txBody>
-              <a:bodyPr rtlCol="0" anchor="ctr"/>
-              <a:lstStyle/>
-              <a:p>
-                <a:pPr algn="ctr"/>
-                <a:endParaRPr lang="es-ES"/>
-              </a:p>
-            </p:txBody>
-          </p:sp>
-          <p:sp>
-            <p:nvSpPr>
-              <p:cNvPr id="3" name="Rectángulo 2"/>
-              <p:cNvSpPr/>
-              <p:nvPr/>
-            </p:nvSpPr>
-            <p:spPr>
-              <a:xfrm>
-                <a:off x="2729995" y="1980215"/>
-                <a:ext cx="3459972" cy="292683"/>
-              </a:xfrm>
-              <a:prstGeom prst="rect">
-                <a:avLst/>
-              </a:prstGeom>
-              <a:pattFill prst="wdDnDiag">
-                <a:fgClr>
-                  <a:schemeClr val="tx1"/>
-                </a:fgClr>
-                <a:bgClr>
-                  <a:prstClr val="white"/>
-                </a:bgClr>
-              </a:pattFill>
-              <a:ln>
-                <a:solidFill>
-                  <a:schemeClr val="tx1"/>
-                </a:solidFill>
-              </a:ln>
-              <a:effectLst/>
-            </p:spPr>
-            <p:style>
-              <a:lnRef idx="1">
-                <a:schemeClr val="accent1"/>
-              </a:lnRef>
-              <a:fillRef idx="3">
-                <a:schemeClr val="accent1"/>
-              </a:fillRef>
-              <a:effectRef idx="2">
-                <a:schemeClr val="accent1"/>
-              </a:effectRef>
-              <a:fontRef idx="minor">
-                <a:schemeClr val="lt1"/>
-              </a:fontRef>
-            </p:style>
-            <p:txBody>
-              <a:bodyPr rtlCol="0" anchor="ctr"/>
-              <a:lstStyle/>
-              <a:p>
-                <a:pPr algn="ctr"/>
-                <a:endParaRPr lang="es-ES"/>
-              </a:p>
-            </p:txBody>
-          </p:sp>
-          <p:sp>
-            <p:nvSpPr>
-              <p:cNvPr id="4" name="Rectángulo 3"/>
-              <p:cNvSpPr/>
-              <p:nvPr/>
-            </p:nvSpPr>
-            <p:spPr>
-              <a:xfrm rot="5400000">
-                <a:off x="3413088" y="2528722"/>
-                <a:ext cx="1385914" cy="292683"/>
-              </a:xfrm>
-              <a:prstGeom prst="rect">
-                <a:avLst/>
-              </a:prstGeom>
-              <a:pattFill prst="wdUpDiag">
-                <a:fgClr>
-                  <a:schemeClr val="tx1"/>
-                </a:fgClr>
-                <a:bgClr>
-                  <a:prstClr val="white"/>
-                </a:bgClr>
-              </a:pattFill>
-              <a:ln>
-                <a:solidFill>
-                  <a:schemeClr val="tx1"/>
-                </a:solidFill>
-              </a:ln>
-              <a:effectLst/>
-            </p:spPr>
-            <p:style>
-              <a:lnRef idx="1">
-                <a:schemeClr val="accent1"/>
-              </a:lnRef>
-              <a:fillRef idx="3">
-                <a:schemeClr val="accent1"/>
-              </a:fillRef>
-              <a:effectRef idx="2">
-                <a:schemeClr val="accent1"/>
-              </a:effectRef>
-              <a:fontRef idx="minor">
-                <a:schemeClr val="lt1"/>
-              </a:fontRef>
-            </p:style>
-            <p:txBody>
-              <a:bodyPr rtlCol="0" anchor="ctr"/>
-              <a:lstStyle/>
-              <a:p>
-                <a:pPr algn="ctr"/>
-                <a:endParaRPr lang="es-ES"/>
-              </a:p>
-            </p:txBody>
-          </p:sp>
-          <p:sp>
-            <p:nvSpPr>
-              <p:cNvPr id="5" name="Rectángulo 4"/>
-              <p:cNvSpPr/>
-              <p:nvPr/>
-            </p:nvSpPr>
-            <p:spPr>
-              <a:xfrm rot="5400000">
-                <a:off x="3959825" y="1980216"/>
-                <a:ext cx="292684" cy="292683"/>
-              </a:xfrm>
-              <a:prstGeom prst="rect">
-                <a:avLst/>
-              </a:prstGeom>
-              <a:pattFill prst="openDmnd">
-                <a:fgClr>
-                  <a:schemeClr val="tx1"/>
-                </a:fgClr>
-                <a:bgClr>
-                  <a:prstClr val="white"/>
-                </a:bgClr>
-              </a:pattFill>
-              <a:ln>
-                <a:solidFill>
-                  <a:schemeClr val="tx1"/>
-                </a:solidFill>
-              </a:ln>
-              <a:effectLst/>
-            </p:spPr>
-            <p:style>
-              <a:lnRef idx="1">
-                <a:schemeClr val="accent1"/>
-              </a:lnRef>
-              <a:fillRef idx="3">
-                <a:schemeClr val="accent1"/>
-              </a:fillRef>
-              <a:effectRef idx="2">
-                <a:schemeClr val="accent1"/>
-              </a:effectRef>
-              <a:fontRef idx="minor">
-                <a:schemeClr val="lt1"/>
-              </a:fontRef>
-            </p:style>
-            <p:txBody>
-              <a:bodyPr rtlCol="0" anchor="ctr"/>
-              <a:lstStyle/>
-              <a:p>
-                <a:pPr algn="ctr"/>
-                <a:endParaRPr lang="es-ES"/>
-              </a:p>
-            </p:txBody>
-          </p:sp>
-        </p:grpSp>
-        <p:cxnSp>
-          <p:nvCxnSpPr>
-            <p:cNvPr id="8" name="Conector recto de flecha 7"/>
-            <p:cNvCxnSpPr/>
-            <p:nvPr/>
-          </p:nvCxnSpPr>
-          <p:spPr>
-            <a:xfrm flipV="1">
-              <a:off x="2729995" y="1792204"/>
-              <a:ext cx="3008930" cy="11869"/>
-            </a:xfrm>
-            <a:prstGeom prst="straightConnector1">
-              <a:avLst/>
-            </a:prstGeom>
-            <a:ln>
-              <a:solidFill>
-                <a:schemeClr val="tx1"/>
-              </a:solidFill>
-              <a:headEnd type="arrow"/>
-              <a:tailEnd type="arrow"/>
-            </a:ln>
-          </p:spPr>
-          <p:style>
-            <a:lnRef idx="2">
-              <a:schemeClr val="accent1"/>
-            </a:lnRef>
-            <a:fillRef idx="0">
-              <a:schemeClr val="accent1"/>
-            </a:fillRef>
-            <a:effectRef idx="1">
-              <a:schemeClr val="accent1"/>
-            </a:effectRef>
-            <a:fontRef idx="minor">
-              <a:schemeClr val="tx1"/>
-            </a:fontRef>
-          </p:style>
-        </p:cxnSp>
-        <p:cxnSp>
-          <p:nvCxnSpPr>
-            <p:cNvPr id="9" name="Conector recto de flecha 8"/>
-            <p:cNvCxnSpPr/>
-            <p:nvPr/>
-          </p:nvCxnSpPr>
-          <p:spPr>
-            <a:xfrm flipV="1">
-              <a:off x="5891325" y="1944605"/>
-              <a:ext cx="0" cy="1145048"/>
-            </a:xfrm>
-            <a:prstGeom prst="straightConnector1">
-              <a:avLst/>
-            </a:prstGeom>
-            <a:ln>
-              <a:solidFill>
-                <a:schemeClr val="tx1"/>
-              </a:solidFill>
-              <a:headEnd type="arrow"/>
-              <a:tailEnd type="arrow"/>
-            </a:ln>
-          </p:spPr>
-          <p:style>
-            <a:lnRef idx="2">
-              <a:schemeClr val="accent1"/>
-            </a:lnRef>
-            <a:fillRef idx="0">
-              <a:schemeClr val="accent1"/>
-            </a:fillRef>
-            <a:effectRef idx="1">
-              <a:schemeClr val="accent1"/>
-            </a:effectRef>
-            <a:fontRef idx="minor">
-              <a:schemeClr val="tx1"/>
-            </a:fontRef>
-          </p:style>
-        </p:cxnSp>
-        <p:sp>
-          <p:nvSpPr>
-            <p:cNvPr id="11" name="CuadroTexto 10"/>
-            <p:cNvSpPr txBox="1"/>
-            <p:nvPr/>
-          </p:nvSpPr>
-          <p:spPr>
-            <a:xfrm>
-              <a:off x="3217235" y="1515205"/>
-              <a:ext cx="1910997" cy="276999"/>
-            </a:xfrm>
-            <a:prstGeom prst="rect">
-              <a:avLst/>
-            </a:prstGeom>
-            <a:noFill/>
-          </p:spPr>
-          <p:txBody>
-            <a:bodyPr wrap="square" rtlCol="0">
-              <a:spAutoFit/>
-            </a:bodyPr>
-            <a:lstStyle/>
-            <a:p>
-              <a:r>
-                <a:rPr lang="es-ES" sz="1200" dirty="0" smtClean="0">
-                  <a:latin typeface="Arial"/>
-                  <a:cs typeface="Arial"/>
-                </a:rPr>
-                <a:t>Distintas funcionalidades</a:t>
-              </a:r>
-              <a:endParaRPr lang="es-ES" sz="1200" dirty="0">
-                <a:latin typeface="Arial"/>
-                <a:cs typeface="Arial"/>
-              </a:endParaRPr>
-            </a:p>
-          </p:txBody>
-        </p:sp>
-        <p:sp>
-          <p:nvSpPr>
-            <p:cNvPr id="12" name="CuadroTexto 11"/>
-            <p:cNvSpPr txBox="1"/>
-            <p:nvPr/>
-          </p:nvSpPr>
-          <p:spPr>
-            <a:xfrm rot="5400000">
-              <a:off x="5567286" y="2292276"/>
-              <a:ext cx="1202072" cy="461665"/>
-            </a:xfrm>
-            <a:prstGeom prst="rect">
-              <a:avLst/>
-            </a:prstGeom>
-            <a:noFill/>
-          </p:spPr>
-          <p:txBody>
-            <a:bodyPr wrap="square" rtlCol="0">
-              <a:spAutoFit/>
-            </a:bodyPr>
-            <a:lstStyle/>
-            <a:p>
-              <a:pPr algn="ctr"/>
-              <a:r>
-                <a:rPr lang="es-ES" sz="1200" dirty="0" smtClean="0">
-                  <a:latin typeface="Arial"/>
-                  <a:cs typeface="Arial"/>
-                </a:rPr>
-                <a:t>Grado de Funcionalidad</a:t>
-              </a:r>
-              <a:endParaRPr lang="es-ES" sz="1200" dirty="0">
-                <a:latin typeface="Arial"/>
-                <a:cs typeface="Arial"/>
-              </a:endParaRPr>
-            </a:p>
-          </p:txBody>
-        </p:sp>
-        <p:cxnSp>
-          <p:nvCxnSpPr>
-            <p:cNvPr id="13" name="Conector recto de flecha 12"/>
-            <p:cNvCxnSpPr/>
-            <p:nvPr/>
-          </p:nvCxnSpPr>
-          <p:spPr>
-            <a:xfrm flipH="1">
-              <a:off x="2540082" y="2107374"/>
-              <a:ext cx="379826" cy="213639"/>
-            </a:xfrm>
-            <a:prstGeom prst="straightConnector1">
-              <a:avLst/>
-            </a:prstGeom>
-            <a:ln>
-              <a:solidFill>
-                <a:schemeClr val="tx1"/>
-              </a:solidFill>
-              <a:headEnd type="arrow"/>
-              <a:tailEnd type="none"/>
-            </a:ln>
-          </p:spPr>
-          <p:style>
-            <a:lnRef idx="2">
-              <a:schemeClr val="accent1"/>
-            </a:lnRef>
-            <a:fillRef idx="0">
-              <a:schemeClr val="accent1"/>
-            </a:fillRef>
-            <a:effectRef idx="1">
-              <a:schemeClr val="accent1"/>
-            </a:effectRef>
-            <a:fontRef idx="minor">
-              <a:schemeClr val="tx1"/>
-            </a:fontRef>
-          </p:style>
-        </p:cxnSp>
-        <p:cxnSp>
-          <p:nvCxnSpPr>
-            <p:cNvPr id="18" name="Conector recto de flecha 17"/>
-            <p:cNvCxnSpPr/>
-            <p:nvPr/>
-          </p:nvCxnSpPr>
-          <p:spPr>
-            <a:xfrm flipH="1">
-              <a:off x="3483711" y="2907255"/>
-              <a:ext cx="431336" cy="332955"/>
-            </a:xfrm>
-            <a:prstGeom prst="straightConnector1">
-              <a:avLst/>
-            </a:prstGeom>
-            <a:ln>
-              <a:solidFill>
-                <a:schemeClr val="tx1"/>
-              </a:solidFill>
-              <a:headEnd type="arrow"/>
-              <a:tailEnd type="none"/>
-            </a:ln>
-          </p:spPr>
-          <p:style>
-            <a:lnRef idx="2">
-              <a:schemeClr val="accent1"/>
-            </a:lnRef>
-            <a:fillRef idx="0">
-              <a:schemeClr val="accent1"/>
-            </a:fillRef>
-            <a:effectRef idx="1">
-              <a:schemeClr val="accent1"/>
-            </a:effectRef>
-            <a:fontRef idx="minor">
-              <a:schemeClr val="tx1"/>
-            </a:fontRef>
-          </p:style>
-        </p:cxnSp>
-        <p:cxnSp>
-          <p:nvCxnSpPr>
-            <p:cNvPr id="21" name="Conector recto de flecha 20"/>
-            <p:cNvCxnSpPr/>
-            <p:nvPr/>
-          </p:nvCxnSpPr>
-          <p:spPr>
-            <a:xfrm flipH="1" flipV="1">
-              <a:off x="2462930" y="1922072"/>
-              <a:ext cx="1481644" cy="191245"/>
-            </a:xfrm>
-            <a:prstGeom prst="straightConnector1">
-              <a:avLst/>
-            </a:prstGeom>
-            <a:ln>
-              <a:solidFill>
-                <a:schemeClr val="tx1"/>
-              </a:solidFill>
-              <a:headEnd type="arrow"/>
-              <a:tailEnd type="none"/>
-            </a:ln>
-          </p:spPr>
-          <p:style>
-            <a:lnRef idx="2">
-              <a:schemeClr val="accent1"/>
-            </a:lnRef>
-            <a:fillRef idx="0">
-              <a:schemeClr val="accent1"/>
-            </a:fillRef>
-            <a:effectRef idx="1">
-              <a:schemeClr val="accent1"/>
-            </a:effectRef>
-            <a:fontRef idx="minor">
-              <a:schemeClr val="tx1"/>
-            </a:fontRef>
-          </p:style>
-        </p:cxnSp>
-        <p:cxnSp>
-          <p:nvCxnSpPr>
-            <p:cNvPr id="24" name="Conector recto de flecha 23"/>
-            <p:cNvCxnSpPr/>
-            <p:nvPr/>
-          </p:nvCxnSpPr>
-          <p:spPr>
-            <a:xfrm>
-              <a:off x="5028880" y="2957667"/>
-              <a:ext cx="0" cy="282543"/>
-            </a:xfrm>
-            <a:prstGeom prst="straightConnector1">
-              <a:avLst/>
-            </a:prstGeom>
-            <a:ln>
-              <a:solidFill>
-                <a:schemeClr val="tx1"/>
-              </a:solidFill>
-              <a:headEnd type="arrow"/>
-              <a:tailEnd type="none"/>
-            </a:ln>
-          </p:spPr>
-          <p:style>
-            <a:lnRef idx="2">
-              <a:schemeClr val="accent1"/>
-            </a:lnRef>
-            <a:fillRef idx="0">
-              <a:schemeClr val="accent1"/>
-            </a:fillRef>
-            <a:effectRef idx="1">
-              <a:schemeClr val="accent1"/>
-            </a:effectRef>
-            <a:fontRef idx="minor">
-              <a:schemeClr val="tx1"/>
-            </a:fontRef>
-          </p:style>
-        </p:cxnSp>
-        <p:sp>
-          <p:nvSpPr>
-            <p:cNvPr id="26" name="CuadroTexto 25"/>
-            <p:cNvSpPr txBox="1"/>
-            <p:nvPr/>
-          </p:nvSpPr>
-          <p:spPr>
-            <a:xfrm>
-              <a:off x="1766229" y="1761165"/>
-              <a:ext cx="779791" cy="246221"/>
-            </a:xfrm>
-            <a:prstGeom prst="rect">
-              <a:avLst/>
-            </a:prstGeom>
-            <a:noFill/>
-          </p:spPr>
-          <p:txBody>
-            <a:bodyPr wrap="square" rtlCol="0">
-              <a:spAutoFit/>
-            </a:bodyPr>
-            <a:lstStyle/>
-            <a:p>
-              <a:r>
-                <a:rPr lang="es-ES" sz="1000" dirty="0" smtClean="0">
-                  <a:latin typeface="Arial"/>
-                  <a:cs typeface="Arial"/>
-                </a:rPr>
-                <a:t>Escenario</a:t>
-              </a:r>
-              <a:endParaRPr lang="es-ES" sz="1000" dirty="0">
-                <a:latin typeface="Arial"/>
-                <a:cs typeface="Arial"/>
-              </a:endParaRPr>
-            </a:p>
-          </p:txBody>
-        </p:sp>
-        <p:sp>
-          <p:nvSpPr>
-            <p:cNvPr id="28" name="CuadroTexto 27"/>
-            <p:cNvSpPr txBox="1"/>
-            <p:nvPr/>
-          </p:nvSpPr>
-          <p:spPr>
-            <a:xfrm>
-              <a:off x="1884922" y="2181903"/>
-              <a:ext cx="779791" cy="400110"/>
-            </a:xfrm>
-            <a:prstGeom prst="rect">
-              <a:avLst/>
-            </a:prstGeom>
-            <a:noFill/>
-          </p:spPr>
-          <p:txBody>
-            <a:bodyPr wrap="square" rtlCol="0">
-              <a:spAutoFit/>
-            </a:bodyPr>
-            <a:lstStyle/>
-            <a:p>
-              <a:r>
-                <a:rPr lang="es-ES" sz="1000" dirty="0" smtClean="0">
-                  <a:latin typeface="Arial"/>
-                  <a:cs typeface="Arial"/>
-                </a:rPr>
-                <a:t>Prototipo horizontal</a:t>
-              </a:r>
-              <a:endParaRPr lang="es-ES" sz="1000" dirty="0">
-                <a:latin typeface="Arial"/>
-                <a:cs typeface="Arial"/>
-              </a:endParaRPr>
-            </a:p>
-          </p:txBody>
-        </p:sp>
-        <p:sp>
-          <p:nvSpPr>
-            <p:cNvPr id="29" name="CuadroTexto 28"/>
-            <p:cNvSpPr txBox="1"/>
-            <p:nvPr/>
-          </p:nvSpPr>
-          <p:spPr>
-            <a:xfrm>
-              <a:off x="2937712" y="3179305"/>
-              <a:ext cx="779791" cy="400110"/>
-            </a:xfrm>
-            <a:prstGeom prst="rect">
-              <a:avLst/>
-            </a:prstGeom>
-            <a:noFill/>
-          </p:spPr>
-          <p:txBody>
-            <a:bodyPr wrap="square" rtlCol="0">
-              <a:spAutoFit/>
-            </a:bodyPr>
-            <a:lstStyle/>
-            <a:p>
-              <a:r>
-                <a:rPr lang="es-ES" sz="1000" dirty="0" smtClean="0">
-                  <a:latin typeface="Arial"/>
-                  <a:cs typeface="Arial"/>
-                </a:rPr>
-                <a:t>Prototipo vertical</a:t>
-              </a:r>
-              <a:endParaRPr lang="es-ES" sz="1000" dirty="0">
-                <a:latin typeface="Arial"/>
-                <a:cs typeface="Arial"/>
-              </a:endParaRPr>
-            </a:p>
-          </p:txBody>
-        </p:sp>
-        <p:sp>
-          <p:nvSpPr>
-            <p:cNvPr id="30" name="CuadroTexto 29"/>
-            <p:cNvSpPr txBox="1"/>
-            <p:nvPr/>
-          </p:nvSpPr>
-          <p:spPr>
-            <a:xfrm>
-              <a:off x="4684235" y="3174013"/>
-              <a:ext cx="779791" cy="400110"/>
-            </a:xfrm>
-            <a:prstGeom prst="rect">
-              <a:avLst/>
-            </a:prstGeom>
-            <a:noFill/>
-          </p:spPr>
-          <p:txBody>
-            <a:bodyPr wrap="square" rtlCol="0">
-              <a:spAutoFit/>
-            </a:bodyPr>
-            <a:lstStyle/>
-            <a:p>
-              <a:r>
-                <a:rPr lang="es-ES" sz="1000" dirty="0" smtClean="0">
-                  <a:latin typeface="Arial"/>
-                  <a:cs typeface="Arial"/>
-                </a:rPr>
-                <a:t>Sistema completo</a:t>
-              </a:r>
-              <a:endParaRPr lang="es-ES" sz="1000" dirty="0">
-                <a:latin typeface="Arial"/>
-                <a:cs typeface="Arial"/>
-              </a:endParaRPr>
-            </a:p>
-          </p:txBody>
-        </p:sp>
-      </p:grpSp>
-    </p:spTree>
-    <p:extLst>
-      <p:ext uri="{BB962C8B-B14F-4D97-AF65-F5344CB8AC3E}">
-        <p14:creationId xmlns:p14="http://schemas.microsoft.com/office/powerpoint/2010/main" val="4053511957"/>
-      </p:ext>
-    </p:extLst>
-  </p:cSld>
-  <p:clrMapOvr>
-    <a:masterClrMapping/>
-  </p:clrMapOvr>
-</p:sld>
-</file>
-
-<file path=ppt/slides/slide5.xml><?xml version="1.0" encoding="utf-8"?>
-<p:sld xmlns:a="http://schemas.openxmlformats.org/drawingml/2006/main" xmlns:r="http://schemas.openxmlformats.org/officeDocument/2006/relationships" xmlns:p="http://schemas.openxmlformats.org/presentationml/2006/main">
-  <p:cSld>
-    <p:spTree>
-      <p:nvGrpSpPr>
-        <p:cNvPr id="1" name=""/>
-        <p:cNvGrpSpPr/>
-        <p:nvPr/>
-      </p:nvGrpSpPr>
-      <p:grpSpPr>
-        <a:xfrm>
-          <a:off x="0" y="0"/>
-          <a:ext cx="0" cy="0"/>
-          <a:chOff x="0" y="0"/>
-          <a:chExt cx="0" cy="0"/>
-        </a:xfrm>
-      </p:grpSpPr>
-      <p:grpSp>
-        <p:nvGrpSpPr>
-          <p:cNvPr id="4" name="Agrupar 3"/>
-          <p:cNvGrpSpPr/>
-          <p:nvPr/>
-        </p:nvGrpSpPr>
-        <p:grpSpPr>
-          <a:xfrm>
-            <a:off x="1788338" y="1774401"/>
-            <a:ext cx="5174786" cy="1810048"/>
-            <a:chOff x="1788338" y="1774401"/>
-            <a:chExt cx="5174786" cy="1810048"/>
-          </a:xfrm>
-        </p:grpSpPr>
-        <p:pic>
-          <p:nvPicPr>
-            <p:cNvPr id="2" name="Imagen 1" descr="wizard-of-oz1.jpg"/>
-            <p:cNvPicPr>
-              <a:picLocks noChangeAspect="1"/>
-            </p:cNvPicPr>
-            <p:nvPr/>
-          </p:nvPicPr>
-          <p:blipFill>
-            <a:blip r:embed="rId2">
-              <a:extLst>
-                <a:ext uri="{28A0092B-C50C-407E-A947-70E740481C1C}">
-                  <a14:useLocalDpi xmlns:a14="http://schemas.microsoft.com/office/drawing/2010/main" val="0"/>
-                </a:ext>
-              </a:extLst>
-            </a:blip>
-            <a:stretch>
-              <a:fillRect/>
-            </a:stretch>
-          </p:blipFill>
-          <p:spPr>
-            <a:xfrm>
-              <a:off x="1788338" y="1774401"/>
-              <a:ext cx="2413397" cy="1810048"/>
-            </a:xfrm>
-            <a:prstGeom prst="rect">
-              <a:avLst/>
-            </a:prstGeom>
-          </p:spPr>
-        </p:pic>
-        <p:pic>
-          <p:nvPicPr>
-            <p:cNvPr id="3" name="Imagen 2" descr="wizard-of-oz2.jpg"/>
-            <p:cNvPicPr>
-              <a:picLocks noChangeAspect="1"/>
-            </p:cNvPicPr>
-            <p:nvPr/>
-          </p:nvPicPr>
-          <p:blipFill>
-            <a:blip r:embed="rId3">
-              <a:extLst>
-                <a:ext uri="{28A0092B-C50C-407E-A947-70E740481C1C}">
-                  <a14:useLocalDpi xmlns:a14="http://schemas.microsoft.com/office/drawing/2010/main" val="0"/>
-                </a:ext>
-              </a:extLst>
-            </a:blip>
-            <a:stretch>
-              <a:fillRect/>
-            </a:stretch>
-          </p:blipFill>
-          <p:spPr>
-            <a:xfrm>
-              <a:off x="4245334" y="1774401"/>
-              <a:ext cx="2717790" cy="1810048"/>
-            </a:xfrm>
-            <a:prstGeom prst="rect">
-              <a:avLst/>
-            </a:prstGeom>
-          </p:spPr>
-        </p:pic>
-      </p:grpSp>
-    </p:spTree>
-    <p:extLst>
-      <p:ext uri="{BB962C8B-B14F-4D97-AF65-F5344CB8AC3E}">
-        <p14:creationId xmlns:p14="http://schemas.microsoft.com/office/powerpoint/2010/main" val="1480369000"/>
+        <p14:creationId xmlns:p14="http://schemas.microsoft.com/office/powerpoint/2010/main" val="2258763118"/>
       </p:ext>
     </p:extLst>
   </p:cSld>

</xml_diff>

<commit_message>
Completado el primer apartado del tema 3 (con gráficas)
</commit_message>
<xml_diff>
--- a/images/paraEsquemasYFiguras.pptx
+++ b/images/paraEsquemasYFiguras.pptx
@@ -6,6 +6,7 @@
   </p:sldMasterIdLst>
   <p:sldIdLst>
     <p:sldId id="256" r:id="rId2"/>
+    <p:sldId id="257" r:id="rId3"/>
   </p:sldIdLst>
   <p:sldSz cx="9144000" cy="6858000" type="screen4x3"/>
   <p:notesSz cx="6858000" cy="9144000"/>
@@ -288,7 +289,7 @@
           <a:p>
             <a:fld id="{D7E2043C-A4E6-B74E-9C07-871FC106E480}" type="datetimeFigureOut">
               <a:rPr lang="es-ES" smtClean="0"/>
-              <a:t>06/10/14</a:t>
+              <a:t>15/10/14</a:t>
             </a:fld>
             <a:endParaRPr lang="es-ES"/>
           </a:p>
@@ -458,7 +459,7 @@
           <a:p>
             <a:fld id="{D7E2043C-A4E6-B74E-9C07-871FC106E480}" type="datetimeFigureOut">
               <a:rPr lang="es-ES" smtClean="0"/>
-              <a:t>06/10/14</a:t>
+              <a:t>15/10/14</a:t>
             </a:fld>
             <a:endParaRPr lang="es-ES"/>
           </a:p>
@@ -638,7 +639,7 @@
           <a:p>
             <a:fld id="{D7E2043C-A4E6-B74E-9C07-871FC106E480}" type="datetimeFigureOut">
               <a:rPr lang="es-ES" smtClean="0"/>
-              <a:t>06/10/14</a:t>
+              <a:t>15/10/14</a:t>
             </a:fld>
             <a:endParaRPr lang="es-ES"/>
           </a:p>
@@ -808,7 +809,7 @@
           <a:p>
             <a:fld id="{D7E2043C-A4E6-B74E-9C07-871FC106E480}" type="datetimeFigureOut">
               <a:rPr lang="es-ES" smtClean="0"/>
-              <a:t>06/10/14</a:t>
+              <a:t>15/10/14</a:t>
             </a:fld>
             <a:endParaRPr lang="es-ES"/>
           </a:p>
@@ -1054,7 +1055,7 @@
           <a:p>
             <a:fld id="{D7E2043C-A4E6-B74E-9C07-871FC106E480}" type="datetimeFigureOut">
               <a:rPr lang="es-ES" smtClean="0"/>
-              <a:t>06/10/14</a:t>
+              <a:t>15/10/14</a:t>
             </a:fld>
             <a:endParaRPr lang="es-ES"/>
           </a:p>
@@ -1342,7 +1343,7 @@
           <a:p>
             <a:fld id="{D7E2043C-A4E6-B74E-9C07-871FC106E480}" type="datetimeFigureOut">
               <a:rPr lang="es-ES" smtClean="0"/>
-              <a:t>06/10/14</a:t>
+              <a:t>15/10/14</a:t>
             </a:fld>
             <a:endParaRPr lang="es-ES"/>
           </a:p>
@@ -1764,7 +1765,7 @@
           <a:p>
             <a:fld id="{D7E2043C-A4E6-B74E-9C07-871FC106E480}" type="datetimeFigureOut">
               <a:rPr lang="es-ES" smtClean="0"/>
-              <a:t>06/10/14</a:t>
+              <a:t>15/10/14</a:t>
             </a:fld>
             <a:endParaRPr lang="es-ES"/>
           </a:p>
@@ -1882,7 +1883,7 @@
           <a:p>
             <a:fld id="{D7E2043C-A4E6-B74E-9C07-871FC106E480}" type="datetimeFigureOut">
               <a:rPr lang="es-ES" smtClean="0"/>
-              <a:t>06/10/14</a:t>
+              <a:t>15/10/14</a:t>
             </a:fld>
             <a:endParaRPr lang="es-ES"/>
           </a:p>
@@ -1977,7 +1978,7 @@
           <a:p>
             <a:fld id="{D7E2043C-A4E6-B74E-9C07-871FC106E480}" type="datetimeFigureOut">
               <a:rPr lang="es-ES" smtClean="0"/>
-              <a:t>06/10/14</a:t>
+              <a:t>15/10/14</a:t>
             </a:fld>
             <a:endParaRPr lang="es-ES"/>
           </a:p>
@@ -2254,7 +2255,7 @@
           <a:p>
             <a:fld id="{D7E2043C-A4E6-B74E-9C07-871FC106E480}" type="datetimeFigureOut">
               <a:rPr lang="es-ES" smtClean="0"/>
-              <a:t>06/10/14</a:t>
+              <a:t>15/10/14</a:t>
             </a:fld>
             <a:endParaRPr lang="es-ES"/>
           </a:p>
@@ -2507,7 +2508,7 @@
           <a:p>
             <a:fld id="{D7E2043C-A4E6-B74E-9C07-871FC106E480}" type="datetimeFigureOut">
               <a:rPr lang="es-ES" smtClean="0"/>
-              <a:t>06/10/14</a:t>
+              <a:t>15/10/14</a:t>
             </a:fld>
             <a:endParaRPr lang="es-ES"/>
           </a:p>
@@ -2720,7 +2721,7 @@
           <a:p>
             <a:fld id="{D7E2043C-A4E6-B74E-9C07-871FC106E480}" type="datetimeFigureOut">
               <a:rPr lang="es-ES" smtClean="0"/>
-              <a:t>06/10/14</a:t>
+              <a:t>15/10/14</a:t>
             </a:fld>
             <a:endParaRPr lang="es-ES"/>
           </a:p>
@@ -3168,6 +3169,160 @@
 </p:sld>
 </file>
 
+<file path=ppt/slides/slide2.xml><?xml version="1.0" encoding="utf-8"?>
+<p:sld xmlns:a="http://schemas.openxmlformats.org/drawingml/2006/main" xmlns:r="http://schemas.openxmlformats.org/officeDocument/2006/relationships" xmlns:p="http://schemas.openxmlformats.org/presentationml/2006/main">
+  <p:cSld>
+    <p:spTree>
+      <p:nvGrpSpPr>
+        <p:cNvPr id="1" name=""/>
+        <p:cNvGrpSpPr/>
+        <p:nvPr/>
+      </p:nvGrpSpPr>
+      <p:grpSpPr>
+        <a:xfrm>
+          <a:off x="0" y="0"/>
+          <a:ext cx="0" cy="0"/>
+          <a:chOff x="0" y="0"/>
+          <a:chExt cx="0" cy="0"/>
+        </a:xfrm>
+      </p:grpSpPr>
+      <p:pic>
+        <p:nvPicPr>
+          <p:cNvPr id="2" name="Imagen 1" descr="powerlawExp.png"/>
+          <p:cNvPicPr>
+            <a:picLocks noChangeAspect="1"/>
+          </p:cNvPicPr>
+          <p:nvPr/>
+        </p:nvPicPr>
+        <p:blipFill>
+          <a:blip r:embed="rId2">
+            <a:extLst>
+              <a:ext uri="{28A0092B-C50C-407E-A947-70E740481C1C}">
+                <a14:useLocalDpi xmlns:a14="http://schemas.microsoft.com/office/drawing/2010/main" val="0"/>
+              </a:ext>
+            </a:extLst>
+          </a:blip>
+          <a:stretch>
+            <a:fillRect/>
+          </a:stretch>
+        </p:blipFill>
+        <p:spPr>
+          <a:xfrm>
+            <a:off x="1584584" y="3053358"/>
+            <a:ext cx="3287209" cy="1563645"/>
+          </a:xfrm>
+          <a:prstGeom prst="rect">
+            <a:avLst/>
+          </a:prstGeom>
+        </p:spPr>
+      </p:pic>
+      <p:pic>
+        <p:nvPicPr>
+          <p:cNvPr id="3" name="Imagen 2" descr="Captura de pantalla 2014-10-15 a la(s) 18.24.58.png"/>
+          <p:cNvPicPr>
+            <a:picLocks noChangeAspect="1"/>
+          </p:cNvPicPr>
+          <p:nvPr/>
+        </p:nvPicPr>
+        <p:blipFill>
+          <a:blip r:embed="rId3">
+            <a:extLst>
+              <a:ext uri="{28A0092B-C50C-407E-A947-70E740481C1C}">
+                <a14:useLocalDpi xmlns:a14="http://schemas.microsoft.com/office/drawing/2010/main" val="0"/>
+              </a:ext>
+            </a:extLst>
+          </a:blip>
+          <a:stretch>
+            <a:fillRect/>
+          </a:stretch>
+        </p:blipFill>
+        <p:spPr>
+          <a:xfrm>
+            <a:off x="5109184" y="2931619"/>
+            <a:ext cx="1844870" cy="1685384"/>
+          </a:xfrm>
+          <a:prstGeom prst="rect">
+            <a:avLst/>
+          </a:prstGeom>
+        </p:spPr>
+      </p:pic>
+      <p:sp>
+        <p:nvSpPr>
+          <p:cNvPr id="4" name="CuadroTexto 3"/>
+          <p:cNvSpPr txBox="1"/>
+          <p:nvPr/>
+        </p:nvSpPr>
+        <p:spPr>
+          <a:xfrm>
+            <a:off x="2753734" y="4617003"/>
+            <a:ext cx="1191352" cy="338554"/>
+          </a:xfrm>
+          <a:prstGeom prst="rect">
+            <a:avLst/>
+          </a:prstGeom>
+          <a:noFill/>
+        </p:spPr>
+        <p:txBody>
+          <a:bodyPr wrap="none" rtlCol="0">
+            <a:spAutoFit/>
+          </a:bodyPr>
+          <a:lstStyle/>
+          <a:p>
+            <a:r>
+              <a:rPr lang="es-ES" sz="1600" dirty="0" smtClean="0"/>
+              <a:t>Escala lineal</a:t>
+            </a:r>
+            <a:endParaRPr lang="es-ES" sz="1600" dirty="0"/>
+          </a:p>
+        </p:txBody>
+      </p:sp>
+      <p:sp>
+        <p:nvSpPr>
+          <p:cNvPr id="5" name="CuadroTexto 4"/>
+          <p:cNvSpPr txBox="1"/>
+          <p:nvPr/>
+        </p:nvSpPr>
+        <p:spPr>
+          <a:xfrm>
+            <a:off x="5180404" y="4615109"/>
+            <a:ext cx="1675459" cy="338554"/>
+          </a:xfrm>
+          <a:prstGeom prst="rect">
+            <a:avLst/>
+          </a:prstGeom>
+          <a:noFill/>
+        </p:spPr>
+        <p:txBody>
+          <a:bodyPr wrap="none" rtlCol="0">
+            <a:spAutoFit/>
+          </a:bodyPr>
+          <a:lstStyle/>
+          <a:p>
+            <a:r>
+              <a:rPr lang="es-ES" sz="1600" dirty="0" smtClean="0"/>
+              <a:t>Escala logar</a:t>
+            </a:r>
+            <a:r>
+              <a:rPr lang="es-ES" sz="1600" dirty="0" smtClean="0"/>
+              <a:t>ítmica</a:t>
+            </a:r>
+            <a:endParaRPr lang="es-ES" sz="1600" dirty="0"/>
+          </a:p>
+        </p:txBody>
+      </p:sp>
+    </p:spTree>
+    <p:extLst>
+      <p:ext uri="{BB962C8B-B14F-4D97-AF65-F5344CB8AC3E}">
+        <p14:creationId xmlns:p14="http://schemas.microsoft.com/office/powerpoint/2010/main" val="2484292234"/>
+      </p:ext>
+    </p:extLst>
+  </p:cSld>
+  <p:clrMapOvr>
+    <a:masterClrMapping/>
+  </p:clrMapOvr>
+</p:sld>
+</file>
+
 <file path=ppt/theme/theme1.xml><?xml version="1.0" encoding="utf-8"?>
 <a:theme xmlns:a="http://schemas.openxmlformats.org/drawingml/2006/main" name="Tema de Office">
   <a:themeElements>

</xml_diff>

<commit_message>
Terminada la sección relativa a las distancias de la red
</commit_message>
<xml_diff>
--- a/images/paraEsquemasYFiguras.pptx
+++ b/images/paraEsquemasYFiguras.pptx
@@ -6,7 +6,8 @@
   </p:sldMasterIdLst>
   <p:sldIdLst>
     <p:sldId id="256" r:id="rId2"/>
-    <p:sldId id="257" r:id="rId3"/>
+    <p:sldId id="258" r:id="rId3"/>
+    <p:sldId id="257" r:id="rId4"/>
   </p:sldIdLst>
   <p:sldSz cx="9144000" cy="6858000" type="screen4x3"/>
   <p:notesSz cx="6858000" cy="9144000"/>
@@ -289,7 +290,7 @@
           <a:p>
             <a:fld id="{D7E2043C-A4E6-B74E-9C07-871FC106E480}" type="datetimeFigureOut">
               <a:rPr lang="es-ES" smtClean="0"/>
-              <a:t>15/10/14</a:t>
+              <a:t>16/10/14</a:t>
             </a:fld>
             <a:endParaRPr lang="es-ES"/>
           </a:p>
@@ -459,7 +460,7 @@
           <a:p>
             <a:fld id="{D7E2043C-A4E6-B74E-9C07-871FC106E480}" type="datetimeFigureOut">
               <a:rPr lang="es-ES" smtClean="0"/>
-              <a:t>15/10/14</a:t>
+              <a:t>16/10/14</a:t>
             </a:fld>
             <a:endParaRPr lang="es-ES"/>
           </a:p>
@@ -639,7 +640,7 @@
           <a:p>
             <a:fld id="{D7E2043C-A4E6-B74E-9C07-871FC106E480}" type="datetimeFigureOut">
               <a:rPr lang="es-ES" smtClean="0"/>
-              <a:t>15/10/14</a:t>
+              <a:t>16/10/14</a:t>
             </a:fld>
             <a:endParaRPr lang="es-ES"/>
           </a:p>
@@ -809,7 +810,7 @@
           <a:p>
             <a:fld id="{D7E2043C-A4E6-B74E-9C07-871FC106E480}" type="datetimeFigureOut">
               <a:rPr lang="es-ES" smtClean="0"/>
-              <a:t>15/10/14</a:t>
+              <a:t>16/10/14</a:t>
             </a:fld>
             <a:endParaRPr lang="es-ES"/>
           </a:p>
@@ -1055,7 +1056,7 @@
           <a:p>
             <a:fld id="{D7E2043C-A4E6-B74E-9C07-871FC106E480}" type="datetimeFigureOut">
               <a:rPr lang="es-ES" smtClean="0"/>
-              <a:t>15/10/14</a:t>
+              <a:t>16/10/14</a:t>
             </a:fld>
             <a:endParaRPr lang="es-ES"/>
           </a:p>
@@ -1343,7 +1344,7 @@
           <a:p>
             <a:fld id="{D7E2043C-A4E6-B74E-9C07-871FC106E480}" type="datetimeFigureOut">
               <a:rPr lang="es-ES" smtClean="0"/>
-              <a:t>15/10/14</a:t>
+              <a:t>16/10/14</a:t>
             </a:fld>
             <a:endParaRPr lang="es-ES"/>
           </a:p>
@@ -1765,7 +1766,7 @@
           <a:p>
             <a:fld id="{D7E2043C-A4E6-B74E-9C07-871FC106E480}" type="datetimeFigureOut">
               <a:rPr lang="es-ES" smtClean="0"/>
-              <a:t>15/10/14</a:t>
+              <a:t>16/10/14</a:t>
             </a:fld>
             <a:endParaRPr lang="es-ES"/>
           </a:p>
@@ -1883,7 +1884,7 @@
           <a:p>
             <a:fld id="{D7E2043C-A4E6-B74E-9C07-871FC106E480}" type="datetimeFigureOut">
               <a:rPr lang="es-ES" smtClean="0"/>
-              <a:t>15/10/14</a:t>
+              <a:t>16/10/14</a:t>
             </a:fld>
             <a:endParaRPr lang="es-ES"/>
           </a:p>
@@ -1978,7 +1979,7 @@
           <a:p>
             <a:fld id="{D7E2043C-A4E6-B74E-9C07-871FC106E480}" type="datetimeFigureOut">
               <a:rPr lang="es-ES" smtClean="0"/>
-              <a:t>15/10/14</a:t>
+              <a:t>16/10/14</a:t>
             </a:fld>
             <a:endParaRPr lang="es-ES"/>
           </a:p>
@@ -2255,7 +2256,7 @@
           <a:p>
             <a:fld id="{D7E2043C-A4E6-B74E-9C07-871FC106E480}" type="datetimeFigureOut">
               <a:rPr lang="es-ES" smtClean="0"/>
-              <a:t>15/10/14</a:t>
+              <a:t>16/10/14</a:t>
             </a:fld>
             <a:endParaRPr lang="es-ES"/>
           </a:p>
@@ -2508,7 +2509,7 @@
           <a:p>
             <a:fld id="{D7E2043C-A4E6-B74E-9C07-871FC106E480}" type="datetimeFigureOut">
               <a:rPr lang="es-ES" smtClean="0"/>
-              <a:t>15/10/14</a:t>
+              <a:t>16/10/14</a:t>
             </a:fld>
             <a:endParaRPr lang="es-ES"/>
           </a:p>
@@ -2721,7 +2722,7 @@
           <a:p>
             <a:fld id="{D7E2043C-A4E6-B74E-9C07-871FC106E480}" type="datetimeFigureOut">
               <a:rPr lang="es-ES" smtClean="0"/>
-              <a:t>15/10/14</a:t>
+              <a:t>16/10/14</a:t>
             </a:fld>
             <a:endParaRPr lang="es-ES"/>
           </a:p>
@@ -3186,6 +3187,126 @@
           <a:chExt cx="0" cy="0"/>
         </a:xfrm>
       </p:grpSpPr>
+      <p:grpSp>
+        <p:nvGrpSpPr>
+          <p:cNvPr id="4" name="Agrupar 3"/>
+          <p:cNvGrpSpPr/>
+          <p:nvPr/>
+        </p:nvGrpSpPr>
+        <p:grpSpPr>
+          <a:xfrm>
+            <a:off x="2491827" y="1351518"/>
+            <a:ext cx="4172922" cy="3271420"/>
+            <a:chOff x="2491826" y="1351517"/>
+            <a:chExt cx="5451867" cy="4232801"/>
+          </a:xfrm>
+        </p:grpSpPr>
+        <p:pic>
+          <p:nvPicPr>
+            <p:cNvPr id="2" name="Imagen 1" descr="Captura de pantalla 2014-10-16 a la(s) 15.29.08.png"/>
+            <p:cNvPicPr>
+              <a:picLocks noChangeAspect="1"/>
+            </p:cNvPicPr>
+            <p:nvPr/>
+          </p:nvPicPr>
+          <p:blipFill>
+            <a:blip r:embed="rId2">
+              <a:extLst>
+                <a:ext uri="{28A0092B-C50C-407E-A947-70E740481C1C}">
+                  <a14:useLocalDpi xmlns:a14="http://schemas.microsoft.com/office/drawing/2010/main" val="0"/>
+                </a:ext>
+              </a:extLst>
+            </a:blip>
+            <a:stretch>
+              <a:fillRect/>
+            </a:stretch>
+          </p:blipFill>
+          <p:spPr>
+            <a:xfrm>
+              <a:off x="2491826" y="1351517"/>
+              <a:ext cx="4950379" cy="4232801"/>
+            </a:xfrm>
+            <a:prstGeom prst="rect">
+              <a:avLst/>
+            </a:prstGeom>
+          </p:spPr>
+        </p:pic>
+        <p:sp>
+          <p:nvSpPr>
+            <p:cNvPr id="3" name="Rectángulo 2"/>
+            <p:cNvSpPr/>
+            <p:nvPr/>
+          </p:nvSpPr>
+          <p:spPr>
+            <a:xfrm>
+              <a:off x="6940716" y="4824708"/>
+              <a:ext cx="1002977" cy="759610"/>
+            </a:xfrm>
+            <a:prstGeom prst="rect">
+              <a:avLst/>
+            </a:prstGeom>
+            <a:solidFill>
+              <a:schemeClr val="bg1"/>
+            </a:solidFill>
+            <a:ln>
+              <a:noFill/>
+            </a:ln>
+            <a:effectLst/>
+          </p:spPr>
+          <p:style>
+            <a:lnRef idx="1">
+              <a:schemeClr val="accent1"/>
+            </a:lnRef>
+            <a:fillRef idx="3">
+              <a:schemeClr val="accent1"/>
+            </a:fillRef>
+            <a:effectRef idx="2">
+              <a:schemeClr val="accent1"/>
+            </a:effectRef>
+            <a:fontRef idx="minor">
+              <a:schemeClr val="lt1"/>
+            </a:fontRef>
+          </p:style>
+          <p:txBody>
+            <a:bodyPr rtlCol="0" anchor="ctr"/>
+            <a:lstStyle/>
+            <a:p>
+              <a:pPr algn="ctr"/>
+              <a:endParaRPr lang="es-ES"/>
+            </a:p>
+          </p:txBody>
+        </p:sp>
+      </p:grpSp>
+    </p:spTree>
+    <p:extLst>
+      <p:ext uri="{BB962C8B-B14F-4D97-AF65-F5344CB8AC3E}">
+        <p14:creationId xmlns:p14="http://schemas.microsoft.com/office/powerpoint/2010/main" val="300763914"/>
+      </p:ext>
+    </p:extLst>
+  </p:cSld>
+  <p:clrMapOvr>
+    <a:masterClrMapping/>
+  </p:clrMapOvr>
+</p:sld>
+</file>
+
+<file path=ppt/slides/slide3.xml><?xml version="1.0" encoding="utf-8"?>
+<p:sld xmlns:a="http://schemas.openxmlformats.org/drawingml/2006/main" xmlns:r="http://schemas.openxmlformats.org/officeDocument/2006/relationships" xmlns:p="http://schemas.openxmlformats.org/presentationml/2006/main">
+  <p:cSld>
+    <p:spTree>
+      <p:nvGrpSpPr>
+        <p:cNvPr id="1" name=""/>
+        <p:cNvGrpSpPr/>
+        <p:nvPr/>
+      </p:nvGrpSpPr>
+      <p:grpSpPr>
+        <a:xfrm>
+          <a:off x="0" y="0"/>
+          <a:ext cx="0" cy="0"/>
+          <a:chOff x="0" y="0"/>
+          <a:chExt cx="0" cy="0"/>
+        </a:xfrm>
+      </p:grpSpPr>
       <p:pic>
         <p:nvPicPr>
           <p:cNvPr id="2" name="Imagen 1" descr="powerlawExp.png"/>
@@ -3300,11 +3421,7 @@
           <a:p>
             <a:r>
               <a:rPr lang="es-ES" sz="1600" dirty="0" smtClean="0"/>
-              <a:t>Escala logar</a:t>
-            </a:r>
-            <a:r>
-              <a:rPr lang="es-ES" sz="1600" dirty="0" smtClean="0"/>
-              <a:t>ítmica</a:t>
+              <a:t>Escala logarítmica</a:t>
             </a:r>
             <a:endParaRPr lang="es-ES" sz="1600" dirty="0"/>
           </a:p>

</xml_diff>

<commit_message>
Revisadas algunas imágenes del tema 3. Se ha comenzado con el tema 4. Hasta la evolución de los grados de los nodos
</commit_message>
<xml_diff>
--- a/images/paraEsquemasYFiguras.pptx
+++ b/images/paraEsquemasYFiguras.pptx
@@ -6,8 +6,10 @@
   </p:sldMasterIdLst>
   <p:sldIdLst>
     <p:sldId id="256" r:id="rId2"/>
-    <p:sldId id="258" r:id="rId3"/>
-    <p:sldId id="257" r:id="rId4"/>
+    <p:sldId id="259" r:id="rId3"/>
+    <p:sldId id="260" r:id="rId4"/>
+    <p:sldId id="258" r:id="rId5"/>
+    <p:sldId id="257" r:id="rId6"/>
   </p:sldIdLst>
   <p:sldSz cx="9144000" cy="6858000" type="screen4x3"/>
   <p:notesSz cx="6858000" cy="9144000"/>
@@ -290,7 +292,7 @@
           <a:p>
             <a:fld id="{D7E2043C-A4E6-B74E-9C07-871FC106E480}" type="datetimeFigureOut">
               <a:rPr lang="es-ES" smtClean="0"/>
-              <a:t>16/10/14</a:t>
+              <a:t>23/10/14</a:t>
             </a:fld>
             <a:endParaRPr lang="es-ES"/>
           </a:p>
@@ -460,7 +462,7 @@
           <a:p>
             <a:fld id="{D7E2043C-A4E6-B74E-9C07-871FC106E480}" type="datetimeFigureOut">
               <a:rPr lang="es-ES" smtClean="0"/>
-              <a:t>16/10/14</a:t>
+              <a:t>23/10/14</a:t>
             </a:fld>
             <a:endParaRPr lang="es-ES"/>
           </a:p>
@@ -640,7 +642,7 @@
           <a:p>
             <a:fld id="{D7E2043C-A4E6-B74E-9C07-871FC106E480}" type="datetimeFigureOut">
               <a:rPr lang="es-ES" smtClean="0"/>
-              <a:t>16/10/14</a:t>
+              <a:t>23/10/14</a:t>
             </a:fld>
             <a:endParaRPr lang="es-ES"/>
           </a:p>
@@ -810,7 +812,7 @@
           <a:p>
             <a:fld id="{D7E2043C-A4E6-B74E-9C07-871FC106E480}" type="datetimeFigureOut">
               <a:rPr lang="es-ES" smtClean="0"/>
-              <a:t>16/10/14</a:t>
+              <a:t>23/10/14</a:t>
             </a:fld>
             <a:endParaRPr lang="es-ES"/>
           </a:p>
@@ -1056,7 +1058,7 @@
           <a:p>
             <a:fld id="{D7E2043C-A4E6-B74E-9C07-871FC106E480}" type="datetimeFigureOut">
               <a:rPr lang="es-ES" smtClean="0"/>
-              <a:t>16/10/14</a:t>
+              <a:t>23/10/14</a:t>
             </a:fld>
             <a:endParaRPr lang="es-ES"/>
           </a:p>
@@ -1344,7 +1346,7 @@
           <a:p>
             <a:fld id="{D7E2043C-A4E6-B74E-9C07-871FC106E480}" type="datetimeFigureOut">
               <a:rPr lang="es-ES" smtClean="0"/>
-              <a:t>16/10/14</a:t>
+              <a:t>23/10/14</a:t>
             </a:fld>
             <a:endParaRPr lang="es-ES"/>
           </a:p>
@@ -1766,7 +1768,7 @@
           <a:p>
             <a:fld id="{D7E2043C-A4E6-B74E-9C07-871FC106E480}" type="datetimeFigureOut">
               <a:rPr lang="es-ES" smtClean="0"/>
-              <a:t>16/10/14</a:t>
+              <a:t>23/10/14</a:t>
             </a:fld>
             <a:endParaRPr lang="es-ES"/>
           </a:p>
@@ -1884,7 +1886,7 @@
           <a:p>
             <a:fld id="{D7E2043C-A4E6-B74E-9C07-871FC106E480}" type="datetimeFigureOut">
               <a:rPr lang="es-ES" smtClean="0"/>
-              <a:t>16/10/14</a:t>
+              <a:t>23/10/14</a:t>
             </a:fld>
             <a:endParaRPr lang="es-ES"/>
           </a:p>
@@ -1979,7 +1981,7 @@
           <a:p>
             <a:fld id="{D7E2043C-A4E6-B74E-9C07-871FC106E480}" type="datetimeFigureOut">
               <a:rPr lang="es-ES" smtClean="0"/>
-              <a:t>16/10/14</a:t>
+              <a:t>23/10/14</a:t>
             </a:fld>
             <a:endParaRPr lang="es-ES"/>
           </a:p>
@@ -2256,7 +2258,7 @@
           <a:p>
             <a:fld id="{D7E2043C-A4E6-B74E-9C07-871FC106E480}" type="datetimeFigureOut">
               <a:rPr lang="es-ES" smtClean="0"/>
-              <a:t>16/10/14</a:t>
+              <a:t>23/10/14</a:t>
             </a:fld>
             <a:endParaRPr lang="es-ES"/>
           </a:p>
@@ -2509,7 +2511,7 @@
           <a:p>
             <a:fld id="{D7E2043C-A4E6-B74E-9C07-871FC106E480}" type="datetimeFigureOut">
               <a:rPr lang="es-ES" smtClean="0"/>
-              <a:t>16/10/14</a:t>
+              <a:t>23/10/14</a:t>
             </a:fld>
             <a:endParaRPr lang="es-ES"/>
           </a:p>
@@ -2722,7 +2724,7 @@
           <a:p>
             <a:fld id="{D7E2043C-A4E6-B74E-9C07-871FC106E480}" type="datetimeFigureOut">
               <a:rPr lang="es-ES" smtClean="0"/>
-              <a:t>16/10/14</a:t>
+              <a:t>23/10/14</a:t>
             </a:fld>
             <a:endParaRPr lang="es-ES"/>
           </a:p>
@@ -3167,10 +3169,211 @@
   <p:clrMapOvr>
     <a:masterClrMapping/>
   </p:clrMapOvr>
+  <p:timing>
+    <p:tnLst>
+      <p:par>
+        <p:cTn xmlns:p14="http://schemas.microsoft.com/office/powerpoint/2010/main" id="1" dur="indefinite" restart="never" nodeType="tmRoot"/>
+      </p:par>
+    </p:tnLst>
+  </p:timing>
 </p:sld>
 </file>
 
 <file path=ppt/slides/slide2.xml><?xml version="1.0" encoding="utf-8"?>
+<p:sld xmlns:a="http://schemas.openxmlformats.org/drawingml/2006/main" xmlns:r="http://schemas.openxmlformats.org/officeDocument/2006/relationships" xmlns:p="http://schemas.openxmlformats.org/presentationml/2006/main">
+  <p:cSld>
+    <p:spTree>
+      <p:nvGrpSpPr>
+        <p:cNvPr id="1" name=""/>
+        <p:cNvGrpSpPr/>
+        <p:nvPr/>
+      </p:nvGrpSpPr>
+      <p:grpSpPr>
+        <a:xfrm>
+          <a:off x="0" y="0"/>
+          <a:ext cx="0" cy="0"/>
+          <a:chOff x="0" y="0"/>
+          <a:chExt cx="0" cy="0"/>
+        </a:xfrm>
+      </p:grpSpPr>
+      <p:pic>
+        <p:nvPicPr>
+          <p:cNvPr id="2" name="Imagen 1" descr="Captura de pantalla 2014-10-23 a la(s) 11.12.49.png"/>
+          <p:cNvPicPr>
+            <a:picLocks noChangeAspect="1"/>
+          </p:cNvPicPr>
+          <p:nvPr/>
+        </p:nvPicPr>
+        <p:blipFill>
+          <a:blip r:embed="rId2">
+            <a:extLst>
+              <a:ext uri="{28A0092B-C50C-407E-A947-70E740481C1C}">
+                <a14:useLocalDpi xmlns:a14="http://schemas.microsoft.com/office/drawing/2010/main" val="0"/>
+              </a:ext>
+            </a:extLst>
+          </a:blip>
+          <a:stretch>
+            <a:fillRect/>
+          </a:stretch>
+        </p:blipFill>
+        <p:spPr>
+          <a:xfrm>
+            <a:off x="1872443" y="2019713"/>
+            <a:ext cx="2347180" cy="2472603"/>
+          </a:xfrm>
+          <a:prstGeom prst="rect">
+            <a:avLst/>
+          </a:prstGeom>
+        </p:spPr>
+      </p:pic>
+      <p:pic>
+        <p:nvPicPr>
+          <p:cNvPr id="3" name="Imagen 2" descr="Captura de pantalla 2014-10-23 a la(s) 11.12.29.png"/>
+          <p:cNvPicPr>
+            <a:picLocks noChangeAspect="1"/>
+          </p:cNvPicPr>
+          <p:nvPr/>
+        </p:nvPicPr>
+        <p:blipFill>
+          <a:blip r:embed="rId3">
+            <a:extLst>
+              <a:ext uri="{28A0092B-C50C-407E-A947-70E740481C1C}">
+                <a14:useLocalDpi xmlns:a14="http://schemas.microsoft.com/office/drawing/2010/main" val="0"/>
+              </a:ext>
+            </a:extLst>
+          </a:blip>
+          <a:stretch>
+            <a:fillRect/>
+          </a:stretch>
+        </p:blipFill>
+        <p:spPr>
+          <a:xfrm>
+            <a:off x="4744885" y="2019713"/>
+            <a:ext cx="2346572" cy="2472603"/>
+          </a:xfrm>
+          <a:prstGeom prst="rect">
+            <a:avLst/>
+          </a:prstGeom>
+        </p:spPr>
+      </p:pic>
+    </p:spTree>
+    <p:extLst>
+      <p:ext uri="{BB962C8B-B14F-4D97-AF65-F5344CB8AC3E}">
+        <p14:creationId xmlns:p14="http://schemas.microsoft.com/office/powerpoint/2010/main" val="1940621143"/>
+      </p:ext>
+    </p:extLst>
+  </p:cSld>
+  <p:clrMapOvr>
+    <a:masterClrMapping/>
+  </p:clrMapOvr>
+  <p:timing>
+    <p:tnLst>
+      <p:par>
+        <p:cTn xmlns:p14="http://schemas.microsoft.com/office/powerpoint/2010/main" id="1" dur="indefinite" restart="never" nodeType="tmRoot"/>
+      </p:par>
+    </p:tnLst>
+  </p:timing>
+</p:sld>
+</file>
+
+<file path=ppt/slides/slide3.xml><?xml version="1.0" encoding="utf-8"?>
+<p:sld xmlns:a="http://schemas.openxmlformats.org/drawingml/2006/main" xmlns:r="http://schemas.openxmlformats.org/officeDocument/2006/relationships" xmlns:p="http://schemas.openxmlformats.org/presentationml/2006/main">
+  <p:cSld>
+    <p:spTree>
+      <p:nvGrpSpPr>
+        <p:cNvPr id="1" name=""/>
+        <p:cNvGrpSpPr/>
+        <p:nvPr/>
+      </p:nvGrpSpPr>
+      <p:grpSpPr>
+        <a:xfrm>
+          <a:off x="0" y="0"/>
+          <a:ext cx="0" cy="0"/>
+          <a:chOff x="0" y="0"/>
+          <a:chExt cx="0" cy="0"/>
+        </a:xfrm>
+      </p:grpSpPr>
+      <p:pic>
+        <p:nvPicPr>
+          <p:cNvPr id="2" name="Imagen 1" descr="Captura de pantalla 2014-10-23 a la(s) 11.18.25.png"/>
+          <p:cNvPicPr>
+            <a:picLocks noChangeAspect="1"/>
+          </p:cNvPicPr>
+          <p:nvPr/>
+        </p:nvPicPr>
+        <p:blipFill>
+          <a:blip r:embed="rId2">
+            <a:extLst>
+              <a:ext uri="{28A0092B-C50C-407E-A947-70E740481C1C}">
+                <a14:useLocalDpi xmlns:a14="http://schemas.microsoft.com/office/drawing/2010/main" val="0"/>
+              </a:ext>
+            </a:extLst>
+          </a:blip>
+          <a:stretch>
+            <a:fillRect/>
+          </a:stretch>
+        </p:blipFill>
+        <p:spPr>
+          <a:xfrm>
+            <a:off x="1409531" y="1768466"/>
+            <a:ext cx="3003786" cy="3156650"/>
+          </a:xfrm>
+          <a:prstGeom prst="rect">
+            <a:avLst/>
+          </a:prstGeom>
+        </p:spPr>
+      </p:pic>
+      <p:pic>
+        <p:nvPicPr>
+          <p:cNvPr id="3" name="Imagen 2" descr="Captura de pantalla 2014-10-23 a la(s) 11.18.02.png"/>
+          <p:cNvPicPr>
+            <a:picLocks noChangeAspect="1"/>
+          </p:cNvPicPr>
+          <p:nvPr/>
+        </p:nvPicPr>
+        <p:blipFill>
+          <a:blip r:embed="rId3">
+            <a:extLst>
+              <a:ext uri="{28A0092B-C50C-407E-A947-70E740481C1C}">
+                <a14:useLocalDpi xmlns:a14="http://schemas.microsoft.com/office/drawing/2010/main" val="0"/>
+              </a:ext>
+            </a:extLst>
+          </a:blip>
+          <a:stretch>
+            <a:fillRect/>
+          </a:stretch>
+        </p:blipFill>
+        <p:spPr>
+          <a:xfrm>
+            <a:off x="4734952" y="1768466"/>
+            <a:ext cx="3003990" cy="3164918"/>
+          </a:xfrm>
+          <a:prstGeom prst="rect">
+            <a:avLst/>
+          </a:prstGeom>
+        </p:spPr>
+      </p:pic>
+    </p:spTree>
+    <p:extLst>
+      <p:ext uri="{BB962C8B-B14F-4D97-AF65-F5344CB8AC3E}">
+        <p14:creationId xmlns:p14="http://schemas.microsoft.com/office/powerpoint/2010/main" val="2761878465"/>
+      </p:ext>
+    </p:extLst>
+  </p:cSld>
+  <p:clrMapOvr>
+    <a:masterClrMapping/>
+  </p:clrMapOvr>
+  <p:timing>
+    <p:tnLst>
+      <p:par>
+        <p:cTn xmlns:p14="http://schemas.microsoft.com/office/powerpoint/2010/main" id="1" dur="indefinite" restart="never" nodeType="tmRoot"/>
+      </p:par>
+    </p:tnLst>
+  </p:timing>
+</p:sld>
+</file>
+
+<file path=ppt/slides/slide4.xml><?xml version="1.0" encoding="utf-8"?>
 <p:sld xmlns:a="http://schemas.openxmlformats.org/drawingml/2006/main" xmlns:r="http://schemas.openxmlformats.org/officeDocument/2006/relationships" xmlns:p="http://schemas.openxmlformats.org/presentationml/2006/main">
   <p:cSld>
     <p:spTree>
@@ -3287,10 +3490,17 @@
   <p:clrMapOvr>
     <a:masterClrMapping/>
   </p:clrMapOvr>
+  <p:timing>
+    <p:tnLst>
+      <p:par>
+        <p:cTn xmlns:p14="http://schemas.microsoft.com/office/powerpoint/2010/main" id="1" dur="indefinite" restart="never" nodeType="tmRoot"/>
+      </p:par>
+    </p:tnLst>
+  </p:timing>
 </p:sld>
 </file>
 
-<file path=ppt/slides/slide3.xml><?xml version="1.0" encoding="utf-8"?>
+<file path=ppt/slides/slide5.xml><?xml version="1.0" encoding="utf-8"?>
 <p:sld xmlns:a="http://schemas.openxmlformats.org/drawingml/2006/main" xmlns:r="http://schemas.openxmlformats.org/officeDocument/2006/relationships" xmlns:p="http://schemas.openxmlformats.org/presentationml/2006/main">
   <p:cSld>
     <p:spTree>

</xml_diff>

<commit_message>
Actualizados el ppt para hacer las figuras
</commit_message>
<xml_diff>
--- a/images/paraEsquemasYFiguras.pptx
+++ b/images/paraEsquemasYFiguras.pptx
@@ -8,8 +8,9 @@
     <p:sldId id="256" r:id="rId2"/>
     <p:sldId id="259" r:id="rId3"/>
     <p:sldId id="260" r:id="rId4"/>
-    <p:sldId id="258" r:id="rId5"/>
-    <p:sldId id="257" r:id="rId6"/>
+    <p:sldId id="261" r:id="rId5"/>
+    <p:sldId id="258" r:id="rId6"/>
+    <p:sldId id="257" r:id="rId7"/>
   </p:sldIdLst>
   <p:sldSz cx="9144000" cy="6858000" type="screen4x3"/>
   <p:notesSz cx="6858000" cy="9144000"/>
@@ -3390,6 +3391,96 @@
           <a:chExt cx="0" cy="0"/>
         </a:xfrm>
       </p:grpSpPr>
+      <p:pic>
+        <p:nvPicPr>
+          <p:cNvPr id="2" name="Imagen 1" descr="Captura de pantalla 2014-10-23 a la(s) 12.49.51.png"/>
+          <p:cNvPicPr>
+            <a:picLocks noChangeAspect="1"/>
+          </p:cNvPicPr>
+          <p:nvPr/>
+        </p:nvPicPr>
+        <p:blipFill>
+          <a:blip r:embed="rId2">
+            <a:extLst>
+              <a:ext uri="{28A0092B-C50C-407E-A947-70E740481C1C}">
+                <a14:useLocalDpi xmlns:a14="http://schemas.microsoft.com/office/drawing/2010/main" val="0"/>
+              </a:ext>
+            </a:extLst>
+          </a:blip>
+          <a:stretch>
+            <a:fillRect/>
+          </a:stretch>
+        </p:blipFill>
+        <p:spPr>
+          <a:xfrm>
+            <a:off x="1471825" y="1003218"/>
+            <a:ext cx="3638014" cy="2381485"/>
+          </a:xfrm>
+          <a:prstGeom prst="rect">
+            <a:avLst/>
+          </a:prstGeom>
+        </p:spPr>
+      </p:pic>
+      <p:pic>
+        <p:nvPicPr>
+          <p:cNvPr id="3" name="Imagen 2" descr="Captura de pantalla 2014-10-23 a la(s) 12.50.06.png"/>
+          <p:cNvPicPr>
+            <a:picLocks noChangeAspect="1"/>
+          </p:cNvPicPr>
+          <p:nvPr/>
+        </p:nvPicPr>
+        <p:blipFill>
+          <a:blip r:embed="rId3">
+            <a:extLst>
+              <a:ext uri="{28A0092B-C50C-407E-A947-70E740481C1C}">
+                <a14:useLocalDpi xmlns:a14="http://schemas.microsoft.com/office/drawing/2010/main" val="0"/>
+              </a:ext>
+            </a:extLst>
+          </a:blip>
+          <a:stretch>
+            <a:fillRect/>
+          </a:stretch>
+        </p:blipFill>
+        <p:spPr>
+          <a:xfrm>
+            <a:off x="5142336" y="1003218"/>
+            <a:ext cx="3445726" cy="2214243"/>
+          </a:xfrm>
+          <a:prstGeom prst="rect">
+            <a:avLst/>
+          </a:prstGeom>
+        </p:spPr>
+      </p:pic>
+    </p:spTree>
+    <p:extLst>
+      <p:ext uri="{BB962C8B-B14F-4D97-AF65-F5344CB8AC3E}">
+        <p14:creationId xmlns:p14="http://schemas.microsoft.com/office/powerpoint/2010/main" val="991137353"/>
+      </p:ext>
+    </p:extLst>
+  </p:cSld>
+  <p:clrMapOvr>
+    <a:masterClrMapping/>
+  </p:clrMapOvr>
+</p:sld>
+</file>
+
+<file path=ppt/slides/slide5.xml><?xml version="1.0" encoding="utf-8"?>
+<p:sld xmlns:a="http://schemas.openxmlformats.org/drawingml/2006/main" xmlns:r="http://schemas.openxmlformats.org/officeDocument/2006/relationships" xmlns:p="http://schemas.openxmlformats.org/presentationml/2006/main">
+  <p:cSld>
+    <p:spTree>
+      <p:nvGrpSpPr>
+        <p:cNvPr id="1" name=""/>
+        <p:cNvGrpSpPr/>
+        <p:nvPr/>
+      </p:nvGrpSpPr>
+      <p:grpSpPr>
+        <a:xfrm>
+          <a:off x="0" y="0"/>
+          <a:ext cx="0" cy="0"/>
+          <a:chOff x="0" y="0"/>
+          <a:chExt cx="0" cy="0"/>
+        </a:xfrm>
+      </p:grpSpPr>
       <p:grpSp>
         <p:nvGrpSpPr>
           <p:cNvPr id="4" name="Agrupar 3"/>
@@ -3500,7 +3591,7 @@
 </p:sld>
 </file>
 
-<file path=ppt/slides/slide5.xml><?xml version="1.0" encoding="utf-8"?>
+<file path=ppt/slides/slide6.xml><?xml version="1.0" encoding="utf-8"?>
 <p:sld xmlns:a="http://schemas.openxmlformats.org/drawingml/2006/main" xmlns:r="http://schemas.openxmlformats.org/officeDocument/2006/relationships" xmlns:p="http://schemas.openxmlformats.org/presentationml/2006/main">
   <p:cSld>
     <p:spTree>

</xml_diff>

<commit_message>
Tema 8 comenzado. Modelos SI y SIR
</commit_message>
<xml_diff>
--- a/images/paraEsquemasYFiguras.pptx
+++ b/images/paraEsquemasYFiguras.pptx
@@ -6,11 +6,12 @@
   </p:sldMasterIdLst>
   <p:sldIdLst>
     <p:sldId id="256" r:id="rId2"/>
-    <p:sldId id="259" r:id="rId3"/>
-    <p:sldId id="260" r:id="rId4"/>
-    <p:sldId id="261" r:id="rId5"/>
-    <p:sldId id="258" r:id="rId6"/>
-    <p:sldId id="257" r:id="rId7"/>
+    <p:sldId id="262" r:id="rId3"/>
+    <p:sldId id="259" r:id="rId4"/>
+    <p:sldId id="260" r:id="rId5"/>
+    <p:sldId id="261" r:id="rId6"/>
+    <p:sldId id="258" r:id="rId7"/>
+    <p:sldId id="257" r:id="rId8"/>
   </p:sldIdLst>
   <p:sldSz cx="9144000" cy="6858000" type="screen4x3"/>
   <p:notesSz cx="6858000" cy="9144000"/>
@@ -293,7 +294,7 @@
           <a:p>
             <a:fld id="{D7E2043C-A4E6-B74E-9C07-871FC106E480}" type="datetimeFigureOut">
               <a:rPr lang="es-ES" smtClean="0"/>
-              <a:t>23/10/14</a:t>
+              <a:t>02/12/14</a:t>
             </a:fld>
             <a:endParaRPr lang="es-ES"/>
           </a:p>
@@ -463,7 +464,7 @@
           <a:p>
             <a:fld id="{D7E2043C-A4E6-B74E-9C07-871FC106E480}" type="datetimeFigureOut">
               <a:rPr lang="es-ES" smtClean="0"/>
-              <a:t>23/10/14</a:t>
+              <a:t>02/12/14</a:t>
             </a:fld>
             <a:endParaRPr lang="es-ES"/>
           </a:p>
@@ -643,7 +644,7 @@
           <a:p>
             <a:fld id="{D7E2043C-A4E6-B74E-9C07-871FC106E480}" type="datetimeFigureOut">
               <a:rPr lang="es-ES" smtClean="0"/>
-              <a:t>23/10/14</a:t>
+              <a:t>02/12/14</a:t>
             </a:fld>
             <a:endParaRPr lang="es-ES"/>
           </a:p>
@@ -813,7 +814,7 @@
           <a:p>
             <a:fld id="{D7E2043C-A4E6-B74E-9C07-871FC106E480}" type="datetimeFigureOut">
               <a:rPr lang="es-ES" smtClean="0"/>
-              <a:t>23/10/14</a:t>
+              <a:t>02/12/14</a:t>
             </a:fld>
             <a:endParaRPr lang="es-ES"/>
           </a:p>
@@ -1059,7 +1060,7 @@
           <a:p>
             <a:fld id="{D7E2043C-A4E6-B74E-9C07-871FC106E480}" type="datetimeFigureOut">
               <a:rPr lang="es-ES" smtClean="0"/>
-              <a:t>23/10/14</a:t>
+              <a:t>02/12/14</a:t>
             </a:fld>
             <a:endParaRPr lang="es-ES"/>
           </a:p>
@@ -1347,7 +1348,7 @@
           <a:p>
             <a:fld id="{D7E2043C-A4E6-B74E-9C07-871FC106E480}" type="datetimeFigureOut">
               <a:rPr lang="es-ES" smtClean="0"/>
-              <a:t>23/10/14</a:t>
+              <a:t>02/12/14</a:t>
             </a:fld>
             <a:endParaRPr lang="es-ES"/>
           </a:p>
@@ -1769,7 +1770,7 @@
           <a:p>
             <a:fld id="{D7E2043C-A4E6-B74E-9C07-871FC106E480}" type="datetimeFigureOut">
               <a:rPr lang="es-ES" smtClean="0"/>
-              <a:t>23/10/14</a:t>
+              <a:t>02/12/14</a:t>
             </a:fld>
             <a:endParaRPr lang="es-ES"/>
           </a:p>
@@ -1887,7 +1888,7 @@
           <a:p>
             <a:fld id="{D7E2043C-A4E6-B74E-9C07-871FC106E480}" type="datetimeFigureOut">
               <a:rPr lang="es-ES" smtClean="0"/>
-              <a:t>23/10/14</a:t>
+              <a:t>02/12/14</a:t>
             </a:fld>
             <a:endParaRPr lang="es-ES"/>
           </a:p>
@@ -1982,7 +1983,7 @@
           <a:p>
             <a:fld id="{D7E2043C-A4E6-B74E-9C07-871FC106E480}" type="datetimeFigureOut">
               <a:rPr lang="es-ES" smtClean="0"/>
-              <a:t>23/10/14</a:t>
+              <a:t>02/12/14</a:t>
             </a:fld>
             <a:endParaRPr lang="es-ES"/>
           </a:p>
@@ -2259,7 +2260,7 @@
           <a:p>
             <a:fld id="{D7E2043C-A4E6-B74E-9C07-871FC106E480}" type="datetimeFigureOut">
               <a:rPr lang="es-ES" smtClean="0"/>
-              <a:t>23/10/14</a:t>
+              <a:t>02/12/14</a:t>
             </a:fld>
             <a:endParaRPr lang="es-ES"/>
           </a:p>
@@ -2512,7 +2513,7 @@
           <a:p>
             <a:fld id="{D7E2043C-A4E6-B74E-9C07-871FC106E480}" type="datetimeFigureOut">
               <a:rPr lang="es-ES" smtClean="0"/>
-              <a:t>23/10/14</a:t>
+              <a:t>02/12/14</a:t>
             </a:fld>
             <a:endParaRPr lang="es-ES"/>
           </a:p>
@@ -2725,7 +2726,7 @@
           <a:p>
             <a:fld id="{D7E2043C-A4E6-B74E-9C07-871FC106E480}" type="datetimeFigureOut">
               <a:rPr lang="es-ES" smtClean="0"/>
-              <a:t>23/10/14</a:t>
+              <a:t>02/12/14</a:t>
             </a:fld>
             <a:endParaRPr lang="es-ES"/>
           </a:p>
@@ -3197,6 +3198,126 @@
           <a:chExt cx="0" cy="0"/>
         </a:xfrm>
       </p:grpSpPr>
+      <p:grpSp>
+        <p:nvGrpSpPr>
+          <p:cNvPr id="4" name="Agrupar 3"/>
+          <p:cNvGrpSpPr/>
+          <p:nvPr/>
+        </p:nvGrpSpPr>
+        <p:grpSpPr>
+          <a:xfrm>
+            <a:off x="1448084" y="1145349"/>
+            <a:ext cx="6752286" cy="3439283"/>
+            <a:chOff x="1448084" y="1145349"/>
+            <a:chExt cx="6752286" cy="3439283"/>
+          </a:xfrm>
+        </p:grpSpPr>
+        <p:pic>
+          <p:nvPicPr>
+            <p:cNvPr id="2" name="Imagen 1" descr="Captura de pantalla 2014-12-02 a la(s) 17.13.43.png"/>
+            <p:cNvPicPr>
+              <a:picLocks noChangeAspect="1"/>
+            </p:cNvPicPr>
+            <p:nvPr/>
+          </p:nvPicPr>
+          <p:blipFill>
+            <a:blip r:embed="rId2">
+              <a:extLst>
+                <a:ext uri="{28A0092B-C50C-407E-A947-70E740481C1C}">
+                  <a14:useLocalDpi xmlns:a14="http://schemas.microsoft.com/office/drawing/2010/main" val="0"/>
+                </a:ext>
+              </a:extLst>
+            </a:blip>
+            <a:stretch>
+              <a:fillRect/>
+            </a:stretch>
+          </p:blipFill>
+          <p:spPr>
+            <a:xfrm>
+              <a:off x="1727017" y="1288784"/>
+              <a:ext cx="6473353" cy="3295848"/>
+            </a:xfrm>
+            <a:prstGeom prst="rect">
+              <a:avLst/>
+            </a:prstGeom>
+          </p:spPr>
+        </p:pic>
+        <p:sp>
+          <p:nvSpPr>
+            <p:cNvPr id="3" name="Rectángulo 2"/>
+            <p:cNvSpPr/>
+            <p:nvPr/>
+          </p:nvSpPr>
+          <p:spPr>
+            <a:xfrm>
+              <a:off x="1448084" y="1145349"/>
+              <a:ext cx="4112797" cy="718069"/>
+            </a:xfrm>
+            <a:prstGeom prst="rect">
+              <a:avLst/>
+            </a:prstGeom>
+            <a:solidFill>
+              <a:schemeClr val="bg1"/>
+            </a:solidFill>
+            <a:ln>
+              <a:noFill/>
+            </a:ln>
+            <a:effectLst/>
+          </p:spPr>
+          <p:style>
+            <a:lnRef idx="1">
+              <a:schemeClr val="accent1"/>
+            </a:lnRef>
+            <a:fillRef idx="3">
+              <a:schemeClr val="accent1"/>
+            </a:fillRef>
+            <a:effectRef idx="2">
+              <a:schemeClr val="accent1"/>
+            </a:effectRef>
+            <a:fontRef idx="minor">
+              <a:schemeClr val="lt1"/>
+            </a:fontRef>
+          </p:style>
+          <p:txBody>
+            <a:bodyPr rtlCol="0" anchor="ctr"/>
+            <a:lstStyle/>
+            <a:p>
+              <a:pPr algn="ctr"/>
+              <a:endParaRPr lang="es-ES"/>
+            </a:p>
+          </p:txBody>
+        </p:sp>
+      </p:grpSp>
+    </p:spTree>
+    <p:extLst>
+      <p:ext uri="{BB962C8B-B14F-4D97-AF65-F5344CB8AC3E}">
+        <p14:creationId xmlns:p14="http://schemas.microsoft.com/office/powerpoint/2010/main" val="9271454"/>
+      </p:ext>
+    </p:extLst>
+  </p:cSld>
+  <p:clrMapOvr>
+    <a:masterClrMapping/>
+  </p:clrMapOvr>
+</p:sld>
+</file>
+
+<file path=ppt/slides/slide3.xml><?xml version="1.0" encoding="utf-8"?>
+<p:sld xmlns:a="http://schemas.openxmlformats.org/drawingml/2006/main" xmlns:r="http://schemas.openxmlformats.org/officeDocument/2006/relationships" xmlns:p="http://schemas.openxmlformats.org/presentationml/2006/main">
+  <p:cSld>
+    <p:spTree>
+      <p:nvGrpSpPr>
+        <p:cNvPr id="1" name=""/>
+        <p:cNvGrpSpPr/>
+        <p:nvPr/>
+      </p:nvGrpSpPr>
+      <p:grpSpPr>
+        <a:xfrm>
+          <a:off x="0" y="0"/>
+          <a:ext cx="0" cy="0"/>
+          <a:chOff x="0" y="0"/>
+          <a:chExt cx="0" cy="0"/>
+        </a:xfrm>
+      </p:grpSpPr>
       <p:pic>
         <p:nvPicPr>
           <p:cNvPr id="2" name="Imagen 1" descr="Captura de pantalla 2014-10-23 a la(s) 11.12.49.png"/>
@@ -3277,7 +3398,7 @@
 </p:sld>
 </file>
 
-<file path=ppt/slides/slide3.xml><?xml version="1.0" encoding="utf-8"?>
+<file path=ppt/slides/slide4.xml><?xml version="1.0" encoding="utf-8"?>
 <p:sld xmlns:a="http://schemas.openxmlformats.org/drawingml/2006/main" xmlns:r="http://schemas.openxmlformats.org/officeDocument/2006/relationships" xmlns:p="http://schemas.openxmlformats.org/presentationml/2006/main">
   <p:cSld>
     <p:spTree>
@@ -3374,7 +3495,7 @@
 </p:sld>
 </file>
 
-<file path=ppt/slides/slide4.xml><?xml version="1.0" encoding="utf-8"?>
+<file path=ppt/slides/slide5.xml><?xml version="1.0" encoding="utf-8"?>
 <p:sld xmlns:a="http://schemas.openxmlformats.org/drawingml/2006/main" xmlns:r="http://schemas.openxmlformats.org/officeDocument/2006/relationships" xmlns:p="http://schemas.openxmlformats.org/presentationml/2006/main">
   <p:cSld>
     <p:spTree>
@@ -3464,7 +3585,7 @@
 </p:sld>
 </file>
 
-<file path=ppt/slides/slide5.xml><?xml version="1.0" encoding="utf-8"?>
+<file path=ppt/slides/slide6.xml><?xml version="1.0" encoding="utf-8"?>
 <p:sld xmlns:a="http://schemas.openxmlformats.org/drawingml/2006/main" xmlns:r="http://schemas.openxmlformats.org/officeDocument/2006/relationships" xmlns:p="http://schemas.openxmlformats.org/presentationml/2006/main">
   <p:cSld>
     <p:spTree>
@@ -3591,7 +3712,7 @@
 </p:sld>
 </file>
 
-<file path=ppt/slides/slide6.xml><?xml version="1.0" encoding="utf-8"?>
+<file path=ppt/slides/slide7.xml><?xml version="1.0" encoding="utf-8"?>
 <p:sld xmlns:a="http://schemas.openxmlformats.org/drawingml/2006/main" xmlns:r="http://schemas.openxmlformats.org/officeDocument/2006/relationships" xmlns:p="http://schemas.openxmlformats.org/presentationml/2006/main">
   <p:cSld>
     <p:spTree>

</xml_diff>

<commit_message>
Más apuntes del tema8 e imágenes del mismo
</commit_message>
<xml_diff>
--- a/images/paraEsquemasYFiguras.pptx
+++ b/images/paraEsquemasYFiguras.pptx
@@ -6,12 +6,14 @@
   </p:sldMasterIdLst>
   <p:sldIdLst>
     <p:sldId id="256" r:id="rId2"/>
-    <p:sldId id="262" r:id="rId3"/>
-    <p:sldId id="259" r:id="rId4"/>
-    <p:sldId id="260" r:id="rId5"/>
-    <p:sldId id="261" r:id="rId6"/>
-    <p:sldId id="258" r:id="rId7"/>
-    <p:sldId id="257" r:id="rId8"/>
+    <p:sldId id="263" r:id="rId3"/>
+    <p:sldId id="264" r:id="rId4"/>
+    <p:sldId id="262" r:id="rId5"/>
+    <p:sldId id="259" r:id="rId6"/>
+    <p:sldId id="260" r:id="rId7"/>
+    <p:sldId id="261" r:id="rId8"/>
+    <p:sldId id="258" r:id="rId9"/>
+    <p:sldId id="257" r:id="rId10"/>
   </p:sldIdLst>
   <p:sldSz cx="9144000" cy="6858000" type="screen4x3"/>
   <p:notesSz cx="6858000" cy="9144000"/>
@@ -294,7 +296,7 @@
           <a:p>
             <a:fld id="{D7E2043C-A4E6-B74E-9C07-871FC106E480}" type="datetimeFigureOut">
               <a:rPr lang="es-ES" smtClean="0"/>
-              <a:t>02/12/14</a:t>
+              <a:t>04/12/14</a:t>
             </a:fld>
             <a:endParaRPr lang="es-ES"/>
           </a:p>
@@ -464,7 +466,7 @@
           <a:p>
             <a:fld id="{D7E2043C-A4E6-B74E-9C07-871FC106E480}" type="datetimeFigureOut">
               <a:rPr lang="es-ES" smtClean="0"/>
-              <a:t>02/12/14</a:t>
+              <a:t>04/12/14</a:t>
             </a:fld>
             <a:endParaRPr lang="es-ES"/>
           </a:p>
@@ -644,7 +646,7 @@
           <a:p>
             <a:fld id="{D7E2043C-A4E6-B74E-9C07-871FC106E480}" type="datetimeFigureOut">
               <a:rPr lang="es-ES" smtClean="0"/>
-              <a:t>02/12/14</a:t>
+              <a:t>04/12/14</a:t>
             </a:fld>
             <a:endParaRPr lang="es-ES"/>
           </a:p>
@@ -814,7 +816,7 @@
           <a:p>
             <a:fld id="{D7E2043C-A4E6-B74E-9C07-871FC106E480}" type="datetimeFigureOut">
               <a:rPr lang="es-ES" smtClean="0"/>
-              <a:t>02/12/14</a:t>
+              <a:t>04/12/14</a:t>
             </a:fld>
             <a:endParaRPr lang="es-ES"/>
           </a:p>
@@ -1060,7 +1062,7 @@
           <a:p>
             <a:fld id="{D7E2043C-A4E6-B74E-9C07-871FC106E480}" type="datetimeFigureOut">
               <a:rPr lang="es-ES" smtClean="0"/>
-              <a:t>02/12/14</a:t>
+              <a:t>04/12/14</a:t>
             </a:fld>
             <a:endParaRPr lang="es-ES"/>
           </a:p>
@@ -1348,7 +1350,7 @@
           <a:p>
             <a:fld id="{D7E2043C-A4E6-B74E-9C07-871FC106E480}" type="datetimeFigureOut">
               <a:rPr lang="es-ES" smtClean="0"/>
-              <a:t>02/12/14</a:t>
+              <a:t>04/12/14</a:t>
             </a:fld>
             <a:endParaRPr lang="es-ES"/>
           </a:p>
@@ -1770,7 +1772,7 @@
           <a:p>
             <a:fld id="{D7E2043C-A4E6-B74E-9C07-871FC106E480}" type="datetimeFigureOut">
               <a:rPr lang="es-ES" smtClean="0"/>
-              <a:t>02/12/14</a:t>
+              <a:t>04/12/14</a:t>
             </a:fld>
             <a:endParaRPr lang="es-ES"/>
           </a:p>
@@ -1888,7 +1890,7 @@
           <a:p>
             <a:fld id="{D7E2043C-A4E6-B74E-9C07-871FC106E480}" type="datetimeFigureOut">
               <a:rPr lang="es-ES" smtClean="0"/>
-              <a:t>02/12/14</a:t>
+              <a:t>04/12/14</a:t>
             </a:fld>
             <a:endParaRPr lang="es-ES"/>
           </a:p>
@@ -1983,7 +1985,7 @@
           <a:p>
             <a:fld id="{D7E2043C-A4E6-B74E-9C07-871FC106E480}" type="datetimeFigureOut">
               <a:rPr lang="es-ES" smtClean="0"/>
-              <a:t>02/12/14</a:t>
+              <a:t>04/12/14</a:t>
             </a:fld>
             <a:endParaRPr lang="es-ES"/>
           </a:p>
@@ -2260,7 +2262,7 @@
           <a:p>
             <a:fld id="{D7E2043C-A4E6-B74E-9C07-871FC106E480}" type="datetimeFigureOut">
               <a:rPr lang="es-ES" smtClean="0"/>
-              <a:t>02/12/14</a:t>
+              <a:t>04/12/14</a:t>
             </a:fld>
             <a:endParaRPr lang="es-ES"/>
           </a:p>
@@ -2513,7 +2515,7 @@
           <a:p>
             <a:fld id="{D7E2043C-A4E6-B74E-9C07-871FC106E480}" type="datetimeFigureOut">
               <a:rPr lang="es-ES" smtClean="0"/>
-              <a:t>02/12/14</a:t>
+              <a:t>04/12/14</a:t>
             </a:fld>
             <a:endParaRPr lang="es-ES"/>
           </a:p>
@@ -2726,7 +2728,7 @@
           <a:p>
             <a:fld id="{D7E2043C-A4E6-B74E-9C07-871FC106E480}" type="datetimeFigureOut">
               <a:rPr lang="es-ES" smtClean="0"/>
-              <a:t>02/12/14</a:t>
+              <a:t>04/12/14</a:t>
             </a:fld>
             <a:endParaRPr lang="es-ES"/>
           </a:p>
@@ -3198,6 +3200,310 @@
           <a:chExt cx="0" cy="0"/>
         </a:xfrm>
       </p:grpSpPr>
+      <p:pic>
+        <p:nvPicPr>
+          <p:cNvPr id="2" name="Imagen 1" descr="Captura de pantalla 2014-12-04 a la(s) 11.30.20.png"/>
+          <p:cNvPicPr>
+            <a:picLocks noChangeAspect="1"/>
+          </p:cNvPicPr>
+          <p:nvPr/>
+        </p:nvPicPr>
+        <p:blipFill>
+          <a:blip r:embed="rId2">
+            <a:extLst>
+              <a:ext uri="{28A0092B-C50C-407E-A947-70E740481C1C}">
+                <a14:useLocalDpi xmlns:a14="http://schemas.microsoft.com/office/drawing/2010/main" val="0"/>
+              </a:ext>
+            </a:extLst>
+          </a:blip>
+          <a:stretch>
+            <a:fillRect/>
+          </a:stretch>
+        </p:blipFill>
+        <p:spPr>
+          <a:xfrm>
+            <a:off x="534709" y="961380"/>
+            <a:ext cx="3341838" cy="3482477"/>
+          </a:xfrm>
+          <a:prstGeom prst="rect">
+            <a:avLst/>
+          </a:prstGeom>
+        </p:spPr>
+      </p:pic>
+      <p:pic>
+        <p:nvPicPr>
+          <p:cNvPr id="3" name="Imagen 2" descr="Captura de pantalla 2014-12-04 a la(s) 11.29.34.png"/>
+          <p:cNvPicPr>
+            <a:picLocks noChangeAspect="1"/>
+          </p:cNvPicPr>
+          <p:nvPr/>
+        </p:nvPicPr>
+        <p:blipFill>
+          <a:blip r:embed="rId3">
+            <a:extLst>
+              <a:ext uri="{28A0092B-C50C-407E-A947-70E740481C1C}">
+                <a14:useLocalDpi xmlns:a14="http://schemas.microsoft.com/office/drawing/2010/main" val="0"/>
+              </a:ext>
+            </a:extLst>
+          </a:blip>
+          <a:stretch>
+            <a:fillRect/>
+          </a:stretch>
+        </p:blipFill>
+        <p:spPr>
+          <a:xfrm>
+            <a:off x="4038959" y="961380"/>
+            <a:ext cx="3375530" cy="3482477"/>
+          </a:xfrm>
+          <a:prstGeom prst="rect">
+            <a:avLst/>
+          </a:prstGeom>
+        </p:spPr>
+      </p:pic>
+      <p:sp>
+        <p:nvSpPr>
+          <p:cNvPr id="4" name="CuadroTexto 3"/>
+          <p:cNvSpPr txBox="1"/>
+          <p:nvPr/>
+        </p:nvSpPr>
+        <p:spPr>
+          <a:xfrm>
+            <a:off x="1495562" y="4441996"/>
+            <a:ext cx="1409949" cy="307777"/>
+          </a:xfrm>
+          <a:prstGeom prst="rect">
+            <a:avLst/>
+          </a:prstGeom>
+          <a:noFill/>
+        </p:spPr>
+        <p:txBody>
+          <a:bodyPr wrap="none" rtlCol="0">
+            <a:spAutoFit/>
+          </a:bodyPr>
+          <a:lstStyle/>
+          <a:p>
+            <a:r>
+              <a:rPr lang="es-ES" sz="1400" dirty="0" smtClean="0"/>
+              <a:t>N=300; &lt;k&gt; = 1.0</a:t>
+            </a:r>
+            <a:endParaRPr lang="es-ES" sz="1400" dirty="0"/>
+          </a:p>
+        </p:txBody>
+      </p:sp>
+      <p:sp>
+        <p:nvSpPr>
+          <p:cNvPr id="5" name="CuadroTexto 4"/>
+          <p:cNvSpPr txBox="1"/>
+          <p:nvPr/>
+        </p:nvSpPr>
+        <p:spPr>
+          <a:xfrm>
+            <a:off x="5036716" y="4441996"/>
+            <a:ext cx="1409949" cy="307777"/>
+          </a:xfrm>
+          <a:prstGeom prst="rect">
+            <a:avLst/>
+          </a:prstGeom>
+          <a:noFill/>
+        </p:spPr>
+        <p:txBody>
+          <a:bodyPr wrap="none" rtlCol="0">
+            <a:spAutoFit/>
+          </a:bodyPr>
+          <a:lstStyle/>
+          <a:p>
+            <a:r>
+              <a:rPr lang="es-ES" sz="1400" dirty="0" smtClean="0"/>
+              <a:t>N=300; &lt;k&gt; = 3.0</a:t>
+            </a:r>
+            <a:endParaRPr lang="es-ES" sz="1400" dirty="0"/>
+          </a:p>
+        </p:txBody>
+      </p:sp>
+    </p:spTree>
+    <p:extLst>
+      <p:ext uri="{BB962C8B-B14F-4D97-AF65-F5344CB8AC3E}">
+        <p14:creationId xmlns:p14="http://schemas.microsoft.com/office/powerpoint/2010/main" val="2579316567"/>
+      </p:ext>
+    </p:extLst>
+  </p:cSld>
+  <p:clrMapOvr>
+    <a:masterClrMapping/>
+  </p:clrMapOvr>
+</p:sld>
+</file>
+
+<file path=ppt/slides/slide3.xml><?xml version="1.0" encoding="utf-8"?>
+<p:sld xmlns:a="http://schemas.openxmlformats.org/drawingml/2006/main" xmlns:r="http://schemas.openxmlformats.org/officeDocument/2006/relationships" xmlns:p="http://schemas.openxmlformats.org/presentationml/2006/main">
+  <p:cSld>
+    <p:spTree>
+      <p:nvGrpSpPr>
+        <p:cNvPr id="1" name=""/>
+        <p:cNvGrpSpPr/>
+        <p:nvPr/>
+      </p:nvGrpSpPr>
+      <p:grpSpPr>
+        <a:xfrm>
+          <a:off x="0" y="0"/>
+          <a:ext cx="0" cy="0"/>
+          <a:chOff x="0" y="0"/>
+          <a:chExt cx="0" cy="0"/>
+        </a:xfrm>
+      </p:grpSpPr>
+      <p:pic>
+        <p:nvPicPr>
+          <p:cNvPr id="2" name="Imagen 1" descr="Captura de pantalla 2014-12-04 a la(s) 11.51.59.png"/>
+          <p:cNvPicPr>
+            <a:picLocks noChangeAspect="1"/>
+          </p:cNvPicPr>
+          <p:nvPr/>
+        </p:nvPicPr>
+        <p:blipFill>
+          <a:blip r:embed="rId2">
+            <a:extLst>
+              <a:ext uri="{28A0092B-C50C-407E-A947-70E740481C1C}">
+                <a14:useLocalDpi xmlns:a14="http://schemas.microsoft.com/office/drawing/2010/main" val="0"/>
+              </a:ext>
+            </a:extLst>
+          </a:blip>
+          <a:stretch>
+            <a:fillRect/>
+          </a:stretch>
+        </p:blipFill>
+        <p:spPr>
+          <a:xfrm>
+            <a:off x="540278" y="906294"/>
+            <a:ext cx="2759455" cy="2912758"/>
+          </a:xfrm>
+          <a:prstGeom prst="rect">
+            <a:avLst/>
+          </a:prstGeom>
+        </p:spPr>
+      </p:pic>
+      <p:pic>
+        <p:nvPicPr>
+          <p:cNvPr id="3" name="Imagen 2" descr="Captura de pantalla 2014-12-04 a la(s) 11.52.35.png"/>
+          <p:cNvPicPr>
+            <a:picLocks noChangeAspect="1"/>
+          </p:cNvPicPr>
+          <p:nvPr/>
+        </p:nvPicPr>
+        <p:blipFill>
+          <a:blip r:embed="rId3">
+            <a:extLst>
+              <a:ext uri="{28A0092B-C50C-407E-A947-70E740481C1C}">
+                <a14:useLocalDpi xmlns:a14="http://schemas.microsoft.com/office/drawing/2010/main" val="0"/>
+              </a:ext>
+            </a:extLst>
+          </a:blip>
+          <a:stretch>
+            <a:fillRect/>
+          </a:stretch>
+        </p:blipFill>
+        <p:spPr>
+          <a:xfrm>
+            <a:off x="3546308" y="906294"/>
+            <a:ext cx="2773725" cy="2912758"/>
+          </a:xfrm>
+          <a:prstGeom prst="rect">
+            <a:avLst/>
+          </a:prstGeom>
+        </p:spPr>
+      </p:pic>
+      <p:sp>
+        <p:nvSpPr>
+          <p:cNvPr id="4" name="CuadroTexto 3"/>
+          <p:cNvSpPr txBox="1"/>
+          <p:nvPr/>
+        </p:nvSpPr>
+        <p:spPr>
+          <a:xfrm>
+            <a:off x="1056389" y="3819052"/>
+            <a:ext cx="1840906" cy="307777"/>
+          </a:xfrm>
+          <a:prstGeom prst="rect">
+            <a:avLst/>
+          </a:prstGeom>
+          <a:noFill/>
+        </p:spPr>
+        <p:txBody>
+          <a:bodyPr wrap="none" rtlCol="0">
+            <a:spAutoFit/>
+          </a:bodyPr>
+          <a:lstStyle/>
+          <a:p>
+            <a:r>
+              <a:rPr lang="es-ES" sz="1400" dirty="0" smtClean="0"/>
+              <a:t>Sin enlace preferencial</a:t>
+            </a:r>
+            <a:endParaRPr lang="es-ES" sz="1400" dirty="0"/>
+          </a:p>
+        </p:txBody>
+      </p:sp>
+      <p:sp>
+        <p:nvSpPr>
+          <p:cNvPr id="5" name="CuadroTexto 4"/>
+          <p:cNvSpPr txBox="1"/>
+          <p:nvPr/>
+        </p:nvSpPr>
+        <p:spPr>
+          <a:xfrm>
+            <a:off x="4063414" y="3819052"/>
+            <a:ext cx="1907619" cy="307777"/>
+          </a:xfrm>
+          <a:prstGeom prst="rect">
+            <a:avLst/>
+          </a:prstGeom>
+          <a:noFill/>
+        </p:spPr>
+        <p:txBody>
+          <a:bodyPr wrap="none" rtlCol="0">
+            <a:spAutoFit/>
+          </a:bodyPr>
+          <a:lstStyle/>
+          <a:p>
+            <a:r>
+              <a:rPr lang="es-ES" sz="1400" smtClean="0"/>
+              <a:t>Con enlace </a:t>
+            </a:r>
+            <a:r>
+              <a:rPr lang="es-ES" sz="1400" dirty="0" smtClean="0"/>
+              <a:t>preferencial</a:t>
+            </a:r>
+            <a:endParaRPr lang="es-ES" sz="1400" dirty="0"/>
+          </a:p>
+        </p:txBody>
+      </p:sp>
+    </p:spTree>
+    <p:extLst>
+      <p:ext uri="{BB962C8B-B14F-4D97-AF65-F5344CB8AC3E}">
+        <p14:creationId xmlns:p14="http://schemas.microsoft.com/office/powerpoint/2010/main" val="888234259"/>
+      </p:ext>
+    </p:extLst>
+  </p:cSld>
+  <p:clrMapOvr>
+    <a:masterClrMapping/>
+  </p:clrMapOvr>
+</p:sld>
+</file>
+
+<file path=ppt/slides/slide4.xml><?xml version="1.0" encoding="utf-8"?>
+<p:sld xmlns:a="http://schemas.openxmlformats.org/drawingml/2006/main" xmlns:r="http://schemas.openxmlformats.org/officeDocument/2006/relationships" xmlns:p="http://schemas.openxmlformats.org/presentationml/2006/main">
+  <p:cSld>
+    <p:spTree>
+      <p:nvGrpSpPr>
+        <p:cNvPr id="1" name=""/>
+        <p:cNvGrpSpPr/>
+        <p:nvPr/>
+      </p:nvGrpSpPr>
+      <p:grpSpPr>
+        <a:xfrm>
+          <a:off x="0" y="0"/>
+          <a:ext cx="0" cy="0"/>
+          <a:chOff x="0" y="0"/>
+          <a:chExt cx="0" cy="0"/>
+        </a:xfrm>
+      </p:grpSpPr>
       <p:grpSp>
         <p:nvGrpSpPr>
           <p:cNvPr id="4" name="Agrupar 3"/>
@@ -3301,7 +3607,7 @@
 </p:sld>
 </file>
 
-<file path=ppt/slides/slide3.xml><?xml version="1.0" encoding="utf-8"?>
+<file path=ppt/slides/slide5.xml><?xml version="1.0" encoding="utf-8"?>
 <p:sld xmlns:a="http://schemas.openxmlformats.org/drawingml/2006/main" xmlns:r="http://schemas.openxmlformats.org/officeDocument/2006/relationships" xmlns:p="http://schemas.openxmlformats.org/presentationml/2006/main">
   <p:cSld>
     <p:spTree>
@@ -3398,7 +3704,7 @@
 </p:sld>
 </file>
 
-<file path=ppt/slides/slide4.xml><?xml version="1.0" encoding="utf-8"?>
+<file path=ppt/slides/slide6.xml><?xml version="1.0" encoding="utf-8"?>
 <p:sld xmlns:a="http://schemas.openxmlformats.org/drawingml/2006/main" xmlns:r="http://schemas.openxmlformats.org/officeDocument/2006/relationships" xmlns:p="http://schemas.openxmlformats.org/presentationml/2006/main">
   <p:cSld>
     <p:spTree>
@@ -3495,7 +3801,7 @@
 </p:sld>
 </file>
 
-<file path=ppt/slides/slide5.xml><?xml version="1.0" encoding="utf-8"?>
+<file path=ppt/slides/slide7.xml><?xml version="1.0" encoding="utf-8"?>
 <p:sld xmlns:a="http://schemas.openxmlformats.org/drawingml/2006/main" xmlns:r="http://schemas.openxmlformats.org/officeDocument/2006/relationships" xmlns:p="http://schemas.openxmlformats.org/presentationml/2006/main">
   <p:cSld>
     <p:spTree>
@@ -3585,7 +3891,7 @@
 </p:sld>
 </file>
 
-<file path=ppt/slides/slide6.xml><?xml version="1.0" encoding="utf-8"?>
+<file path=ppt/slides/slide8.xml><?xml version="1.0" encoding="utf-8"?>
 <p:sld xmlns:a="http://schemas.openxmlformats.org/drawingml/2006/main" xmlns:r="http://schemas.openxmlformats.org/officeDocument/2006/relationships" xmlns:p="http://schemas.openxmlformats.org/presentationml/2006/main">
   <p:cSld>
     <p:spTree>
@@ -3712,7 +4018,7 @@
 </p:sld>
 </file>
 
-<file path=ppt/slides/slide7.xml><?xml version="1.0" encoding="utf-8"?>
+<file path=ppt/slides/slide9.xml><?xml version="1.0" encoding="utf-8"?>
 <p:sld xmlns:a="http://schemas.openxmlformats.org/drawingml/2006/main" xmlns:r="http://schemas.openxmlformats.org/officeDocument/2006/relationships" xmlns:p="http://schemas.openxmlformats.org/presentationml/2006/main">
   <p:cSld>
     <p:spTree>

</xml_diff>

<commit_message>
Completado la sección  de modelos de difusión en redes
</commit_message>
<xml_diff>
--- a/images/paraEsquemasYFiguras.pptx
+++ b/images/paraEsquemasYFiguras.pptx
@@ -6,14 +6,15 @@
   </p:sldMasterIdLst>
   <p:sldIdLst>
     <p:sldId id="256" r:id="rId2"/>
-    <p:sldId id="263" r:id="rId3"/>
-    <p:sldId id="264" r:id="rId4"/>
-    <p:sldId id="262" r:id="rId5"/>
-    <p:sldId id="259" r:id="rId6"/>
-    <p:sldId id="260" r:id="rId7"/>
-    <p:sldId id="261" r:id="rId8"/>
-    <p:sldId id="258" r:id="rId9"/>
-    <p:sldId id="257" r:id="rId10"/>
+    <p:sldId id="265" r:id="rId3"/>
+    <p:sldId id="263" r:id="rId4"/>
+    <p:sldId id="264" r:id="rId5"/>
+    <p:sldId id="262" r:id="rId6"/>
+    <p:sldId id="259" r:id="rId7"/>
+    <p:sldId id="260" r:id="rId8"/>
+    <p:sldId id="261" r:id="rId9"/>
+    <p:sldId id="258" r:id="rId10"/>
+    <p:sldId id="257" r:id="rId11"/>
   </p:sldIdLst>
   <p:sldSz cx="9144000" cy="6858000" type="screen4x3"/>
   <p:notesSz cx="6858000" cy="9144000"/>
@@ -3183,7 +3184,331 @@
 </p:sld>
 </file>
 
+<file path=ppt/slides/slide10.xml><?xml version="1.0" encoding="utf-8"?>
+<p:sld xmlns:a="http://schemas.openxmlformats.org/drawingml/2006/main" xmlns:r="http://schemas.openxmlformats.org/officeDocument/2006/relationships" xmlns:p="http://schemas.openxmlformats.org/presentationml/2006/main">
+  <p:cSld>
+    <p:spTree>
+      <p:nvGrpSpPr>
+        <p:cNvPr id="1" name=""/>
+        <p:cNvGrpSpPr/>
+        <p:nvPr/>
+      </p:nvGrpSpPr>
+      <p:grpSpPr>
+        <a:xfrm>
+          <a:off x="0" y="0"/>
+          <a:ext cx="0" cy="0"/>
+          <a:chOff x="0" y="0"/>
+          <a:chExt cx="0" cy="0"/>
+        </a:xfrm>
+      </p:grpSpPr>
+      <p:pic>
+        <p:nvPicPr>
+          <p:cNvPr id="2" name="Imagen 1" descr="powerlawExp.png"/>
+          <p:cNvPicPr>
+            <a:picLocks noChangeAspect="1"/>
+          </p:cNvPicPr>
+          <p:nvPr/>
+        </p:nvPicPr>
+        <p:blipFill>
+          <a:blip r:embed="rId2">
+            <a:extLst>
+              <a:ext uri="{28A0092B-C50C-407E-A947-70E740481C1C}">
+                <a14:useLocalDpi xmlns:a14="http://schemas.microsoft.com/office/drawing/2010/main" val="0"/>
+              </a:ext>
+            </a:extLst>
+          </a:blip>
+          <a:stretch>
+            <a:fillRect/>
+          </a:stretch>
+        </p:blipFill>
+        <p:spPr>
+          <a:xfrm>
+            <a:off x="1584584" y="3053358"/>
+            <a:ext cx="3287209" cy="1563645"/>
+          </a:xfrm>
+          <a:prstGeom prst="rect">
+            <a:avLst/>
+          </a:prstGeom>
+        </p:spPr>
+      </p:pic>
+      <p:pic>
+        <p:nvPicPr>
+          <p:cNvPr id="3" name="Imagen 2" descr="Captura de pantalla 2014-10-15 a la(s) 18.24.58.png"/>
+          <p:cNvPicPr>
+            <a:picLocks noChangeAspect="1"/>
+          </p:cNvPicPr>
+          <p:nvPr/>
+        </p:nvPicPr>
+        <p:blipFill>
+          <a:blip r:embed="rId3">
+            <a:extLst>
+              <a:ext uri="{28A0092B-C50C-407E-A947-70E740481C1C}">
+                <a14:useLocalDpi xmlns:a14="http://schemas.microsoft.com/office/drawing/2010/main" val="0"/>
+              </a:ext>
+            </a:extLst>
+          </a:blip>
+          <a:stretch>
+            <a:fillRect/>
+          </a:stretch>
+        </p:blipFill>
+        <p:spPr>
+          <a:xfrm>
+            <a:off x="5109184" y="2931619"/>
+            <a:ext cx="1844870" cy="1685384"/>
+          </a:xfrm>
+          <a:prstGeom prst="rect">
+            <a:avLst/>
+          </a:prstGeom>
+        </p:spPr>
+      </p:pic>
+      <p:sp>
+        <p:nvSpPr>
+          <p:cNvPr id="4" name="CuadroTexto 3"/>
+          <p:cNvSpPr txBox="1"/>
+          <p:nvPr/>
+        </p:nvSpPr>
+        <p:spPr>
+          <a:xfrm>
+            <a:off x="2753734" y="4617003"/>
+            <a:ext cx="1191352" cy="338554"/>
+          </a:xfrm>
+          <a:prstGeom prst="rect">
+            <a:avLst/>
+          </a:prstGeom>
+          <a:noFill/>
+        </p:spPr>
+        <p:txBody>
+          <a:bodyPr wrap="none" rtlCol="0">
+            <a:spAutoFit/>
+          </a:bodyPr>
+          <a:lstStyle/>
+          <a:p>
+            <a:r>
+              <a:rPr lang="es-ES" sz="1600" dirty="0" smtClean="0"/>
+              <a:t>Escala lineal</a:t>
+            </a:r>
+            <a:endParaRPr lang="es-ES" sz="1600" dirty="0"/>
+          </a:p>
+        </p:txBody>
+      </p:sp>
+      <p:sp>
+        <p:nvSpPr>
+          <p:cNvPr id="5" name="CuadroTexto 4"/>
+          <p:cNvSpPr txBox="1"/>
+          <p:nvPr/>
+        </p:nvSpPr>
+        <p:spPr>
+          <a:xfrm>
+            <a:off x="5180404" y="4615109"/>
+            <a:ext cx="1675459" cy="338554"/>
+          </a:xfrm>
+          <a:prstGeom prst="rect">
+            <a:avLst/>
+          </a:prstGeom>
+          <a:noFill/>
+        </p:spPr>
+        <p:txBody>
+          <a:bodyPr wrap="none" rtlCol="0">
+            <a:spAutoFit/>
+          </a:bodyPr>
+          <a:lstStyle/>
+          <a:p>
+            <a:r>
+              <a:rPr lang="es-ES" sz="1600" dirty="0" smtClean="0"/>
+              <a:t>Escala logarítmica</a:t>
+            </a:r>
+            <a:endParaRPr lang="es-ES" sz="1600" dirty="0"/>
+          </a:p>
+        </p:txBody>
+      </p:sp>
+    </p:spTree>
+    <p:extLst>
+      <p:ext uri="{BB962C8B-B14F-4D97-AF65-F5344CB8AC3E}">
+        <p14:creationId xmlns:p14="http://schemas.microsoft.com/office/powerpoint/2010/main" val="2484292234"/>
+      </p:ext>
+    </p:extLst>
+  </p:cSld>
+  <p:clrMapOvr>
+    <a:masterClrMapping/>
+  </p:clrMapOvr>
+</p:sld>
+</file>
+
 <file path=ppt/slides/slide2.xml><?xml version="1.0" encoding="utf-8"?>
+<p:sld xmlns:a="http://schemas.openxmlformats.org/drawingml/2006/main" xmlns:r="http://schemas.openxmlformats.org/officeDocument/2006/relationships" xmlns:p="http://schemas.openxmlformats.org/presentationml/2006/main">
+  <p:cSld>
+    <p:spTree>
+      <p:nvGrpSpPr>
+        <p:cNvPr id="1" name=""/>
+        <p:cNvGrpSpPr/>
+        <p:nvPr/>
+      </p:nvGrpSpPr>
+      <p:grpSpPr>
+        <a:xfrm>
+          <a:off x="0" y="0"/>
+          <a:ext cx="0" cy="0"/>
+          <a:chOff x="0" y="0"/>
+          <a:chExt cx="0" cy="0"/>
+        </a:xfrm>
+      </p:grpSpPr>
+      <p:pic>
+        <p:nvPicPr>
+          <p:cNvPr id="2" name="Imagen 1" descr="Captura de pantalla 2014-12-04 a la(s) 17.09.48.png"/>
+          <p:cNvPicPr>
+            <a:picLocks noChangeAspect="1"/>
+          </p:cNvPicPr>
+          <p:nvPr/>
+        </p:nvPicPr>
+        <p:blipFill>
+          <a:blip r:embed="rId2">
+            <a:extLst>
+              <a:ext uri="{28A0092B-C50C-407E-A947-70E740481C1C}">
+                <a14:useLocalDpi xmlns:a14="http://schemas.microsoft.com/office/drawing/2010/main" val="0"/>
+              </a:ext>
+            </a:extLst>
+          </a:blip>
+          <a:stretch>
+            <a:fillRect/>
+          </a:stretch>
+        </p:blipFill>
+        <p:spPr>
+          <a:xfrm>
+            <a:off x="783389" y="1915992"/>
+            <a:ext cx="2561715" cy="2684537"/>
+          </a:xfrm>
+          <a:prstGeom prst="rect">
+            <a:avLst/>
+          </a:prstGeom>
+        </p:spPr>
+      </p:pic>
+      <p:pic>
+        <p:nvPicPr>
+          <p:cNvPr id="3" name="Imagen 2" descr="Captura de pantalla 2014-12-04 a la(s) 17.10.27.png"/>
+          <p:cNvPicPr>
+            <a:picLocks noChangeAspect="1"/>
+          </p:cNvPicPr>
+          <p:nvPr/>
+        </p:nvPicPr>
+        <p:blipFill>
+          <a:blip r:embed="rId3">
+            <a:extLst>
+              <a:ext uri="{28A0092B-C50C-407E-A947-70E740481C1C}">
+                <a14:useLocalDpi xmlns:a14="http://schemas.microsoft.com/office/drawing/2010/main" val="0"/>
+              </a:ext>
+            </a:extLst>
+          </a:blip>
+          <a:stretch>
+            <a:fillRect/>
+          </a:stretch>
+        </p:blipFill>
+        <p:spPr>
+          <a:xfrm>
+            <a:off x="3515491" y="1926153"/>
+            <a:ext cx="2561715" cy="2672840"/>
+          </a:xfrm>
+          <a:prstGeom prst="rect">
+            <a:avLst/>
+          </a:prstGeom>
+        </p:spPr>
+      </p:pic>
+      <p:sp>
+        <p:nvSpPr>
+          <p:cNvPr id="4" name="CuadroTexto 3"/>
+          <p:cNvSpPr txBox="1"/>
+          <p:nvPr/>
+        </p:nvSpPr>
+        <p:spPr>
+          <a:xfrm>
+            <a:off x="1495562" y="4595271"/>
+            <a:ext cx="1162648" cy="307777"/>
+          </a:xfrm>
+          <a:prstGeom prst="rect">
+            <a:avLst/>
+          </a:prstGeom>
+          <a:noFill/>
+        </p:spPr>
+        <p:txBody>
+          <a:bodyPr wrap="none" rtlCol="0">
+            <a:spAutoFit/>
+          </a:bodyPr>
+          <a:lstStyle/>
+          <a:p>
+            <a:r>
+              <a:rPr lang="es-ES" sz="1400" dirty="0" smtClean="0"/>
+              <a:t>N</a:t>
+            </a:r>
+            <a:r>
+              <a:rPr lang="es-ES" sz="1400" dirty="0" smtClean="0"/>
+              <a:t>=200</a:t>
+            </a:r>
+            <a:r>
+              <a:rPr lang="es-ES" sz="1400" dirty="0" smtClean="0"/>
+              <a:t>; </a:t>
+            </a:r>
+            <a:r>
+              <a:rPr lang="es-ES" sz="1400" dirty="0" smtClean="0"/>
+              <a:t>p=0.0</a:t>
+            </a:r>
+            <a:endParaRPr lang="es-ES" sz="1400" dirty="0"/>
+          </a:p>
+        </p:txBody>
+      </p:sp>
+      <p:sp>
+        <p:nvSpPr>
+          <p:cNvPr id="5" name="CuadroTexto 4"/>
+          <p:cNvSpPr txBox="1"/>
+          <p:nvPr/>
+        </p:nvSpPr>
+        <p:spPr>
+          <a:xfrm>
+            <a:off x="4247392" y="4600639"/>
+            <a:ext cx="1253643" cy="307777"/>
+          </a:xfrm>
+          <a:prstGeom prst="rect">
+            <a:avLst/>
+          </a:prstGeom>
+          <a:noFill/>
+        </p:spPr>
+        <p:txBody>
+          <a:bodyPr wrap="none" rtlCol="0">
+            <a:spAutoFit/>
+          </a:bodyPr>
+          <a:lstStyle/>
+          <a:p>
+            <a:r>
+              <a:rPr lang="es-ES" sz="1400" dirty="0" smtClean="0"/>
+              <a:t>N</a:t>
+            </a:r>
+            <a:r>
+              <a:rPr lang="es-ES" sz="1400" dirty="0" smtClean="0"/>
+              <a:t>=200</a:t>
+            </a:r>
+            <a:r>
+              <a:rPr lang="es-ES" sz="1400" dirty="0" smtClean="0"/>
+              <a:t>; </a:t>
+            </a:r>
+            <a:r>
+              <a:rPr lang="es-ES" sz="1400" dirty="0" smtClean="0"/>
+              <a:t>p=0.10</a:t>
+            </a:r>
+            <a:endParaRPr lang="es-ES" sz="1400" dirty="0"/>
+          </a:p>
+        </p:txBody>
+      </p:sp>
+    </p:spTree>
+    <p:extLst>
+      <p:ext uri="{BB962C8B-B14F-4D97-AF65-F5344CB8AC3E}">
+        <p14:creationId xmlns:p14="http://schemas.microsoft.com/office/powerpoint/2010/main" val="2174899281"/>
+      </p:ext>
+    </p:extLst>
+  </p:cSld>
+  <p:clrMapOvr>
+    <a:masterClrMapping/>
+  </p:clrMapOvr>
+</p:sld>
+</file>
+
+<file path=ppt/slides/slide3.xml><?xml version="1.0" encoding="utf-8"?>
 <p:sld xmlns:a="http://schemas.openxmlformats.org/drawingml/2006/main" xmlns:r="http://schemas.openxmlformats.org/officeDocument/2006/relationships" xmlns:p="http://schemas.openxmlformats.org/presentationml/2006/main">
   <p:cSld>
     <p:spTree>
@@ -3333,7 +3658,7 @@
 </p:sld>
 </file>
 
-<file path=ppt/slides/slide3.xml><?xml version="1.0" encoding="utf-8"?>
+<file path=ppt/slides/slide4.xml><?xml version="1.0" encoding="utf-8"?>
 <p:sld xmlns:a="http://schemas.openxmlformats.org/drawingml/2006/main" xmlns:r="http://schemas.openxmlformats.org/officeDocument/2006/relationships" xmlns:p="http://schemas.openxmlformats.org/presentationml/2006/main">
   <p:cSld>
     <p:spTree>
@@ -3487,7 +3812,7 @@
 </p:sld>
 </file>
 
-<file path=ppt/slides/slide4.xml><?xml version="1.0" encoding="utf-8"?>
+<file path=ppt/slides/slide5.xml><?xml version="1.0" encoding="utf-8"?>
 <p:sld xmlns:a="http://schemas.openxmlformats.org/drawingml/2006/main" xmlns:r="http://schemas.openxmlformats.org/officeDocument/2006/relationships" xmlns:p="http://schemas.openxmlformats.org/presentationml/2006/main">
   <p:cSld>
     <p:spTree>
@@ -3607,7 +3932,7 @@
 </p:sld>
 </file>
 
-<file path=ppt/slides/slide5.xml><?xml version="1.0" encoding="utf-8"?>
+<file path=ppt/slides/slide6.xml><?xml version="1.0" encoding="utf-8"?>
 <p:sld xmlns:a="http://schemas.openxmlformats.org/drawingml/2006/main" xmlns:r="http://schemas.openxmlformats.org/officeDocument/2006/relationships" xmlns:p="http://schemas.openxmlformats.org/presentationml/2006/main">
   <p:cSld>
     <p:spTree>
@@ -3704,7 +4029,7 @@
 </p:sld>
 </file>
 
-<file path=ppt/slides/slide6.xml><?xml version="1.0" encoding="utf-8"?>
+<file path=ppt/slides/slide7.xml><?xml version="1.0" encoding="utf-8"?>
 <p:sld xmlns:a="http://schemas.openxmlformats.org/drawingml/2006/main" xmlns:r="http://schemas.openxmlformats.org/officeDocument/2006/relationships" xmlns:p="http://schemas.openxmlformats.org/presentationml/2006/main">
   <p:cSld>
     <p:spTree>
@@ -3801,7 +4126,7 @@
 </p:sld>
 </file>
 
-<file path=ppt/slides/slide7.xml><?xml version="1.0" encoding="utf-8"?>
+<file path=ppt/slides/slide8.xml><?xml version="1.0" encoding="utf-8"?>
 <p:sld xmlns:a="http://schemas.openxmlformats.org/drawingml/2006/main" xmlns:r="http://schemas.openxmlformats.org/officeDocument/2006/relationships" xmlns:p="http://schemas.openxmlformats.org/presentationml/2006/main">
   <p:cSld>
     <p:spTree>
@@ -3891,7 +4216,7 @@
 </p:sld>
 </file>
 
-<file path=ppt/slides/slide8.xml><?xml version="1.0" encoding="utf-8"?>
+<file path=ppt/slides/slide9.xml><?xml version="1.0" encoding="utf-8"?>
 <p:sld xmlns:a="http://schemas.openxmlformats.org/drawingml/2006/main" xmlns:r="http://schemas.openxmlformats.org/officeDocument/2006/relationships" xmlns:p="http://schemas.openxmlformats.org/presentationml/2006/main">
   <p:cSld>
     <p:spTree>
@@ -4015,156 +4340,6 @@
       </p:par>
     </p:tnLst>
   </p:timing>
-</p:sld>
-</file>
-
-<file path=ppt/slides/slide9.xml><?xml version="1.0" encoding="utf-8"?>
-<p:sld xmlns:a="http://schemas.openxmlformats.org/drawingml/2006/main" xmlns:r="http://schemas.openxmlformats.org/officeDocument/2006/relationships" xmlns:p="http://schemas.openxmlformats.org/presentationml/2006/main">
-  <p:cSld>
-    <p:spTree>
-      <p:nvGrpSpPr>
-        <p:cNvPr id="1" name=""/>
-        <p:cNvGrpSpPr/>
-        <p:nvPr/>
-      </p:nvGrpSpPr>
-      <p:grpSpPr>
-        <a:xfrm>
-          <a:off x="0" y="0"/>
-          <a:ext cx="0" cy="0"/>
-          <a:chOff x="0" y="0"/>
-          <a:chExt cx="0" cy="0"/>
-        </a:xfrm>
-      </p:grpSpPr>
-      <p:pic>
-        <p:nvPicPr>
-          <p:cNvPr id="2" name="Imagen 1" descr="powerlawExp.png"/>
-          <p:cNvPicPr>
-            <a:picLocks noChangeAspect="1"/>
-          </p:cNvPicPr>
-          <p:nvPr/>
-        </p:nvPicPr>
-        <p:blipFill>
-          <a:blip r:embed="rId2">
-            <a:extLst>
-              <a:ext uri="{28A0092B-C50C-407E-A947-70E740481C1C}">
-                <a14:useLocalDpi xmlns:a14="http://schemas.microsoft.com/office/drawing/2010/main" val="0"/>
-              </a:ext>
-            </a:extLst>
-          </a:blip>
-          <a:stretch>
-            <a:fillRect/>
-          </a:stretch>
-        </p:blipFill>
-        <p:spPr>
-          <a:xfrm>
-            <a:off x="1584584" y="3053358"/>
-            <a:ext cx="3287209" cy="1563645"/>
-          </a:xfrm>
-          <a:prstGeom prst="rect">
-            <a:avLst/>
-          </a:prstGeom>
-        </p:spPr>
-      </p:pic>
-      <p:pic>
-        <p:nvPicPr>
-          <p:cNvPr id="3" name="Imagen 2" descr="Captura de pantalla 2014-10-15 a la(s) 18.24.58.png"/>
-          <p:cNvPicPr>
-            <a:picLocks noChangeAspect="1"/>
-          </p:cNvPicPr>
-          <p:nvPr/>
-        </p:nvPicPr>
-        <p:blipFill>
-          <a:blip r:embed="rId3">
-            <a:extLst>
-              <a:ext uri="{28A0092B-C50C-407E-A947-70E740481C1C}">
-                <a14:useLocalDpi xmlns:a14="http://schemas.microsoft.com/office/drawing/2010/main" val="0"/>
-              </a:ext>
-            </a:extLst>
-          </a:blip>
-          <a:stretch>
-            <a:fillRect/>
-          </a:stretch>
-        </p:blipFill>
-        <p:spPr>
-          <a:xfrm>
-            <a:off x="5109184" y="2931619"/>
-            <a:ext cx="1844870" cy="1685384"/>
-          </a:xfrm>
-          <a:prstGeom prst="rect">
-            <a:avLst/>
-          </a:prstGeom>
-        </p:spPr>
-      </p:pic>
-      <p:sp>
-        <p:nvSpPr>
-          <p:cNvPr id="4" name="CuadroTexto 3"/>
-          <p:cNvSpPr txBox="1"/>
-          <p:nvPr/>
-        </p:nvSpPr>
-        <p:spPr>
-          <a:xfrm>
-            <a:off x="2753734" y="4617003"/>
-            <a:ext cx="1191352" cy="338554"/>
-          </a:xfrm>
-          <a:prstGeom prst="rect">
-            <a:avLst/>
-          </a:prstGeom>
-          <a:noFill/>
-        </p:spPr>
-        <p:txBody>
-          <a:bodyPr wrap="none" rtlCol="0">
-            <a:spAutoFit/>
-          </a:bodyPr>
-          <a:lstStyle/>
-          <a:p>
-            <a:r>
-              <a:rPr lang="es-ES" sz="1600" dirty="0" smtClean="0"/>
-              <a:t>Escala lineal</a:t>
-            </a:r>
-            <a:endParaRPr lang="es-ES" sz="1600" dirty="0"/>
-          </a:p>
-        </p:txBody>
-      </p:sp>
-      <p:sp>
-        <p:nvSpPr>
-          <p:cNvPr id="5" name="CuadroTexto 4"/>
-          <p:cNvSpPr txBox="1"/>
-          <p:nvPr/>
-        </p:nvSpPr>
-        <p:spPr>
-          <a:xfrm>
-            <a:off x="5180404" y="4615109"/>
-            <a:ext cx="1675459" cy="338554"/>
-          </a:xfrm>
-          <a:prstGeom prst="rect">
-            <a:avLst/>
-          </a:prstGeom>
-          <a:noFill/>
-        </p:spPr>
-        <p:txBody>
-          <a:bodyPr wrap="none" rtlCol="0">
-            <a:spAutoFit/>
-          </a:bodyPr>
-          <a:lstStyle/>
-          <a:p>
-            <a:r>
-              <a:rPr lang="es-ES" sz="1600" dirty="0" smtClean="0"/>
-              <a:t>Escala logarítmica</a:t>
-            </a:r>
-            <a:endParaRPr lang="es-ES" sz="1600" dirty="0"/>
-          </a:p>
-        </p:txBody>
-      </p:sp>
-    </p:spTree>
-    <p:extLst>
-      <p:ext uri="{BB962C8B-B14F-4D97-AF65-F5344CB8AC3E}">
-        <p14:creationId xmlns:p14="http://schemas.microsoft.com/office/powerpoint/2010/main" val="2484292234"/>
-      </p:ext>
-    </p:extLst>
-  </p:cSld>
-  <p:clrMapOvr>
-    <a:masterClrMapping/>
-  </p:clrMapOvr>
 </p:sld>
 </file>
 

</xml_diff>

<commit_message>
Termianda la parte de modelos de contagio complejos Subidas nuevas simulaciones de Netlogo
</commit_message>
<xml_diff>
--- a/images/paraEsquemasYFiguras.pptx
+++ b/images/paraEsquemasYFiguras.pptx
@@ -6,15 +6,16 @@
   </p:sldMasterIdLst>
   <p:sldIdLst>
     <p:sldId id="256" r:id="rId2"/>
-    <p:sldId id="265" r:id="rId3"/>
-    <p:sldId id="263" r:id="rId4"/>
-    <p:sldId id="264" r:id="rId5"/>
-    <p:sldId id="262" r:id="rId6"/>
-    <p:sldId id="259" r:id="rId7"/>
-    <p:sldId id="260" r:id="rId8"/>
-    <p:sldId id="261" r:id="rId9"/>
-    <p:sldId id="258" r:id="rId10"/>
-    <p:sldId id="257" r:id="rId11"/>
+    <p:sldId id="266" r:id="rId3"/>
+    <p:sldId id="265" r:id="rId4"/>
+    <p:sldId id="263" r:id="rId5"/>
+    <p:sldId id="264" r:id="rId6"/>
+    <p:sldId id="262" r:id="rId7"/>
+    <p:sldId id="259" r:id="rId8"/>
+    <p:sldId id="260" r:id="rId9"/>
+    <p:sldId id="261" r:id="rId10"/>
+    <p:sldId id="258" r:id="rId11"/>
+    <p:sldId id="257" r:id="rId12"/>
   </p:sldIdLst>
   <p:sldSz cx="9144000" cy="6858000" type="screen4x3"/>
   <p:notesSz cx="6858000" cy="9144000"/>
@@ -297,7 +298,7 @@
           <a:p>
             <a:fld id="{D7E2043C-A4E6-B74E-9C07-871FC106E480}" type="datetimeFigureOut">
               <a:rPr lang="es-ES" smtClean="0"/>
-              <a:t>04/12/14</a:t>
+              <a:t>09/12/14</a:t>
             </a:fld>
             <a:endParaRPr lang="es-ES"/>
           </a:p>
@@ -467,7 +468,7 @@
           <a:p>
             <a:fld id="{D7E2043C-A4E6-B74E-9C07-871FC106E480}" type="datetimeFigureOut">
               <a:rPr lang="es-ES" smtClean="0"/>
-              <a:t>04/12/14</a:t>
+              <a:t>09/12/14</a:t>
             </a:fld>
             <a:endParaRPr lang="es-ES"/>
           </a:p>
@@ -647,7 +648,7 @@
           <a:p>
             <a:fld id="{D7E2043C-A4E6-B74E-9C07-871FC106E480}" type="datetimeFigureOut">
               <a:rPr lang="es-ES" smtClean="0"/>
-              <a:t>04/12/14</a:t>
+              <a:t>09/12/14</a:t>
             </a:fld>
             <a:endParaRPr lang="es-ES"/>
           </a:p>
@@ -817,7 +818,7 @@
           <a:p>
             <a:fld id="{D7E2043C-A4E6-B74E-9C07-871FC106E480}" type="datetimeFigureOut">
               <a:rPr lang="es-ES" smtClean="0"/>
-              <a:t>04/12/14</a:t>
+              <a:t>09/12/14</a:t>
             </a:fld>
             <a:endParaRPr lang="es-ES"/>
           </a:p>
@@ -1063,7 +1064,7 @@
           <a:p>
             <a:fld id="{D7E2043C-A4E6-B74E-9C07-871FC106E480}" type="datetimeFigureOut">
               <a:rPr lang="es-ES" smtClean="0"/>
-              <a:t>04/12/14</a:t>
+              <a:t>09/12/14</a:t>
             </a:fld>
             <a:endParaRPr lang="es-ES"/>
           </a:p>
@@ -1351,7 +1352,7 @@
           <a:p>
             <a:fld id="{D7E2043C-A4E6-B74E-9C07-871FC106E480}" type="datetimeFigureOut">
               <a:rPr lang="es-ES" smtClean="0"/>
-              <a:t>04/12/14</a:t>
+              <a:t>09/12/14</a:t>
             </a:fld>
             <a:endParaRPr lang="es-ES"/>
           </a:p>
@@ -1773,7 +1774,7 @@
           <a:p>
             <a:fld id="{D7E2043C-A4E6-B74E-9C07-871FC106E480}" type="datetimeFigureOut">
               <a:rPr lang="es-ES" smtClean="0"/>
-              <a:t>04/12/14</a:t>
+              <a:t>09/12/14</a:t>
             </a:fld>
             <a:endParaRPr lang="es-ES"/>
           </a:p>
@@ -1891,7 +1892,7 @@
           <a:p>
             <a:fld id="{D7E2043C-A4E6-B74E-9C07-871FC106E480}" type="datetimeFigureOut">
               <a:rPr lang="es-ES" smtClean="0"/>
-              <a:t>04/12/14</a:t>
+              <a:t>09/12/14</a:t>
             </a:fld>
             <a:endParaRPr lang="es-ES"/>
           </a:p>
@@ -1986,7 +1987,7 @@
           <a:p>
             <a:fld id="{D7E2043C-A4E6-B74E-9C07-871FC106E480}" type="datetimeFigureOut">
               <a:rPr lang="es-ES" smtClean="0"/>
-              <a:t>04/12/14</a:t>
+              <a:t>09/12/14</a:t>
             </a:fld>
             <a:endParaRPr lang="es-ES"/>
           </a:p>
@@ -2263,7 +2264,7 @@
           <a:p>
             <a:fld id="{D7E2043C-A4E6-B74E-9C07-871FC106E480}" type="datetimeFigureOut">
               <a:rPr lang="es-ES" smtClean="0"/>
-              <a:t>04/12/14</a:t>
+              <a:t>09/12/14</a:t>
             </a:fld>
             <a:endParaRPr lang="es-ES"/>
           </a:p>
@@ -2516,7 +2517,7 @@
           <a:p>
             <a:fld id="{D7E2043C-A4E6-B74E-9C07-871FC106E480}" type="datetimeFigureOut">
               <a:rPr lang="es-ES" smtClean="0"/>
-              <a:t>04/12/14</a:t>
+              <a:t>09/12/14</a:t>
             </a:fld>
             <a:endParaRPr lang="es-ES"/>
           </a:p>
@@ -2729,7 +2730,7 @@
           <a:p>
             <a:fld id="{D7E2043C-A4E6-B74E-9C07-871FC106E480}" type="datetimeFigureOut">
               <a:rPr lang="es-ES" smtClean="0"/>
-              <a:t>04/12/14</a:t>
+              <a:t>09/12/14</a:t>
             </a:fld>
             <a:endParaRPr lang="es-ES"/>
           </a:p>
@@ -3201,1038 +3202,6 @@
           <a:chExt cx="0" cy="0"/>
         </a:xfrm>
       </p:grpSpPr>
-      <p:pic>
-        <p:nvPicPr>
-          <p:cNvPr id="2" name="Imagen 1" descr="powerlawExp.png"/>
-          <p:cNvPicPr>
-            <a:picLocks noChangeAspect="1"/>
-          </p:cNvPicPr>
-          <p:nvPr/>
-        </p:nvPicPr>
-        <p:blipFill>
-          <a:blip r:embed="rId2">
-            <a:extLst>
-              <a:ext uri="{28A0092B-C50C-407E-A947-70E740481C1C}">
-                <a14:useLocalDpi xmlns:a14="http://schemas.microsoft.com/office/drawing/2010/main" val="0"/>
-              </a:ext>
-            </a:extLst>
-          </a:blip>
-          <a:stretch>
-            <a:fillRect/>
-          </a:stretch>
-        </p:blipFill>
-        <p:spPr>
-          <a:xfrm>
-            <a:off x="1584584" y="3053358"/>
-            <a:ext cx="3287209" cy="1563645"/>
-          </a:xfrm>
-          <a:prstGeom prst="rect">
-            <a:avLst/>
-          </a:prstGeom>
-        </p:spPr>
-      </p:pic>
-      <p:pic>
-        <p:nvPicPr>
-          <p:cNvPr id="3" name="Imagen 2" descr="Captura de pantalla 2014-10-15 a la(s) 18.24.58.png"/>
-          <p:cNvPicPr>
-            <a:picLocks noChangeAspect="1"/>
-          </p:cNvPicPr>
-          <p:nvPr/>
-        </p:nvPicPr>
-        <p:blipFill>
-          <a:blip r:embed="rId3">
-            <a:extLst>
-              <a:ext uri="{28A0092B-C50C-407E-A947-70E740481C1C}">
-                <a14:useLocalDpi xmlns:a14="http://schemas.microsoft.com/office/drawing/2010/main" val="0"/>
-              </a:ext>
-            </a:extLst>
-          </a:blip>
-          <a:stretch>
-            <a:fillRect/>
-          </a:stretch>
-        </p:blipFill>
-        <p:spPr>
-          <a:xfrm>
-            <a:off x="5109184" y="2931619"/>
-            <a:ext cx="1844870" cy="1685384"/>
-          </a:xfrm>
-          <a:prstGeom prst="rect">
-            <a:avLst/>
-          </a:prstGeom>
-        </p:spPr>
-      </p:pic>
-      <p:sp>
-        <p:nvSpPr>
-          <p:cNvPr id="4" name="CuadroTexto 3"/>
-          <p:cNvSpPr txBox="1"/>
-          <p:nvPr/>
-        </p:nvSpPr>
-        <p:spPr>
-          <a:xfrm>
-            <a:off x="2753734" y="4617003"/>
-            <a:ext cx="1191352" cy="338554"/>
-          </a:xfrm>
-          <a:prstGeom prst="rect">
-            <a:avLst/>
-          </a:prstGeom>
-          <a:noFill/>
-        </p:spPr>
-        <p:txBody>
-          <a:bodyPr wrap="none" rtlCol="0">
-            <a:spAutoFit/>
-          </a:bodyPr>
-          <a:lstStyle/>
-          <a:p>
-            <a:r>
-              <a:rPr lang="es-ES" sz="1600" dirty="0" smtClean="0"/>
-              <a:t>Escala lineal</a:t>
-            </a:r>
-            <a:endParaRPr lang="es-ES" sz="1600" dirty="0"/>
-          </a:p>
-        </p:txBody>
-      </p:sp>
-      <p:sp>
-        <p:nvSpPr>
-          <p:cNvPr id="5" name="CuadroTexto 4"/>
-          <p:cNvSpPr txBox="1"/>
-          <p:nvPr/>
-        </p:nvSpPr>
-        <p:spPr>
-          <a:xfrm>
-            <a:off x="5180404" y="4615109"/>
-            <a:ext cx="1675459" cy="338554"/>
-          </a:xfrm>
-          <a:prstGeom prst="rect">
-            <a:avLst/>
-          </a:prstGeom>
-          <a:noFill/>
-        </p:spPr>
-        <p:txBody>
-          <a:bodyPr wrap="none" rtlCol="0">
-            <a:spAutoFit/>
-          </a:bodyPr>
-          <a:lstStyle/>
-          <a:p>
-            <a:r>
-              <a:rPr lang="es-ES" sz="1600" dirty="0" smtClean="0"/>
-              <a:t>Escala logarítmica</a:t>
-            </a:r>
-            <a:endParaRPr lang="es-ES" sz="1600" dirty="0"/>
-          </a:p>
-        </p:txBody>
-      </p:sp>
-    </p:spTree>
-    <p:extLst>
-      <p:ext uri="{BB962C8B-B14F-4D97-AF65-F5344CB8AC3E}">
-        <p14:creationId xmlns:p14="http://schemas.microsoft.com/office/powerpoint/2010/main" val="2484292234"/>
-      </p:ext>
-    </p:extLst>
-  </p:cSld>
-  <p:clrMapOvr>
-    <a:masterClrMapping/>
-  </p:clrMapOvr>
-</p:sld>
-</file>
-
-<file path=ppt/slides/slide2.xml><?xml version="1.0" encoding="utf-8"?>
-<p:sld xmlns:a="http://schemas.openxmlformats.org/drawingml/2006/main" xmlns:r="http://schemas.openxmlformats.org/officeDocument/2006/relationships" xmlns:p="http://schemas.openxmlformats.org/presentationml/2006/main">
-  <p:cSld>
-    <p:spTree>
-      <p:nvGrpSpPr>
-        <p:cNvPr id="1" name=""/>
-        <p:cNvGrpSpPr/>
-        <p:nvPr/>
-      </p:nvGrpSpPr>
-      <p:grpSpPr>
-        <a:xfrm>
-          <a:off x="0" y="0"/>
-          <a:ext cx="0" cy="0"/>
-          <a:chOff x="0" y="0"/>
-          <a:chExt cx="0" cy="0"/>
-        </a:xfrm>
-      </p:grpSpPr>
-      <p:pic>
-        <p:nvPicPr>
-          <p:cNvPr id="2" name="Imagen 1" descr="Captura de pantalla 2014-12-04 a la(s) 17.09.48.png"/>
-          <p:cNvPicPr>
-            <a:picLocks noChangeAspect="1"/>
-          </p:cNvPicPr>
-          <p:nvPr/>
-        </p:nvPicPr>
-        <p:blipFill>
-          <a:blip r:embed="rId2">
-            <a:extLst>
-              <a:ext uri="{28A0092B-C50C-407E-A947-70E740481C1C}">
-                <a14:useLocalDpi xmlns:a14="http://schemas.microsoft.com/office/drawing/2010/main" val="0"/>
-              </a:ext>
-            </a:extLst>
-          </a:blip>
-          <a:stretch>
-            <a:fillRect/>
-          </a:stretch>
-        </p:blipFill>
-        <p:spPr>
-          <a:xfrm>
-            <a:off x="783389" y="1915992"/>
-            <a:ext cx="2561715" cy="2684537"/>
-          </a:xfrm>
-          <a:prstGeom prst="rect">
-            <a:avLst/>
-          </a:prstGeom>
-        </p:spPr>
-      </p:pic>
-      <p:pic>
-        <p:nvPicPr>
-          <p:cNvPr id="3" name="Imagen 2" descr="Captura de pantalla 2014-12-04 a la(s) 17.10.27.png"/>
-          <p:cNvPicPr>
-            <a:picLocks noChangeAspect="1"/>
-          </p:cNvPicPr>
-          <p:nvPr/>
-        </p:nvPicPr>
-        <p:blipFill>
-          <a:blip r:embed="rId3">
-            <a:extLst>
-              <a:ext uri="{28A0092B-C50C-407E-A947-70E740481C1C}">
-                <a14:useLocalDpi xmlns:a14="http://schemas.microsoft.com/office/drawing/2010/main" val="0"/>
-              </a:ext>
-            </a:extLst>
-          </a:blip>
-          <a:stretch>
-            <a:fillRect/>
-          </a:stretch>
-        </p:blipFill>
-        <p:spPr>
-          <a:xfrm>
-            <a:off x="3515491" y="1926153"/>
-            <a:ext cx="2561715" cy="2672840"/>
-          </a:xfrm>
-          <a:prstGeom prst="rect">
-            <a:avLst/>
-          </a:prstGeom>
-        </p:spPr>
-      </p:pic>
-      <p:sp>
-        <p:nvSpPr>
-          <p:cNvPr id="4" name="CuadroTexto 3"/>
-          <p:cNvSpPr txBox="1"/>
-          <p:nvPr/>
-        </p:nvSpPr>
-        <p:spPr>
-          <a:xfrm>
-            <a:off x="1495562" y="4595271"/>
-            <a:ext cx="1162648" cy="307777"/>
-          </a:xfrm>
-          <a:prstGeom prst="rect">
-            <a:avLst/>
-          </a:prstGeom>
-          <a:noFill/>
-        </p:spPr>
-        <p:txBody>
-          <a:bodyPr wrap="none" rtlCol="0">
-            <a:spAutoFit/>
-          </a:bodyPr>
-          <a:lstStyle/>
-          <a:p>
-            <a:r>
-              <a:rPr lang="es-ES" sz="1400" dirty="0" smtClean="0"/>
-              <a:t>N</a:t>
-            </a:r>
-            <a:r>
-              <a:rPr lang="es-ES" sz="1400" dirty="0" smtClean="0"/>
-              <a:t>=200</a:t>
-            </a:r>
-            <a:r>
-              <a:rPr lang="es-ES" sz="1400" dirty="0" smtClean="0"/>
-              <a:t>; </a:t>
-            </a:r>
-            <a:r>
-              <a:rPr lang="es-ES" sz="1400" dirty="0" smtClean="0"/>
-              <a:t>p=0.0</a:t>
-            </a:r>
-            <a:endParaRPr lang="es-ES" sz="1400" dirty="0"/>
-          </a:p>
-        </p:txBody>
-      </p:sp>
-      <p:sp>
-        <p:nvSpPr>
-          <p:cNvPr id="5" name="CuadroTexto 4"/>
-          <p:cNvSpPr txBox="1"/>
-          <p:nvPr/>
-        </p:nvSpPr>
-        <p:spPr>
-          <a:xfrm>
-            <a:off x="4247392" y="4600639"/>
-            <a:ext cx="1253643" cy="307777"/>
-          </a:xfrm>
-          <a:prstGeom prst="rect">
-            <a:avLst/>
-          </a:prstGeom>
-          <a:noFill/>
-        </p:spPr>
-        <p:txBody>
-          <a:bodyPr wrap="none" rtlCol="0">
-            <a:spAutoFit/>
-          </a:bodyPr>
-          <a:lstStyle/>
-          <a:p>
-            <a:r>
-              <a:rPr lang="es-ES" sz="1400" dirty="0" smtClean="0"/>
-              <a:t>N</a:t>
-            </a:r>
-            <a:r>
-              <a:rPr lang="es-ES" sz="1400" dirty="0" smtClean="0"/>
-              <a:t>=200</a:t>
-            </a:r>
-            <a:r>
-              <a:rPr lang="es-ES" sz="1400" dirty="0" smtClean="0"/>
-              <a:t>; </a:t>
-            </a:r>
-            <a:r>
-              <a:rPr lang="es-ES" sz="1400" dirty="0" smtClean="0"/>
-              <a:t>p=0.10</a:t>
-            </a:r>
-            <a:endParaRPr lang="es-ES" sz="1400" dirty="0"/>
-          </a:p>
-        </p:txBody>
-      </p:sp>
-    </p:spTree>
-    <p:extLst>
-      <p:ext uri="{BB962C8B-B14F-4D97-AF65-F5344CB8AC3E}">
-        <p14:creationId xmlns:p14="http://schemas.microsoft.com/office/powerpoint/2010/main" val="2174899281"/>
-      </p:ext>
-    </p:extLst>
-  </p:cSld>
-  <p:clrMapOvr>
-    <a:masterClrMapping/>
-  </p:clrMapOvr>
-</p:sld>
-</file>
-
-<file path=ppt/slides/slide3.xml><?xml version="1.0" encoding="utf-8"?>
-<p:sld xmlns:a="http://schemas.openxmlformats.org/drawingml/2006/main" xmlns:r="http://schemas.openxmlformats.org/officeDocument/2006/relationships" xmlns:p="http://schemas.openxmlformats.org/presentationml/2006/main">
-  <p:cSld>
-    <p:spTree>
-      <p:nvGrpSpPr>
-        <p:cNvPr id="1" name=""/>
-        <p:cNvGrpSpPr/>
-        <p:nvPr/>
-      </p:nvGrpSpPr>
-      <p:grpSpPr>
-        <a:xfrm>
-          <a:off x="0" y="0"/>
-          <a:ext cx="0" cy="0"/>
-          <a:chOff x="0" y="0"/>
-          <a:chExt cx="0" cy="0"/>
-        </a:xfrm>
-      </p:grpSpPr>
-      <p:pic>
-        <p:nvPicPr>
-          <p:cNvPr id="2" name="Imagen 1" descr="Captura de pantalla 2014-12-04 a la(s) 11.30.20.png"/>
-          <p:cNvPicPr>
-            <a:picLocks noChangeAspect="1"/>
-          </p:cNvPicPr>
-          <p:nvPr/>
-        </p:nvPicPr>
-        <p:blipFill>
-          <a:blip r:embed="rId2">
-            <a:extLst>
-              <a:ext uri="{28A0092B-C50C-407E-A947-70E740481C1C}">
-                <a14:useLocalDpi xmlns:a14="http://schemas.microsoft.com/office/drawing/2010/main" val="0"/>
-              </a:ext>
-            </a:extLst>
-          </a:blip>
-          <a:stretch>
-            <a:fillRect/>
-          </a:stretch>
-        </p:blipFill>
-        <p:spPr>
-          <a:xfrm>
-            <a:off x="534709" y="961380"/>
-            <a:ext cx="3341838" cy="3482477"/>
-          </a:xfrm>
-          <a:prstGeom prst="rect">
-            <a:avLst/>
-          </a:prstGeom>
-        </p:spPr>
-      </p:pic>
-      <p:pic>
-        <p:nvPicPr>
-          <p:cNvPr id="3" name="Imagen 2" descr="Captura de pantalla 2014-12-04 a la(s) 11.29.34.png"/>
-          <p:cNvPicPr>
-            <a:picLocks noChangeAspect="1"/>
-          </p:cNvPicPr>
-          <p:nvPr/>
-        </p:nvPicPr>
-        <p:blipFill>
-          <a:blip r:embed="rId3">
-            <a:extLst>
-              <a:ext uri="{28A0092B-C50C-407E-A947-70E740481C1C}">
-                <a14:useLocalDpi xmlns:a14="http://schemas.microsoft.com/office/drawing/2010/main" val="0"/>
-              </a:ext>
-            </a:extLst>
-          </a:blip>
-          <a:stretch>
-            <a:fillRect/>
-          </a:stretch>
-        </p:blipFill>
-        <p:spPr>
-          <a:xfrm>
-            <a:off x="4038959" y="961380"/>
-            <a:ext cx="3375530" cy="3482477"/>
-          </a:xfrm>
-          <a:prstGeom prst="rect">
-            <a:avLst/>
-          </a:prstGeom>
-        </p:spPr>
-      </p:pic>
-      <p:sp>
-        <p:nvSpPr>
-          <p:cNvPr id="4" name="CuadroTexto 3"/>
-          <p:cNvSpPr txBox="1"/>
-          <p:nvPr/>
-        </p:nvSpPr>
-        <p:spPr>
-          <a:xfrm>
-            <a:off x="1495562" y="4441996"/>
-            <a:ext cx="1409949" cy="307777"/>
-          </a:xfrm>
-          <a:prstGeom prst="rect">
-            <a:avLst/>
-          </a:prstGeom>
-          <a:noFill/>
-        </p:spPr>
-        <p:txBody>
-          <a:bodyPr wrap="none" rtlCol="0">
-            <a:spAutoFit/>
-          </a:bodyPr>
-          <a:lstStyle/>
-          <a:p>
-            <a:r>
-              <a:rPr lang="es-ES" sz="1400" dirty="0" smtClean="0"/>
-              <a:t>N=300; &lt;k&gt; = 1.0</a:t>
-            </a:r>
-            <a:endParaRPr lang="es-ES" sz="1400" dirty="0"/>
-          </a:p>
-        </p:txBody>
-      </p:sp>
-      <p:sp>
-        <p:nvSpPr>
-          <p:cNvPr id="5" name="CuadroTexto 4"/>
-          <p:cNvSpPr txBox="1"/>
-          <p:nvPr/>
-        </p:nvSpPr>
-        <p:spPr>
-          <a:xfrm>
-            <a:off x="5036716" y="4441996"/>
-            <a:ext cx="1409949" cy="307777"/>
-          </a:xfrm>
-          <a:prstGeom prst="rect">
-            <a:avLst/>
-          </a:prstGeom>
-          <a:noFill/>
-        </p:spPr>
-        <p:txBody>
-          <a:bodyPr wrap="none" rtlCol="0">
-            <a:spAutoFit/>
-          </a:bodyPr>
-          <a:lstStyle/>
-          <a:p>
-            <a:r>
-              <a:rPr lang="es-ES" sz="1400" dirty="0" smtClean="0"/>
-              <a:t>N=300; &lt;k&gt; = 3.0</a:t>
-            </a:r>
-            <a:endParaRPr lang="es-ES" sz="1400" dirty="0"/>
-          </a:p>
-        </p:txBody>
-      </p:sp>
-    </p:spTree>
-    <p:extLst>
-      <p:ext uri="{BB962C8B-B14F-4D97-AF65-F5344CB8AC3E}">
-        <p14:creationId xmlns:p14="http://schemas.microsoft.com/office/powerpoint/2010/main" val="2579316567"/>
-      </p:ext>
-    </p:extLst>
-  </p:cSld>
-  <p:clrMapOvr>
-    <a:masterClrMapping/>
-  </p:clrMapOvr>
-</p:sld>
-</file>
-
-<file path=ppt/slides/slide4.xml><?xml version="1.0" encoding="utf-8"?>
-<p:sld xmlns:a="http://schemas.openxmlformats.org/drawingml/2006/main" xmlns:r="http://schemas.openxmlformats.org/officeDocument/2006/relationships" xmlns:p="http://schemas.openxmlformats.org/presentationml/2006/main">
-  <p:cSld>
-    <p:spTree>
-      <p:nvGrpSpPr>
-        <p:cNvPr id="1" name=""/>
-        <p:cNvGrpSpPr/>
-        <p:nvPr/>
-      </p:nvGrpSpPr>
-      <p:grpSpPr>
-        <a:xfrm>
-          <a:off x="0" y="0"/>
-          <a:ext cx="0" cy="0"/>
-          <a:chOff x="0" y="0"/>
-          <a:chExt cx="0" cy="0"/>
-        </a:xfrm>
-      </p:grpSpPr>
-      <p:pic>
-        <p:nvPicPr>
-          <p:cNvPr id="2" name="Imagen 1" descr="Captura de pantalla 2014-12-04 a la(s) 11.51.59.png"/>
-          <p:cNvPicPr>
-            <a:picLocks noChangeAspect="1"/>
-          </p:cNvPicPr>
-          <p:nvPr/>
-        </p:nvPicPr>
-        <p:blipFill>
-          <a:blip r:embed="rId2">
-            <a:extLst>
-              <a:ext uri="{28A0092B-C50C-407E-A947-70E740481C1C}">
-                <a14:useLocalDpi xmlns:a14="http://schemas.microsoft.com/office/drawing/2010/main" val="0"/>
-              </a:ext>
-            </a:extLst>
-          </a:blip>
-          <a:stretch>
-            <a:fillRect/>
-          </a:stretch>
-        </p:blipFill>
-        <p:spPr>
-          <a:xfrm>
-            <a:off x="540278" y="906294"/>
-            <a:ext cx="2759455" cy="2912758"/>
-          </a:xfrm>
-          <a:prstGeom prst="rect">
-            <a:avLst/>
-          </a:prstGeom>
-        </p:spPr>
-      </p:pic>
-      <p:pic>
-        <p:nvPicPr>
-          <p:cNvPr id="3" name="Imagen 2" descr="Captura de pantalla 2014-12-04 a la(s) 11.52.35.png"/>
-          <p:cNvPicPr>
-            <a:picLocks noChangeAspect="1"/>
-          </p:cNvPicPr>
-          <p:nvPr/>
-        </p:nvPicPr>
-        <p:blipFill>
-          <a:blip r:embed="rId3">
-            <a:extLst>
-              <a:ext uri="{28A0092B-C50C-407E-A947-70E740481C1C}">
-                <a14:useLocalDpi xmlns:a14="http://schemas.microsoft.com/office/drawing/2010/main" val="0"/>
-              </a:ext>
-            </a:extLst>
-          </a:blip>
-          <a:stretch>
-            <a:fillRect/>
-          </a:stretch>
-        </p:blipFill>
-        <p:spPr>
-          <a:xfrm>
-            <a:off x="3546308" y="906294"/>
-            <a:ext cx="2773725" cy="2912758"/>
-          </a:xfrm>
-          <a:prstGeom prst="rect">
-            <a:avLst/>
-          </a:prstGeom>
-        </p:spPr>
-      </p:pic>
-      <p:sp>
-        <p:nvSpPr>
-          <p:cNvPr id="4" name="CuadroTexto 3"/>
-          <p:cNvSpPr txBox="1"/>
-          <p:nvPr/>
-        </p:nvSpPr>
-        <p:spPr>
-          <a:xfrm>
-            <a:off x="1056389" y="3819052"/>
-            <a:ext cx="1840906" cy="307777"/>
-          </a:xfrm>
-          <a:prstGeom prst="rect">
-            <a:avLst/>
-          </a:prstGeom>
-          <a:noFill/>
-        </p:spPr>
-        <p:txBody>
-          <a:bodyPr wrap="none" rtlCol="0">
-            <a:spAutoFit/>
-          </a:bodyPr>
-          <a:lstStyle/>
-          <a:p>
-            <a:r>
-              <a:rPr lang="es-ES" sz="1400" dirty="0" smtClean="0"/>
-              <a:t>Sin enlace preferencial</a:t>
-            </a:r>
-            <a:endParaRPr lang="es-ES" sz="1400" dirty="0"/>
-          </a:p>
-        </p:txBody>
-      </p:sp>
-      <p:sp>
-        <p:nvSpPr>
-          <p:cNvPr id="5" name="CuadroTexto 4"/>
-          <p:cNvSpPr txBox="1"/>
-          <p:nvPr/>
-        </p:nvSpPr>
-        <p:spPr>
-          <a:xfrm>
-            <a:off x="4063414" y="3819052"/>
-            <a:ext cx="1907619" cy="307777"/>
-          </a:xfrm>
-          <a:prstGeom prst="rect">
-            <a:avLst/>
-          </a:prstGeom>
-          <a:noFill/>
-        </p:spPr>
-        <p:txBody>
-          <a:bodyPr wrap="none" rtlCol="0">
-            <a:spAutoFit/>
-          </a:bodyPr>
-          <a:lstStyle/>
-          <a:p>
-            <a:r>
-              <a:rPr lang="es-ES" sz="1400" smtClean="0"/>
-              <a:t>Con enlace </a:t>
-            </a:r>
-            <a:r>
-              <a:rPr lang="es-ES" sz="1400" dirty="0" smtClean="0"/>
-              <a:t>preferencial</a:t>
-            </a:r>
-            <a:endParaRPr lang="es-ES" sz="1400" dirty="0"/>
-          </a:p>
-        </p:txBody>
-      </p:sp>
-    </p:spTree>
-    <p:extLst>
-      <p:ext uri="{BB962C8B-B14F-4D97-AF65-F5344CB8AC3E}">
-        <p14:creationId xmlns:p14="http://schemas.microsoft.com/office/powerpoint/2010/main" val="888234259"/>
-      </p:ext>
-    </p:extLst>
-  </p:cSld>
-  <p:clrMapOvr>
-    <a:masterClrMapping/>
-  </p:clrMapOvr>
-</p:sld>
-</file>
-
-<file path=ppt/slides/slide5.xml><?xml version="1.0" encoding="utf-8"?>
-<p:sld xmlns:a="http://schemas.openxmlformats.org/drawingml/2006/main" xmlns:r="http://schemas.openxmlformats.org/officeDocument/2006/relationships" xmlns:p="http://schemas.openxmlformats.org/presentationml/2006/main">
-  <p:cSld>
-    <p:spTree>
-      <p:nvGrpSpPr>
-        <p:cNvPr id="1" name=""/>
-        <p:cNvGrpSpPr/>
-        <p:nvPr/>
-      </p:nvGrpSpPr>
-      <p:grpSpPr>
-        <a:xfrm>
-          <a:off x="0" y="0"/>
-          <a:ext cx="0" cy="0"/>
-          <a:chOff x="0" y="0"/>
-          <a:chExt cx="0" cy="0"/>
-        </a:xfrm>
-      </p:grpSpPr>
-      <p:grpSp>
-        <p:nvGrpSpPr>
-          <p:cNvPr id="4" name="Agrupar 3"/>
-          <p:cNvGrpSpPr/>
-          <p:nvPr/>
-        </p:nvGrpSpPr>
-        <p:grpSpPr>
-          <a:xfrm>
-            <a:off x="1448084" y="1145349"/>
-            <a:ext cx="6752286" cy="3439283"/>
-            <a:chOff x="1448084" y="1145349"/>
-            <a:chExt cx="6752286" cy="3439283"/>
-          </a:xfrm>
-        </p:grpSpPr>
-        <p:pic>
-          <p:nvPicPr>
-            <p:cNvPr id="2" name="Imagen 1" descr="Captura de pantalla 2014-12-02 a la(s) 17.13.43.png"/>
-            <p:cNvPicPr>
-              <a:picLocks noChangeAspect="1"/>
-            </p:cNvPicPr>
-            <p:nvPr/>
-          </p:nvPicPr>
-          <p:blipFill>
-            <a:blip r:embed="rId2">
-              <a:extLst>
-                <a:ext uri="{28A0092B-C50C-407E-A947-70E740481C1C}">
-                  <a14:useLocalDpi xmlns:a14="http://schemas.microsoft.com/office/drawing/2010/main" val="0"/>
-                </a:ext>
-              </a:extLst>
-            </a:blip>
-            <a:stretch>
-              <a:fillRect/>
-            </a:stretch>
-          </p:blipFill>
-          <p:spPr>
-            <a:xfrm>
-              <a:off x="1727017" y="1288784"/>
-              <a:ext cx="6473353" cy="3295848"/>
-            </a:xfrm>
-            <a:prstGeom prst="rect">
-              <a:avLst/>
-            </a:prstGeom>
-          </p:spPr>
-        </p:pic>
-        <p:sp>
-          <p:nvSpPr>
-            <p:cNvPr id="3" name="Rectángulo 2"/>
-            <p:cNvSpPr/>
-            <p:nvPr/>
-          </p:nvSpPr>
-          <p:spPr>
-            <a:xfrm>
-              <a:off x="1448084" y="1145349"/>
-              <a:ext cx="4112797" cy="718069"/>
-            </a:xfrm>
-            <a:prstGeom prst="rect">
-              <a:avLst/>
-            </a:prstGeom>
-            <a:solidFill>
-              <a:schemeClr val="bg1"/>
-            </a:solidFill>
-            <a:ln>
-              <a:noFill/>
-            </a:ln>
-            <a:effectLst/>
-          </p:spPr>
-          <p:style>
-            <a:lnRef idx="1">
-              <a:schemeClr val="accent1"/>
-            </a:lnRef>
-            <a:fillRef idx="3">
-              <a:schemeClr val="accent1"/>
-            </a:fillRef>
-            <a:effectRef idx="2">
-              <a:schemeClr val="accent1"/>
-            </a:effectRef>
-            <a:fontRef idx="minor">
-              <a:schemeClr val="lt1"/>
-            </a:fontRef>
-          </p:style>
-          <p:txBody>
-            <a:bodyPr rtlCol="0" anchor="ctr"/>
-            <a:lstStyle/>
-            <a:p>
-              <a:pPr algn="ctr"/>
-              <a:endParaRPr lang="es-ES"/>
-            </a:p>
-          </p:txBody>
-        </p:sp>
-      </p:grpSp>
-    </p:spTree>
-    <p:extLst>
-      <p:ext uri="{BB962C8B-B14F-4D97-AF65-F5344CB8AC3E}">
-        <p14:creationId xmlns:p14="http://schemas.microsoft.com/office/powerpoint/2010/main" val="9271454"/>
-      </p:ext>
-    </p:extLst>
-  </p:cSld>
-  <p:clrMapOvr>
-    <a:masterClrMapping/>
-  </p:clrMapOvr>
-</p:sld>
-</file>
-
-<file path=ppt/slides/slide6.xml><?xml version="1.0" encoding="utf-8"?>
-<p:sld xmlns:a="http://schemas.openxmlformats.org/drawingml/2006/main" xmlns:r="http://schemas.openxmlformats.org/officeDocument/2006/relationships" xmlns:p="http://schemas.openxmlformats.org/presentationml/2006/main">
-  <p:cSld>
-    <p:spTree>
-      <p:nvGrpSpPr>
-        <p:cNvPr id="1" name=""/>
-        <p:cNvGrpSpPr/>
-        <p:nvPr/>
-      </p:nvGrpSpPr>
-      <p:grpSpPr>
-        <a:xfrm>
-          <a:off x="0" y="0"/>
-          <a:ext cx="0" cy="0"/>
-          <a:chOff x="0" y="0"/>
-          <a:chExt cx="0" cy="0"/>
-        </a:xfrm>
-      </p:grpSpPr>
-      <p:pic>
-        <p:nvPicPr>
-          <p:cNvPr id="2" name="Imagen 1" descr="Captura de pantalla 2014-10-23 a la(s) 11.12.49.png"/>
-          <p:cNvPicPr>
-            <a:picLocks noChangeAspect="1"/>
-          </p:cNvPicPr>
-          <p:nvPr/>
-        </p:nvPicPr>
-        <p:blipFill>
-          <a:blip r:embed="rId2">
-            <a:extLst>
-              <a:ext uri="{28A0092B-C50C-407E-A947-70E740481C1C}">
-                <a14:useLocalDpi xmlns:a14="http://schemas.microsoft.com/office/drawing/2010/main" val="0"/>
-              </a:ext>
-            </a:extLst>
-          </a:blip>
-          <a:stretch>
-            <a:fillRect/>
-          </a:stretch>
-        </p:blipFill>
-        <p:spPr>
-          <a:xfrm>
-            <a:off x="1872443" y="2019713"/>
-            <a:ext cx="2347180" cy="2472603"/>
-          </a:xfrm>
-          <a:prstGeom prst="rect">
-            <a:avLst/>
-          </a:prstGeom>
-        </p:spPr>
-      </p:pic>
-      <p:pic>
-        <p:nvPicPr>
-          <p:cNvPr id="3" name="Imagen 2" descr="Captura de pantalla 2014-10-23 a la(s) 11.12.29.png"/>
-          <p:cNvPicPr>
-            <a:picLocks noChangeAspect="1"/>
-          </p:cNvPicPr>
-          <p:nvPr/>
-        </p:nvPicPr>
-        <p:blipFill>
-          <a:blip r:embed="rId3">
-            <a:extLst>
-              <a:ext uri="{28A0092B-C50C-407E-A947-70E740481C1C}">
-                <a14:useLocalDpi xmlns:a14="http://schemas.microsoft.com/office/drawing/2010/main" val="0"/>
-              </a:ext>
-            </a:extLst>
-          </a:blip>
-          <a:stretch>
-            <a:fillRect/>
-          </a:stretch>
-        </p:blipFill>
-        <p:spPr>
-          <a:xfrm>
-            <a:off x="4744885" y="2019713"/>
-            <a:ext cx="2346572" cy="2472603"/>
-          </a:xfrm>
-          <a:prstGeom prst="rect">
-            <a:avLst/>
-          </a:prstGeom>
-        </p:spPr>
-      </p:pic>
-    </p:spTree>
-    <p:extLst>
-      <p:ext uri="{BB962C8B-B14F-4D97-AF65-F5344CB8AC3E}">
-        <p14:creationId xmlns:p14="http://schemas.microsoft.com/office/powerpoint/2010/main" val="1940621143"/>
-      </p:ext>
-    </p:extLst>
-  </p:cSld>
-  <p:clrMapOvr>
-    <a:masterClrMapping/>
-  </p:clrMapOvr>
-  <p:timing>
-    <p:tnLst>
-      <p:par>
-        <p:cTn xmlns:p14="http://schemas.microsoft.com/office/powerpoint/2010/main" id="1" dur="indefinite" restart="never" nodeType="tmRoot"/>
-      </p:par>
-    </p:tnLst>
-  </p:timing>
-</p:sld>
-</file>
-
-<file path=ppt/slides/slide7.xml><?xml version="1.0" encoding="utf-8"?>
-<p:sld xmlns:a="http://schemas.openxmlformats.org/drawingml/2006/main" xmlns:r="http://schemas.openxmlformats.org/officeDocument/2006/relationships" xmlns:p="http://schemas.openxmlformats.org/presentationml/2006/main">
-  <p:cSld>
-    <p:spTree>
-      <p:nvGrpSpPr>
-        <p:cNvPr id="1" name=""/>
-        <p:cNvGrpSpPr/>
-        <p:nvPr/>
-      </p:nvGrpSpPr>
-      <p:grpSpPr>
-        <a:xfrm>
-          <a:off x="0" y="0"/>
-          <a:ext cx="0" cy="0"/>
-          <a:chOff x="0" y="0"/>
-          <a:chExt cx="0" cy="0"/>
-        </a:xfrm>
-      </p:grpSpPr>
-      <p:pic>
-        <p:nvPicPr>
-          <p:cNvPr id="2" name="Imagen 1" descr="Captura de pantalla 2014-10-23 a la(s) 11.18.25.png"/>
-          <p:cNvPicPr>
-            <a:picLocks noChangeAspect="1"/>
-          </p:cNvPicPr>
-          <p:nvPr/>
-        </p:nvPicPr>
-        <p:blipFill>
-          <a:blip r:embed="rId2">
-            <a:extLst>
-              <a:ext uri="{28A0092B-C50C-407E-A947-70E740481C1C}">
-                <a14:useLocalDpi xmlns:a14="http://schemas.microsoft.com/office/drawing/2010/main" val="0"/>
-              </a:ext>
-            </a:extLst>
-          </a:blip>
-          <a:stretch>
-            <a:fillRect/>
-          </a:stretch>
-        </p:blipFill>
-        <p:spPr>
-          <a:xfrm>
-            <a:off x="1409531" y="1768466"/>
-            <a:ext cx="3003786" cy="3156650"/>
-          </a:xfrm>
-          <a:prstGeom prst="rect">
-            <a:avLst/>
-          </a:prstGeom>
-        </p:spPr>
-      </p:pic>
-      <p:pic>
-        <p:nvPicPr>
-          <p:cNvPr id="3" name="Imagen 2" descr="Captura de pantalla 2014-10-23 a la(s) 11.18.02.png"/>
-          <p:cNvPicPr>
-            <a:picLocks noChangeAspect="1"/>
-          </p:cNvPicPr>
-          <p:nvPr/>
-        </p:nvPicPr>
-        <p:blipFill>
-          <a:blip r:embed="rId3">
-            <a:extLst>
-              <a:ext uri="{28A0092B-C50C-407E-A947-70E740481C1C}">
-                <a14:useLocalDpi xmlns:a14="http://schemas.microsoft.com/office/drawing/2010/main" val="0"/>
-              </a:ext>
-            </a:extLst>
-          </a:blip>
-          <a:stretch>
-            <a:fillRect/>
-          </a:stretch>
-        </p:blipFill>
-        <p:spPr>
-          <a:xfrm>
-            <a:off x="4734952" y="1768466"/>
-            <a:ext cx="3003990" cy="3164918"/>
-          </a:xfrm>
-          <a:prstGeom prst="rect">
-            <a:avLst/>
-          </a:prstGeom>
-        </p:spPr>
-      </p:pic>
-    </p:spTree>
-    <p:extLst>
-      <p:ext uri="{BB962C8B-B14F-4D97-AF65-F5344CB8AC3E}">
-        <p14:creationId xmlns:p14="http://schemas.microsoft.com/office/powerpoint/2010/main" val="2761878465"/>
-      </p:ext>
-    </p:extLst>
-  </p:cSld>
-  <p:clrMapOvr>
-    <a:masterClrMapping/>
-  </p:clrMapOvr>
-  <p:timing>
-    <p:tnLst>
-      <p:par>
-        <p:cTn xmlns:p14="http://schemas.microsoft.com/office/powerpoint/2010/main" id="1" dur="indefinite" restart="never" nodeType="tmRoot"/>
-      </p:par>
-    </p:tnLst>
-  </p:timing>
-</p:sld>
-</file>
-
-<file path=ppt/slides/slide8.xml><?xml version="1.0" encoding="utf-8"?>
-<p:sld xmlns:a="http://schemas.openxmlformats.org/drawingml/2006/main" xmlns:r="http://schemas.openxmlformats.org/officeDocument/2006/relationships" xmlns:p="http://schemas.openxmlformats.org/presentationml/2006/main">
-  <p:cSld>
-    <p:spTree>
-      <p:nvGrpSpPr>
-        <p:cNvPr id="1" name=""/>
-        <p:cNvGrpSpPr/>
-        <p:nvPr/>
-      </p:nvGrpSpPr>
-      <p:grpSpPr>
-        <a:xfrm>
-          <a:off x="0" y="0"/>
-          <a:ext cx="0" cy="0"/>
-          <a:chOff x="0" y="0"/>
-          <a:chExt cx="0" cy="0"/>
-        </a:xfrm>
-      </p:grpSpPr>
-      <p:pic>
-        <p:nvPicPr>
-          <p:cNvPr id="2" name="Imagen 1" descr="Captura de pantalla 2014-10-23 a la(s) 12.49.51.png"/>
-          <p:cNvPicPr>
-            <a:picLocks noChangeAspect="1"/>
-          </p:cNvPicPr>
-          <p:nvPr/>
-        </p:nvPicPr>
-        <p:blipFill>
-          <a:blip r:embed="rId2">
-            <a:extLst>
-              <a:ext uri="{28A0092B-C50C-407E-A947-70E740481C1C}">
-                <a14:useLocalDpi xmlns:a14="http://schemas.microsoft.com/office/drawing/2010/main" val="0"/>
-              </a:ext>
-            </a:extLst>
-          </a:blip>
-          <a:stretch>
-            <a:fillRect/>
-          </a:stretch>
-        </p:blipFill>
-        <p:spPr>
-          <a:xfrm>
-            <a:off x="1471825" y="1003218"/>
-            <a:ext cx="3638014" cy="2381485"/>
-          </a:xfrm>
-          <a:prstGeom prst="rect">
-            <a:avLst/>
-          </a:prstGeom>
-        </p:spPr>
-      </p:pic>
-      <p:pic>
-        <p:nvPicPr>
-          <p:cNvPr id="3" name="Imagen 2" descr="Captura de pantalla 2014-10-23 a la(s) 12.50.06.png"/>
-          <p:cNvPicPr>
-            <a:picLocks noChangeAspect="1"/>
-          </p:cNvPicPr>
-          <p:nvPr/>
-        </p:nvPicPr>
-        <p:blipFill>
-          <a:blip r:embed="rId3">
-            <a:extLst>
-              <a:ext uri="{28A0092B-C50C-407E-A947-70E740481C1C}">
-                <a14:useLocalDpi xmlns:a14="http://schemas.microsoft.com/office/drawing/2010/main" val="0"/>
-              </a:ext>
-            </a:extLst>
-          </a:blip>
-          <a:stretch>
-            <a:fillRect/>
-          </a:stretch>
-        </p:blipFill>
-        <p:spPr>
-          <a:xfrm>
-            <a:off x="5142336" y="1003218"/>
-            <a:ext cx="3445726" cy="2214243"/>
-          </a:xfrm>
-          <a:prstGeom prst="rect">
-            <a:avLst/>
-          </a:prstGeom>
-        </p:spPr>
-      </p:pic>
-    </p:spTree>
-    <p:extLst>
-      <p:ext uri="{BB962C8B-B14F-4D97-AF65-F5344CB8AC3E}">
-        <p14:creationId xmlns:p14="http://schemas.microsoft.com/office/powerpoint/2010/main" val="991137353"/>
-      </p:ext>
-    </p:extLst>
-  </p:cSld>
-  <p:clrMapOvr>
-    <a:masterClrMapping/>
-  </p:clrMapOvr>
-</p:sld>
-</file>
-
-<file path=ppt/slides/slide9.xml><?xml version="1.0" encoding="utf-8"?>
-<p:sld xmlns:a="http://schemas.openxmlformats.org/drawingml/2006/main" xmlns:r="http://schemas.openxmlformats.org/officeDocument/2006/relationships" xmlns:p="http://schemas.openxmlformats.org/presentationml/2006/main">
-  <p:cSld>
-    <p:spTree>
-      <p:nvGrpSpPr>
-        <p:cNvPr id="1" name=""/>
-        <p:cNvGrpSpPr/>
-        <p:nvPr/>
-      </p:nvGrpSpPr>
-      <p:grpSpPr>
-        <a:xfrm>
-          <a:off x="0" y="0"/>
-          <a:ext cx="0" cy="0"/>
-          <a:chOff x="0" y="0"/>
-          <a:chExt cx="0" cy="0"/>
-        </a:xfrm>
-      </p:grpSpPr>
       <p:grpSp>
         <p:nvGrpSpPr>
           <p:cNvPr id="4" name="Agrupar 3"/>
@@ -4340,6 +3309,1650 @@
       </p:par>
     </p:tnLst>
   </p:timing>
+</p:sld>
+</file>
+
+<file path=ppt/slides/slide11.xml><?xml version="1.0" encoding="utf-8"?>
+<p:sld xmlns:a="http://schemas.openxmlformats.org/drawingml/2006/main" xmlns:r="http://schemas.openxmlformats.org/officeDocument/2006/relationships" xmlns:p="http://schemas.openxmlformats.org/presentationml/2006/main">
+  <p:cSld>
+    <p:spTree>
+      <p:nvGrpSpPr>
+        <p:cNvPr id="1" name=""/>
+        <p:cNvGrpSpPr/>
+        <p:nvPr/>
+      </p:nvGrpSpPr>
+      <p:grpSpPr>
+        <a:xfrm>
+          <a:off x="0" y="0"/>
+          <a:ext cx="0" cy="0"/>
+          <a:chOff x="0" y="0"/>
+          <a:chExt cx="0" cy="0"/>
+        </a:xfrm>
+      </p:grpSpPr>
+      <p:pic>
+        <p:nvPicPr>
+          <p:cNvPr id="2" name="Imagen 1" descr="powerlawExp.png"/>
+          <p:cNvPicPr>
+            <a:picLocks noChangeAspect="1"/>
+          </p:cNvPicPr>
+          <p:nvPr/>
+        </p:nvPicPr>
+        <p:blipFill>
+          <a:blip r:embed="rId2">
+            <a:extLst>
+              <a:ext uri="{28A0092B-C50C-407E-A947-70E740481C1C}">
+                <a14:useLocalDpi xmlns:a14="http://schemas.microsoft.com/office/drawing/2010/main" val="0"/>
+              </a:ext>
+            </a:extLst>
+          </a:blip>
+          <a:stretch>
+            <a:fillRect/>
+          </a:stretch>
+        </p:blipFill>
+        <p:spPr>
+          <a:xfrm>
+            <a:off x="1584584" y="3053358"/>
+            <a:ext cx="3287209" cy="1563645"/>
+          </a:xfrm>
+          <a:prstGeom prst="rect">
+            <a:avLst/>
+          </a:prstGeom>
+        </p:spPr>
+      </p:pic>
+      <p:pic>
+        <p:nvPicPr>
+          <p:cNvPr id="3" name="Imagen 2" descr="Captura de pantalla 2014-10-15 a la(s) 18.24.58.png"/>
+          <p:cNvPicPr>
+            <a:picLocks noChangeAspect="1"/>
+          </p:cNvPicPr>
+          <p:nvPr/>
+        </p:nvPicPr>
+        <p:blipFill>
+          <a:blip r:embed="rId3">
+            <a:extLst>
+              <a:ext uri="{28A0092B-C50C-407E-A947-70E740481C1C}">
+                <a14:useLocalDpi xmlns:a14="http://schemas.microsoft.com/office/drawing/2010/main" val="0"/>
+              </a:ext>
+            </a:extLst>
+          </a:blip>
+          <a:stretch>
+            <a:fillRect/>
+          </a:stretch>
+        </p:blipFill>
+        <p:spPr>
+          <a:xfrm>
+            <a:off x="5109184" y="2931619"/>
+            <a:ext cx="1844870" cy="1685384"/>
+          </a:xfrm>
+          <a:prstGeom prst="rect">
+            <a:avLst/>
+          </a:prstGeom>
+        </p:spPr>
+      </p:pic>
+      <p:sp>
+        <p:nvSpPr>
+          <p:cNvPr id="4" name="CuadroTexto 3"/>
+          <p:cNvSpPr txBox="1"/>
+          <p:nvPr/>
+        </p:nvSpPr>
+        <p:spPr>
+          <a:xfrm>
+            <a:off x="2753734" y="4617003"/>
+            <a:ext cx="1191352" cy="338554"/>
+          </a:xfrm>
+          <a:prstGeom prst="rect">
+            <a:avLst/>
+          </a:prstGeom>
+          <a:noFill/>
+        </p:spPr>
+        <p:txBody>
+          <a:bodyPr wrap="none" rtlCol="0">
+            <a:spAutoFit/>
+          </a:bodyPr>
+          <a:lstStyle/>
+          <a:p>
+            <a:r>
+              <a:rPr lang="es-ES" sz="1600" dirty="0" smtClean="0"/>
+              <a:t>Escala lineal</a:t>
+            </a:r>
+            <a:endParaRPr lang="es-ES" sz="1600" dirty="0"/>
+          </a:p>
+        </p:txBody>
+      </p:sp>
+      <p:sp>
+        <p:nvSpPr>
+          <p:cNvPr id="5" name="CuadroTexto 4"/>
+          <p:cNvSpPr txBox="1"/>
+          <p:nvPr/>
+        </p:nvSpPr>
+        <p:spPr>
+          <a:xfrm>
+            <a:off x="5180404" y="4615109"/>
+            <a:ext cx="1675459" cy="338554"/>
+          </a:xfrm>
+          <a:prstGeom prst="rect">
+            <a:avLst/>
+          </a:prstGeom>
+          <a:noFill/>
+        </p:spPr>
+        <p:txBody>
+          <a:bodyPr wrap="none" rtlCol="0">
+            <a:spAutoFit/>
+          </a:bodyPr>
+          <a:lstStyle/>
+          <a:p>
+            <a:r>
+              <a:rPr lang="es-ES" sz="1600" dirty="0" smtClean="0"/>
+              <a:t>Escala logarítmica</a:t>
+            </a:r>
+            <a:endParaRPr lang="es-ES" sz="1600" dirty="0"/>
+          </a:p>
+        </p:txBody>
+      </p:sp>
+    </p:spTree>
+    <p:extLst>
+      <p:ext uri="{BB962C8B-B14F-4D97-AF65-F5344CB8AC3E}">
+        <p14:creationId xmlns:p14="http://schemas.microsoft.com/office/powerpoint/2010/main" val="2484292234"/>
+      </p:ext>
+    </p:extLst>
+  </p:cSld>
+  <p:clrMapOvr>
+    <a:masterClrMapping/>
+  </p:clrMapOvr>
+</p:sld>
+</file>
+
+<file path=ppt/slides/slide2.xml><?xml version="1.0" encoding="utf-8"?>
+<p:sld xmlns:a="http://schemas.openxmlformats.org/drawingml/2006/main" xmlns:r="http://schemas.openxmlformats.org/officeDocument/2006/relationships" xmlns:p="http://schemas.openxmlformats.org/presentationml/2006/main">
+  <p:cSld>
+    <p:spTree>
+      <p:nvGrpSpPr>
+        <p:cNvPr id="1" name=""/>
+        <p:cNvGrpSpPr/>
+        <p:nvPr/>
+      </p:nvGrpSpPr>
+      <p:grpSpPr>
+        <a:xfrm>
+          <a:off x="0" y="0"/>
+          <a:ext cx="0" cy="0"/>
+          <a:chOff x="0" y="0"/>
+          <a:chExt cx="0" cy="0"/>
+        </a:xfrm>
+      </p:grpSpPr>
+      <p:pic>
+        <p:nvPicPr>
+          <p:cNvPr id="11" name="Imagen 10" descr="Captura de pantalla 2014-12-09 a la(s) 10.37.41.png"/>
+          <p:cNvPicPr>
+            <a:picLocks noChangeAspect="1"/>
+          </p:cNvPicPr>
+          <p:nvPr/>
+        </p:nvPicPr>
+        <p:blipFill>
+          <a:blip r:embed="rId2">
+            <a:extLst>
+              <a:ext uri="{28A0092B-C50C-407E-A947-70E740481C1C}">
+                <a14:useLocalDpi xmlns:a14="http://schemas.microsoft.com/office/drawing/2010/main" val="0"/>
+              </a:ext>
+            </a:extLst>
+          </a:blip>
+          <a:stretch>
+            <a:fillRect/>
+          </a:stretch>
+        </p:blipFill>
+        <p:spPr>
+          <a:xfrm>
+            <a:off x="3548263" y="3972220"/>
+            <a:ext cx="2846719" cy="1859516"/>
+          </a:xfrm>
+          <a:prstGeom prst="rect">
+            <a:avLst/>
+          </a:prstGeom>
+        </p:spPr>
+      </p:pic>
+      <p:pic>
+        <p:nvPicPr>
+          <p:cNvPr id="4" name="Imagen 3" descr="Captura de pantalla 2014-12-09 a la(s) 10.37.41.png"/>
+          <p:cNvPicPr>
+            <a:picLocks noChangeAspect="1"/>
+          </p:cNvPicPr>
+          <p:nvPr/>
+        </p:nvPicPr>
+        <p:blipFill>
+          <a:blip r:embed="rId2">
+            <a:extLst>
+              <a:ext uri="{28A0092B-C50C-407E-A947-70E740481C1C}">
+                <a14:useLocalDpi xmlns:a14="http://schemas.microsoft.com/office/drawing/2010/main" val="0"/>
+              </a:ext>
+            </a:extLst>
+          </a:blip>
+          <a:stretch>
+            <a:fillRect/>
+          </a:stretch>
+        </p:blipFill>
+        <p:spPr>
+          <a:xfrm>
+            <a:off x="3518585" y="2176023"/>
+            <a:ext cx="2846719" cy="1859516"/>
+          </a:xfrm>
+          <a:prstGeom prst="rect">
+            <a:avLst/>
+          </a:prstGeom>
+        </p:spPr>
+      </p:pic>
+      <p:pic>
+        <p:nvPicPr>
+          <p:cNvPr id="2" name="Imagen 1" descr="Captura de pantalla 2014-12-09 a la(s) 10.37.41.png"/>
+          <p:cNvPicPr>
+            <a:picLocks noChangeAspect="1"/>
+          </p:cNvPicPr>
+          <p:nvPr/>
+        </p:nvPicPr>
+        <p:blipFill>
+          <a:blip r:embed="rId2">
+            <a:extLst>
+              <a:ext uri="{28A0092B-C50C-407E-A947-70E740481C1C}">
+                <a14:useLocalDpi xmlns:a14="http://schemas.microsoft.com/office/drawing/2010/main" val="0"/>
+              </a:ext>
+            </a:extLst>
+          </a:blip>
+          <a:stretch>
+            <a:fillRect/>
+          </a:stretch>
+        </p:blipFill>
+        <p:spPr>
+          <a:xfrm>
+            <a:off x="131734" y="2664570"/>
+            <a:ext cx="2846719" cy="1859516"/>
+          </a:xfrm>
+          <a:prstGeom prst="rect">
+            <a:avLst/>
+          </a:prstGeom>
+        </p:spPr>
+      </p:pic>
+      <p:sp>
+        <p:nvSpPr>
+          <p:cNvPr id="3" name="Elipse 2"/>
+          <p:cNvSpPr/>
+          <p:nvPr/>
+        </p:nvSpPr>
+        <p:spPr>
+          <a:xfrm>
+            <a:off x="4207753" y="2832741"/>
+            <a:ext cx="213652" cy="213640"/>
+          </a:xfrm>
+          <a:prstGeom prst="ellipse">
+            <a:avLst/>
+          </a:prstGeom>
+          <a:solidFill>
+            <a:schemeClr val="accent2">
+              <a:lumMod val="75000"/>
+              <a:alpha val="60000"/>
+            </a:schemeClr>
+          </a:solidFill>
+          <a:ln>
+            <a:noFill/>
+          </a:ln>
+          <a:effectLst/>
+        </p:spPr>
+        <p:style>
+          <a:lnRef idx="1">
+            <a:schemeClr val="accent1"/>
+          </a:lnRef>
+          <a:fillRef idx="3">
+            <a:schemeClr val="accent1"/>
+          </a:fillRef>
+          <a:effectRef idx="2">
+            <a:schemeClr val="accent1"/>
+          </a:effectRef>
+          <a:fontRef idx="minor">
+            <a:schemeClr val="lt1"/>
+          </a:fontRef>
+        </p:style>
+        <p:txBody>
+          <a:bodyPr rtlCol="0" anchor="ctr"/>
+          <a:lstStyle/>
+          <a:p>
+            <a:pPr algn="ctr"/>
+            <a:endParaRPr lang="es-ES"/>
+          </a:p>
+        </p:txBody>
+      </p:sp>
+      <p:sp>
+        <p:nvSpPr>
+          <p:cNvPr id="5" name="Elipse 4"/>
+          <p:cNvSpPr/>
+          <p:nvPr/>
+        </p:nvSpPr>
+        <p:spPr>
+          <a:xfrm>
+            <a:off x="3582697" y="2909891"/>
+            <a:ext cx="213652" cy="213640"/>
+          </a:xfrm>
+          <a:prstGeom prst="ellipse">
+            <a:avLst/>
+          </a:prstGeom>
+          <a:solidFill>
+            <a:schemeClr val="accent2">
+              <a:lumMod val="75000"/>
+              <a:alpha val="60000"/>
+            </a:schemeClr>
+          </a:solidFill>
+          <a:ln>
+            <a:noFill/>
+          </a:ln>
+          <a:effectLst/>
+        </p:spPr>
+        <p:style>
+          <a:lnRef idx="1">
+            <a:schemeClr val="accent1"/>
+          </a:lnRef>
+          <a:fillRef idx="3">
+            <a:schemeClr val="accent1"/>
+          </a:fillRef>
+          <a:effectRef idx="2">
+            <a:schemeClr val="accent1"/>
+          </a:effectRef>
+          <a:fontRef idx="minor">
+            <a:schemeClr val="lt1"/>
+          </a:fontRef>
+        </p:style>
+        <p:txBody>
+          <a:bodyPr rtlCol="0" anchor="ctr"/>
+          <a:lstStyle/>
+          <a:p>
+            <a:pPr algn="ctr"/>
+            <a:endParaRPr lang="es-ES"/>
+          </a:p>
+        </p:txBody>
+      </p:sp>
+      <p:sp>
+        <p:nvSpPr>
+          <p:cNvPr id="6" name="Elipse 5"/>
+          <p:cNvSpPr/>
+          <p:nvPr/>
+        </p:nvSpPr>
+        <p:spPr>
+          <a:xfrm>
+            <a:off x="3913140" y="2257103"/>
+            <a:ext cx="213652" cy="213640"/>
+          </a:xfrm>
+          <a:prstGeom prst="ellipse">
+            <a:avLst/>
+          </a:prstGeom>
+          <a:solidFill>
+            <a:schemeClr val="accent2">
+              <a:lumMod val="75000"/>
+              <a:alpha val="60000"/>
+            </a:schemeClr>
+          </a:solidFill>
+          <a:ln>
+            <a:noFill/>
+          </a:ln>
+          <a:effectLst/>
+        </p:spPr>
+        <p:style>
+          <a:lnRef idx="1">
+            <a:schemeClr val="accent1"/>
+          </a:lnRef>
+          <a:fillRef idx="3">
+            <a:schemeClr val="accent1"/>
+          </a:fillRef>
+          <a:effectRef idx="2">
+            <a:schemeClr val="accent1"/>
+          </a:effectRef>
+          <a:fontRef idx="minor">
+            <a:schemeClr val="lt1"/>
+          </a:fontRef>
+        </p:style>
+        <p:txBody>
+          <a:bodyPr rtlCol="0" anchor="ctr"/>
+          <a:lstStyle/>
+          <a:p>
+            <a:pPr algn="ctr"/>
+            <a:endParaRPr lang="es-ES"/>
+          </a:p>
+        </p:txBody>
+      </p:sp>
+      <p:sp>
+        <p:nvSpPr>
+          <p:cNvPr id="7" name="Elipse 6"/>
+          <p:cNvSpPr/>
+          <p:nvPr/>
+        </p:nvSpPr>
+        <p:spPr>
+          <a:xfrm>
+            <a:off x="5335581" y="2777300"/>
+            <a:ext cx="213652" cy="213640"/>
+          </a:xfrm>
+          <a:prstGeom prst="ellipse">
+            <a:avLst/>
+          </a:prstGeom>
+          <a:solidFill>
+            <a:schemeClr val="accent2">
+              <a:lumMod val="75000"/>
+              <a:alpha val="60000"/>
+            </a:schemeClr>
+          </a:solidFill>
+          <a:ln>
+            <a:noFill/>
+          </a:ln>
+          <a:effectLst/>
+        </p:spPr>
+        <p:style>
+          <a:lnRef idx="1">
+            <a:schemeClr val="accent1"/>
+          </a:lnRef>
+          <a:fillRef idx="3">
+            <a:schemeClr val="accent1"/>
+          </a:fillRef>
+          <a:effectRef idx="2">
+            <a:schemeClr val="accent1"/>
+          </a:effectRef>
+          <a:fontRef idx="minor">
+            <a:schemeClr val="lt1"/>
+          </a:fontRef>
+        </p:style>
+        <p:txBody>
+          <a:bodyPr rtlCol="0" anchor="ctr"/>
+          <a:lstStyle/>
+          <a:p>
+            <a:pPr algn="ctr"/>
+            <a:endParaRPr lang="es-ES"/>
+          </a:p>
+        </p:txBody>
+      </p:sp>
+      <p:sp>
+        <p:nvSpPr>
+          <p:cNvPr id="8" name="Elipse 7"/>
+          <p:cNvSpPr/>
+          <p:nvPr/>
+        </p:nvSpPr>
+        <p:spPr>
+          <a:xfrm>
+            <a:off x="5861872" y="2809005"/>
+            <a:ext cx="213652" cy="213640"/>
+          </a:xfrm>
+          <a:prstGeom prst="ellipse">
+            <a:avLst/>
+          </a:prstGeom>
+          <a:solidFill>
+            <a:schemeClr val="accent2">
+              <a:lumMod val="75000"/>
+              <a:alpha val="60000"/>
+            </a:schemeClr>
+          </a:solidFill>
+          <a:ln>
+            <a:noFill/>
+          </a:ln>
+          <a:effectLst/>
+        </p:spPr>
+        <p:style>
+          <a:lnRef idx="1">
+            <a:schemeClr val="accent1"/>
+          </a:lnRef>
+          <a:fillRef idx="3">
+            <a:schemeClr val="accent1"/>
+          </a:fillRef>
+          <a:effectRef idx="2">
+            <a:schemeClr val="accent1"/>
+          </a:effectRef>
+          <a:fontRef idx="minor">
+            <a:schemeClr val="lt1"/>
+          </a:fontRef>
+        </p:style>
+        <p:txBody>
+          <a:bodyPr rtlCol="0" anchor="ctr"/>
+          <a:lstStyle/>
+          <a:p>
+            <a:pPr algn="ctr"/>
+            <a:endParaRPr lang="es-ES"/>
+          </a:p>
+        </p:txBody>
+      </p:sp>
+      <p:sp>
+        <p:nvSpPr>
+          <p:cNvPr id="9" name="Elipse 8"/>
+          <p:cNvSpPr/>
+          <p:nvPr/>
+        </p:nvSpPr>
+        <p:spPr>
+          <a:xfrm>
+            <a:off x="5838132" y="3760549"/>
+            <a:ext cx="213652" cy="213640"/>
+          </a:xfrm>
+          <a:prstGeom prst="ellipse">
+            <a:avLst/>
+          </a:prstGeom>
+          <a:solidFill>
+            <a:schemeClr val="accent2">
+              <a:lumMod val="75000"/>
+              <a:alpha val="60000"/>
+            </a:schemeClr>
+          </a:solidFill>
+          <a:ln>
+            <a:noFill/>
+          </a:ln>
+          <a:effectLst/>
+        </p:spPr>
+        <p:style>
+          <a:lnRef idx="1">
+            <a:schemeClr val="accent1"/>
+          </a:lnRef>
+          <a:fillRef idx="3">
+            <a:schemeClr val="accent1"/>
+          </a:fillRef>
+          <a:effectRef idx="2">
+            <a:schemeClr val="accent1"/>
+          </a:effectRef>
+          <a:fontRef idx="minor">
+            <a:schemeClr val="lt1"/>
+          </a:fontRef>
+        </p:style>
+        <p:txBody>
+          <a:bodyPr rtlCol="0" anchor="ctr"/>
+          <a:lstStyle/>
+          <a:p>
+            <a:pPr algn="ctr"/>
+            <a:endParaRPr lang="es-ES"/>
+          </a:p>
+        </p:txBody>
+      </p:sp>
+      <p:sp>
+        <p:nvSpPr>
+          <p:cNvPr id="10" name="Elipse 9"/>
+          <p:cNvSpPr/>
+          <p:nvPr/>
+        </p:nvSpPr>
+        <p:spPr>
+          <a:xfrm>
+            <a:off x="4953850" y="3406514"/>
+            <a:ext cx="213652" cy="213640"/>
+          </a:xfrm>
+          <a:prstGeom prst="ellipse">
+            <a:avLst/>
+          </a:prstGeom>
+          <a:solidFill>
+            <a:schemeClr val="accent2">
+              <a:lumMod val="75000"/>
+              <a:alpha val="60000"/>
+            </a:schemeClr>
+          </a:solidFill>
+          <a:ln>
+            <a:noFill/>
+          </a:ln>
+          <a:effectLst/>
+        </p:spPr>
+        <p:style>
+          <a:lnRef idx="1">
+            <a:schemeClr val="accent1"/>
+          </a:lnRef>
+          <a:fillRef idx="3">
+            <a:schemeClr val="accent1"/>
+          </a:fillRef>
+          <a:effectRef idx="2">
+            <a:schemeClr val="accent1"/>
+          </a:effectRef>
+          <a:fontRef idx="minor">
+            <a:schemeClr val="lt1"/>
+          </a:fontRef>
+        </p:style>
+        <p:txBody>
+          <a:bodyPr rtlCol="0" anchor="ctr"/>
+          <a:lstStyle/>
+          <a:p>
+            <a:pPr algn="ctr"/>
+            <a:endParaRPr lang="es-ES"/>
+          </a:p>
+        </p:txBody>
+      </p:sp>
+      <p:sp>
+        <p:nvSpPr>
+          <p:cNvPr id="12" name="Elipse 11"/>
+          <p:cNvSpPr/>
+          <p:nvPr/>
+        </p:nvSpPr>
+        <p:spPr>
+          <a:xfrm>
+            <a:off x="4241681" y="4636824"/>
+            <a:ext cx="213652" cy="213640"/>
+          </a:xfrm>
+          <a:prstGeom prst="ellipse">
+            <a:avLst/>
+          </a:prstGeom>
+          <a:solidFill>
+            <a:schemeClr val="accent2">
+              <a:lumMod val="75000"/>
+              <a:alpha val="60000"/>
+            </a:schemeClr>
+          </a:solidFill>
+          <a:ln>
+            <a:noFill/>
+          </a:ln>
+          <a:effectLst/>
+        </p:spPr>
+        <p:style>
+          <a:lnRef idx="1">
+            <a:schemeClr val="accent1"/>
+          </a:lnRef>
+          <a:fillRef idx="3">
+            <a:schemeClr val="accent1"/>
+          </a:fillRef>
+          <a:effectRef idx="2">
+            <a:schemeClr val="accent1"/>
+          </a:effectRef>
+          <a:fontRef idx="minor">
+            <a:schemeClr val="lt1"/>
+          </a:fontRef>
+        </p:style>
+        <p:txBody>
+          <a:bodyPr rtlCol="0" anchor="ctr"/>
+          <a:lstStyle/>
+          <a:p>
+            <a:pPr algn="ctr"/>
+            <a:endParaRPr lang="es-ES"/>
+          </a:p>
+        </p:txBody>
+      </p:sp>
+      <p:cxnSp>
+        <p:nvCxnSpPr>
+          <p:cNvPr id="14" name="Conector angular 13"/>
+          <p:cNvCxnSpPr/>
+          <p:nvPr/>
+        </p:nvCxnSpPr>
+        <p:spPr>
+          <a:xfrm flipV="1">
+            <a:off x="1756693" y="2729847"/>
+            <a:ext cx="1696610" cy="284855"/>
+          </a:xfrm>
+          <a:prstGeom prst="bentConnector3">
+            <a:avLst>
+              <a:gd name="adj1" fmla="val 50000"/>
+            </a:avLst>
+          </a:prstGeom>
+          <a:ln>
+            <a:tailEnd type="arrow"/>
+          </a:ln>
+        </p:spPr>
+        <p:style>
+          <a:lnRef idx="2">
+            <a:schemeClr val="accent1"/>
+          </a:lnRef>
+          <a:fillRef idx="0">
+            <a:schemeClr val="accent1"/>
+          </a:fillRef>
+          <a:effectRef idx="1">
+            <a:schemeClr val="accent1"/>
+          </a:effectRef>
+          <a:fontRef idx="minor">
+            <a:schemeClr val="tx1"/>
+          </a:fontRef>
+        </p:style>
+      </p:cxnSp>
+      <p:cxnSp>
+        <p:nvCxnSpPr>
+          <p:cNvPr id="18" name="Conector angular 17"/>
+          <p:cNvCxnSpPr>
+            <a:endCxn id="11" idx="1"/>
+          </p:cNvCxnSpPr>
+          <p:nvPr/>
+        </p:nvCxnSpPr>
+        <p:spPr>
+          <a:xfrm>
+            <a:off x="1881324" y="4654642"/>
+            <a:ext cx="1666939" cy="247336"/>
+          </a:xfrm>
+          <a:prstGeom prst="bentConnector3">
+            <a:avLst>
+              <a:gd name="adj1" fmla="val 50000"/>
+            </a:avLst>
+          </a:prstGeom>
+          <a:ln>
+            <a:tailEnd type="arrow"/>
+          </a:ln>
+        </p:spPr>
+        <p:style>
+          <a:lnRef idx="2">
+            <a:schemeClr val="accent1"/>
+          </a:lnRef>
+          <a:fillRef idx="0">
+            <a:schemeClr val="accent1"/>
+          </a:fillRef>
+          <a:effectRef idx="1">
+            <a:schemeClr val="accent1"/>
+          </a:effectRef>
+          <a:fontRef idx="minor">
+            <a:schemeClr val="tx1"/>
+          </a:fontRef>
+        </p:style>
+      </p:cxnSp>
+      <p:sp>
+        <p:nvSpPr>
+          <p:cNvPr id="24" name="CuadroTexto 23"/>
+          <p:cNvSpPr txBox="1"/>
+          <p:nvPr/>
+        </p:nvSpPr>
+        <p:spPr>
+          <a:xfrm>
+            <a:off x="1756693" y="2440977"/>
+            <a:ext cx="1541558" cy="276999"/>
+          </a:xfrm>
+          <a:prstGeom prst="rect">
+            <a:avLst/>
+          </a:prstGeom>
+          <a:noFill/>
+        </p:spPr>
+        <p:txBody>
+          <a:bodyPr wrap="none" rtlCol="0">
+            <a:spAutoFit/>
+          </a:bodyPr>
+          <a:lstStyle/>
+          <a:p>
+            <a:r>
+              <a:rPr lang="es-ES" sz="1200" dirty="0" smtClean="0"/>
+              <a:t>Contagio simple (k=1)</a:t>
+            </a:r>
+            <a:endParaRPr lang="es-ES" sz="1200" dirty="0"/>
+          </a:p>
+        </p:txBody>
+      </p:sp>
+      <p:sp>
+        <p:nvSpPr>
+          <p:cNvPr id="25" name="CuadroTexto 24"/>
+          <p:cNvSpPr txBox="1"/>
+          <p:nvPr/>
+        </p:nvSpPr>
+        <p:spPr>
+          <a:xfrm>
+            <a:off x="1750758" y="4907912"/>
+            <a:ext cx="1710249" cy="276999"/>
+          </a:xfrm>
+          <a:prstGeom prst="rect">
+            <a:avLst/>
+          </a:prstGeom>
+          <a:noFill/>
+        </p:spPr>
+        <p:txBody>
+          <a:bodyPr wrap="none" rtlCol="0">
+            <a:spAutoFit/>
+          </a:bodyPr>
+          <a:lstStyle/>
+          <a:p>
+            <a:r>
+              <a:rPr lang="es-ES" sz="1200" dirty="0" smtClean="0"/>
+              <a:t>Contagio complejo (k=2)</a:t>
+            </a:r>
+            <a:endParaRPr lang="es-ES" sz="1200" dirty="0"/>
+          </a:p>
+        </p:txBody>
+      </p:sp>
+    </p:spTree>
+    <p:extLst>
+      <p:ext uri="{BB962C8B-B14F-4D97-AF65-F5344CB8AC3E}">
+        <p14:creationId xmlns:p14="http://schemas.microsoft.com/office/powerpoint/2010/main" val="842092529"/>
+      </p:ext>
+    </p:extLst>
+  </p:cSld>
+  <p:clrMapOvr>
+    <a:masterClrMapping/>
+  </p:clrMapOvr>
+</p:sld>
+</file>
+
+<file path=ppt/slides/slide3.xml><?xml version="1.0" encoding="utf-8"?>
+<p:sld xmlns:a="http://schemas.openxmlformats.org/drawingml/2006/main" xmlns:r="http://schemas.openxmlformats.org/officeDocument/2006/relationships" xmlns:p="http://schemas.openxmlformats.org/presentationml/2006/main">
+  <p:cSld>
+    <p:spTree>
+      <p:nvGrpSpPr>
+        <p:cNvPr id="1" name=""/>
+        <p:cNvGrpSpPr/>
+        <p:nvPr/>
+      </p:nvGrpSpPr>
+      <p:grpSpPr>
+        <a:xfrm>
+          <a:off x="0" y="0"/>
+          <a:ext cx="0" cy="0"/>
+          <a:chOff x="0" y="0"/>
+          <a:chExt cx="0" cy="0"/>
+        </a:xfrm>
+      </p:grpSpPr>
+      <p:pic>
+        <p:nvPicPr>
+          <p:cNvPr id="2" name="Imagen 1" descr="Captura de pantalla 2014-12-04 a la(s) 17.09.48.png"/>
+          <p:cNvPicPr>
+            <a:picLocks noChangeAspect="1"/>
+          </p:cNvPicPr>
+          <p:nvPr/>
+        </p:nvPicPr>
+        <p:blipFill>
+          <a:blip r:embed="rId2">
+            <a:extLst>
+              <a:ext uri="{28A0092B-C50C-407E-A947-70E740481C1C}">
+                <a14:useLocalDpi xmlns:a14="http://schemas.microsoft.com/office/drawing/2010/main" val="0"/>
+              </a:ext>
+            </a:extLst>
+          </a:blip>
+          <a:stretch>
+            <a:fillRect/>
+          </a:stretch>
+        </p:blipFill>
+        <p:spPr>
+          <a:xfrm>
+            <a:off x="783389" y="1915992"/>
+            <a:ext cx="2561715" cy="2684537"/>
+          </a:xfrm>
+          <a:prstGeom prst="rect">
+            <a:avLst/>
+          </a:prstGeom>
+        </p:spPr>
+      </p:pic>
+      <p:pic>
+        <p:nvPicPr>
+          <p:cNvPr id="3" name="Imagen 2" descr="Captura de pantalla 2014-12-04 a la(s) 17.10.27.png"/>
+          <p:cNvPicPr>
+            <a:picLocks noChangeAspect="1"/>
+          </p:cNvPicPr>
+          <p:nvPr/>
+        </p:nvPicPr>
+        <p:blipFill>
+          <a:blip r:embed="rId3">
+            <a:extLst>
+              <a:ext uri="{28A0092B-C50C-407E-A947-70E740481C1C}">
+                <a14:useLocalDpi xmlns:a14="http://schemas.microsoft.com/office/drawing/2010/main" val="0"/>
+              </a:ext>
+            </a:extLst>
+          </a:blip>
+          <a:stretch>
+            <a:fillRect/>
+          </a:stretch>
+        </p:blipFill>
+        <p:spPr>
+          <a:xfrm>
+            <a:off x="3515491" y="1926153"/>
+            <a:ext cx="2561715" cy="2672840"/>
+          </a:xfrm>
+          <a:prstGeom prst="rect">
+            <a:avLst/>
+          </a:prstGeom>
+        </p:spPr>
+      </p:pic>
+      <p:sp>
+        <p:nvSpPr>
+          <p:cNvPr id="4" name="CuadroTexto 3"/>
+          <p:cNvSpPr txBox="1"/>
+          <p:nvPr/>
+        </p:nvSpPr>
+        <p:spPr>
+          <a:xfrm>
+            <a:off x="1495562" y="4595271"/>
+            <a:ext cx="1162648" cy="307777"/>
+          </a:xfrm>
+          <a:prstGeom prst="rect">
+            <a:avLst/>
+          </a:prstGeom>
+          <a:noFill/>
+        </p:spPr>
+        <p:txBody>
+          <a:bodyPr wrap="none" rtlCol="0">
+            <a:spAutoFit/>
+          </a:bodyPr>
+          <a:lstStyle/>
+          <a:p>
+            <a:r>
+              <a:rPr lang="es-ES" sz="1400" dirty="0" smtClean="0"/>
+              <a:t>N=200; p=0.0</a:t>
+            </a:r>
+            <a:endParaRPr lang="es-ES" sz="1400" dirty="0"/>
+          </a:p>
+        </p:txBody>
+      </p:sp>
+      <p:sp>
+        <p:nvSpPr>
+          <p:cNvPr id="5" name="CuadroTexto 4"/>
+          <p:cNvSpPr txBox="1"/>
+          <p:nvPr/>
+        </p:nvSpPr>
+        <p:spPr>
+          <a:xfrm>
+            <a:off x="4247392" y="4600639"/>
+            <a:ext cx="1253643" cy="307777"/>
+          </a:xfrm>
+          <a:prstGeom prst="rect">
+            <a:avLst/>
+          </a:prstGeom>
+          <a:noFill/>
+        </p:spPr>
+        <p:txBody>
+          <a:bodyPr wrap="none" rtlCol="0">
+            <a:spAutoFit/>
+          </a:bodyPr>
+          <a:lstStyle/>
+          <a:p>
+            <a:r>
+              <a:rPr lang="es-ES" sz="1400" dirty="0" smtClean="0"/>
+              <a:t>N=200; p=0.10</a:t>
+            </a:r>
+            <a:endParaRPr lang="es-ES" sz="1400" dirty="0"/>
+          </a:p>
+        </p:txBody>
+      </p:sp>
+    </p:spTree>
+    <p:extLst>
+      <p:ext uri="{BB962C8B-B14F-4D97-AF65-F5344CB8AC3E}">
+        <p14:creationId xmlns:p14="http://schemas.microsoft.com/office/powerpoint/2010/main" val="2174899281"/>
+      </p:ext>
+    </p:extLst>
+  </p:cSld>
+  <p:clrMapOvr>
+    <a:masterClrMapping/>
+  </p:clrMapOvr>
+</p:sld>
+</file>
+
+<file path=ppt/slides/slide4.xml><?xml version="1.0" encoding="utf-8"?>
+<p:sld xmlns:a="http://schemas.openxmlformats.org/drawingml/2006/main" xmlns:r="http://schemas.openxmlformats.org/officeDocument/2006/relationships" xmlns:p="http://schemas.openxmlformats.org/presentationml/2006/main">
+  <p:cSld>
+    <p:spTree>
+      <p:nvGrpSpPr>
+        <p:cNvPr id="1" name=""/>
+        <p:cNvGrpSpPr/>
+        <p:nvPr/>
+      </p:nvGrpSpPr>
+      <p:grpSpPr>
+        <a:xfrm>
+          <a:off x="0" y="0"/>
+          <a:ext cx="0" cy="0"/>
+          <a:chOff x="0" y="0"/>
+          <a:chExt cx="0" cy="0"/>
+        </a:xfrm>
+      </p:grpSpPr>
+      <p:pic>
+        <p:nvPicPr>
+          <p:cNvPr id="2" name="Imagen 1" descr="Captura de pantalla 2014-12-04 a la(s) 11.30.20.png"/>
+          <p:cNvPicPr>
+            <a:picLocks noChangeAspect="1"/>
+          </p:cNvPicPr>
+          <p:nvPr/>
+        </p:nvPicPr>
+        <p:blipFill>
+          <a:blip r:embed="rId2">
+            <a:extLst>
+              <a:ext uri="{28A0092B-C50C-407E-A947-70E740481C1C}">
+                <a14:useLocalDpi xmlns:a14="http://schemas.microsoft.com/office/drawing/2010/main" val="0"/>
+              </a:ext>
+            </a:extLst>
+          </a:blip>
+          <a:stretch>
+            <a:fillRect/>
+          </a:stretch>
+        </p:blipFill>
+        <p:spPr>
+          <a:xfrm>
+            <a:off x="534709" y="961380"/>
+            <a:ext cx="3341838" cy="3482477"/>
+          </a:xfrm>
+          <a:prstGeom prst="rect">
+            <a:avLst/>
+          </a:prstGeom>
+        </p:spPr>
+      </p:pic>
+      <p:pic>
+        <p:nvPicPr>
+          <p:cNvPr id="3" name="Imagen 2" descr="Captura de pantalla 2014-12-04 a la(s) 11.29.34.png"/>
+          <p:cNvPicPr>
+            <a:picLocks noChangeAspect="1"/>
+          </p:cNvPicPr>
+          <p:nvPr/>
+        </p:nvPicPr>
+        <p:blipFill>
+          <a:blip r:embed="rId3">
+            <a:extLst>
+              <a:ext uri="{28A0092B-C50C-407E-A947-70E740481C1C}">
+                <a14:useLocalDpi xmlns:a14="http://schemas.microsoft.com/office/drawing/2010/main" val="0"/>
+              </a:ext>
+            </a:extLst>
+          </a:blip>
+          <a:stretch>
+            <a:fillRect/>
+          </a:stretch>
+        </p:blipFill>
+        <p:spPr>
+          <a:xfrm>
+            <a:off x="4038959" y="961380"/>
+            <a:ext cx="3375530" cy="3482477"/>
+          </a:xfrm>
+          <a:prstGeom prst="rect">
+            <a:avLst/>
+          </a:prstGeom>
+        </p:spPr>
+      </p:pic>
+      <p:sp>
+        <p:nvSpPr>
+          <p:cNvPr id="4" name="CuadroTexto 3"/>
+          <p:cNvSpPr txBox="1"/>
+          <p:nvPr/>
+        </p:nvSpPr>
+        <p:spPr>
+          <a:xfrm>
+            <a:off x="1495562" y="4441996"/>
+            <a:ext cx="1409949" cy="307777"/>
+          </a:xfrm>
+          <a:prstGeom prst="rect">
+            <a:avLst/>
+          </a:prstGeom>
+          <a:noFill/>
+        </p:spPr>
+        <p:txBody>
+          <a:bodyPr wrap="none" rtlCol="0">
+            <a:spAutoFit/>
+          </a:bodyPr>
+          <a:lstStyle/>
+          <a:p>
+            <a:r>
+              <a:rPr lang="es-ES" sz="1400" dirty="0" smtClean="0"/>
+              <a:t>N=300; &lt;k&gt; = 1.0</a:t>
+            </a:r>
+            <a:endParaRPr lang="es-ES" sz="1400" dirty="0"/>
+          </a:p>
+        </p:txBody>
+      </p:sp>
+      <p:sp>
+        <p:nvSpPr>
+          <p:cNvPr id="5" name="CuadroTexto 4"/>
+          <p:cNvSpPr txBox="1"/>
+          <p:nvPr/>
+        </p:nvSpPr>
+        <p:spPr>
+          <a:xfrm>
+            <a:off x="5036716" y="4441996"/>
+            <a:ext cx="1409949" cy="307777"/>
+          </a:xfrm>
+          <a:prstGeom prst="rect">
+            <a:avLst/>
+          </a:prstGeom>
+          <a:noFill/>
+        </p:spPr>
+        <p:txBody>
+          <a:bodyPr wrap="none" rtlCol="0">
+            <a:spAutoFit/>
+          </a:bodyPr>
+          <a:lstStyle/>
+          <a:p>
+            <a:r>
+              <a:rPr lang="es-ES" sz="1400" dirty="0" smtClean="0"/>
+              <a:t>N=300; &lt;k&gt; = 3.0</a:t>
+            </a:r>
+            <a:endParaRPr lang="es-ES" sz="1400" dirty="0"/>
+          </a:p>
+        </p:txBody>
+      </p:sp>
+    </p:spTree>
+    <p:extLst>
+      <p:ext uri="{BB962C8B-B14F-4D97-AF65-F5344CB8AC3E}">
+        <p14:creationId xmlns:p14="http://schemas.microsoft.com/office/powerpoint/2010/main" val="2579316567"/>
+      </p:ext>
+    </p:extLst>
+  </p:cSld>
+  <p:clrMapOvr>
+    <a:masterClrMapping/>
+  </p:clrMapOvr>
+</p:sld>
+</file>
+
+<file path=ppt/slides/slide5.xml><?xml version="1.0" encoding="utf-8"?>
+<p:sld xmlns:a="http://schemas.openxmlformats.org/drawingml/2006/main" xmlns:r="http://schemas.openxmlformats.org/officeDocument/2006/relationships" xmlns:p="http://schemas.openxmlformats.org/presentationml/2006/main">
+  <p:cSld>
+    <p:spTree>
+      <p:nvGrpSpPr>
+        <p:cNvPr id="1" name=""/>
+        <p:cNvGrpSpPr/>
+        <p:nvPr/>
+      </p:nvGrpSpPr>
+      <p:grpSpPr>
+        <a:xfrm>
+          <a:off x="0" y="0"/>
+          <a:ext cx="0" cy="0"/>
+          <a:chOff x="0" y="0"/>
+          <a:chExt cx="0" cy="0"/>
+        </a:xfrm>
+      </p:grpSpPr>
+      <p:pic>
+        <p:nvPicPr>
+          <p:cNvPr id="2" name="Imagen 1" descr="Captura de pantalla 2014-12-04 a la(s) 11.51.59.png"/>
+          <p:cNvPicPr>
+            <a:picLocks noChangeAspect="1"/>
+          </p:cNvPicPr>
+          <p:nvPr/>
+        </p:nvPicPr>
+        <p:blipFill>
+          <a:blip r:embed="rId2">
+            <a:extLst>
+              <a:ext uri="{28A0092B-C50C-407E-A947-70E740481C1C}">
+                <a14:useLocalDpi xmlns:a14="http://schemas.microsoft.com/office/drawing/2010/main" val="0"/>
+              </a:ext>
+            </a:extLst>
+          </a:blip>
+          <a:stretch>
+            <a:fillRect/>
+          </a:stretch>
+        </p:blipFill>
+        <p:spPr>
+          <a:xfrm>
+            <a:off x="540278" y="906294"/>
+            <a:ext cx="2759455" cy="2912758"/>
+          </a:xfrm>
+          <a:prstGeom prst="rect">
+            <a:avLst/>
+          </a:prstGeom>
+        </p:spPr>
+      </p:pic>
+      <p:pic>
+        <p:nvPicPr>
+          <p:cNvPr id="3" name="Imagen 2" descr="Captura de pantalla 2014-12-04 a la(s) 11.52.35.png"/>
+          <p:cNvPicPr>
+            <a:picLocks noChangeAspect="1"/>
+          </p:cNvPicPr>
+          <p:nvPr/>
+        </p:nvPicPr>
+        <p:blipFill>
+          <a:blip r:embed="rId3">
+            <a:extLst>
+              <a:ext uri="{28A0092B-C50C-407E-A947-70E740481C1C}">
+                <a14:useLocalDpi xmlns:a14="http://schemas.microsoft.com/office/drawing/2010/main" val="0"/>
+              </a:ext>
+            </a:extLst>
+          </a:blip>
+          <a:stretch>
+            <a:fillRect/>
+          </a:stretch>
+        </p:blipFill>
+        <p:spPr>
+          <a:xfrm>
+            <a:off x="3546308" y="906294"/>
+            <a:ext cx="2773725" cy="2912758"/>
+          </a:xfrm>
+          <a:prstGeom prst="rect">
+            <a:avLst/>
+          </a:prstGeom>
+        </p:spPr>
+      </p:pic>
+      <p:sp>
+        <p:nvSpPr>
+          <p:cNvPr id="4" name="CuadroTexto 3"/>
+          <p:cNvSpPr txBox="1"/>
+          <p:nvPr/>
+        </p:nvSpPr>
+        <p:spPr>
+          <a:xfrm>
+            <a:off x="1056389" y="3819052"/>
+            <a:ext cx="1840906" cy="307777"/>
+          </a:xfrm>
+          <a:prstGeom prst="rect">
+            <a:avLst/>
+          </a:prstGeom>
+          <a:noFill/>
+        </p:spPr>
+        <p:txBody>
+          <a:bodyPr wrap="none" rtlCol="0">
+            <a:spAutoFit/>
+          </a:bodyPr>
+          <a:lstStyle/>
+          <a:p>
+            <a:r>
+              <a:rPr lang="es-ES" sz="1400" dirty="0" smtClean="0"/>
+              <a:t>Sin enlace preferencial</a:t>
+            </a:r>
+            <a:endParaRPr lang="es-ES" sz="1400" dirty="0"/>
+          </a:p>
+        </p:txBody>
+      </p:sp>
+      <p:sp>
+        <p:nvSpPr>
+          <p:cNvPr id="5" name="CuadroTexto 4"/>
+          <p:cNvSpPr txBox="1"/>
+          <p:nvPr/>
+        </p:nvSpPr>
+        <p:spPr>
+          <a:xfrm>
+            <a:off x="4063414" y="3819052"/>
+            <a:ext cx="1907619" cy="307777"/>
+          </a:xfrm>
+          <a:prstGeom prst="rect">
+            <a:avLst/>
+          </a:prstGeom>
+          <a:noFill/>
+        </p:spPr>
+        <p:txBody>
+          <a:bodyPr wrap="none" rtlCol="0">
+            <a:spAutoFit/>
+          </a:bodyPr>
+          <a:lstStyle/>
+          <a:p>
+            <a:r>
+              <a:rPr lang="es-ES" sz="1400" smtClean="0"/>
+              <a:t>Con enlace </a:t>
+            </a:r>
+            <a:r>
+              <a:rPr lang="es-ES" sz="1400" dirty="0" smtClean="0"/>
+              <a:t>preferencial</a:t>
+            </a:r>
+            <a:endParaRPr lang="es-ES" sz="1400" dirty="0"/>
+          </a:p>
+        </p:txBody>
+      </p:sp>
+    </p:spTree>
+    <p:extLst>
+      <p:ext uri="{BB962C8B-B14F-4D97-AF65-F5344CB8AC3E}">
+        <p14:creationId xmlns:p14="http://schemas.microsoft.com/office/powerpoint/2010/main" val="888234259"/>
+      </p:ext>
+    </p:extLst>
+  </p:cSld>
+  <p:clrMapOvr>
+    <a:masterClrMapping/>
+  </p:clrMapOvr>
+</p:sld>
+</file>
+
+<file path=ppt/slides/slide6.xml><?xml version="1.0" encoding="utf-8"?>
+<p:sld xmlns:a="http://schemas.openxmlformats.org/drawingml/2006/main" xmlns:r="http://schemas.openxmlformats.org/officeDocument/2006/relationships" xmlns:p="http://schemas.openxmlformats.org/presentationml/2006/main">
+  <p:cSld>
+    <p:spTree>
+      <p:nvGrpSpPr>
+        <p:cNvPr id="1" name=""/>
+        <p:cNvGrpSpPr/>
+        <p:nvPr/>
+      </p:nvGrpSpPr>
+      <p:grpSpPr>
+        <a:xfrm>
+          <a:off x="0" y="0"/>
+          <a:ext cx="0" cy="0"/>
+          <a:chOff x="0" y="0"/>
+          <a:chExt cx="0" cy="0"/>
+        </a:xfrm>
+      </p:grpSpPr>
+      <p:grpSp>
+        <p:nvGrpSpPr>
+          <p:cNvPr id="4" name="Agrupar 3"/>
+          <p:cNvGrpSpPr/>
+          <p:nvPr/>
+        </p:nvGrpSpPr>
+        <p:grpSpPr>
+          <a:xfrm>
+            <a:off x="1448084" y="1145349"/>
+            <a:ext cx="6752286" cy="3439283"/>
+            <a:chOff x="1448084" y="1145349"/>
+            <a:chExt cx="6752286" cy="3439283"/>
+          </a:xfrm>
+        </p:grpSpPr>
+        <p:pic>
+          <p:nvPicPr>
+            <p:cNvPr id="2" name="Imagen 1" descr="Captura de pantalla 2014-12-02 a la(s) 17.13.43.png"/>
+            <p:cNvPicPr>
+              <a:picLocks noChangeAspect="1"/>
+            </p:cNvPicPr>
+            <p:nvPr/>
+          </p:nvPicPr>
+          <p:blipFill>
+            <a:blip r:embed="rId2">
+              <a:extLst>
+                <a:ext uri="{28A0092B-C50C-407E-A947-70E740481C1C}">
+                  <a14:useLocalDpi xmlns:a14="http://schemas.microsoft.com/office/drawing/2010/main" val="0"/>
+                </a:ext>
+              </a:extLst>
+            </a:blip>
+            <a:stretch>
+              <a:fillRect/>
+            </a:stretch>
+          </p:blipFill>
+          <p:spPr>
+            <a:xfrm>
+              <a:off x="1727017" y="1288784"/>
+              <a:ext cx="6473353" cy="3295848"/>
+            </a:xfrm>
+            <a:prstGeom prst="rect">
+              <a:avLst/>
+            </a:prstGeom>
+          </p:spPr>
+        </p:pic>
+        <p:sp>
+          <p:nvSpPr>
+            <p:cNvPr id="3" name="Rectángulo 2"/>
+            <p:cNvSpPr/>
+            <p:nvPr/>
+          </p:nvSpPr>
+          <p:spPr>
+            <a:xfrm>
+              <a:off x="1448084" y="1145349"/>
+              <a:ext cx="4112797" cy="718069"/>
+            </a:xfrm>
+            <a:prstGeom prst="rect">
+              <a:avLst/>
+            </a:prstGeom>
+            <a:solidFill>
+              <a:schemeClr val="bg1"/>
+            </a:solidFill>
+            <a:ln>
+              <a:noFill/>
+            </a:ln>
+            <a:effectLst/>
+          </p:spPr>
+          <p:style>
+            <a:lnRef idx="1">
+              <a:schemeClr val="accent1"/>
+            </a:lnRef>
+            <a:fillRef idx="3">
+              <a:schemeClr val="accent1"/>
+            </a:fillRef>
+            <a:effectRef idx="2">
+              <a:schemeClr val="accent1"/>
+            </a:effectRef>
+            <a:fontRef idx="minor">
+              <a:schemeClr val="lt1"/>
+            </a:fontRef>
+          </p:style>
+          <p:txBody>
+            <a:bodyPr rtlCol="0" anchor="ctr"/>
+            <a:lstStyle/>
+            <a:p>
+              <a:pPr algn="ctr"/>
+              <a:endParaRPr lang="es-ES"/>
+            </a:p>
+          </p:txBody>
+        </p:sp>
+      </p:grpSp>
+    </p:spTree>
+    <p:extLst>
+      <p:ext uri="{BB962C8B-B14F-4D97-AF65-F5344CB8AC3E}">
+        <p14:creationId xmlns:p14="http://schemas.microsoft.com/office/powerpoint/2010/main" val="9271454"/>
+      </p:ext>
+    </p:extLst>
+  </p:cSld>
+  <p:clrMapOvr>
+    <a:masterClrMapping/>
+  </p:clrMapOvr>
+</p:sld>
+</file>
+
+<file path=ppt/slides/slide7.xml><?xml version="1.0" encoding="utf-8"?>
+<p:sld xmlns:a="http://schemas.openxmlformats.org/drawingml/2006/main" xmlns:r="http://schemas.openxmlformats.org/officeDocument/2006/relationships" xmlns:p="http://schemas.openxmlformats.org/presentationml/2006/main">
+  <p:cSld>
+    <p:spTree>
+      <p:nvGrpSpPr>
+        <p:cNvPr id="1" name=""/>
+        <p:cNvGrpSpPr/>
+        <p:nvPr/>
+      </p:nvGrpSpPr>
+      <p:grpSpPr>
+        <a:xfrm>
+          <a:off x="0" y="0"/>
+          <a:ext cx="0" cy="0"/>
+          <a:chOff x="0" y="0"/>
+          <a:chExt cx="0" cy="0"/>
+        </a:xfrm>
+      </p:grpSpPr>
+      <p:pic>
+        <p:nvPicPr>
+          <p:cNvPr id="2" name="Imagen 1" descr="Captura de pantalla 2014-10-23 a la(s) 11.12.49.png"/>
+          <p:cNvPicPr>
+            <a:picLocks noChangeAspect="1"/>
+          </p:cNvPicPr>
+          <p:nvPr/>
+        </p:nvPicPr>
+        <p:blipFill>
+          <a:blip r:embed="rId2">
+            <a:extLst>
+              <a:ext uri="{28A0092B-C50C-407E-A947-70E740481C1C}">
+                <a14:useLocalDpi xmlns:a14="http://schemas.microsoft.com/office/drawing/2010/main" val="0"/>
+              </a:ext>
+            </a:extLst>
+          </a:blip>
+          <a:stretch>
+            <a:fillRect/>
+          </a:stretch>
+        </p:blipFill>
+        <p:spPr>
+          <a:xfrm>
+            <a:off x="1872443" y="2019713"/>
+            <a:ext cx="2347180" cy="2472603"/>
+          </a:xfrm>
+          <a:prstGeom prst="rect">
+            <a:avLst/>
+          </a:prstGeom>
+        </p:spPr>
+      </p:pic>
+      <p:pic>
+        <p:nvPicPr>
+          <p:cNvPr id="3" name="Imagen 2" descr="Captura de pantalla 2014-10-23 a la(s) 11.12.29.png"/>
+          <p:cNvPicPr>
+            <a:picLocks noChangeAspect="1"/>
+          </p:cNvPicPr>
+          <p:nvPr/>
+        </p:nvPicPr>
+        <p:blipFill>
+          <a:blip r:embed="rId3">
+            <a:extLst>
+              <a:ext uri="{28A0092B-C50C-407E-A947-70E740481C1C}">
+                <a14:useLocalDpi xmlns:a14="http://schemas.microsoft.com/office/drawing/2010/main" val="0"/>
+              </a:ext>
+            </a:extLst>
+          </a:blip>
+          <a:stretch>
+            <a:fillRect/>
+          </a:stretch>
+        </p:blipFill>
+        <p:spPr>
+          <a:xfrm>
+            <a:off x="4744885" y="2019713"/>
+            <a:ext cx="2346572" cy="2472603"/>
+          </a:xfrm>
+          <a:prstGeom prst="rect">
+            <a:avLst/>
+          </a:prstGeom>
+        </p:spPr>
+      </p:pic>
+    </p:spTree>
+    <p:extLst>
+      <p:ext uri="{BB962C8B-B14F-4D97-AF65-F5344CB8AC3E}">
+        <p14:creationId xmlns:p14="http://schemas.microsoft.com/office/powerpoint/2010/main" val="1940621143"/>
+      </p:ext>
+    </p:extLst>
+  </p:cSld>
+  <p:clrMapOvr>
+    <a:masterClrMapping/>
+  </p:clrMapOvr>
+  <p:timing>
+    <p:tnLst>
+      <p:par>
+        <p:cTn xmlns:p14="http://schemas.microsoft.com/office/powerpoint/2010/main" id="1" dur="indefinite" restart="never" nodeType="tmRoot"/>
+      </p:par>
+    </p:tnLst>
+  </p:timing>
+</p:sld>
+</file>
+
+<file path=ppt/slides/slide8.xml><?xml version="1.0" encoding="utf-8"?>
+<p:sld xmlns:a="http://schemas.openxmlformats.org/drawingml/2006/main" xmlns:r="http://schemas.openxmlformats.org/officeDocument/2006/relationships" xmlns:p="http://schemas.openxmlformats.org/presentationml/2006/main">
+  <p:cSld>
+    <p:spTree>
+      <p:nvGrpSpPr>
+        <p:cNvPr id="1" name=""/>
+        <p:cNvGrpSpPr/>
+        <p:nvPr/>
+      </p:nvGrpSpPr>
+      <p:grpSpPr>
+        <a:xfrm>
+          <a:off x="0" y="0"/>
+          <a:ext cx="0" cy="0"/>
+          <a:chOff x="0" y="0"/>
+          <a:chExt cx="0" cy="0"/>
+        </a:xfrm>
+      </p:grpSpPr>
+      <p:pic>
+        <p:nvPicPr>
+          <p:cNvPr id="2" name="Imagen 1" descr="Captura de pantalla 2014-10-23 a la(s) 11.18.25.png"/>
+          <p:cNvPicPr>
+            <a:picLocks noChangeAspect="1"/>
+          </p:cNvPicPr>
+          <p:nvPr/>
+        </p:nvPicPr>
+        <p:blipFill>
+          <a:blip r:embed="rId2">
+            <a:extLst>
+              <a:ext uri="{28A0092B-C50C-407E-A947-70E740481C1C}">
+                <a14:useLocalDpi xmlns:a14="http://schemas.microsoft.com/office/drawing/2010/main" val="0"/>
+              </a:ext>
+            </a:extLst>
+          </a:blip>
+          <a:stretch>
+            <a:fillRect/>
+          </a:stretch>
+        </p:blipFill>
+        <p:spPr>
+          <a:xfrm>
+            <a:off x="1409531" y="1768466"/>
+            <a:ext cx="3003786" cy="3156650"/>
+          </a:xfrm>
+          <a:prstGeom prst="rect">
+            <a:avLst/>
+          </a:prstGeom>
+        </p:spPr>
+      </p:pic>
+      <p:pic>
+        <p:nvPicPr>
+          <p:cNvPr id="3" name="Imagen 2" descr="Captura de pantalla 2014-10-23 a la(s) 11.18.02.png"/>
+          <p:cNvPicPr>
+            <a:picLocks noChangeAspect="1"/>
+          </p:cNvPicPr>
+          <p:nvPr/>
+        </p:nvPicPr>
+        <p:blipFill>
+          <a:blip r:embed="rId3">
+            <a:extLst>
+              <a:ext uri="{28A0092B-C50C-407E-A947-70E740481C1C}">
+                <a14:useLocalDpi xmlns:a14="http://schemas.microsoft.com/office/drawing/2010/main" val="0"/>
+              </a:ext>
+            </a:extLst>
+          </a:blip>
+          <a:stretch>
+            <a:fillRect/>
+          </a:stretch>
+        </p:blipFill>
+        <p:spPr>
+          <a:xfrm>
+            <a:off x="4734952" y="1768466"/>
+            <a:ext cx="3003990" cy="3164918"/>
+          </a:xfrm>
+          <a:prstGeom prst="rect">
+            <a:avLst/>
+          </a:prstGeom>
+        </p:spPr>
+      </p:pic>
+    </p:spTree>
+    <p:extLst>
+      <p:ext uri="{BB962C8B-B14F-4D97-AF65-F5344CB8AC3E}">
+        <p14:creationId xmlns:p14="http://schemas.microsoft.com/office/powerpoint/2010/main" val="2761878465"/>
+      </p:ext>
+    </p:extLst>
+  </p:cSld>
+  <p:clrMapOvr>
+    <a:masterClrMapping/>
+  </p:clrMapOvr>
+  <p:timing>
+    <p:tnLst>
+      <p:par>
+        <p:cTn xmlns:p14="http://schemas.microsoft.com/office/powerpoint/2010/main" id="1" dur="indefinite" restart="never" nodeType="tmRoot"/>
+      </p:par>
+    </p:tnLst>
+  </p:timing>
+</p:sld>
+</file>
+
+<file path=ppt/slides/slide9.xml><?xml version="1.0" encoding="utf-8"?>
+<p:sld xmlns:a="http://schemas.openxmlformats.org/drawingml/2006/main" xmlns:r="http://schemas.openxmlformats.org/officeDocument/2006/relationships" xmlns:p="http://schemas.openxmlformats.org/presentationml/2006/main">
+  <p:cSld>
+    <p:spTree>
+      <p:nvGrpSpPr>
+        <p:cNvPr id="1" name=""/>
+        <p:cNvGrpSpPr/>
+        <p:nvPr/>
+      </p:nvGrpSpPr>
+      <p:grpSpPr>
+        <a:xfrm>
+          <a:off x="0" y="0"/>
+          <a:ext cx="0" cy="0"/>
+          <a:chOff x="0" y="0"/>
+          <a:chExt cx="0" cy="0"/>
+        </a:xfrm>
+      </p:grpSpPr>
+      <p:pic>
+        <p:nvPicPr>
+          <p:cNvPr id="2" name="Imagen 1" descr="Captura de pantalla 2014-10-23 a la(s) 12.49.51.png"/>
+          <p:cNvPicPr>
+            <a:picLocks noChangeAspect="1"/>
+          </p:cNvPicPr>
+          <p:nvPr/>
+        </p:nvPicPr>
+        <p:blipFill>
+          <a:blip r:embed="rId2">
+            <a:extLst>
+              <a:ext uri="{28A0092B-C50C-407E-A947-70E740481C1C}">
+                <a14:useLocalDpi xmlns:a14="http://schemas.microsoft.com/office/drawing/2010/main" val="0"/>
+              </a:ext>
+            </a:extLst>
+          </a:blip>
+          <a:stretch>
+            <a:fillRect/>
+          </a:stretch>
+        </p:blipFill>
+        <p:spPr>
+          <a:xfrm>
+            <a:off x="1471825" y="1003218"/>
+            <a:ext cx="3638014" cy="2381485"/>
+          </a:xfrm>
+          <a:prstGeom prst="rect">
+            <a:avLst/>
+          </a:prstGeom>
+        </p:spPr>
+      </p:pic>
+      <p:pic>
+        <p:nvPicPr>
+          <p:cNvPr id="3" name="Imagen 2" descr="Captura de pantalla 2014-10-23 a la(s) 12.50.06.png"/>
+          <p:cNvPicPr>
+            <a:picLocks noChangeAspect="1"/>
+          </p:cNvPicPr>
+          <p:nvPr/>
+        </p:nvPicPr>
+        <p:blipFill>
+          <a:blip r:embed="rId3">
+            <a:extLst>
+              <a:ext uri="{28A0092B-C50C-407E-A947-70E740481C1C}">
+                <a14:useLocalDpi xmlns:a14="http://schemas.microsoft.com/office/drawing/2010/main" val="0"/>
+              </a:ext>
+            </a:extLst>
+          </a:blip>
+          <a:stretch>
+            <a:fillRect/>
+          </a:stretch>
+        </p:blipFill>
+        <p:spPr>
+          <a:xfrm>
+            <a:off x="5142336" y="1003218"/>
+            <a:ext cx="3445726" cy="2214243"/>
+          </a:xfrm>
+          <a:prstGeom prst="rect">
+            <a:avLst/>
+          </a:prstGeom>
+        </p:spPr>
+      </p:pic>
+    </p:spTree>
+    <p:extLst>
+      <p:ext uri="{BB962C8B-B14F-4D97-AF65-F5344CB8AC3E}">
+        <p14:creationId xmlns:p14="http://schemas.microsoft.com/office/powerpoint/2010/main" val="991137353"/>
+      </p:ext>
+    </p:extLst>
+  </p:cSld>
+  <p:clrMapOvr>
+    <a:masterClrMapping/>
+  </p:clrMapOvr>
 </p:sld>
 </file>
 

</xml_diff>

<commit_message>
Completada la parte de l juego de coordinación en la red.
</commit_message>
<xml_diff>
--- a/images/paraEsquemasYFiguras.pptx
+++ b/images/paraEsquemasYFiguras.pptx
@@ -6,16 +6,17 @@
   </p:sldMasterIdLst>
   <p:sldIdLst>
     <p:sldId id="256" r:id="rId2"/>
-    <p:sldId id="266" r:id="rId3"/>
-    <p:sldId id="265" r:id="rId4"/>
-    <p:sldId id="263" r:id="rId5"/>
-    <p:sldId id="264" r:id="rId6"/>
-    <p:sldId id="262" r:id="rId7"/>
-    <p:sldId id="259" r:id="rId8"/>
-    <p:sldId id="260" r:id="rId9"/>
-    <p:sldId id="261" r:id="rId10"/>
-    <p:sldId id="258" r:id="rId11"/>
-    <p:sldId id="257" r:id="rId12"/>
+    <p:sldId id="267" r:id="rId3"/>
+    <p:sldId id="266" r:id="rId4"/>
+    <p:sldId id="265" r:id="rId5"/>
+    <p:sldId id="263" r:id="rId6"/>
+    <p:sldId id="264" r:id="rId7"/>
+    <p:sldId id="262" r:id="rId8"/>
+    <p:sldId id="259" r:id="rId9"/>
+    <p:sldId id="260" r:id="rId10"/>
+    <p:sldId id="261" r:id="rId11"/>
+    <p:sldId id="258" r:id="rId12"/>
+    <p:sldId id="257" r:id="rId13"/>
   </p:sldIdLst>
   <p:sldSz cx="9144000" cy="6858000" type="screen4x3"/>
   <p:notesSz cx="6858000" cy="9144000"/>
@@ -3202,6 +3203,96 @@
           <a:chExt cx="0" cy="0"/>
         </a:xfrm>
       </p:grpSpPr>
+      <p:pic>
+        <p:nvPicPr>
+          <p:cNvPr id="2" name="Imagen 1" descr="Captura de pantalla 2014-10-23 a la(s) 12.49.51.png"/>
+          <p:cNvPicPr>
+            <a:picLocks noChangeAspect="1"/>
+          </p:cNvPicPr>
+          <p:nvPr/>
+        </p:nvPicPr>
+        <p:blipFill>
+          <a:blip r:embed="rId2">
+            <a:extLst>
+              <a:ext uri="{28A0092B-C50C-407E-A947-70E740481C1C}">
+                <a14:useLocalDpi xmlns:a14="http://schemas.microsoft.com/office/drawing/2010/main" val="0"/>
+              </a:ext>
+            </a:extLst>
+          </a:blip>
+          <a:stretch>
+            <a:fillRect/>
+          </a:stretch>
+        </p:blipFill>
+        <p:spPr>
+          <a:xfrm>
+            <a:off x="1471825" y="1003218"/>
+            <a:ext cx="3638014" cy="2381485"/>
+          </a:xfrm>
+          <a:prstGeom prst="rect">
+            <a:avLst/>
+          </a:prstGeom>
+        </p:spPr>
+      </p:pic>
+      <p:pic>
+        <p:nvPicPr>
+          <p:cNvPr id="3" name="Imagen 2" descr="Captura de pantalla 2014-10-23 a la(s) 12.50.06.png"/>
+          <p:cNvPicPr>
+            <a:picLocks noChangeAspect="1"/>
+          </p:cNvPicPr>
+          <p:nvPr/>
+        </p:nvPicPr>
+        <p:blipFill>
+          <a:blip r:embed="rId3">
+            <a:extLst>
+              <a:ext uri="{28A0092B-C50C-407E-A947-70E740481C1C}">
+                <a14:useLocalDpi xmlns:a14="http://schemas.microsoft.com/office/drawing/2010/main" val="0"/>
+              </a:ext>
+            </a:extLst>
+          </a:blip>
+          <a:stretch>
+            <a:fillRect/>
+          </a:stretch>
+        </p:blipFill>
+        <p:spPr>
+          <a:xfrm>
+            <a:off x="5142336" y="1003218"/>
+            <a:ext cx="3445726" cy="2214243"/>
+          </a:xfrm>
+          <a:prstGeom prst="rect">
+            <a:avLst/>
+          </a:prstGeom>
+        </p:spPr>
+      </p:pic>
+    </p:spTree>
+    <p:extLst>
+      <p:ext uri="{BB962C8B-B14F-4D97-AF65-F5344CB8AC3E}">
+        <p14:creationId xmlns:p14="http://schemas.microsoft.com/office/powerpoint/2010/main" val="991137353"/>
+      </p:ext>
+    </p:extLst>
+  </p:cSld>
+  <p:clrMapOvr>
+    <a:masterClrMapping/>
+  </p:clrMapOvr>
+</p:sld>
+</file>
+
+<file path=ppt/slides/slide11.xml><?xml version="1.0" encoding="utf-8"?>
+<p:sld xmlns:a="http://schemas.openxmlformats.org/drawingml/2006/main" xmlns:r="http://schemas.openxmlformats.org/officeDocument/2006/relationships" xmlns:p="http://schemas.openxmlformats.org/presentationml/2006/main">
+  <p:cSld>
+    <p:spTree>
+      <p:nvGrpSpPr>
+        <p:cNvPr id="1" name=""/>
+        <p:cNvGrpSpPr/>
+        <p:nvPr/>
+      </p:nvGrpSpPr>
+      <p:grpSpPr>
+        <a:xfrm>
+          <a:off x="0" y="0"/>
+          <a:ext cx="0" cy="0"/>
+          <a:chOff x="0" y="0"/>
+          <a:chExt cx="0" cy="0"/>
+        </a:xfrm>
+      </p:grpSpPr>
       <p:grpSp>
         <p:nvGrpSpPr>
           <p:cNvPr id="4" name="Agrupar 3"/>
@@ -3312,7 +3403,7 @@
 </p:sld>
 </file>
 
-<file path=ppt/slides/slide11.xml><?xml version="1.0" encoding="utf-8"?>
+<file path=ppt/slides/slide12.xml><?xml version="1.0" encoding="utf-8"?>
 <p:sld xmlns:a="http://schemas.openxmlformats.org/drawingml/2006/main" xmlns:r="http://schemas.openxmlformats.org/officeDocument/2006/relationships" xmlns:p="http://schemas.openxmlformats.org/presentationml/2006/main">
   <p:cSld>
     <p:spTree>
@@ -3481,6 +3572,266 @@
       </p:grpSpPr>
       <p:pic>
         <p:nvPicPr>
+          <p:cNvPr id="2" name="Picture 3" descr="IMG_0185.JPG"/>
+          <p:cNvPicPr>
+            <a:picLocks noChangeAspect="1"/>
+          </p:cNvPicPr>
+          <p:nvPr/>
+        </p:nvPicPr>
+        <p:blipFill rotWithShape="1">
+          <a:blip r:embed="rId2">
+            <a:extLst>
+              <a:ext uri="{28A0092B-C50C-407E-A947-70E740481C1C}">
+                <a14:useLocalDpi xmlns:a14="http://schemas.microsoft.com/office/drawing/2010/main" val="0"/>
+              </a:ext>
+            </a:extLst>
+          </a:blip>
+          <a:srcRect l="20216" t="32304" r="43827" b="26955"/>
+          <a:stretch/>
+        </p:blipFill>
+        <p:spPr>
+          <a:xfrm>
+            <a:off x="200271" y="3269882"/>
+            <a:ext cx="1800215" cy="1529797"/>
+          </a:xfrm>
+          <a:prstGeom prst="rect">
+            <a:avLst/>
+          </a:prstGeom>
+        </p:spPr>
+      </p:pic>
+      <p:pic>
+        <p:nvPicPr>
+          <p:cNvPr id="3" name="Picture 5" descr="IMG_0186.JPG"/>
+          <p:cNvPicPr>
+            <a:picLocks noChangeAspect="1"/>
+          </p:cNvPicPr>
+          <p:nvPr/>
+        </p:nvPicPr>
+        <p:blipFill rotWithShape="1">
+          <a:blip r:embed="rId3">
+            <a:extLst>
+              <a:ext uri="{28A0092B-C50C-407E-A947-70E740481C1C}">
+                <a14:useLocalDpi xmlns:a14="http://schemas.microsoft.com/office/drawing/2010/main" val="0"/>
+              </a:ext>
+            </a:extLst>
+          </a:blip>
+          <a:srcRect l="20216" t="31893" r="43210" b="26749"/>
+          <a:stretch/>
+        </p:blipFill>
+        <p:spPr>
+          <a:xfrm>
+            <a:off x="1919005" y="3246703"/>
+            <a:ext cx="1831120" cy="1552976"/>
+          </a:xfrm>
+          <a:prstGeom prst="rect">
+            <a:avLst/>
+          </a:prstGeom>
+        </p:spPr>
+      </p:pic>
+      <p:pic>
+        <p:nvPicPr>
+          <p:cNvPr id="4" name="Picture 4" descr="IMG_0188.JPG"/>
+          <p:cNvPicPr>
+            <a:picLocks noChangeAspect="1"/>
+          </p:cNvPicPr>
+          <p:nvPr/>
+        </p:nvPicPr>
+        <p:blipFill rotWithShape="1">
+          <a:blip r:embed="rId4">
+            <a:extLst>
+              <a:ext uri="{28A0092B-C50C-407E-A947-70E740481C1C}">
+                <a14:useLocalDpi xmlns:a14="http://schemas.microsoft.com/office/drawing/2010/main" val="0"/>
+              </a:ext>
+            </a:extLst>
+          </a:blip>
+          <a:srcRect l="19290" t="32509" r="44136" b="26955"/>
+          <a:stretch/>
+        </p:blipFill>
+        <p:spPr>
+          <a:xfrm>
+            <a:off x="5274901" y="3246703"/>
+            <a:ext cx="1734745" cy="1441961"/>
+          </a:xfrm>
+          <a:prstGeom prst="rect">
+            <a:avLst/>
+          </a:prstGeom>
+        </p:spPr>
+      </p:pic>
+      <p:pic>
+        <p:nvPicPr>
+          <p:cNvPr id="5" name="Picture 5" descr="IMG_0187.JPG"/>
+          <p:cNvPicPr>
+            <a:picLocks noChangeAspect="1"/>
+          </p:cNvPicPr>
+          <p:nvPr/>
+        </p:nvPicPr>
+        <p:blipFill rotWithShape="1">
+          <a:blip r:embed="rId5">
+            <a:extLst>
+              <a:ext uri="{28A0092B-C50C-407E-A947-70E740481C1C}">
+                <a14:useLocalDpi xmlns:a14="http://schemas.microsoft.com/office/drawing/2010/main" val="0"/>
+              </a:ext>
+            </a:extLst>
+          </a:blip>
+          <a:srcRect l="20679" t="31482" r="44290" b="25515"/>
+          <a:stretch/>
+        </p:blipFill>
+        <p:spPr>
+          <a:xfrm>
+            <a:off x="3672701" y="3269882"/>
+            <a:ext cx="1661550" cy="1529797"/>
+          </a:xfrm>
+          <a:prstGeom prst="rect">
+            <a:avLst/>
+          </a:prstGeom>
+        </p:spPr>
+      </p:pic>
+      <p:sp>
+        <p:nvSpPr>
+          <p:cNvPr id="6" name="Flecha derecha 5"/>
+          <p:cNvSpPr/>
+          <p:nvPr/>
+        </p:nvSpPr>
+        <p:spPr>
+          <a:xfrm>
+            <a:off x="1851649" y="3946410"/>
+            <a:ext cx="290804" cy="409477"/>
+          </a:xfrm>
+          <a:prstGeom prst="rightArrow">
+            <a:avLst/>
+          </a:prstGeom>
+        </p:spPr>
+        <p:style>
+          <a:lnRef idx="1">
+            <a:schemeClr val="accent1"/>
+          </a:lnRef>
+          <a:fillRef idx="3">
+            <a:schemeClr val="accent1"/>
+          </a:fillRef>
+          <a:effectRef idx="2">
+            <a:schemeClr val="accent1"/>
+          </a:effectRef>
+          <a:fontRef idx="minor">
+            <a:schemeClr val="lt1"/>
+          </a:fontRef>
+        </p:style>
+        <p:txBody>
+          <a:bodyPr rtlCol="0" anchor="ctr"/>
+          <a:lstStyle/>
+          <a:p>
+            <a:pPr algn="ctr"/>
+            <a:endParaRPr lang="es-ES"/>
+          </a:p>
+        </p:txBody>
+      </p:sp>
+      <p:sp>
+        <p:nvSpPr>
+          <p:cNvPr id="7" name="Flecha derecha 6"/>
+          <p:cNvSpPr/>
+          <p:nvPr/>
+        </p:nvSpPr>
+        <p:spPr>
+          <a:xfrm>
+            <a:off x="3604723" y="3946410"/>
+            <a:ext cx="290804" cy="409477"/>
+          </a:xfrm>
+          <a:prstGeom prst="rightArrow">
+            <a:avLst/>
+          </a:prstGeom>
+        </p:spPr>
+        <p:style>
+          <a:lnRef idx="1">
+            <a:schemeClr val="accent1"/>
+          </a:lnRef>
+          <a:fillRef idx="3">
+            <a:schemeClr val="accent1"/>
+          </a:fillRef>
+          <a:effectRef idx="2">
+            <a:schemeClr val="accent1"/>
+          </a:effectRef>
+          <a:fontRef idx="minor">
+            <a:schemeClr val="lt1"/>
+          </a:fontRef>
+        </p:style>
+        <p:txBody>
+          <a:bodyPr rtlCol="0" anchor="ctr"/>
+          <a:lstStyle/>
+          <a:p>
+            <a:pPr algn="ctr"/>
+            <a:endParaRPr lang="es-ES"/>
+          </a:p>
+        </p:txBody>
+      </p:sp>
+      <p:sp>
+        <p:nvSpPr>
+          <p:cNvPr id="8" name="Flecha derecha 7"/>
+          <p:cNvSpPr/>
+          <p:nvPr/>
+        </p:nvSpPr>
+        <p:spPr>
+          <a:xfrm>
+            <a:off x="5239100" y="3946410"/>
+            <a:ext cx="290804" cy="409477"/>
+          </a:xfrm>
+          <a:prstGeom prst="rightArrow">
+            <a:avLst/>
+          </a:prstGeom>
+        </p:spPr>
+        <p:style>
+          <a:lnRef idx="1">
+            <a:schemeClr val="accent1"/>
+          </a:lnRef>
+          <a:fillRef idx="3">
+            <a:schemeClr val="accent1"/>
+          </a:fillRef>
+          <a:effectRef idx="2">
+            <a:schemeClr val="accent1"/>
+          </a:effectRef>
+          <a:fontRef idx="minor">
+            <a:schemeClr val="lt1"/>
+          </a:fontRef>
+        </p:style>
+        <p:txBody>
+          <a:bodyPr rtlCol="0" anchor="ctr"/>
+          <a:lstStyle/>
+          <a:p>
+            <a:pPr algn="ctr"/>
+            <a:endParaRPr lang="es-ES"/>
+          </a:p>
+        </p:txBody>
+      </p:sp>
+    </p:spTree>
+    <p:extLst>
+      <p:ext uri="{BB962C8B-B14F-4D97-AF65-F5344CB8AC3E}">
+        <p14:creationId xmlns:p14="http://schemas.microsoft.com/office/powerpoint/2010/main" val="4023880299"/>
+      </p:ext>
+    </p:extLst>
+  </p:cSld>
+  <p:clrMapOvr>
+    <a:masterClrMapping/>
+  </p:clrMapOvr>
+</p:sld>
+</file>
+
+<file path=ppt/slides/slide3.xml><?xml version="1.0" encoding="utf-8"?>
+<p:sld xmlns:a="http://schemas.openxmlformats.org/drawingml/2006/main" xmlns:r="http://schemas.openxmlformats.org/officeDocument/2006/relationships" xmlns:p="http://schemas.openxmlformats.org/presentationml/2006/main">
+  <p:cSld>
+    <p:spTree>
+      <p:nvGrpSpPr>
+        <p:cNvPr id="1" name=""/>
+        <p:cNvGrpSpPr/>
+        <p:nvPr/>
+      </p:nvGrpSpPr>
+      <p:grpSpPr>
+        <a:xfrm>
+          <a:off x="0" y="0"/>
+          <a:ext cx="0" cy="0"/>
+          <a:chOff x="0" y="0"/>
+          <a:chExt cx="0" cy="0"/>
+        </a:xfrm>
+      </p:grpSpPr>
+      <p:pic>
+        <p:nvPicPr>
           <p:cNvPr id="11" name="Imagen 10" descr="Captura de pantalla 2014-12-09 a la(s) 10.37.41.png"/>
           <p:cNvPicPr>
             <a:picLocks noChangeAspect="1"/>
@@ -4098,7 +4449,7 @@
 </p:sld>
 </file>
 
-<file path=ppt/slides/slide3.xml><?xml version="1.0" encoding="utf-8"?>
+<file path=ppt/slides/slide4.xml><?xml version="1.0" encoding="utf-8"?>
 <p:sld xmlns:a="http://schemas.openxmlformats.org/drawingml/2006/main" xmlns:r="http://schemas.openxmlformats.org/officeDocument/2006/relationships" xmlns:p="http://schemas.openxmlformats.org/presentationml/2006/main">
   <p:cSld>
     <p:spTree>
@@ -4248,7 +4599,7 @@
 </p:sld>
 </file>
 
-<file path=ppt/slides/slide4.xml><?xml version="1.0" encoding="utf-8"?>
+<file path=ppt/slides/slide5.xml><?xml version="1.0" encoding="utf-8"?>
 <p:sld xmlns:a="http://schemas.openxmlformats.org/drawingml/2006/main" xmlns:r="http://schemas.openxmlformats.org/officeDocument/2006/relationships" xmlns:p="http://schemas.openxmlformats.org/presentationml/2006/main">
   <p:cSld>
     <p:spTree>
@@ -4398,7 +4749,7 @@
 </p:sld>
 </file>
 
-<file path=ppt/slides/slide5.xml><?xml version="1.0" encoding="utf-8"?>
+<file path=ppt/slides/slide6.xml><?xml version="1.0" encoding="utf-8"?>
 <p:sld xmlns:a="http://schemas.openxmlformats.org/drawingml/2006/main" xmlns:r="http://schemas.openxmlformats.org/officeDocument/2006/relationships" xmlns:p="http://schemas.openxmlformats.org/presentationml/2006/main">
   <p:cSld>
     <p:spTree>
@@ -4552,7 +4903,7 @@
 </p:sld>
 </file>
 
-<file path=ppt/slides/slide6.xml><?xml version="1.0" encoding="utf-8"?>
+<file path=ppt/slides/slide7.xml><?xml version="1.0" encoding="utf-8"?>
 <p:sld xmlns:a="http://schemas.openxmlformats.org/drawingml/2006/main" xmlns:r="http://schemas.openxmlformats.org/officeDocument/2006/relationships" xmlns:p="http://schemas.openxmlformats.org/presentationml/2006/main">
   <p:cSld>
     <p:spTree>
@@ -4672,7 +5023,7 @@
 </p:sld>
 </file>
 
-<file path=ppt/slides/slide7.xml><?xml version="1.0" encoding="utf-8"?>
+<file path=ppt/slides/slide8.xml><?xml version="1.0" encoding="utf-8"?>
 <p:sld xmlns:a="http://schemas.openxmlformats.org/drawingml/2006/main" xmlns:r="http://schemas.openxmlformats.org/officeDocument/2006/relationships" xmlns:p="http://schemas.openxmlformats.org/presentationml/2006/main">
   <p:cSld>
     <p:spTree>
@@ -4769,7 +5120,7 @@
 </p:sld>
 </file>
 
-<file path=ppt/slides/slide8.xml><?xml version="1.0" encoding="utf-8"?>
+<file path=ppt/slides/slide9.xml><?xml version="1.0" encoding="utf-8"?>
 <p:sld xmlns:a="http://schemas.openxmlformats.org/drawingml/2006/main" xmlns:r="http://schemas.openxmlformats.org/officeDocument/2006/relationships" xmlns:p="http://schemas.openxmlformats.org/presentationml/2006/main">
   <p:cSld>
     <p:spTree>
@@ -4863,96 +5214,6 @@
       </p:par>
     </p:tnLst>
   </p:timing>
-</p:sld>
-</file>
-
-<file path=ppt/slides/slide9.xml><?xml version="1.0" encoding="utf-8"?>
-<p:sld xmlns:a="http://schemas.openxmlformats.org/drawingml/2006/main" xmlns:r="http://schemas.openxmlformats.org/officeDocument/2006/relationships" xmlns:p="http://schemas.openxmlformats.org/presentationml/2006/main">
-  <p:cSld>
-    <p:spTree>
-      <p:nvGrpSpPr>
-        <p:cNvPr id="1" name=""/>
-        <p:cNvGrpSpPr/>
-        <p:nvPr/>
-      </p:nvGrpSpPr>
-      <p:grpSpPr>
-        <a:xfrm>
-          <a:off x="0" y="0"/>
-          <a:ext cx="0" cy="0"/>
-          <a:chOff x="0" y="0"/>
-          <a:chExt cx="0" cy="0"/>
-        </a:xfrm>
-      </p:grpSpPr>
-      <p:pic>
-        <p:nvPicPr>
-          <p:cNvPr id="2" name="Imagen 1" descr="Captura de pantalla 2014-10-23 a la(s) 12.49.51.png"/>
-          <p:cNvPicPr>
-            <a:picLocks noChangeAspect="1"/>
-          </p:cNvPicPr>
-          <p:nvPr/>
-        </p:nvPicPr>
-        <p:blipFill>
-          <a:blip r:embed="rId2">
-            <a:extLst>
-              <a:ext uri="{28A0092B-C50C-407E-A947-70E740481C1C}">
-                <a14:useLocalDpi xmlns:a14="http://schemas.microsoft.com/office/drawing/2010/main" val="0"/>
-              </a:ext>
-            </a:extLst>
-          </a:blip>
-          <a:stretch>
-            <a:fillRect/>
-          </a:stretch>
-        </p:blipFill>
-        <p:spPr>
-          <a:xfrm>
-            <a:off x="1471825" y="1003218"/>
-            <a:ext cx="3638014" cy="2381485"/>
-          </a:xfrm>
-          <a:prstGeom prst="rect">
-            <a:avLst/>
-          </a:prstGeom>
-        </p:spPr>
-      </p:pic>
-      <p:pic>
-        <p:nvPicPr>
-          <p:cNvPr id="3" name="Imagen 2" descr="Captura de pantalla 2014-10-23 a la(s) 12.50.06.png"/>
-          <p:cNvPicPr>
-            <a:picLocks noChangeAspect="1"/>
-          </p:cNvPicPr>
-          <p:nvPr/>
-        </p:nvPicPr>
-        <p:blipFill>
-          <a:blip r:embed="rId3">
-            <a:extLst>
-              <a:ext uri="{28A0092B-C50C-407E-A947-70E740481C1C}">
-                <a14:useLocalDpi xmlns:a14="http://schemas.microsoft.com/office/drawing/2010/main" val="0"/>
-              </a:ext>
-            </a:extLst>
-          </a:blip>
-          <a:stretch>
-            <a:fillRect/>
-          </a:stretch>
-        </p:blipFill>
-        <p:spPr>
-          <a:xfrm>
-            <a:off x="5142336" y="1003218"/>
-            <a:ext cx="3445726" cy="2214243"/>
-          </a:xfrm>
-          <a:prstGeom prst="rect">
-            <a:avLst/>
-          </a:prstGeom>
-        </p:spPr>
-      </p:pic>
-    </p:spTree>
-    <p:extLst>
-      <p:ext uri="{BB962C8B-B14F-4D97-AF65-F5344CB8AC3E}">
-        <p14:creationId xmlns:p14="http://schemas.microsoft.com/office/powerpoint/2010/main" val="991137353"/>
-      </p:ext>
-    </p:extLst>
-  </p:cSld>
-  <p:clrMapOvr>
-    <a:masterClrMapping/>
-  </p:clrMapOvr>
 </p:sld>
 </file>
 

</xml_diff>

<commit_message>
Completado el tema de difusión
</commit_message>
<xml_diff>
--- a/images/paraEsquemasYFiguras.pptx
+++ b/images/paraEsquemasYFiguras.pptx
@@ -5,23 +5,25 @@
     <p:sldMasterId id="2147483648" r:id="rId1"/>
   </p:sldMasterIdLst>
   <p:notesMasterIdLst>
-    <p:notesMasterId r:id="rId16"/>
+    <p:notesMasterId r:id="rId18"/>
   </p:notesMasterIdLst>
   <p:sldIdLst>
     <p:sldId id="256" r:id="rId2"/>
-    <p:sldId id="267" r:id="rId3"/>
-    <p:sldId id="268" r:id="rId4"/>
-    <p:sldId id="269" r:id="rId5"/>
-    <p:sldId id="266" r:id="rId6"/>
-    <p:sldId id="265" r:id="rId7"/>
-    <p:sldId id="263" r:id="rId8"/>
-    <p:sldId id="264" r:id="rId9"/>
-    <p:sldId id="262" r:id="rId10"/>
-    <p:sldId id="259" r:id="rId11"/>
-    <p:sldId id="260" r:id="rId12"/>
-    <p:sldId id="261" r:id="rId13"/>
-    <p:sldId id="258" r:id="rId14"/>
-    <p:sldId id="257" r:id="rId15"/>
+    <p:sldId id="270" r:id="rId3"/>
+    <p:sldId id="271" r:id="rId4"/>
+    <p:sldId id="267" r:id="rId5"/>
+    <p:sldId id="268" r:id="rId6"/>
+    <p:sldId id="269" r:id="rId7"/>
+    <p:sldId id="266" r:id="rId8"/>
+    <p:sldId id="265" r:id="rId9"/>
+    <p:sldId id="263" r:id="rId10"/>
+    <p:sldId id="264" r:id="rId11"/>
+    <p:sldId id="262" r:id="rId12"/>
+    <p:sldId id="259" r:id="rId13"/>
+    <p:sldId id="260" r:id="rId14"/>
+    <p:sldId id="261" r:id="rId15"/>
+    <p:sldId id="258" r:id="rId16"/>
+    <p:sldId id="257" r:id="rId17"/>
   </p:sldIdLst>
   <p:sldSz cx="9144000" cy="6858000" type="screen4x3"/>
   <p:notesSz cx="6858000" cy="9144000"/>
@@ -205,7 +207,7 @@
           <a:p>
             <a:fld id="{2E24EDA5-CF97-A44C-82E3-1872A390DF8E}" type="datetimeFigureOut">
               <a:rPr lang="es-ES" smtClean="0"/>
-              <a:t>09/12/14</a:t>
+              <a:t>11/12/14</a:t>
             </a:fld>
             <a:endParaRPr lang="es-ES"/>
           </a:p>
@@ -538,7 +540,7 @@
           <a:p>
             <a:fld id="{6EA4D9EE-5449-E344-B6CE-1C83F2718A87}" type="slidenum">
               <a:rPr lang="es-ES" smtClean="0"/>
-              <a:t>3</a:t>
+              <a:t>5</a:t>
             </a:fld>
             <a:endParaRPr lang="es-ES"/>
           </a:p>
@@ -738,7 +740,7 @@
           <a:p>
             <a:fld id="{D7E2043C-A4E6-B74E-9C07-871FC106E480}" type="datetimeFigureOut">
               <a:rPr lang="es-ES" smtClean="0"/>
-              <a:t>09/12/14</a:t>
+              <a:t>11/12/14</a:t>
             </a:fld>
             <a:endParaRPr lang="es-ES"/>
           </a:p>
@@ -908,7 +910,7 @@
           <a:p>
             <a:fld id="{D7E2043C-A4E6-B74E-9C07-871FC106E480}" type="datetimeFigureOut">
               <a:rPr lang="es-ES" smtClean="0"/>
-              <a:t>09/12/14</a:t>
+              <a:t>11/12/14</a:t>
             </a:fld>
             <a:endParaRPr lang="es-ES"/>
           </a:p>
@@ -1088,7 +1090,7 @@
           <a:p>
             <a:fld id="{D7E2043C-A4E6-B74E-9C07-871FC106E480}" type="datetimeFigureOut">
               <a:rPr lang="es-ES" smtClean="0"/>
-              <a:t>09/12/14</a:t>
+              <a:t>11/12/14</a:t>
             </a:fld>
             <a:endParaRPr lang="es-ES"/>
           </a:p>
@@ -1258,7 +1260,7 @@
           <a:p>
             <a:fld id="{D7E2043C-A4E6-B74E-9C07-871FC106E480}" type="datetimeFigureOut">
               <a:rPr lang="es-ES" smtClean="0"/>
-              <a:t>09/12/14</a:t>
+              <a:t>11/12/14</a:t>
             </a:fld>
             <a:endParaRPr lang="es-ES"/>
           </a:p>
@@ -1504,7 +1506,7 @@
           <a:p>
             <a:fld id="{D7E2043C-A4E6-B74E-9C07-871FC106E480}" type="datetimeFigureOut">
               <a:rPr lang="es-ES" smtClean="0"/>
-              <a:t>09/12/14</a:t>
+              <a:t>11/12/14</a:t>
             </a:fld>
             <a:endParaRPr lang="es-ES"/>
           </a:p>
@@ -1792,7 +1794,7 @@
           <a:p>
             <a:fld id="{D7E2043C-A4E6-B74E-9C07-871FC106E480}" type="datetimeFigureOut">
               <a:rPr lang="es-ES" smtClean="0"/>
-              <a:t>09/12/14</a:t>
+              <a:t>11/12/14</a:t>
             </a:fld>
             <a:endParaRPr lang="es-ES"/>
           </a:p>
@@ -2214,7 +2216,7 @@
           <a:p>
             <a:fld id="{D7E2043C-A4E6-B74E-9C07-871FC106E480}" type="datetimeFigureOut">
               <a:rPr lang="es-ES" smtClean="0"/>
-              <a:t>09/12/14</a:t>
+              <a:t>11/12/14</a:t>
             </a:fld>
             <a:endParaRPr lang="es-ES"/>
           </a:p>
@@ -2332,7 +2334,7 @@
           <a:p>
             <a:fld id="{D7E2043C-A4E6-B74E-9C07-871FC106E480}" type="datetimeFigureOut">
               <a:rPr lang="es-ES" smtClean="0"/>
-              <a:t>09/12/14</a:t>
+              <a:t>11/12/14</a:t>
             </a:fld>
             <a:endParaRPr lang="es-ES"/>
           </a:p>
@@ -2427,7 +2429,7 @@
           <a:p>
             <a:fld id="{D7E2043C-A4E6-B74E-9C07-871FC106E480}" type="datetimeFigureOut">
               <a:rPr lang="es-ES" smtClean="0"/>
-              <a:t>09/12/14</a:t>
+              <a:t>11/12/14</a:t>
             </a:fld>
             <a:endParaRPr lang="es-ES"/>
           </a:p>
@@ -2704,7 +2706,7 @@
           <a:p>
             <a:fld id="{D7E2043C-A4E6-B74E-9C07-871FC106E480}" type="datetimeFigureOut">
               <a:rPr lang="es-ES" smtClean="0"/>
-              <a:t>09/12/14</a:t>
+              <a:t>11/12/14</a:t>
             </a:fld>
             <a:endParaRPr lang="es-ES"/>
           </a:p>
@@ -2957,7 +2959,7 @@
           <a:p>
             <a:fld id="{D7E2043C-A4E6-B74E-9C07-871FC106E480}" type="datetimeFigureOut">
               <a:rPr lang="es-ES" smtClean="0"/>
-              <a:t>09/12/14</a:t>
+              <a:t>11/12/14</a:t>
             </a:fld>
             <a:endParaRPr lang="es-ES"/>
           </a:p>
@@ -3170,7 +3172,7 @@
           <a:p>
             <a:fld id="{D7E2043C-A4E6-B74E-9C07-871FC106E480}" type="datetimeFigureOut">
               <a:rPr lang="es-ES" smtClean="0"/>
-              <a:t>09/12/14</a:t>
+              <a:t>11/12/14</a:t>
             </a:fld>
             <a:endParaRPr lang="es-ES"/>
           </a:p>
@@ -3644,6 +3646,280 @@
       </p:grpSpPr>
       <p:pic>
         <p:nvPicPr>
+          <p:cNvPr id="2" name="Imagen 1" descr="Captura de pantalla 2014-12-04 a la(s) 11.51.59.png"/>
+          <p:cNvPicPr>
+            <a:picLocks noChangeAspect="1"/>
+          </p:cNvPicPr>
+          <p:nvPr/>
+        </p:nvPicPr>
+        <p:blipFill>
+          <a:blip r:embed="rId2">
+            <a:extLst>
+              <a:ext uri="{28A0092B-C50C-407E-A947-70E740481C1C}">
+                <a14:useLocalDpi xmlns:a14="http://schemas.microsoft.com/office/drawing/2010/main" val="0"/>
+              </a:ext>
+            </a:extLst>
+          </a:blip>
+          <a:stretch>
+            <a:fillRect/>
+          </a:stretch>
+        </p:blipFill>
+        <p:spPr>
+          <a:xfrm>
+            <a:off x="540278" y="906294"/>
+            <a:ext cx="2759455" cy="2912758"/>
+          </a:xfrm>
+          <a:prstGeom prst="rect">
+            <a:avLst/>
+          </a:prstGeom>
+        </p:spPr>
+      </p:pic>
+      <p:pic>
+        <p:nvPicPr>
+          <p:cNvPr id="3" name="Imagen 2" descr="Captura de pantalla 2014-12-04 a la(s) 11.52.35.png"/>
+          <p:cNvPicPr>
+            <a:picLocks noChangeAspect="1"/>
+          </p:cNvPicPr>
+          <p:nvPr/>
+        </p:nvPicPr>
+        <p:blipFill>
+          <a:blip r:embed="rId3">
+            <a:extLst>
+              <a:ext uri="{28A0092B-C50C-407E-A947-70E740481C1C}">
+                <a14:useLocalDpi xmlns:a14="http://schemas.microsoft.com/office/drawing/2010/main" val="0"/>
+              </a:ext>
+            </a:extLst>
+          </a:blip>
+          <a:stretch>
+            <a:fillRect/>
+          </a:stretch>
+        </p:blipFill>
+        <p:spPr>
+          <a:xfrm>
+            <a:off x="3546308" y="906294"/>
+            <a:ext cx="2773725" cy="2912758"/>
+          </a:xfrm>
+          <a:prstGeom prst="rect">
+            <a:avLst/>
+          </a:prstGeom>
+        </p:spPr>
+      </p:pic>
+      <p:sp>
+        <p:nvSpPr>
+          <p:cNvPr id="4" name="CuadroTexto 3"/>
+          <p:cNvSpPr txBox="1"/>
+          <p:nvPr/>
+        </p:nvSpPr>
+        <p:spPr>
+          <a:xfrm>
+            <a:off x="1056389" y="3819052"/>
+            <a:ext cx="1840906" cy="307777"/>
+          </a:xfrm>
+          <a:prstGeom prst="rect">
+            <a:avLst/>
+          </a:prstGeom>
+          <a:noFill/>
+        </p:spPr>
+        <p:txBody>
+          <a:bodyPr wrap="none" rtlCol="0">
+            <a:spAutoFit/>
+          </a:bodyPr>
+          <a:lstStyle/>
+          <a:p>
+            <a:r>
+              <a:rPr lang="es-ES" sz="1400" dirty="0" smtClean="0"/>
+              <a:t>Sin enlace preferencial</a:t>
+            </a:r>
+            <a:endParaRPr lang="es-ES" sz="1400" dirty="0"/>
+          </a:p>
+        </p:txBody>
+      </p:sp>
+      <p:sp>
+        <p:nvSpPr>
+          <p:cNvPr id="5" name="CuadroTexto 4"/>
+          <p:cNvSpPr txBox="1"/>
+          <p:nvPr/>
+        </p:nvSpPr>
+        <p:spPr>
+          <a:xfrm>
+            <a:off x="4063414" y="3819052"/>
+            <a:ext cx="1907619" cy="307777"/>
+          </a:xfrm>
+          <a:prstGeom prst="rect">
+            <a:avLst/>
+          </a:prstGeom>
+          <a:noFill/>
+        </p:spPr>
+        <p:txBody>
+          <a:bodyPr wrap="none" rtlCol="0">
+            <a:spAutoFit/>
+          </a:bodyPr>
+          <a:lstStyle/>
+          <a:p>
+            <a:r>
+              <a:rPr lang="es-ES" sz="1400" smtClean="0"/>
+              <a:t>Con enlace </a:t>
+            </a:r>
+            <a:r>
+              <a:rPr lang="es-ES" sz="1400" dirty="0" smtClean="0"/>
+              <a:t>preferencial</a:t>
+            </a:r>
+            <a:endParaRPr lang="es-ES" sz="1400" dirty="0"/>
+          </a:p>
+        </p:txBody>
+      </p:sp>
+    </p:spTree>
+    <p:extLst>
+      <p:ext uri="{BB962C8B-B14F-4D97-AF65-F5344CB8AC3E}">
+        <p14:creationId xmlns:p14="http://schemas.microsoft.com/office/powerpoint/2010/main" val="888234259"/>
+      </p:ext>
+    </p:extLst>
+  </p:cSld>
+  <p:clrMapOvr>
+    <a:masterClrMapping/>
+  </p:clrMapOvr>
+</p:sld>
+</file>
+
+<file path=ppt/slides/slide11.xml><?xml version="1.0" encoding="utf-8"?>
+<p:sld xmlns:a="http://schemas.openxmlformats.org/drawingml/2006/main" xmlns:r="http://schemas.openxmlformats.org/officeDocument/2006/relationships" xmlns:p="http://schemas.openxmlformats.org/presentationml/2006/main">
+  <p:cSld>
+    <p:spTree>
+      <p:nvGrpSpPr>
+        <p:cNvPr id="1" name=""/>
+        <p:cNvGrpSpPr/>
+        <p:nvPr/>
+      </p:nvGrpSpPr>
+      <p:grpSpPr>
+        <a:xfrm>
+          <a:off x="0" y="0"/>
+          <a:ext cx="0" cy="0"/>
+          <a:chOff x="0" y="0"/>
+          <a:chExt cx="0" cy="0"/>
+        </a:xfrm>
+      </p:grpSpPr>
+      <p:grpSp>
+        <p:nvGrpSpPr>
+          <p:cNvPr id="4" name="Agrupar 3"/>
+          <p:cNvGrpSpPr/>
+          <p:nvPr/>
+        </p:nvGrpSpPr>
+        <p:grpSpPr>
+          <a:xfrm>
+            <a:off x="1448084" y="1145349"/>
+            <a:ext cx="6752286" cy="3439283"/>
+            <a:chOff x="1448084" y="1145349"/>
+            <a:chExt cx="6752286" cy="3439283"/>
+          </a:xfrm>
+        </p:grpSpPr>
+        <p:pic>
+          <p:nvPicPr>
+            <p:cNvPr id="2" name="Imagen 1" descr="Captura de pantalla 2014-12-02 a la(s) 17.13.43.png"/>
+            <p:cNvPicPr>
+              <a:picLocks noChangeAspect="1"/>
+            </p:cNvPicPr>
+            <p:nvPr/>
+          </p:nvPicPr>
+          <p:blipFill>
+            <a:blip r:embed="rId2">
+              <a:extLst>
+                <a:ext uri="{28A0092B-C50C-407E-A947-70E740481C1C}">
+                  <a14:useLocalDpi xmlns:a14="http://schemas.microsoft.com/office/drawing/2010/main" val="0"/>
+                </a:ext>
+              </a:extLst>
+            </a:blip>
+            <a:stretch>
+              <a:fillRect/>
+            </a:stretch>
+          </p:blipFill>
+          <p:spPr>
+            <a:xfrm>
+              <a:off x="1727017" y="1288784"/>
+              <a:ext cx="6473353" cy="3295848"/>
+            </a:xfrm>
+            <a:prstGeom prst="rect">
+              <a:avLst/>
+            </a:prstGeom>
+          </p:spPr>
+        </p:pic>
+        <p:sp>
+          <p:nvSpPr>
+            <p:cNvPr id="3" name="Rectángulo 2"/>
+            <p:cNvSpPr/>
+            <p:nvPr/>
+          </p:nvSpPr>
+          <p:spPr>
+            <a:xfrm>
+              <a:off x="1448084" y="1145349"/>
+              <a:ext cx="4112797" cy="718069"/>
+            </a:xfrm>
+            <a:prstGeom prst="rect">
+              <a:avLst/>
+            </a:prstGeom>
+            <a:solidFill>
+              <a:schemeClr val="bg1"/>
+            </a:solidFill>
+            <a:ln>
+              <a:noFill/>
+            </a:ln>
+            <a:effectLst/>
+          </p:spPr>
+          <p:style>
+            <a:lnRef idx="1">
+              <a:schemeClr val="accent1"/>
+            </a:lnRef>
+            <a:fillRef idx="3">
+              <a:schemeClr val="accent1"/>
+            </a:fillRef>
+            <a:effectRef idx="2">
+              <a:schemeClr val="accent1"/>
+            </a:effectRef>
+            <a:fontRef idx="minor">
+              <a:schemeClr val="lt1"/>
+            </a:fontRef>
+          </p:style>
+          <p:txBody>
+            <a:bodyPr rtlCol="0" anchor="ctr"/>
+            <a:lstStyle/>
+            <a:p>
+              <a:pPr algn="ctr"/>
+              <a:endParaRPr lang="es-ES"/>
+            </a:p>
+          </p:txBody>
+        </p:sp>
+      </p:grpSp>
+    </p:spTree>
+    <p:extLst>
+      <p:ext uri="{BB962C8B-B14F-4D97-AF65-F5344CB8AC3E}">
+        <p14:creationId xmlns:p14="http://schemas.microsoft.com/office/powerpoint/2010/main" val="9271454"/>
+      </p:ext>
+    </p:extLst>
+  </p:cSld>
+  <p:clrMapOvr>
+    <a:masterClrMapping/>
+  </p:clrMapOvr>
+</p:sld>
+</file>
+
+<file path=ppt/slides/slide12.xml><?xml version="1.0" encoding="utf-8"?>
+<p:sld xmlns:a="http://schemas.openxmlformats.org/drawingml/2006/main" xmlns:r="http://schemas.openxmlformats.org/officeDocument/2006/relationships" xmlns:p="http://schemas.openxmlformats.org/presentationml/2006/main">
+  <p:cSld>
+    <p:spTree>
+      <p:nvGrpSpPr>
+        <p:cNvPr id="1" name=""/>
+        <p:cNvGrpSpPr/>
+        <p:nvPr/>
+      </p:nvGrpSpPr>
+      <p:grpSpPr>
+        <a:xfrm>
+          <a:off x="0" y="0"/>
+          <a:ext cx="0" cy="0"/>
+          <a:chOff x="0" y="0"/>
+          <a:chExt cx="0" cy="0"/>
+        </a:xfrm>
+      </p:grpSpPr>
+      <p:pic>
+        <p:nvPicPr>
           <p:cNvPr id="2" name="Imagen 1" descr="Captura de pantalla 2014-10-23 a la(s) 11.12.49.png"/>
           <p:cNvPicPr>
             <a:picLocks noChangeAspect="1"/>
@@ -3722,7 +3998,7 @@
 </p:sld>
 </file>
 
-<file path=ppt/slides/slide11.xml><?xml version="1.0" encoding="utf-8"?>
+<file path=ppt/slides/slide13.xml><?xml version="1.0" encoding="utf-8"?>
 <p:sld xmlns:a="http://schemas.openxmlformats.org/drawingml/2006/main" xmlns:r="http://schemas.openxmlformats.org/officeDocument/2006/relationships" xmlns:p="http://schemas.openxmlformats.org/presentationml/2006/main">
   <p:cSld>
     <p:spTree>
@@ -3819,7 +4095,7 @@
 </p:sld>
 </file>
 
-<file path=ppt/slides/slide12.xml><?xml version="1.0" encoding="utf-8"?>
+<file path=ppt/slides/slide14.xml><?xml version="1.0" encoding="utf-8"?>
 <p:sld xmlns:a="http://schemas.openxmlformats.org/drawingml/2006/main" xmlns:r="http://schemas.openxmlformats.org/officeDocument/2006/relationships" xmlns:p="http://schemas.openxmlformats.org/presentationml/2006/main">
   <p:cSld>
     <p:spTree>
@@ -3909,7 +4185,7 @@
 </p:sld>
 </file>
 
-<file path=ppt/slides/slide13.xml><?xml version="1.0" encoding="utf-8"?>
+<file path=ppt/slides/slide15.xml><?xml version="1.0" encoding="utf-8"?>
 <p:sld xmlns:a="http://schemas.openxmlformats.org/drawingml/2006/main" xmlns:r="http://schemas.openxmlformats.org/officeDocument/2006/relationships" xmlns:p="http://schemas.openxmlformats.org/presentationml/2006/main">
   <p:cSld>
     <p:spTree>
@@ -4036,7 +4312,7 @@
 </p:sld>
 </file>
 
-<file path=ppt/slides/slide14.xml><?xml version="1.0" encoding="utf-8"?>
+<file path=ppt/slides/slide16.xml><?xml version="1.0" encoding="utf-8"?>
 <p:sld xmlns:a="http://schemas.openxmlformats.org/drawingml/2006/main" xmlns:r="http://schemas.openxmlformats.org/officeDocument/2006/relationships" xmlns:p="http://schemas.openxmlformats.org/presentationml/2006/main">
   <p:cSld>
     <p:spTree>
@@ -4205,6 +4481,428 @@
       </p:grpSpPr>
       <p:pic>
         <p:nvPicPr>
+          <p:cNvPr id="2" name="Picture 8"/>
+          <p:cNvPicPr>
+            <a:picLocks noChangeAspect="1"/>
+          </p:cNvPicPr>
+          <p:nvPr/>
+        </p:nvPicPr>
+        <p:blipFill>
+          <a:blip r:embed="rId2"/>
+          <a:stretch>
+            <a:fillRect/>
+          </a:stretch>
+        </p:blipFill>
+        <p:spPr>
+          <a:xfrm>
+            <a:off x="3534589" y="2411486"/>
+            <a:ext cx="2324501" cy="2336800"/>
+          </a:xfrm>
+          <a:prstGeom prst="rect">
+            <a:avLst/>
+          </a:prstGeom>
+        </p:spPr>
+      </p:pic>
+      <p:pic>
+        <p:nvPicPr>
+          <p:cNvPr id="3" name="Picture 9"/>
+          <p:cNvPicPr>
+            <a:picLocks noChangeAspect="1"/>
+          </p:cNvPicPr>
+          <p:nvPr/>
+        </p:nvPicPr>
+        <p:blipFill>
+          <a:blip r:embed="rId3"/>
+          <a:stretch>
+            <a:fillRect/>
+          </a:stretch>
+        </p:blipFill>
+        <p:spPr>
+          <a:xfrm>
+            <a:off x="792725" y="2411486"/>
+            <a:ext cx="2362200" cy="2374698"/>
+          </a:xfrm>
+          <a:prstGeom prst="rect">
+            <a:avLst/>
+          </a:prstGeom>
+        </p:spPr>
+      </p:pic>
+      <p:sp>
+        <p:nvSpPr>
+          <p:cNvPr id="4" name="CuadroTexto 3"/>
+          <p:cNvSpPr txBox="1"/>
+          <p:nvPr/>
+        </p:nvSpPr>
+        <p:spPr>
+          <a:xfrm>
+            <a:off x="1163216" y="4747576"/>
+            <a:ext cx="1626127" cy="369332"/>
+          </a:xfrm>
+          <a:prstGeom prst="rect">
+            <a:avLst/>
+          </a:prstGeom>
+          <a:noFill/>
+        </p:spPr>
+        <p:txBody>
+          <a:bodyPr wrap="square" rtlCol="0">
+            <a:spAutoFit/>
+          </a:bodyPr>
+          <a:lstStyle/>
+          <a:p>
+            <a:r>
+              <a:rPr lang="es-ES" dirty="0" smtClean="0"/>
+              <a:t>Trabajo aislado</a:t>
+            </a:r>
+            <a:endParaRPr lang="es-ES" dirty="0"/>
+          </a:p>
+        </p:txBody>
+      </p:sp>
+      <p:sp>
+        <p:nvSpPr>
+          <p:cNvPr id="5" name="CuadroTexto 4"/>
+          <p:cNvSpPr txBox="1"/>
+          <p:nvPr/>
+        </p:nvSpPr>
+        <p:spPr>
+          <a:xfrm>
+            <a:off x="3879437" y="4747576"/>
+            <a:ext cx="1626127" cy="369332"/>
+          </a:xfrm>
+          <a:prstGeom prst="rect">
+            <a:avLst/>
+          </a:prstGeom>
+          <a:noFill/>
+        </p:spPr>
+        <p:txBody>
+          <a:bodyPr wrap="square" rtlCol="0">
+            <a:spAutoFit/>
+          </a:bodyPr>
+          <a:lstStyle/>
+          <a:p>
+            <a:r>
+              <a:rPr lang="es-ES" dirty="0" smtClean="0"/>
+              <a:t>Brainstorming</a:t>
+            </a:r>
+            <a:endParaRPr lang="es-ES" dirty="0"/>
+          </a:p>
+        </p:txBody>
+      </p:sp>
+    </p:spTree>
+    <p:extLst>
+      <p:ext uri="{BB962C8B-B14F-4D97-AF65-F5344CB8AC3E}">
+        <p14:creationId xmlns:p14="http://schemas.microsoft.com/office/powerpoint/2010/main" val="183425711"/>
+      </p:ext>
+    </p:extLst>
+  </p:cSld>
+  <p:clrMapOvr>
+    <a:masterClrMapping/>
+  </p:clrMapOvr>
+  <p:timing>
+    <p:tnLst>
+      <p:par>
+        <p:cTn xmlns:p14="http://schemas.microsoft.com/office/powerpoint/2010/main" id="1" dur="indefinite" restart="never" nodeType="tmRoot"/>
+      </p:par>
+    </p:tnLst>
+  </p:timing>
+</p:sld>
+</file>
+
+<file path=ppt/slides/slide3.xml><?xml version="1.0" encoding="utf-8"?>
+<p:sld xmlns:a="http://schemas.openxmlformats.org/drawingml/2006/main" xmlns:r="http://schemas.openxmlformats.org/officeDocument/2006/relationships" xmlns:p="http://schemas.openxmlformats.org/presentationml/2006/main">
+  <p:cSld>
+    <p:spTree>
+      <p:nvGrpSpPr>
+        <p:cNvPr id="1" name=""/>
+        <p:cNvGrpSpPr/>
+        <p:nvPr/>
+      </p:nvGrpSpPr>
+      <p:grpSpPr>
+        <a:xfrm>
+          <a:off x="0" y="0"/>
+          <a:ext cx="0" cy="0"/>
+          <a:chOff x="0" y="0"/>
+          <a:chExt cx="0" cy="0"/>
+        </a:xfrm>
+      </p:grpSpPr>
+      <p:pic>
+        <p:nvPicPr>
+          <p:cNvPr id="2" name="Imagen 1" descr="Captura de pantalla 2014-12-11 a la(s) 10.09.36.png"/>
+          <p:cNvPicPr>
+            <a:picLocks noChangeAspect="1"/>
+          </p:cNvPicPr>
+          <p:nvPr/>
+        </p:nvPicPr>
+        <p:blipFill>
+          <a:blip r:embed="rId2">
+            <a:extLst>
+              <a:ext uri="{28A0092B-C50C-407E-A947-70E740481C1C}">
+                <a14:useLocalDpi xmlns:a14="http://schemas.microsoft.com/office/drawing/2010/main" val="0"/>
+              </a:ext>
+            </a:extLst>
+          </a:blip>
+          <a:stretch>
+            <a:fillRect/>
+          </a:stretch>
+        </p:blipFill>
+        <p:spPr>
+          <a:xfrm>
+            <a:off x="4084818" y="2335730"/>
+            <a:ext cx="3698240" cy="2565400"/>
+          </a:xfrm>
+          <a:prstGeom prst="rect">
+            <a:avLst/>
+          </a:prstGeom>
+        </p:spPr>
+      </p:pic>
+      <p:pic>
+        <p:nvPicPr>
+          <p:cNvPr id="3" name="Imagen 2" descr="Captura de pantalla 2014-12-11 a la(s) 10.09.02.png"/>
+          <p:cNvPicPr>
+            <a:picLocks noChangeAspect="1"/>
+          </p:cNvPicPr>
+          <p:nvPr/>
+        </p:nvPicPr>
+        <p:blipFill>
+          <a:blip r:embed="rId3">
+            <a:extLst>
+              <a:ext uri="{28A0092B-C50C-407E-A947-70E740481C1C}">
+                <a14:useLocalDpi xmlns:a14="http://schemas.microsoft.com/office/drawing/2010/main" val="0"/>
+              </a:ext>
+            </a:extLst>
+          </a:blip>
+          <a:stretch>
+            <a:fillRect/>
+          </a:stretch>
+        </p:blipFill>
+        <p:spPr>
+          <a:xfrm>
+            <a:off x="255195" y="2345890"/>
+            <a:ext cx="3698240" cy="2555240"/>
+          </a:xfrm>
+          <a:prstGeom prst="rect">
+            <a:avLst/>
+          </a:prstGeom>
+        </p:spPr>
+      </p:pic>
+      <p:sp>
+        <p:nvSpPr>
+          <p:cNvPr id="4" name="Elipse 3"/>
+          <p:cNvSpPr/>
+          <p:nvPr/>
+        </p:nvSpPr>
+        <p:spPr>
+          <a:xfrm>
+            <a:off x="255195" y="2335730"/>
+            <a:ext cx="598805" cy="262592"/>
+          </a:xfrm>
+          <a:prstGeom prst="ellipse">
+            <a:avLst/>
+          </a:prstGeom>
+          <a:noFill/>
+          <a:ln w="19050">
+            <a:solidFill>
+              <a:srgbClr val="FF0000"/>
+            </a:solidFill>
+          </a:ln>
+          <a:effectLst/>
+        </p:spPr>
+        <p:style>
+          <a:lnRef idx="1">
+            <a:schemeClr val="accent1"/>
+          </a:lnRef>
+          <a:fillRef idx="3">
+            <a:schemeClr val="accent1"/>
+          </a:fillRef>
+          <a:effectRef idx="2">
+            <a:schemeClr val="accent1"/>
+          </a:effectRef>
+          <a:fontRef idx="minor">
+            <a:schemeClr val="lt1"/>
+          </a:fontRef>
+        </p:style>
+        <p:txBody>
+          <a:bodyPr rtlCol="0" anchor="ctr"/>
+          <a:lstStyle/>
+          <a:p>
+            <a:pPr algn="ctr"/>
+            <a:endParaRPr lang="es-ES"/>
+          </a:p>
+        </p:txBody>
+      </p:sp>
+      <p:sp>
+        <p:nvSpPr>
+          <p:cNvPr id="5" name="Elipse 4"/>
+          <p:cNvSpPr/>
+          <p:nvPr/>
+        </p:nvSpPr>
+        <p:spPr>
+          <a:xfrm>
+            <a:off x="2852808" y="3874875"/>
+            <a:ext cx="598805" cy="1088212"/>
+          </a:xfrm>
+          <a:prstGeom prst="ellipse">
+            <a:avLst/>
+          </a:prstGeom>
+          <a:noFill/>
+          <a:ln w="19050">
+            <a:solidFill>
+              <a:srgbClr val="FF0000"/>
+            </a:solidFill>
+          </a:ln>
+          <a:effectLst/>
+        </p:spPr>
+        <p:style>
+          <a:lnRef idx="1">
+            <a:schemeClr val="accent1"/>
+          </a:lnRef>
+          <a:fillRef idx="3">
+            <a:schemeClr val="accent1"/>
+          </a:fillRef>
+          <a:effectRef idx="2">
+            <a:schemeClr val="accent1"/>
+          </a:effectRef>
+          <a:fontRef idx="minor">
+            <a:schemeClr val="lt1"/>
+          </a:fontRef>
+        </p:style>
+        <p:txBody>
+          <a:bodyPr rtlCol="0" anchor="ctr"/>
+          <a:lstStyle/>
+          <a:p>
+            <a:pPr algn="ctr"/>
+            <a:endParaRPr lang="es-ES"/>
+          </a:p>
+        </p:txBody>
+      </p:sp>
+      <p:sp>
+        <p:nvSpPr>
+          <p:cNvPr id="6" name="Elipse 5"/>
+          <p:cNvSpPr/>
+          <p:nvPr/>
+        </p:nvSpPr>
+        <p:spPr>
+          <a:xfrm>
+            <a:off x="6669377" y="3874875"/>
+            <a:ext cx="598805" cy="1088212"/>
+          </a:xfrm>
+          <a:prstGeom prst="ellipse">
+            <a:avLst/>
+          </a:prstGeom>
+          <a:noFill/>
+          <a:ln w="19050">
+            <a:solidFill>
+              <a:srgbClr val="FF0000"/>
+            </a:solidFill>
+          </a:ln>
+          <a:effectLst/>
+        </p:spPr>
+        <p:style>
+          <a:lnRef idx="1">
+            <a:schemeClr val="accent1"/>
+          </a:lnRef>
+          <a:fillRef idx="3">
+            <a:schemeClr val="accent1"/>
+          </a:fillRef>
+          <a:effectRef idx="2">
+            <a:schemeClr val="accent1"/>
+          </a:effectRef>
+          <a:fontRef idx="minor">
+            <a:schemeClr val="lt1"/>
+          </a:fontRef>
+        </p:style>
+        <p:txBody>
+          <a:bodyPr rtlCol="0" anchor="ctr"/>
+          <a:lstStyle/>
+          <a:p>
+            <a:pPr algn="ctr"/>
+            <a:endParaRPr lang="es-ES"/>
+          </a:p>
+        </p:txBody>
+      </p:sp>
+      <p:sp>
+        <p:nvSpPr>
+          <p:cNvPr id="7" name="Elipse 6"/>
+          <p:cNvSpPr/>
+          <p:nvPr/>
+        </p:nvSpPr>
+        <p:spPr>
+          <a:xfrm>
+            <a:off x="4084818" y="2335730"/>
+            <a:ext cx="598805" cy="262592"/>
+          </a:xfrm>
+          <a:prstGeom prst="ellipse">
+            <a:avLst/>
+          </a:prstGeom>
+          <a:noFill/>
+          <a:ln w="19050">
+            <a:solidFill>
+              <a:srgbClr val="FF0000"/>
+            </a:solidFill>
+          </a:ln>
+          <a:effectLst/>
+        </p:spPr>
+        <p:style>
+          <a:lnRef idx="1">
+            <a:schemeClr val="accent1"/>
+          </a:lnRef>
+          <a:fillRef idx="3">
+            <a:schemeClr val="accent1"/>
+          </a:fillRef>
+          <a:effectRef idx="2">
+            <a:schemeClr val="accent1"/>
+          </a:effectRef>
+          <a:fontRef idx="minor">
+            <a:schemeClr val="lt1"/>
+          </a:fontRef>
+        </p:style>
+        <p:txBody>
+          <a:bodyPr rtlCol="0" anchor="ctr"/>
+          <a:lstStyle/>
+          <a:p>
+            <a:pPr algn="ctr"/>
+            <a:endParaRPr lang="es-ES"/>
+          </a:p>
+        </p:txBody>
+      </p:sp>
+    </p:spTree>
+    <p:extLst>
+      <p:ext uri="{BB962C8B-B14F-4D97-AF65-F5344CB8AC3E}">
+        <p14:creationId xmlns:p14="http://schemas.microsoft.com/office/powerpoint/2010/main" val="3131903258"/>
+      </p:ext>
+    </p:extLst>
+  </p:cSld>
+  <p:clrMapOvr>
+    <a:masterClrMapping/>
+  </p:clrMapOvr>
+  <p:timing>
+    <p:tnLst>
+      <p:par>
+        <p:cTn xmlns:p14="http://schemas.microsoft.com/office/powerpoint/2010/main" id="1" dur="indefinite" restart="never" nodeType="tmRoot"/>
+      </p:par>
+    </p:tnLst>
+  </p:timing>
+</p:sld>
+</file>
+
+<file path=ppt/slides/slide4.xml><?xml version="1.0" encoding="utf-8"?>
+<p:sld xmlns:a="http://schemas.openxmlformats.org/drawingml/2006/main" xmlns:r="http://schemas.openxmlformats.org/officeDocument/2006/relationships" xmlns:p="http://schemas.openxmlformats.org/presentationml/2006/main">
+  <p:cSld>
+    <p:spTree>
+      <p:nvGrpSpPr>
+        <p:cNvPr id="1" name=""/>
+        <p:cNvGrpSpPr/>
+        <p:nvPr/>
+      </p:nvGrpSpPr>
+      <p:grpSpPr>
+        <a:xfrm>
+          <a:off x="0" y="0"/>
+          <a:ext cx="0" cy="0"/>
+          <a:chOff x="0" y="0"/>
+          <a:chExt cx="0" cy="0"/>
+        </a:xfrm>
+      </p:grpSpPr>
+      <p:pic>
+        <p:nvPicPr>
           <p:cNvPr id="2" name="Picture 3" descr="IMG_0185.JPG"/>
           <p:cNvPicPr>
             <a:picLocks noChangeAspect="1"/>
@@ -4443,10 +5141,17 @@
   <p:clrMapOvr>
     <a:masterClrMapping/>
   </p:clrMapOvr>
+  <p:timing>
+    <p:tnLst>
+      <p:par>
+        <p:cTn xmlns:p14="http://schemas.microsoft.com/office/powerpoint/2010/main" id="1" dur="indefinite" restart="never" nodeType="tmRoot"/>
+      </p:par>
+    </p:tnLst>
+  </p:timing>
 </p:sld>
 </file>
 
-<file path=ppt/slides/slide3.xml><?xml version="1.0" encoding="utf-8"?>
+<file path=ppt/slides/slide5.xml><?xml version="1.0" encoding="utf-8"?>
 <p:sld xmlns:a="http://schemas.openxmlformats.org/drawingml/2006/main" xmlns:r="http://schemas.openxmlformats.org/officeDocument/2006/relationships" xmlns:p="http://schemas.openxmlformats.org/presentationml/2006/main">
   <p:cSld>
     <p:spTree>
@@ -4574,7 +5279,7 @@
 </p:sld>
 </file>
 
-<file path=ppt/slides/slide4.xml><?xml version="1.0" encoding="utf-8"?>
+<file path=ppt/slides/slide6.xml><?xml version="1.0" encoding="utf-8"?>
 <p:sld xmlns:a="http://schemas.openxmlformats.org/drawingml/2006/main" xmlns:r="http://schemas.openxmlformats.org/officeDocument/2006/relationships" xmlns:p="http://schemas.openxmlformats.org/presentationml/2006/main">
   <p:cSld>
     <p:spTree>
@@ -4702,7 +5407,7 @@
 </p:sld>
 </file>
 
-<file path=ppt/slides/slide5.xml><?xml version="1.0" encoding="utf-8"?>
+<file path=ppt/slides/slide7.xml><?xml version="1.0" encoding="utf-8"?>
 <p:sld xmlns:a="http://schemas.openxmlformats.org/drawingml/2006/main" xmlns:r="http://schemas.openxmlformats.org/officeDocument/2006/relationships" xmlns:p="http://schemas.openxmlformats.org/presentationml/2006/main">
   <p:cSld>
     <p:spTree>
@@ -5338,7 +6043,7 @@
 </p:sld>
 </file>
 
-<file path=ppt/slides/slide6.xml><?xml version="1.0" encoding="utf-8"?>
+<file path=ppt/slides/slide8.xml><?xml version="1.0" encoding="utf-8"?>
 <p:sld xmlns:a="http://schemas.openxmlformats.org/drawingml/2006/main" xmlns:r="http://schemas.openxmlformats.org/officeDocument/2006/relationships" xmlns:p="http://schemas.openxmlformats.org/presentationml/2006/main">
   <p:cSld>
     <p:spTree>
@@ -5488,7 +6193,7 @@
 </p:sld>
 </file>
 
-<file path=ppt/slides/slide7.xml><?xml version="1.0" encoding="utf-8"?>
+<file path=ppt/slides/slide9.xml><?xml version="1.0" encoding="utf-8"?>
 <p:sld xmlns:a="http://schemas.openxmlformats.org/drawingml/2006/main" xmlns:r="http://schemas.openxmlformats.org/officeDocument/2006/relationships" xmlns:p="http://schemas.openxmlformats.org/presentationml/2006/main">
   <p:cSld>
     <p:spTree>
@@ -5629,280 +6334,6 @@
     <p:extLst>
       <p:ext uri="{BB962C8B-B14F-4D97-AF65-F5344CB8AC3E}">
         <p14:creationId xmlns:p14="http://schemas.microsoft.com/office/powerpoint/2010/main" val="2579316567"/>
-      </p:ext>
-    </p:extLst>
-  </p:cSld>
-  <p:clrMapOvr>
-    <a:masterClrMapping/>
-  </p:clrMapOvr>
-</p:sld>
-</file>
-
-<file path=ppt/slides/slide8.xml><?xml version="1.0" encoding="utf-8"?>
-<p:sld xmlns:a="http://schemas.openxmlformats.org/drawingml/2006/main" xmlns:r="http://schemas.openxmlformats.org/officeDocument/2006/relationships" xmlns:p="http://schemas.openxmlformats.org/presentationml/2006/main">
-  <p:cSld>
-    <p:spTree>
-      <p:nvGrpSpPr>
-        <p:cNvPr id="1" name=""/>
-        <p:cNvGrpSpPr/>
-        <p:nvPr/>
-      </p:nvGrpSpPr>
-      <p:grpSpPr>
-        <a:xfrm>
-          <a:off x="0" y="0"/>
-          <a:ext cx="0" cy="0"/>
-          <a:chOff x="0" y="0"/>
-          <a:chExt cx="0" cy="0"/>
-        </a:xfrm>
-      </p:grpSpPr>
-      <p:pic>
-        <p:nvPicPr>
-          <p:cNvPr id="2" name="Imagen 1" descr="Captura de pantalla 2014-12-04 a la(s) 11.51.59.png"/>
-          <p:cNvPicPr>
-            <a:picLocks noChangeAspect="1"/>
-          </p:cNvPicPr>
-          <p:nvPr/>
-        </p:nvPicPr>
-        <p:blipFill>
-          <a:blip r:embed="rId2">
-            <a:extLst>
-              <a:ext uri="{28A0092B-C50C-407E-A947-70E740481C1C}">
-                <a14:useLocalDpi xmlns:a14="http://schemas.microsoft.com/office/drawing/2010/main" val="0"/>
-              </a:ext>
-            </a:extLst>
-          </a:blip>
-          <a:stretch>
-            <a:fillRect/>
-          </a:stretch>
-        </p:blipFill>
-        <p:spPr>
-          <a:xfrm>
-            <a:off x="540278" y="906294"/>
-            <a:ext cx="2759455" cy="2912758"/>
-          </a:xfrm>
-          <a:prstGeom prst="rect">
-            <a:avLst/>
-          </a:prstGeom>
-        </p:spPr>
-      </p:pic>
-      <p:pic>
-        <p:nvPicPr>
-          <p:cNvPr id="3" name="Imagen 2" descr="Captura de pantalla 2014-12-04 a la(s) 11.52.35.png"/>
-          <p:cNvPicPr>
-            <a:picLocks noChangeAspect="1"/>
-          </p:cNvPicPr>
-          <p:nvPr/>
-        </p:nvPicPr>
-        <p:blipFill>
-          <a:blip r:embed="rId3">
-            <a:extLst>
-              <a:ext uri="{28A0092B-C50C-407E-A947-70E740481C1C}">
-                <a14:useLocalDpi xmlns:a14="http://schemas.microsoft.com/office/drawing/2010/main" val="0"/>
-              </a:ext>
-            </a:extLst>
-          </a:blip>
-          <a:stretch>
-            <a:fillRect/>
-          </a:stretch>
-        </p:blipFill>
-        <p:spPr>
-          <a:xfrm>
-            <a:off x="3546308" y="906294"/>
-            <a:ext cx="2773725" cy="2912758"/>
-          </a:xfrm>
-          <a:prstGeom prst="rect">
-            <a:avLst/>
-          </a:prstGeom>
-        </p:spPr>
-      </p:pic>
-      <p:sp>
-        <p:nvSpPr>
-          <p:cNvPr id="4" name="CuadroTexto 3"/>
-          <p:cNvSpPr txBox="1"/>
-          <p:nvPr/>
-        </p:nvSpPr>
-        <p:spPr>
-          <a:xfrm>
-            <a:off x="1056389" y="3819052"/>
-            <a:ext cx="1840906" cy="307777"/>
-          </a:xfrm>
-          <a:prstGeom prst="rect">
-            <a:avLst/>
-          </a:prstGeom>
-          <a:noFill/>
-        </p:spPr>
-        <p:txBody>
-          <a:bodyPr wrap="none" rtlCol="0">
-            <a:spAutoFit/>
-          </a:bodyPr>
-          <a:lstStyle/>
-          <a:p>
-            <a:r>
-              <a:rPr lang="es-ES" sz="1400" dirty="0" smtClean="0"/>
-              <a:t>Sin enlace preferencial</a:t>
-            </a:r>
-            <a:endParaRPr lang="es-ES" sz="1400" dirty="0"/>
-          </a:p>
-        </p:txBody>
-      </p:sp>
-      <p:sp>
-        <p:nvSpPr>
-          <p:cNvPr id="5" name="CuadroTexto 4"/>
-          <p:cNvSpPr txBox="1"/>
-          <p:nvPr/>
-        </p:nvSpPr>
-        <p:spPr>
-          <a:xfrm>
-            <a:off x="4063414" y="3819052"/>
-            <a:ext cx="1907619" cy="307777"/>
-          </a:xfrm>
-          <a:prstGeom prst="rect">
-            <a:avLst/>
-          </a:prstGeom>
-          <a:noFill/>
-        </p:spPr>
-        <p:txBody>
-          <a:bodyPr wrap="none" rtlCol="0">
-            <a:spAutoFit/>
-          </a:bodyPr>
-          <a:lstStyle/>
-          <a:p>
-            <a:r>
-              <a:rPr lang="es-ES" sz="1400" smtClean="0"/>
-              <a:t>Con enlace </a:t>
-            </a:r>
-            <a:r>
-              <a:rPr lang="es-ES" sz="1400" dirty="0" smtClean="0"/>
-              <a:t>preferencial</a:t>
-            </a:r>
-            <a:endParaRPr lang="es-ES" sz="1400" dirty="0"/>
-          </a:p>
-        </p:txBody>
-      </p:sp>
-    </p:spTree>
-    <p:extLst>
-      <p:ext uri="{BB962C8B-B14F-4D97-AF65-F5344CB8AC3E}">
-        <p14:creationId xmlns:p14="http://schemas.microsoft.com/office/powerpoint/2010/main" val="888234259"/>
-      </p:ext>
-    </p:extLst>
-  </p:cSld>
-  <p:clrMapOvr>
-    <a:masterClrMapping/>
-  </p:clrMapOvr>
-</p:sld>
-</file>
-
-<file path=ppt/slides/slide9.xml><?xml version="1.0" encoding="utf-8"?>
-<p:sld xmlns:a="http://schemas.openxmlformats.org/drawingml/2006/main" xmlns:r="http://schemas.openxmlformats.org/officeDocument/2006/relationships" xmlns:p="http://schemas.openxmlformats.org/presentationml/2006/main">
-  <p:cSld>
-    <p:spTree>
-      <p:nvGrpSpPr>
-        <p:cNvPr id="1" name=""/>
-        <p:cNvGrpSpPr/>
-        <p:nvPr/>
-      </p:nvGrpSpPr>
-      <p:grpSpPr>
-        <a:xfrm>
-          <a:off x="0" y="0"/>
-          <a:ext cx="0" cy="0"/>
-          <a:chOff x="0" y="0"/>
-          <a:chExt cx="0" cy="0"/>
-        </a:xfrm>
-      </p:grpSpPr>
-      <p:grpSp>
-        <p:nvGrpSpPr>
-          <p:cNvPr id="4" name="Agrupar 3"/>
-          <p:cNvGrpSpPr/>
-          <p:nvPr/>
-        </p:nvGrpSpPr>
-        <p:grpSpPr>
-          <a:xfrm>
-            <a:off x="1448084" y="1145349"/>
-            <a:ext cx="6752286" cy="3439283"/>
-            <a:chOff x="1448084" y="1145349"/>
-            <a:chExt cx="6752286" cy="3439283"/>
-          </a:xfrm>
-        </p:grpSpPr>
-        <p:pic>
-          <p:nvPicPr>
-            <p:cNvPr id="2" name="Imagen 1" descr="Captura de pantalla 2014-12-02 a la(s) 17.13.43.png"/>
-            <p:cNvPicPr>
-              <a:picLocks noChangeAspect="1"/>
-            </p:cNvPicPr>
-            <p:nvPr/>
-          </p:nvPicPr>
-          <p:blipFill>
-            <a:blip r:embed="rId2">
-              <a:extLst>
-                <a:ext uri="{28A0092B-C50C-407E-A947-70E740481C1C}">
-                  <a14:useLocalDpi xmlns:a14="http://schemas.microsoft.com/office/drawing/2010/main" val="0"/>
-                </a:ext>
-              </a:extLst>
-            </a:blip>
-            <a:stretch>
-              <a:fillRect/>
-            </a:stretch>
-          </p:blipFill>
-          <p:spPr>
-            <a:xfrm>
-              <a:off x="1727017" y="1288784"/>
-              <a:ext cx="6473353" cy="3295848"/>
-            </a:xfrm>
-            <a:prstGeom prst="rect">
-              <a:avLst/>
-            </a:prstGeom>
-          </p:spPr>
-        </p:pic>
-        <p:sp>
-          <p:nvSpPr>
-            <p:cNvPr id="3" name="Rectángulo 2"/>
-            <p:cNvSpPr/>
-            <p:nvPr/>
-          </p:nvSpPr>
-          <p:spPr>
-            <a:xfrm>
-              <a:off x="1448084" y="1145349"/>
-              <a:ext cx="4112797" cy="718069"/>
-            </a:xfrm>
-            <a:prstGeom prst="rect">
-              <a:avLst/>
-            </a:prstGeom>
-            <a:solidFill>
-              <a:schemeClr val="bg1"/>
-            </a:solidFill>
-            <a:ln>
-              <a:noFill/>
-            </a:ln>
-            <a:effectLst/>
-          </p:spPr>
-          <p:style>
-            <a:lnRef idx="1">
-              <a:schemeClr val="accent1"/>
-            </a:lnRef>
-            <a:fillRef idx="3">
-              <a:schemeClr val="accent1"/>
-            </a:fillRef>
-            <a:effectRef idx="2">
-              <a:schemeClr val="accent1"/>
-            </a:effectRef>
-            <a:fontRef idx="minor">
-              <a:schemeClr val="lt1"/>
-            </a:fontRef>
-          </p:style>
-          <p:txBody>
-            <a:bodyPr rtlCol="0" anchor="ctr"/>
-            <a:lstStyle/>
-            <a:p>
-              <a:pPr algn="ctr"/>
-              <a:endParaRPr lang="es-ES"/>
-            </a:p>
-          </p:txBody>
-        </p:sp>
-      </p:grpSp>
-    </p:spTree>
-    <p:extLst>
-      <p:ext uri="{BB962C8B-B14F-4D97-AF65-F5344CB8AC3E}">
-        <p14:creationId xmlns:p14="http://schemas.microsoft.com/office/powerpoint/2010/main" val="9271454"/>
       </p:ext>
     </p:extLst>
   </p:cSld>

</xml_diff>

<commit_message>
Terminado para las redes aleatorias
</commit_message>
<xml_diff>
--- a/images/paraEsquemasYFiguras.pptx
+++ b/images/paraEsquemasYFiguras.pptx
@@ -5,25 +5,27 @@
     <p:sldMasterId id="2147483648" r:id="rId1"/>
   </p:sldMasterIdLst>
   <p:notesMasterIdLst>
-    <p:notesMasterId r:id="rId18"/>
+    <p:notesMasterId r:id="rId20"/>
   </p:notesMasterIdLst>
   <p:sldIdLst>
     <p:sldId id="256" r:id="rId2"/>
-    <p:sldId id="270" r:id="rId3"/>
-    <p:sldId id="271" r:id="rId4"/>
-    <p:sldId id="267" r:id="rId5"/>
-    <p:sldId id="268" r:id="rId6"/>
-    <p:sldId id="269" r:id="rId7"/>
-    <p:sldId id="266" r:id="rId8"/>
-    <p:sldId id="265" r:id="rId9"/>
-    <p:sldId id="263" r:id="rId10"/>
-    <p:sldId id="264" r:id="rId11"/>
-    <p:sldId id="262" r:id="rId12"/>
-    <p:sldId id="259" r:id="rId13"/>
-    <p:sldId id="260" r:id="rId14"/>
-    <p:sldId id="261" r:id="rId15"/>
-    <p:sldId id="258" r:id="rId16"/>
-    <p:sldId id="257" r:id="rId17"/>
+    <p:sldId id="272" r:id="rId3"/>
+    <p:sldId id="273" r:id="rId4"/>
+    <p:sldId id="270" r:id="rId5"/>
+    <p:sldId id="271" r:id="rId6"/>
+    <p:sldId id="267" r:id="rId7"/>
+    <p:sldId id="268" r:id="rId8"/>
+    <p:sldId id="269" r:id="rId9"/>
+    <p:sldId id="266" r:id="rId10"/>
+    <p:sldId id="265" r:id="rId11"/>
+    <p:sldId id="263" r:id="rId12"/>
+    <p:sldId id="264" r:id="rId13"/>
+    <p:sldId id="262" r:id="rId14"/>
+    <p:sldId id="259" r:id="rId15"/>
+    <p:sldId id="260" r:id="rId16"/>
+    <p:sldId id="261" r:id="rId17"/>
+    <p:sldId id="258" r:id="rId18"/>
+    <p:sldId id="257" r:id="rId19"/>
   </p:sldIdLst>
   <p:sldSz cx="9144000" cy="6858000" type="screen4x3"/>
   <p:notesSz cx="6858000" cy="9144000"/>
@@ -207,7 +209,7 @@
           <a:p>
             <a:fld id="{2E24EDA5-CF97-A44C-82E3-1872A390DF8E}" type="datetimeFigureOut">
               <a:rPr lang="es-ES" smtClean="0"/>
-              <a:t>11/12/14</a:t>
+              <a:t>30/12/14</a:t>
             </a:fld>
             <a:endParaRPr lang="es-ES"/>
           </a:p>
@@ -540,7 +542,7 @@
           <a:p>
             <a:fld id="{6EA4D9EE-5449-E344-B6CE-1C83F2718A87}" type="slidenum">
               <a:rPr lang="es-ES" smtClean="0"/>
-              <a:t>5</a:t>
+              <a:t>7</a:t>
             </a:fld>
             <a:endParaRPr lang="es-ES"/>
           </a:p>
@@ -740,7 +742,7 @@
           <a:p>
             <a:fld id="{D7E2043C-A4E6-B74E-9C07-871FC106E480}" type="datetimeFigureOut">
               <a:rPr lang="es-ES" smtClean="0"/>
-              <a:t>11/12/14</a:t>
+              <a:t>30/12/14</a:t>
             </a:fld>
             <a:endParaRPr lang="es-ES"/>
           </a:p>
@@ -910,7 +912,7 @@
           <a:p>
             <a:fld id="{D7E2043C-A4E6-B74E-9C07-871FC106E480}" type="datetimeFigureOut">
               <a:rPr lang="es-ES" smtClean="0"/>
-              <a:t>11/12/14</a:t>
+              <a:t>30/12/14</a:t>
             </a:fld>
             <a:endParaRPr lang="es-ES"/>
           </a:p>
@@ -1090,7 +1092,7 @@
           <a:p>
             <a:fld id="{D7E2043C-A4E6-B74E-9C07-871FC106E480}" type="datetimeFigureOut">
               <a:rPr lang="es-ES" smtClean="0"/>
-              <a:t>11/12/14</a:t>
+              <a:t>30/12/14</a:t>
             </a:fld>
             <a:endParaRPr lang="es-ES"/>
           </a:p>
@@ -1260,7 +1262,7 @@
           <a:p>
             <a:fld id="{D7E2043C-A4E6-B74E-9C07-871FC106E480}" type="datetimeFigureOut">
               <a:rPr lang="es-ES" smtClean="0"/>
-              <a:t>11/12/14</a:t>
+              <a:t>30/12/14</a:t>
             </a:fld>
             <a:endParaRPr lang="es-ES"/>
           </a:p>
@@ -1506,7 +1508,7 @@
           <a:p>
             <a:fld id="{D7E2043C-A4E6-B74E-9C07-871FC106E480}" type="datetimeFigureOut">
               <a:rPr lang="es-ES" smtClean="0"/>
-              <a:t>11/12/14</a:t>
+              <a:t>30/12/14</a:t>
             </a:fld>
             <a:endParaRPr lang="es-ES"/>
           </a:p>
@@ -1794,7 +1796,7 @@
           <a:p>
             <a:fld id="{D7E2043C-A4E6-B74E-9C07-871FC106E480}" type="datetimeFigureOut">
               <a:rPr lang="es-ES" smtClean="0"/>
-              <a:t>11/12/14</a:t>
+              <a:t>30/12/14</a:t>
             </a:fld>
             <a:endParaRPr lang="es-ES"/>
           </a:p>
@@ -2216,7 +2218,7 @@
           <a:p>
             <a:fld id="{D7E2043C-A4E6-B74E-9C07-871FC106E480}" type="datetimeFigureOut">
               <a:rPr lang="es-ES" smtClean="0"/>
-              <a:t>11/12/14</a:t>
+              <a:t>30/12/14</a:t>
             </a:fld>
             <a:endParaRPr lang="es-ES"/>
           </a:p>
@@ -2334,7 +2336,7 @@
           <a:p>
             <a:fld id="{D7E2043C-A4E6-B74E-9C07-871FC106E480}" type="datetimeFigureOut">
               <a:rPr lang="es-ES" smtClean="0"/>
-              <a:t>11/12/14</a:t>
+              <a:t>30/12/14</a:t>
             </a:fld>
             <a:endParaRPr lang="es-ES"/>
           </a:p>
@@ -2429,7 +2431,7 @@
           <a:p>
             <a:fld id="{D7E2043C-A4E6-B74E-9C07-871FC106E480}" type="datetimeFigureOut">
               <a:rPr lang="es-ES" smtClean="0"/>
-              <a:t>11/12/14</a:t>
+              <a:t>30/12/14</a:t>
             </a:fld>
             <a:endParaRPr lang="es-ES"/>
           </a:p>
@@ -2706,7 +2708,7 @@
           <a:p>
             <a:fld id="{D7E2043C-A4E6-B74E-9C07-871FC106E480}" type="datetimeFigureOut">
               <a:rPr lang="es-ES" smtClean="0"/>
-              <a:t>11/12/14</a:t>
+              <a:t>30/12/14</a:t>
             </a:fld>
             <a:endParaRPr lang="es-ES"/>
           </a:p>
@@ -2959,7 +2961,7 @@
           <a:p>
             <a:fld id="{D7E2043C-A4E6-B74E-9C07-871FC106E480}" type="datetimeFigureOut">
               <a:rPr lang="es-ES" smtClean="0"/>
-              <a:t>11/12/14</a:t>
+              <a:t>30/12/14</a:t>
             </a:fld>
             <a:endParaRPr lang="es-ES"/>
           </a:p>
@@ -3172,7 +3174,7 @@
           <a:p>
             <a:fld id="{D7E2043C-A4E6-B74E-9C07-871FC106E480}" type="datetimeFigureOut">
               <a:rPr lang="es-ES" smtClean="0"/>
-              <a:t>11/12/14</a:t>
+              <a:t>30/12/14</a:t>
             </a:fld>
             <a:endParaRPr lang="es-ES"/>
           </a:p>
@@ -3646,6 +3648,306 @@
       </p:grpSpPr>
       <p:pic>
         <p:nvPicPr>
+          <p:cNvPr id="2" name="Imagen 1" descr="Captura de pantalla 2014-12-04 a la(s) 17.09.48.png"/>
+          <p:cNvPicPr>
+            <a:picLocks noChangeAspect="1"/>
+          </p:cNvPicPr>
+          <p:nvPr/>
+        </p:nvPicPr>
+        <p:blipFill>
+          <a:blip r:embed="rId2">
+            <a:extLst>
+              <a:ext uri="{28A0092B-C50C-407E-A947-70E740481C1C}">
+                <a14:useLocalDpi xmlns:a14="http://schemas.microsoft.com/office/drawing/2010/main" val="0"/>
+              </a:ext>
+            </a:extLst>
+          </a:blip>
+          <a:stretch>
+            <a:fillRect/>
+          </a:stretch>
+        </p:blipFill>
+        <p:spPr>
+          <a:xfrm>
+            <a:off x="783389" y="1915992"/>
+            <a:ext cx="2561715" cy="2684537"/>
+          </a:xfrm>
+          <a:prstGeom prst="rect">
+            <a:avLst/>
+          </a:prstGeom>
+        </p:spPr>
+      </p:pic>
+      <p:pic>
+        <p:nvPicPr>
+          <p:cNvPr id="3" name="Imagen 2" descr="Captura de pantalla 2014-12-04 a la(s) 17.10.27.png"/>
+          <p:cNvPicPr>
+            <a:picLocks noChangeAspect="1"/>
+          </p:cNvPicPr>
+          <p:nvPr/>
+        </p:nvPicPr>
+        <p:blipFill>
+          <a:blip r:embed="rId3">
+            <a:extLst>
+              <a:ext uri="{28A0092B-C50C-407E-A947-70E740481C1C}">
+                <a14:useLocalDpi xmlns:a14="http://schemas.microsoft.com/office/drawing/2010/main" val="0"/>
+              </a:ext>
+            </a:extLst>
+          </a:blip>
+          <a:stretch>
+            <a:fillRect/>
+          </a:stretch>
+        </p:blipFill>
+        <p:spPr>
+          <a:xfrm>
+            <a:off x="3515491" y="1926153"/>
+            <a:ext cx="2561715" cy="2672840"/>
+          </a:xfrm>
+          <a:prstGeom prst="rect">
+            <a:avLst/>
+          </a:prstGeom>
+        </p:spPr>
+      </p:pic>
+      <p:sp>
+        <p:nvSpPr>
+          <p:cNvPr id="4" name="CuadroTexto 3"/>
+          <p:cNvSpPr txBox="1"/>
+          <p:nvPr/>
+        </p:nvSpPr>
+        <p:spPr>
+          <a:xfrm>
+            <a:off x="1495562" y="4595271"/>
+            <a:ext cx="1162648" cy="307777"/>
+          </a:xfrm>
+          <a:prstGeom prst="rect">
+            <a:avLst/>
+          </a:prstGeom>
+          <a:noFill/>
+        </p:spPr>
+        <p:txBody>
+          <a:bodyPr wrap="none" rtlCol="0">
+            <a:spAutoFit/>
+          </a:bodyPr>
+          <a:lstStyle/>
+          <a:p>
+            <a:r>
+              <a:rPr lang="es-ES" sz="1400" dirty="0" smtClean="0"/>
+              <a:t>N=200; p=0.0</a:t>
+            </a:r>
+            <a:endParaRPr lang="es-ES" sz="1400" dirty="0"/>
+          </a:p>
+        </p:txBody>
+      </p:sp>
+      <p:sp>
+        <p:nvSpPr>
+          <p:cNvPr id="5" name="CuadroTexto 4"/>
+          <p:cNvSpPr txBox="1"/>
+          <p:nvPr/>
+        </p:nvSpPr>
+        <p:spPr>
+          <a:xfrm>
+            <a:off x="4247392" y="4600639"/>
+            <a:ext cx="1253643" cy="307777"/>
+          </a:xfrm>
+          <a:prstGeom prst="rect">
+            <a:avLst/>
+          </a:prstGeom>
+          <a:noFill/>
+        </p:spPr>
+        <p:txBody>
+          <a:bodyPr wrap="none" rtlCol="0">
+            <a:spAutoFit/>
+          </a:bodyPr>
+          <a:lstStyle/>
+          <a:p>
+            <a:r>
+              <a:rPr lang="es-ES" sz="1400" dirty="0" smtClean="0"/>
+              <a:t>N=200; p=0.10</a:t>
+            </a:r>
+            <a:endParaRPr lang="es-ES" sz="1400" dirty="0"/>
+          </a:p>
+        </p:txBody>
+      </p:sp>
+    </p:spTree>
+    <p:extLst>
+      <p:ext uri="{BB962C8B-B14F-4D97-AF65-F5344CB8AC3E}">
+        <p14:creationId xmlns:p14="http://schemas.microsoft.com/office/powerpoint/2010/main" val="2174899281"/>
+      </p:ext>
+    </p:extLst>
+  </p:cSld>
+  <p:clrMapOvr>
+    <a:masterClrMapping/>
+  </p:clrMapOvr>
+</p:sld>
+</file>
+
+<file path=ppt/slides/slide11.xml><?xml version="1.0" encoding="utf-8"?>
+<p:sld xmlns:a="http://schemas.openxmlformats.org/drawingml/2006/main" xmlns:r="http://schemas.openxmlformats.org/officeDocument/2006/relationships" xmlns:p="http://schemas.openxmlformats.org/presentationml/2006/main">
+  <p:cSld>
+    <p:spTree>
+      <p:nvGrpSpPr>
+        <p:cNvPr id="1" name=""/>
+        <p:cNvGrpSpPr/>
+        <p:nvPr/>
+      </p:nvGrpSpPr>
+      <p:grpSpPr>
+        <a:xfrm>
+          <a:off x="0" y="0"/>
+          <a:ext cx="0" cy="0"/>
+          <a:chOff x="0" y="0"/>
+          <a:chExt cx="0" cy="0"/>
+        </a:xfrm>
+      </p:grpSpPr>
+      <p:pic>
+        <p:nvPicPr>
+          <p:cNvPr id="2" name="Imagen 1" descr="Captura de pantalla 2014-12-04 a la(s) 11.30.20.png"/>
+          <p:cNvPicPr>
+            <a:picLocks noChangeAspect="1"/>
+          </p:cNvPicPr>
+          <p:nvPr/>
+        </p:nvPicPr>
+        <p:blipFill>
+          <a:blip r:embed="rId2">
+            <a:extLst>
+              <a:ext uri="{28A0092B-C50C-407E-A947-70E740481C1C}">
+                <a14:useLocalDpi xmlns:a14="http://schemas.microsoft.com/office/drawing/2010/main" val="0"/>
+              </a:ext>
+            </a:extLst>
+          </a:blip>
+          <a:stretch>
+            <a:fillRect/>
+          </a:stretch>
+        </p:blipFill>
+        <p:spPr>
+          <a:xfrm>
+            <a:off x="534709" y="961380"/>
+            <a:ext cx="3341838" cy="3482477"/>
+          </a:xfrm>
+          <a:prstGeom prst="rect">
+            <a:avLst/>
+          </a:prstGeom>
+        </p:spPr>
+      </p:pic>
+      <p:pic>
+        <p:nvPicPr>
+          <p:cNvPr id="3" name="Imagen 2" descr="Captura de pantalla 2014-12-04 a la(s) 11.29.34.png"/>
+          <p:cNvPicPr>
+            <a:picLocks noChangeAspect="1"/>
+          </p:cNvPicPr>
+          <p:nvPr/>
+        </p:nvPicPr>
+        <p:blipFill>
+          <a:blip r:embed="rId3">
+            <a:extLst>
+              <a:ext uri="{28A0092B-C50C-407E-A947-70E740481C1C}">
+                <a14:useLocalDpi xmlns:a14="http://schemas.microsoft.com/office/drawing/2010/main" val="0"/>
+              </a:ext>
+            </a:extLst>
+          </a:blip>
+          <a:stretch>
+            <a:fillRect/>
+          </a:stretch>
+        </p:blipFill>
+        <p:spPr>
+          <a:xfrm>
+            <a:off x="4038959" y="961380"/>
+            <a:ext cx="3375530" cy="3482477"/>
+          </a:xfrm>
+          <a:prstGeom prst="rect">
+            <a:avLst/>
+          </a:prstGeom>
+        </p:spPr>
+      </p:pic>
+      <p:sp>
+        <p:nvSpPr>
+          <p:cNvPr id="4" name="CuadroTexto 3"/>
+          <p:cNvSpPr txBox="1"/>
+          <p:nvPr/>
+        </p:nvSpPr>
+        <p:spPr>
+          <a:xfrm>
+            <a:off x="1495562" y="4441996"/>
+            <a:ext cx="1409949" cy="307777"/>
+          </a:xfrm>
+          <a:prstGeom prst="rect">
+            <a:avLst/>
+          </a:prstGeom>
+          <a:noFill/>
+        </p:spPr>
+        <p:txBody>
+          <a:bodyPr wrap="none" rtlCol="0">
+            <a:spAutoFit/>
+          </a:bodyPr>
+          <a:lstStyle/>
+          <a:p>
+            <a:r>
+              <a:rPr lang="es-ES" sz="1400" dirty="0" smtClean="0"/>
+              <a:t>N=300; &lt;k&gt; = 1.0</a:t>
+            </a:r>
+            <a:endParaRPr lang="es-ES" sz="1400" dirty="0"/>
+          </a:p>
+        </p:txBody>
+      </p:sp>
+      <p:sp>
+        <p:nvSpPr>
+          <p:cNvPr id="5" name="CuadroTexto 4"/>
+          <p:cNvSpPr txBox="1"/>
+          <p:nvPr/>
+        </p:nvSpPr>
+        <p:spPr>
+          <a:xfrm>
+            <a:off x="5036716" y="4441996"/>
+            <a:ext cx="1409949" cy="307777"/>
+          </a:xfrm>
+          <a:prstGeom prst="rect">
+            <a:avLst/>
+          </a:prstGeom>
+          <a:noFill/>
+        </p:spPr>
+        <p:txBody>
+          <a:bodyPr wrap="none" rtlCol="0">
+            <a:spAutoFit/>
+          </a:bodyPr>
+          <a:lstStyle/>
+          <a:p>
+            <a:r>
+              <a:rPr lang="es-ES" sz="1400" dirty="0" smtClean="0"/>
+              <a:t>N=300; &lt;k&gt; = 3.0</a:t>
+            </a:r>
+            <a:endParaRPr lang="es-ES" sz="1400" dirty="0"/>
+          </a:p>
+        </p:txBody>
+      </p:sp>
+    </p:spTree>
+    <p:extLst>
+      <p:ext uri="{BB962C8B-B14F-4D97-AF65-F5344CB8AC3E}">
+        <p14:creationId xmlns:p14="http://schemas.microsoft.com/office/powerpoint/2010/main" val="2579316567"/>
+      </p:ext>
+    </p:extLst>
+  </p:cSld>
+  <p:clrMapOvr>
+    <a:masterClrMapping/>
+  </p:clrMapOvr>
+</p:sld>
+</file>
+
+<file path=ppt/slides/slide12.xml><?xml version="1.0" encoding="utf-8"?>
+<p:sld xmlns:a="http://schemas.openxmlformats.org/drawingml/2006/main" xmlns:r="http://schemas.openxmlformats.org/officeDocument/2006/relationships" xmlns:p="http://schemas.openxmlformats.org/presentationml/2006/main">
+  <p:cSld>
+    <p:spTree>
+      <p:nvGrpSpPr>
+        <p:cNvPr id="1" name=""/>
+        <p:cNvGrpSpPr/>
+        <p:nvPr/>
+      </p:nvGrpSpPr>
+      <p:grpSpPr>
+        <a:xfrm>
+          <a:off x="0" y="0"/>
+          <a:ext cx="0" cy="0"/>
+          <a:chOff x="0" y="0"/>
+          <a:chExt cx="0" cy="0"/>
+        </a:xfrm>
+      </p:grpSpPr>
+      <p:pic>
+        <p:nvPicPr>
           <p:cNvPr id="2" name="Imagen 1" descr="Captura de pantalla 2014-12-04 a la(s) 11.51.59.png"/>
           <p:cNvPicPr>
             <a:picLocks noChangeAspect="1"/>
@@ -3781,7 +4083,7 @@
 </p:sld>
 </file>
 
-<file path=ppt/slides/slide11.xml><?xml version="1.0" encoding="utf-8"?>
+<file path=ppt/slides/slide13.xml><?xml version="1.0" encoding="utf-8"?>
 <p:sld xmlns:a="http://schemas.openxmlformats.org/drawingml/2006/main" xmlns:r="http://schemas.openxmlformats.org/officeDocument/2006/relationships" xmlns:p="http://schemas.openxmlformats.org/presentationml/2006/main">
   <p:cSld>
     <p:spTree>
@@ -3901,7 +4203,7 @@
 </p:sld>
 </file>
 
-<file path=ppt/slides/slide12.xml><?xml version="1.0" encoding="utf-8"?>
+<file path=ppt/slides/slide14.xml><?xml version="1.0" encoding="utf-8"?>
 <p:sld xmlns:a="http://schemas.openxmlformats.org/drawingml/2006/main" xmlns:r="http://schemas.openxmlformats.org/officeDocument/2006/relationships" xmlns:p="http://schemas.openxmlformats.org/presentationml/2006/main">
   <p:cSld>
     <p:spTree>
@@ -3998,7 +4300,7 @@
 </p:sld>
 </file>
 
-<file path=ppt/slides/slide13.xml><?xml version="1.0" encoding="utf-8"?>
+<file path=ppt/slides/slide15.xml><?xml version="1.0" encoding="utf-8"?>
 <p:sld xmlns:a="http://schemas.openxmlformats.org/drawingml/2006/main" xmlns:r="http://schemas.openxmlformats.org/officeDocument/2006/relationships" xmlns:p="http://schemas.openxmlformats.org/presentationml/2006/main">
   <p:cSld>
     <p:spTree>
@@ -4095,7 +4397,7 @@
 </p:sld>
 </file>
 
-<file path=ppt/slides/slide14.xml><?xml version="1.0" encoding="utf-8"?>
+<file path=ppt/slides/slide16.xml><?xml version="1.0" encoding="utf-8"?>
 <p:sld xmlns:a="http://schemas.openxmlformats.org/drawingml/2006/main" xmlns:r="http://schemas.openxmlformats.org/officeDocument/2006/relationships" xmlns:p="http://schemas.openxmlformats.org/presentationml/2006/main">
   <p:cSld>
     <p:spTree>
@@ -4185,7 +4487,7 @@
 </p:sld>
 </file>
 
-<file path=ppt/slides/slide15.xml><?xml version="1.0" encoding="utf-8"?>
+<file path=ppt/slides/slide17.xml><?xml version="1.0" encoding="utf-8"?>
 <p:sld xmlns:a="http://schemas.openxmlformats.org/drawingml/2006/main" xmlns:r="http://schemas.openxmlformats.org/officeDocument/2006/relationships" xmlns:p="http://schemas.openxmlformats.org/presentationml/2006/main">
   <p:cSld>
     <p:spTree>
@@ -4312,7 +4614,7 @@
 </p:sld>
 </file>
 
-<file path=ppt/slides/slide16.xml><?xml version="1.0" encoding="utf-8"?>
+<file path=ppt/slides/slide18.xml><?xml version="1.0" encoding="utf-8"?>
 <p:sld xmlns:a="http://schemas.openxmlformats.org/drawingml/2006/main" xmlns:r="http://schemas.openxmlformats.org/officeDocument/2006/relationships" xmlns:p="http://schemas.openxmlformats.org/presentationml/2006/main">
   <p:cSld>
     <p:spTree>
@@ -4481,6 +4783,336 @@
       </p:grpSpPr>
       <p:pic>
         <p:nvPicPr>
+          <p:cNvPr id="2" name="Imagen 1" descr="Captura de pantalla 2014-12-30 a la(s) 12.14.59.png"/>
+          <p:cNvPicPr>
+            <a:picLocks noChangeAspect="1"/>
+          </p:cNvPicPr>
+          <p:nvPr/>
+        </p:nvPicPr>
+        <p:blipFill>
+          <a:blip r:embed="rId2">
+            <a:extLst>
+              <a:ext uri="{28A0092B-C50C-407E-A947-70E740481C1C}">
+                <a14:useLocalDpi xmlns:a14="http://schemas.microsoft.com/office/drawing/2010/main" val="0"/>
+              </a:ext>
+            </a:extLst>
+          </a:blip>
+          <a:stretch>
+            <a:fillRect/>
+          </a:stretch>
+        </p:blipFill>
+        <p:spPr>
+          <a:xfrm>
+            <a:off x="1337196" y="1956040"/>
+            <a:ext cx="2717075" cy="3068332"/>
+          </a:xfrm>
+          <a:prstGeom prst="rect">
+            <a:avLst/>
+          </a:prstGeom>
+        </p:spPr>
+      </p:pic>
+      <p:pic>
+        <p:nvPicPr>
+          <p:cNvPr id="3" name="Imagen 2" descr="Captura de pantalla 2014-12-30 a la(s) 12.15.09.png"/>
+          <p:cNvPicPr>
+            <a:picLocks noChangeAspect="1"/>
+          </p:cNvPicPr>
+          <p:nvPr/>
+        </p:nvPicPr>
+        <p:blipFill>
+          <a:blip r:embed="rId3">
+            <a:extLst>
+              <a:ext uri="{28A0092B-C50C-407E-A947-70E740481C1C}">
+                <a14:useLocalDpi xmlns:a14="http://schemas.microsoft.com/office/drawing/2010/main" val="0"/>
+              </a:ext>
+            </a:extLst>
+          </a:blip>
+          <a:stretch>
+            <a:fillRect/>
+          </a:stretch>
+        </p:blipFill>
+        <p:spPr>
+          <a:xfrm>
+            <a:off x="4076168" y="1998160"/>
+            <a:ext cx="2755828" cy="3026211"/>
+          </a:xfrm>
+          <a:prstGeom prst="rect">
+            <a:avLst/>
+          </a:prstGeom>
+        </p:spPr>
+      </p:pic>
+    </p:spTree>
+    <p:extLst>
+      <p:ext uri="{BB962C8B-B14F-4D97-AF65-F5344CB8AC3E}">
+        <p14:creationId xmlns:p14="http://schemas.microsoft.com/office/powerpoint/2010/main" val="692927998"/>
+      </p:ext>
+    </p:extLst>
+  </p:cSld>
+  <p:clrMapOvr>
+    <a:masterClrMapping/>
+  </p:clrMapOvr>
+</p:sld>
+</file>
+
+<file path=ppt/slides/slide3.xml><?xml version="1.0" encoding="utf-8"?>
+<p:sld xmlns:a="http://schemas.openxmlformats.org/drawingml/2006/main" xmlns:r="http://schemas.openxmlformats.org/officeDocument/2006/relationships" xmlns:p="http://schemas.openxmlformats.org/presentationml/2006/main">
+  <p:cSld>
+    <p:spTree>
+      <p:nvGrpSpPr>
+        <p:cNvPr id="1" name=""/>
+        <p:cNvGrpSpPr/>
+        <p:nvPr/>
+      </p:nvGrpSpPr>
+      <p:grpSpPr>
+        <a:xfrm>
+          <a:off x="0" y="0"/>
+          <a:ext cx="0" cy="0"/>
+          <a:chOff x="0" y="0"/>
+          <a:chExt cx="0" cy="0"/>
+        </a:xfrm>
+      </p:grpSpPr>
+      <p:pic>
+        <p:nvPicPr>
+          <p:cNvPr id="2" name="Imagen 1" descr="Captura de pantalla 2014-12-30 a la(s) 13.08.26.png"/>
+          <p:cNvPicPr>
+            <a:picLocks noChangeAspect="1"/>
+          </p:cNvPicPr>
+          <p:nvPr/>
+        </p:nvPicPr>
+        <p:blipFill>
+          <a:blip r:embed="rId2">
+            <a:extLst>
+              <a:ext uri="{28A0092B-C50C-407E-A947-70E740481C1C}">
+                <a14:useLocalDpi xmlns:a14="http://schemas.microsoft.com/office/drawing/2010/main" val="0"/>
+              </a:ext>
+            </a:extLst>
+          </a:blip>
+          <a:stretch>
+            <a:fillRect/>
+          </a:stretch>
+        </p:blipFill>
+        <p:spPr>
+          <a:xfrm>
+            <a:off x="2515947" y="2711835"/>
+            <a:ext cx="4127500" cy="2273300"/>
+          </a:xfrm>
+          <a:prstGeom prst="rect">
+            <a:avLst/>
+          </a:prstGeom>
+        </p:spPr>
+      </p:pic>
+      <p:sp>
+        <p:nvSpPr>
+          <p:cNvPr id="4" name="Rectángulo 3"/>
+          <p:cNvSpPr/>
+          <p:nvPr/>
+        </p:nvSpPr>
+        <p:spPr>
+          <a:xfrm>
+            <a:off x="4756727" y="2547697"/>
+            <a:ext cx="1871326" cy="1069879"/>
+          </a:xfrm>
+          <a:prstGeom prst="rect">
+            <a:avLst/>
+          </a:prstGeom>
+          <a:solidFill>
+            <a:schemeClr val="bg1"/>
+          </a:solidFill>
+          <a:ln>
+            <a:noFill/>
+          </a:ln>
+          <a:effectLst/>
+        </p:spPr>
+        <p:style>
+          <a:lnRef idx="1">
+            <a:schemeClr val="accent1"/>
+          </a:lnRef>
+          <a:fillRef idx="3">
+            <a:schemeClr val="accent1"/>
+          </a:fillRef>
+          <a:effectRef idx="2">
+            <a:schemeClr val="accent1"/>
+          </a:effectRef>
+          <a:fontRef idx="minor">
+            <a:schemeClr val="lt1"/>
+          </a:fontRef>
+        </p:style>
+        <p:txBody>
+          <a:bodyPr rtlCol="0" anchor="ctr"/>
+          <a:lstStyle/>
+          <a:p>
+            <a:pPr algn="ctr"/>
+            <a:endParaRPr lang="es-ES"/>
+          </a:p>
+        </p:txBody>
+      </p:sp>
+      <p:sp>
+        <p:nvSpPr>
+          <p:cNvPr id="5" name="Rectángulo 4"/>
+          <p:cNvSpPr/>
+          <p:nvPr/>
+        </p:nvSpPr>
+        <p:spPr>
+          <a:xfrm rot="5400000">
+            <a:off x="6096481" y="3423614"/>
+            <a:ext cx="1871326" cy="1069879"/>
+          </a:xfrm>
+          <a:prstGeom prst="rect">
+            <a:avLst/>
+          </a:prstGeom>
+          <a:solidFill>
+            <a:schemeClr val="bg1"/>
+          </a:solidFill>
+          <a:ln>
+            <a:noFill/>
+          </a:ln>
+          <a:effectLst/>
+        </p:spPr>
+        <p:style>
+          <a:lnRef idx="1">
+            <a:schemeClr val="accent1"/>
+          </a:lnRef>
+          <a:fillRef idx="3">
+            <a:schemeClr val="accent1"/>
+          </a:fillRef>
+          <a:effectRef idx="2">
+            <a:schemeClr val="accent1"/>
+          </a:effectRef>
+          <a:fontRef idx="minor">
+            <a:schemeClr val="lt1"/>
+          </a:fontRef>
+        </p:style>
+        <p:txBody>
+          <a:bodyPr rtlCol="0" anchor="ctr"/>
+          <a:lstStyle/>
+          <a:p>
+            <a:pPr algn="ctr"/>
+            <a:endParaRPr lang="es-ES"/>
+          </a:p>
+        </p:txBody>
+      </p:sp>
+      <p:sp>
+        <p:nvSpPr>
+          <p:cNvPr id="6" name="Rectángulo 5"/>
+          <p:cNvSpPr/>
+          <p:nvPr/>
+        </p:nvSpPr>
+        <p:spPr>
+          <a:xfrm rot="5400000">
+            <a:off x="5692389" y="2487951"/>
+            <a:ext cx="1871326" cy="1069879"/>
+          </a:xfrm>
+          <a:prstGeom prst="rect">
+            <a:avLst/>
+          </a:prstGeom>
+          <a:solidFill>
+            <a:schemeClr val="bg1"/>
+          </a:solidFill>
+          <a:ln>
+            <a:noFill/>
+          </a:ln>
+          <a:effectLst/>
+        </p:spPr>
+        <p:style>
+          <a:lnRef idx="1">
+            <a:schemeClr val="accent1"/>
+          </a:lnRef>
+          <a:fillRef idx="3">
+            <a:schemeClr val="accent1"/>
+          </a:fillRef>
+          <a:effectRef idx="2">
+            <a:schemeClr val="accent1"/>
+          </a:effectRef>
+          <a:fontRef idx="minor">
+            <a:schemeClr val="lt1"/>
+          </a:fontRef>
+        </p:style>
+        <p:txBody>
+          <a:bodyPr rtlCol="0" anchor="ctr"/>
+          <a:lstStyle/>
+          <a:p>
+            <a:pPr algn="ctr"/>
+            <a:endParaRPr lang="es-ES"/>
+          </a:p>
+        </p:txBody>
+      </p:sp>
+      <p:sp>
+        <p:nvSpPr>
+          <p:cNvPr id="7" name="Rectángulo 6"/>
+          <p:cNvSpPr/>
+          <p:nvPr/>
+        </p:nvSpPr>
+        <p:spPr>
+          <a:xfrm>
+            <a:off x="2800158" y="1799551"/>
+            <a:ext cx="1871326" cy="1069879"/>
+          </a:xfrm>
+          <a:prstGeom prst="rect">
+            <a:avLst/>
+          </a:prstGeom>
+          <a:solidFill>
+            <a:schemeClr val="bg1"/>
+          </a:solidFill>
+          <a:ln>
+            <a:noFill/>
+          </a:ln>
+          <a:effectLst/>
+        </p:spPr>
+        <p:style>
+          <a:lnRef idx="1">
+            <a:schemeClr val="accent1"/>
+          </a:lnRef>
+          <a:fillRef idx="3">
+            <a:schemeClr val="accent1"/>
+          </a:fillRef>
+          <a:effectRef idx="2">
+            <a:schemeClr val="accent1"/>
+          </a:effectRef>
+          <a:fontRef idx="minor">
+            <a:schemeClr val="lt1"/>
+          </a:fontRef>
+        </p:style>
+        <p:txBody>
+          <a:bodyPr rtlCol="0" anchor="ctr"/>
+          <a:lstStyle/>
+          <a:p>
+            <a:pPr algn="ctr"/>
+            <a:endParaRPr lang="es-ES"/>
+          </a:p>
+        </p:txBody>
+      </p:sp>
+    </p:spTree>
+    <p:extLst>
+      <p:ext uri="{BB962C8B-B14F-4D97-AF65-F5344CB8AC3E}">
+        <p14:creationId xmlns:p14="http://schemas.microsoft.com/office/powerpoint/2010/main" val="250171469"/>
+      </p:ext>
+    </p:extLst>
+  </p:cSld>
+  <p:clrMapOvr>
+    <a:masterClrMapping/>
+  </p:clrMapOvr>
+</p:sld>
+</file>
+
+<file path=ppt/slides/slide4.xml><?xml version="1.0" encoding="utf-8"?>
+<p:sld xmlns:a="http://schemas.openxmlformats.org/drawingml/2006/main" xmlns:r="http://schemas.openxmlformats.org/officeDocument/2006/relationships" xmlns:p="http://schemas.openxmlformats.org/presentationml/2006/main">
+  <p:cSld>
+    <p:spTree>
+      <p:nvGrpSpPr>
+        <p:cNvPr id="1" name=""/>
+        <p:cNvGrpSpPr/>
+        <p:nvPr/>
+      </p:nvGrpSpPr>
+      <p:grpSpPr>
+        <a:xfrm>
+          <a:off x="0" y="0"/>
+          <a:ext cx="0" cy="0"/>
+          <a:chOff x="0" y="0"/>
+          <a:chExt cx="0" cy="0"/>
+        </a:xfrm>
+      </p:grpSpPr>
+      <p:pic>
+        <p:nvPicPr>
           <p:cNvPr id="2" name="Picture 8"/>
           <p:cNvPicPr>
             <a:picLocks noChangeAspect="1"/>
@@ -4607,7 +5239,7 @@
 </p:sld>
 </file>
 
-<file path=ppt/slides/slide3.xml><?xml version="1.0" encoding="utf-8"?>
+<file path=ppt/slides/slide5.xml><?xml version="1.0" encoding="utf-8"?>
 <p:sld xmlns:a="http://schemas.openxmlformats.org/drawingml/2006/main" xmlns:r="http://schemas.openxmlformats.org/officeDocument/2006/relationships" xmlns:p="http://schemas.openxmlformats.org/presentationml/2006/main">
   <p:cSld>
     <p:spTree>
@@ -4884,7 +5516,7 @@
 </p:sld>
 </file>
 
-<file path=ppt/slides/slide4.xml><?xml version="1.0" encoding="utf-8"?>
+<file path=ppt/slides/slide6.xml><?xml version="1.0" encoding="utf-8"?>
 <p:sld xmlns:a="http://schemas.openxmlformats.org/drawingml/2006/main" xmlns:r="http://schemas.openxmlformats.org/officeDocument/2006/relationships" xmlns:p="http://schemas.openxmlformats.org/presentationml/2006/main">
   <p:cSld>
     <p:spTree>
@@ -5151,7 +5783,7 @@
 </p:sld>
 </file>
 
-<file path=ppt/slides/slide5.xml><?xml version="1.0" encoding="utf-8"?>
+<file path=ppt/slides/slide7.xml><?xml version="1.0" encoding="utf-8"?>
 <p:sld xmlns:a="http://schemas.openxmlformats.org/drawingml/2006/main" xmlns:r="http://schemas.openxmlformats.org/officeDocument/2006/relationships" xmlns:p="http://schemas.openxmlformats.org/presentationml/2006/main">
   <p:cSld>
     <p:spTree>
@@ -5279,7 +5911,7 @@
 </p:sld>
 </file>
 
-<file path=ppt/slides/slide6.xml><?xml version="1.0" encoding="utf-8"?>
+<file path=ppt/slides/slide8.xml><?xml version="1.0" encoding="utf-8"?>
 <p:sld xmlns:a="http://schemas.openxmlformats.org/drawingml/2006/main" xmlns:r="http://schemas.openxmlformats.org/officeDocument/2006/relationships" xmlns:p="http://schemas.openxmlformats.org/presentationml/2006/main">
   <p:cSld>
     <p:spTree>
@@ -5407,7 +6039,7 @@
 </p:sld>
 </file>
 
-<file path=ppt/slides/slide7.xml><?xml version="1.0" encoding="utf-8"?>
+<file path=ppt/slides/slide9.xml><?xml version="1.0" encoding="utf-8"?>
 <p:sld xmlns:a="http://schemas.openxmlformats.org/drawingml/2006/main" xmlns:r="http://schemas.openxmlformats.org/officeDocument/2006/relationships" xmlns:p="http://schemas.openxmlformats.org/presentationml/2006/main">
   <p:cSld>
     <p:spTree>
@@ -6034,306 +6666,6 @@
     <p:extLst>
       <p:ext uri="{BB962C8B-B14F-4D97-AF65-F5344CB8AC3E}">
         <p14:creationId xmlns:p14="http://schemas.microsoft.com/office/powerpoint/2010/main" val="842092529"/>
-      </p:ext>
-    </p:extLst>
-  </p:cSld>
-  <p:clrMapOvr>
-    <a:masterClrMapping/>
-  </p:clrMapOvr>
-</p:sld>
-</file>
-
-<file path=ppt/slides/slide8.xml><?xml version="1.0" encoding="utf-8"?>
-<p:sld xmlns:a="http://schemas.openxmlformats.org/drawingml/2006/main" xmlns:r="http://schemas.openxmlformats.org/officeDocument/2006/relationships" xmlns:p="http://schemas.openxmlformats.org/presentationml/2006/main">
-  <p:cSld>
-    <p:spTree>
-      <p:nvGrpSpPr>
-        <p:cNvPr id="1" name=""/>
-        <p:cNvGrpSpPr/>
-        <p:nvPr/>
-      </p:nvGrpSpPr>
-      <p:grpSpPr>
-        <a:xfrm>
-          <a:off x="0" y="0"/>
-          <a:ext cx="0" cy="0"/>
-          <a:chOff x="0" y="0"/>
-          <a:chExt cx="0" cy="0"/>
-        </a:xfrm>
-      </p:grpSpPr>
-      <p:pic>
-        <p:nvPicPr>
-          <p:cNvPr id="2" name="Imagen 1" descr="Captura de pantalla 2014-12-04 a la(s) 17.09.48.png"/>
-          <p:cNvPicPr>
-            <a:picLocks noChangeAspect="1"/>
-          </p:cNvPicPr>
-          <p:nvPr/>
-        </p:nvPicPr>
-        <p:blipFill>
-          <a:blip r:embed="rId2">
-            <a:extLst>
-              <a:ext uri="{28A0092B-C50C-407E-A947-70E740481C1C}">
-                <a14:useLocalDpi xmlns:a14="http://schemas.microsoft.com/office/drawing/2010/main" val="0"/>
-              </a:ext>
-            </a:extLst>
-          </a:blip>
-          <a:stretch>
-            <a:fillRect/>
-          </a:stretch>
-        </p:blipFill>
-        <p:spPr>
-          <a:xfrm>
-            <a:off x="783389" y="1915992"/>
-            <a:ext cx="2561715" cy="2684537"/>
-          </a:xfrm>
-          <a:prstGeom prst="rect">
-            <a:avLst/>
-          </a:prstGeom>
-        </p:spPr>
-      </p:pic>
-      <p:pic>
-        <p:nvPicPr>
-          <p:cNvPr id="3" name="Imagen 2" descr="Captura de pantalla 2014-12-04 a la(s) 17.10.27.png"/>
-          <p:cNvPicPr>
-            <a:picLocks noChangeAspect="1"/>
-          </p:cNvPicPr>
-          <p:nvPr/>
-        </p:nvPicPr>
-        <p:blipFill>
-          <a:blip r:embed="rId3">
-            <a:extLst>
-              <a:ext uri="{28A0092B-C50C-407E-A947-70E740481C1C}">
-                <a14:useLocalDpi xmlns:a14="http://schemas.microsoft.com/office/drawing/2010/main" val="0"/>
-              </a:ext>
-            </a:extLst>
-          </a:blip>
-          <a:stretch>
-            <a:fillRect/>
-          </a:stretch>
-        </p:blipFill>
-        <p:spPr>
-          <a:xfrm>
-            <a:off x="3515491" y="1926153"/>
-            <a:ext cx="2561715" cy="2672840"/>
-          </a:xfrm>
-          <a:prstGeom prst="rect">
-            <a:avLst/>
-          </a:prstGeom>
-        </p:spPr>
-      </p:pic>
-      <p:sp>
-        <p:nvSpPr>
-          <p:cNvPr id="4" name="CuadroTexto 3"/>
-          <p:cNvSpPr txBox="1"/>
-          <p:nvPr/>
-        </p:nvSpPr>
-        <p:spPr>
-          <a:xfrm>
-            <a:off x="1495562" y="4595271"/>
-            <a:ext cx="1162648" cy="307777"/>
-          </a:xfrm>
-          <a:prstGeom prst="rect">
-            <a:avLst/>
-          </a:prstGeom>
-          <a:noFill/>
-        </p:spPr>
-        <p:txBody>
-          <a:bodyPr wrap="none" rtlCol="0">
-            <a:spAutoFit/>
-          </a:bodyPr>
-          <a:lstStyle/>
-          <a:p>
-            <a:r>
-              <a:rPr lang="es-ES" sz="1400" dirty="0" smtClean="0"/>
-              <a:t>N=200; p=0.0</a:t>
-            </a:r>
-            <a:endParaRPr lang="es-ES" sz="1400" dirty="0"/>
-          </a:p>
-        </p:txBody>
-      </p:sp>
-      <p:sp>
-        <p:nvSpPr>
-          <p:cNvPr id="5" name="CuadroTexto 4"/>
-          <p:cNvSpPr txBox="1"/>
-          <p:nvPr/>
-        </p:nvSpPr>
-        <p:spPr>
-          <a:xfrm>
-            <a:off x="4247392" y="4600639"/>
-            <a:ext cx="1253643" cy="307777"/>
-          </a:xfrm>
-          <a:prstGeom prst="rect">
-            <a:avLst/>
-          </a:prstGeom>
-          <a:noFill/>
-        </p:spPr>
-        <p:txBody>
-          <a:bodyPr wrap="none" rtlCol="0">
-            <a:spAutoFit/>
-          </a:bodyPr>
-          <a:lstStyle/>
-          <a:p>
-            <a:r>
-              <a:rPr lang="es-ES" sz="1400" dirty="0" smtClean="0"/>
-              <a:t>N=200; p=0.10</a:t>
-            </a:r>
-            <a:endParaRPr lang="es-ES" sz="1400" dirty="0"/>
-          </a:p>
-        </p:txBody>
-      </p:sp>
-    </p:spTree>
-    <p:extLst>
-      <p:ext uri="{BB962C8B-B14F-4D97-AF65-F5344CB8AC3E}">
-        <p14:creationId xmlns:p14="http://schemas.microsoft.com/office/powerpoint/2010/main" val="2174899281"/>
-      </p:ext>
-    </p:extLst>
-  </p:cSld>
-  <p:clrMapOvr>
-    <a:masterClrMapping/>
-  </p:clrMapOvr>
-</p:sld>
-</file>
-
-<file path=ppt/slides/slide9.xml><?xml version="1.0" encoding="utf-8"?>
-<p:sld xmlns:a="http://schemas.openxmlformats.org/drawingml/2006/main" xmlns:r="http://schemas.openxmlformats.org/officeDocument/2006/relationships" xmlns:p="http://schemas.openxmlformats.org/presentationml/2006/main">
-  <p:cSld>
-    <p:spTree>
-      <p:nvGrpSpPr>
-        <p:cNvPr id="1" name=""/>
-        <p:cNvGrpSpPr/>
-        <p:nvPr/>
-      </p:nvGrpSpPr>
-      <p:grpSpPr>
-        <a:xfrm>
-          <a:off x="0" y="0"/>
-          <a:ext cx="0" cy="0"/>
-          <a:chOff x="0" y="0"/>
-          <a:chExt cx="0" cy="0"/>
-        </a:xfrm>
-      </p:grpSpPr>
-      <p:pic>
-        <p:nvPicPr>
-          <p:cNvPr id="2" name="Imagen 1" descr="Captura de pantalla 2014-12-04 a la(s) 11.30.20.png"/>
-          <p:cNvPicPr>
-            <a:picLocks noChangeAspect="1"/>
-          </p:cNvPicPr>
-          <p:nvPr/>
-        </p:nvPicPr>
-        <p:blipFill>
-          <a:blip r:embed="rId2">
-            <a:extLst>
-              <a:ext uri="{28A0092B-C50C-407E-A947-70E740481C1C}">
-                <a14:useLocalDpi xmlns:a14="http://schemas.microsoft.com/office/drawing/2010/main" val="0"/>
-              </a:ext>
-            </a:extLst>
-          </a:blip>
-          <a:stretch>
-            <a:fillRect/>
-          </a:stretch>
-        </p:blipFill>
-        <p:spPr>
-          <a:xfrm>
-            <a:off x="534709" y="961380"/>
-            <a:ext cx="3341838" cy="3482477"/>
-          </a:xfrm>
-          <a:prstGeom prst="rect">
-            <a:avLst/>
-          </a:prstGeom>
-        </p:spPr>
-      </p:pic>
-      <p:pic>
-        <p:nvPicPr>
-          <p:cNvPr id="3" name="Imagen 2" descr="Captura de pantalla 2014-12-04 a la(s) 11.29.34.png"/>
-          <p:cNvPicPr>
-            <a:picLocks noChangeAspect="1"/>
-          </p:cNvPicPr>
-          <p:nvPr/>
-        </p:nvPicPr>
-        <p:blipFill>
-          <a:blip r:embed="rId3">
-            <a:extLst>
-              <a:ext uri="{28A0092B-C50C-407E-A947-70E740481C1C}">
-                <a14:useLocalDpi xmlns:a14="http://schemas.microsoft.com/office/drawing/2010/main" val="0"/>
-              </a:ext>
-            </a:extLst>
-          </a:blip>
-          <a:stretch>
-            <a:fillRect/>
-          </a:stretch>
-        </p:blipFill>
-        <p:spPr>
-          <a:xfrm>
-            <a:off x="4038959" y="961380"/>
-            <a:ext cx="3375530" cy="3482477"/>
-          </a:xfrm>
-          <a:prstGeom prst="rect">
-            <a:avLst/>
-          </a:prstGeom>
-        </p:spPr>
-      </p:pic>
-      <p:sp>
-        <p:nvSpPr>
-          <p:cNvPr id="4" name="CuadroTexto 3"/>
-          <p:cNvSpPr txBox="1"/>
-          <p:nvPr/>
-        </p:nvSpPr>
-        <p:spPr>
-          <a:xfrm>
-            <a:off x="1495562" y="4441996"/>
-            <a:ext cx="1409949" cy="307777"/>
-          </a:xfrm>
-          <a:prstGeom prst="rect">
-            <a:avLst/>
-          </a:prstGeom>
-          <a:noFill/>
-        </p:spPr>
-        <p:txBody>
-          <a:bodyPr wrap="none" rtlCol="0">
-            <a:spAutoFit/>
-          </a:bodyPr>
-          <a:lstStyle/>
-          <a:p>
-            <a:r>
-              <a:rPr lang="es-ES" sz="1400" dirty="0" smtClean="0"/>
-              <a:t>N=300; &lt;k&gt; = 1.0</a:t>
-            </a:r>
-            <a:endParaRPr lang="es-ES" sz="1400" dirty="0"/>
-          </a:p>
-        </p:txBody>
-      </p:sp>
-      <p:sp>
-        <p:nvSpPr>
-          <p:cNvPr id="5" name="CuadroTexto 4"/>
-          <p:cNvSpPr txBox="1"/>
-          <p:nvPr/>
-        </p:nvSpPr>
-        <p:spPr>
-          <a:xfrm>
-            <a:off x="5036716" y="4441996"/>
-            <a:ext cx="1409949" cy="307777"/>
-          </a:xfrm>
-          <a:prstGeom prst="rect">
-            <a:avLst/>
-          </a:prstGeom>
-          <a:noFill/>
-        </p:spPr>
-        <p:txBody>
-          <a:bodyPr wrap="none" rtlCol="0">
-            <a:spAutoFit/>
-          </a:bodyPr>
-          <a:lstStyle/>
-          <a:p>
-            <a:r>
-              <a:rPr lang="es-ES" sz="1400" dirty="0" smtClean="0"/>
-              <a:t>N=300; &lt;k&gt; = 3.0</a:t>
-            </a:r>
-            <a:endParaRPr lang="es-ES" sz="1400" dirty="0"/>
-          </a:p>
-        </p:txBody>
-      </p:sp>
-    </p:spTree>
-    <p:extLst>
-      <p:ext uri="{BB962C8B-B14F-4D97-AF65-F5344CB8AC3E}">
-        <p14:creationId xmlns:p14="http://schemas.microsoft.com/office/powerpoint/2010/main" val="2579316567"/>
       </p:ext>
     </p:extLst>
   </p:cSld>

</xml_diff>